<commit_message>
add append / prepend section
</commit_message>
<xml_diff>
--- a/hesc_slides.pptx
+++ b/hesc_slides.pptx
@@ -5,10 +5,10 @@
     <p:sldMasterId id="2147483648" r:id="rId1"/>
   </p:sldMasterIdLst>
   <p:notesMasterIdLst>
-    <p:notesMasterId r:id="rId10"/>
+    <p:notesMasterId r:id="rId11"/>
   </p:notesMasterIdLst>
   <p:handoutMasterIdLst>
-    <p:handoutMasterId r:id="rId11"/>
+    <p:handoutMasterId r:id="rId12"/>
   </p:handoutMasterIdLst>
   <p:sldIdLst>
     <p:sldId id="256" r:id="rId2"/>
@@ -18,26 +18,27 @@
     <p:sldId id="259" r:id="rId6"/>
     <p:sldId id="260" r:id="rId7"/>
     <p:sldId id="266" r:id="rId8"/>
-    <p:sldId id="265" r:id="rId9"/>
+    <p:sldId id="267" r:id="rId9"/>
+    <p:sldId id="265" r:id="rId10"/>
   </p:sldIdLst>
   <p:sldSz cx="9144000" cy="6858000" type="screen4x3"/>
   <p:notesSz cx="6858000" cy="9144000"/>
   <p:embeddedFontLst>
     <p:embeddedFont>
       <p:font typeface="AA Zuehlke" panose="02000503060000020004" pitchFamily="2" charset="0"/>
-      <p:regular r:id="rId12"/>
-      <p:italic r:id="rId13"/>
+      <p:regular r:id="rId13"/>
+      <p:italic r:id="rId14"/>
     </p:embeddedFont>
     <p:embeddedFont>
       <p:font typeface="Consolas" panose="020B0609020204030204" pitchFamily="49" charset="0"/>
-      <p:regular r:id="rId14"/>
-      <p:bold r:id="rId15"/>
-      <p:italic r:id="rId16"/>
-      <p:boldItalic r:id="rId17"/>
+      <p:regular r:id="rId15"/>
+      <p:bold r:id="rId16"/>
+      <p:italic r:id="rId17"/>
+      <p:boldItalic r:id="rId18"/>
     </p:embeddedFont>
   </p:embeddedFontLst>
   <p:custDataLst>
-    <p:tags r:id="rId18"/>
+    <p:tags r:id="rId19"/>
   </p:custDataLst>
   <p:defaultTextStyle>
     <a:defPPr>
@@ -845,14 +846,14 @@
               <a:rPr lang="de-CH" smtClean="0"/>
               <a:t>Slide </a:t>
             </a:r>
-            <a:fld id="{ECE9629B-9647-4835-AB1C-37A457C59234}" type="slidenum">
+            <a:fld id="{BF7F65D6-E0EC-4E53-9946-76BB26DBB39D}" type="slidenum">
               <a:rPr smtClean="0"/>
               <a:pPr/>
               <a:t>‹#›</a:t>
             </a:fld>
             <a:r>
               <a:rPr lang="de-CH" smtClean="0"/>
-              <a:t> of 8</a:t>
+              <a:t> of 9</a:t>
             </a:r>
             <a:endParaRPr dirty="0"/>
           </a:p>
@@ -1169,14 +1170,14 @@
               <a:rPr lang="de-CH" smtClean="0"/>
               <a:t>Slide </a:t>
             </a:r>
-            <a:fld id="{873D4377-A358-4E03-A4E6-FDC1C104949D}" type="slidenum">
+            <a:fld id="{37538ACF-D7C1-4D39-A08C-8647BDE3B254}" type="slidenum">
               <a:rPr smtClean="0"/>
               <a:pPr/>
               <a:t>‹#›</a:t>
             </a:fld>
             <a:r>
               <a:rPr lang="de-CH" smtClean="0"/>
-              <a:t> of 8</a:t>
+              <a:t> of 9</a:t>
             </a:r>
             <a:endParaRPr dirty="0"/>
           </a:p>
@@ -1471,14 +1472,14 @@
               <a:rPr lang="de-CH" smtClean="0"/>
               <a:t>Slide </a:t>
             </a:r>
-            <a:fld id="{B3D0DF4B-00EB-488C-B671-453C9040EEDF}" type="slidenum">
+            <a:fld id="{7C7C95A3-E56C-4C09-BA7E-F5B5876AE206}" type="slidenum">
               <a:rPr smtClean="0"/>
               <a:pPr/>
               <a:t>‹#›</a:t>
             </a:fld>
             <a:r>
               <a:rPr lang="de-CH" smtClean="0"/>
-              <a:t> of 8</a:t>
+              <a:t> of 9</a:t>
             </a:r>
             <a:endParaRPr dirty="0"/>
           </a:p>
@@ -1803,14 +1804,14 @@
               <a:rPr lang="de-CH" smtClean="0"/>
               <a:t>Slide </a:t>
             </a:r>
-            <a:fld id="{A391D8D8-7E6E-4262-B73A-C8CB4BF5C4DE}" type="slidenum">
+            <a:fld id="{48A0E61A-F99F-4166-9400-1F53183BF6C8}" type="slidenum">
               <a:rPr smtClean="0"/>
               <a:pPr/>
               <a:t>‹#›</a:t>
             </a:fld>
             <a:r>
               <a:rPr lang="de-CH" smtClean="0"/>
-              <a:t> of 8</a:t>
+              <a:t> of 9</a:t>
             </a:r>
             <a:endParaRPr dirty="0"/>
           </a:p>
@@ -2137,14 +2138,14 @@
               <a:rPr lang="de-CH" smtClean="0"/>
               <a:t>Slide </a:t>
             </a:r>
-            <a:fld id="{67913A4B-306B-46F6-BB5F-522C264070D5}" type="slidenum">
+            <a:fld id="{0E02B6C7-7D22-4383-B9D5-52E56BFB5CAB}" type="slidenum">
               <a:rPr smtClean="0"/>
               <a:pPr/>
               <a:t>‹#›</a:t>
             </a:fld>
             <a:r>
               <a:rPr lang="de-CH" smtClean="0"/>
-              <a:t> of 8</a:t>
+              <a:t> of 9</a:t>
             </a:r>
             <a:endParaRPr dirty="0"/>
           </a:p>
@@ -2567,14 +2568,14 @@
               <a:rPr lang="de-CH" smtClean="0"/>
               <a:t>Slide </a:t>
             </a:r>
-            <a:fld id="{5C289A6F-A83F-4DDC-8A77-009CD687EA1E}" type="slidenum">
+            <a:fld id="{6130FCF3-B8A7-484B-B1C8-A23CFE400485}" type="slidenum">
               <a:rPr smtClean="0"/>
               <a:pPr/>
               <a:t>‹#›</a:t>
             </a:fld>
             <a:r>
               <a:rPr lang="de-CH" smtClean="0"/>
-              <a:t> of 8</a:t>
+              <a:t> of 9</a:t>
             </a:r>
             <a:endParaRPr dirty="0"/>
           </a:p>
@@ -3285,14 +3286,14 @@
               <a:rPr lang="de-CH" smtClean="0"/>
               <a:t>Slide </a:t>
             </a:r>
-            <a:fld id="{E1F8B51B-2252-4E73-BE14-CD6AAF5228DF}" type="slidenum">
+            <a:fld id="{F939E486-6CE5-4463-A306-A892B5C9F9C8}" type="slidenum">
               <a:rPr smtClean="0"/>
               <a:pPr/>
               <a:t>‹#›</a:t>
             </a:fld>
             <a:r>
               <a:rPr lang="de-CH" smtClean="0"/>
-              <a:t> of 8</a:t>
+              <a:t> of 9</a:t>
             </a:r>
             <a:endParaRPr dirty="0"/>
           </a:p>
@@ -3591,14 +3592,14 @@
               <a:rPr lang="de-CH" smtClean="0"/>
               <a:t>Slide </a:t>
             </a:r>
-            <a:fld id="{06D94193-9B76-4101-A15B-89F882B3F48B}" type="slidenum">
+            <a:fld id="{CB67DC54-FDA3-4C1C-BD36-6B322607EC97}" type="slidenum">
               <a:rPr smtClean="0"/>
               <a:pPr/>
               <a:t>‹#›</a:t>
             </a:fld>
             <a:r>
               <a:rPr lang="de-CH" smtClean="0"/>
-              <a:t> of 8</a:t>
+              <a:t> of 9</a:t>
             </a:r>
             <a:endParaRPr dirty="0"/>
           </a:p>
@@ -4118,14 +4119,14 @@
               <a:rPr lang="de-CH" smtClean="0"/>
               <a:t>Slide </a:t>
             </a:r>
-            <a:fld id="{7103915C-1D2D-4D64-A18A-A69681765F97}" type="slidenum">
+            <a:fld id="{34EBFDCD-70A7-427F-998C-90EAA7B514B6}" type="slidenum">
               <a:rPr smtClean="0"/>
               <a:pPr/>
               <a:t>‹#›</a:t>
             </a:fld>
             <a:r>
               <a:rPr lang="de-CH" smtClean="0"/>
-              <a:t> of 8</a:t>
+              <a:t> of 9</a:t>
             </a:r>
             <a:endParaRPr dirty="0"/>
           </a:p>
@@ -4516,14 +4517,14 @@
               <a:rPr lang="de-CH" smtClean="0"/>
               <a:t>Slide </a:t>
             </a:r>
-            <a:fld id="{57BC55C2-BC2D-4171-95A2-C33B790E4398}" type="slidenum">
+            <a:fld id="{20F51C58-615B-4CD0-B97B-F9ADDDE3D638}" type="slidenum">
               <a:rPr smtClean="0"/>
               <a:pPr/>
               <a:t>‹#›</a:t>
             </a:fld>
             <a:r>
               <a:rPr lang="de-CH" smtClean="0"/>
-              <a:t> of 8</a:t>
+              <a:t> of 9</a:t>
             </a:r>
             <a:endParaRPr dirty="0"/>
           </a:p>
@@ -4746,14 +4747,14 @@
               <a:rPr lang="de-CH" smtClean="0"/>
               <a:t>Slide </a:t>
             </a:r>
-            <a:fld id="{07AA4DEB-CB92-41F4-86F3-63034F814170}" type="slidenum">
+            <a:fld id="{6AD167B2-B74A-4025-884B-D4B25B91EAB5}" type="slidenum">
               <a:rPr smtClean="0"/>
               <a:pPr/>
               <a:t>‹#›</a:t>
             </a:fld>
             <a:r>
               <a:rPr lang="de-CH" smtClean="0"/>
-              <a:t> of 8</a:t>
+              <a:t> of 9</a:t>
             </a:r>
             <a:endParaRPr dirty="0"/>
           </a:p>
@@ -5024,14 +5025,14 @@
               <a:rPr lang="de-CH" smtClean="0"/>
               <a:t>Slide </a:t>
             </a:r>
-            <a:fld id="{D9FCBA1E-C2FE-4AA0-965C-738AF7F0D40E}" type="slidenum">
+            <a:fld id="{E1FD0774-CC6E-4021-9CC6-4B6372FC63F7}" type="slidenum">
               <a:rPr smtClean="0"/>
               <a:pPr/>
               <a:t>‹#›</a:t>
             </a:fld>
             <a:r>
               <a:rPr lang="de-CH" smtClean="0"/>
-              <a:t> of 8</a:t>
+              <a:t> of 9</a:t>
             </a:r>
             <a:endParaRPr dirty="0"/>
           </a:p>
@@ -5074,14 +5075,6 @@
               </a:rPr>
               <a:t>© Zühlke 2015</a:t>
             </a:r>
-            <a:endParaRPr lang="de-CH" sz="700" kern="1200" noProof="1" smtClean="0">
-              <a:solidFill>
-                <a:srgbClr val="4D4D4D"/>
-              </a:solidFill>
-              <a:latin typeface="AA Zuehlke" pitchFamily="2" charset="0"/>
-              <a:ea typeface="+mn-ea"/>
-              <a:cs typeface="+mn-cs"/>
-            </a:endParaRPr>
           </a:p>
         </p:txBody>
       </p:sp>
@@ -5503,13 +5496,13 @@
               <a:rPr lang="de-CH" smtClean="0"/>
               <a:t>Slide </a:t>
             </a:r>
-            <a:fld id="{CF9B78EC-DAB9-4030-9B08-0DA57AC36FFD}" type="slidenum">
+            <a:fld id="{17B2F4A2-9383-457B-92B8-B3EE60B0B8FE}" type="slidenum">
               <a:rPr lang="de-CH" smtClean="0"/>
               <a:t>1</a:t>
             </a:fld>
             <a:r>
               <a:rPr lang="de-CH" smtClean="0"/>
-              <a:t> of 8</a:t>
+              <a:t> of 9</a:t>
             </a:r>
             <a:endParaRPr lang="de-CH" dirty="0"/>
           </a:p>
@@ -5684,13 +5677,13 @@
               <a:rPr lang="de-CH" smtClean="0"/>
               <a:t>Slide </a:t>
             </a:r>
-            <a:fld id="{CFA9E24E-33EE-4A9E-9AB1-4F450F58E11B}" type="slidenum">
+            <a:fld id="{F5355D3F-95B8-47E5-8374-E666C77FF9F2}" type="slidenum">
               <a:rPr lang="de-CH" smtClean="0"/>
               <a:t>2</a:t>
             </a:fld>
             <a:r>
               <a:rPr lang="de-CH" smtClean="0"/>
-              <a:t> of 8</a:t>
+              <a:t> of 9</a:t>
             </a:r>
             <a:endParaRPr lang="de-CH" dirty="0"/>
           </a:p>
@@ -5837,11 +5830,7 @@
             </a:pPr>
             <a:r>
               <a:rPr lang="en-GB" dirty="0" smtClean="0"/>
-              <a:t>Manipulation of compl</a:t>
-            </a:r>
-            <a:r>
-              <a:rPr lang="en-GB" dirty="0" smtClean="0"/>
-              <a:t>ex objects </a:t>
+              <a:t>Manipulation of complex objects </a:t>
             </a:r>
             <a:endParaRPr lang="en-GB" dirty="0"/>
           </a:p>
@@ -5935,13 +5924,13 @@
               <a:rPr lang="de-CH" smtClean="0"/>
               <a:t>Slide </a:t>
             </a:r>
-            <a:fld id="{2E3D8E43-7FD8-4641-BC40-62B5947C2F12}" type="slidenum">
+            <a:fld id="{893FC7A5-0586-43B2-AB55-26FFD681EDF2}" type="slidenum">
               <a:rPr lang="de-CH" smtClean="0"/>
               <a:t>3</a:t>
             </a:fld>
             <a:r>
               <a:rPr lang="de-CH" smtClean="0"/>
-              <a:t> of 8</a:t>
+              <a:t> of 9</a:t>
             </a:r>
             <a:endParaRPr lang="de-CH" dirty="0"/>
           </a:p>
@@ -6145,13 +6134,13 @@
               <a:rPr lang="de-CH" smtClean="0"/>
               <a:t>Slide </a:t>
             </a:r>
-            <a:fld id="{0DB77420-2F88-4883-AC72-4FF1696D2240}" type="slidenum">
+            <a:fld id="{9F333B5A-7C29-4488-953B-9E3D1EFC09CF}" type="slidenum">
               <a:rPr lang="de-CH" smtClean="0"/>
               <a:t>4</a:t>
             </a:fld>
             <a:r>
               <a:rPr lang="de-CH" smtClean="0"/>
-              <a:t> of 8</a:t>
+              <a:t> of 9</a:t>
             </a:r>
             <a:endParaRPr dirty="0"/>
           </a:p>
@@ -6380,13 +6369,13 @@
               <a:rPr lang="de-CH" smtClean="0"/>
               <a:t>Slide </a:t>
             </a:r>
-            <a:fld id="{09F83E9B-A3F4-47E9-91E2-21E55B043FA3}" type="slidenum">
+            <a:fld id="{4E1BE664-8BD9-412F-B27F-45F68970B29E}" type="slidenum">
               <a:rPr lang="de-CH" smtClean="0"/>
               <a:t>5</a:t>
             </a:fld>
             <a:r>
               <a:rPr lang="de-CH" smtClean="0"/>
-              <a:t> of 8</a:t>
+              <a:t> of 9</a:t>
             </a:r>
             <a:endParaRPr lang="de-CH" dirty="0"/>
           </a:p>
@@ -6545,13 +6534,13 @@
               <a:rPr lang="de-CH" smtClean="0"/>
               <a:t>Slide </a:t>
             </a:r>
-            <a:fld id="{A686A369-EF09-4744-90B7-D0109EDA0333}" type="slidenum">
+            <a:fld id="{CEAA1CE8-69DF-4F4E-8739-2010A652AAB8}" type="slidenum">
               <a:rPr lang="de-CH" smtClean="0"/>
               <a:t>6</a:t>
             </a:fld>
             <a:r>
               <a:rPr lang="de-CH" smtClean="0"/>
-              <a:t> of 8</a:t>
+              <a:t> of 9</a:t>
             </a:r>
             <a:endParaRPr lang="de-CH" dirty="0"/>
           </a:p>
@@ -6668,9 +6657,6 @@
               </a:rPr>
               <a:t>2</a:t>
             </a:r>
-            <a:endParaRPr lang="en-GB" sz="2200" dirty="0" smtClean="0">
-              <a:latin typeface="AA Zuehlke" pitchFamily="2" charset="0"/>
-            </a:endParaRPr>
           </a:p>
         </p:txBody>
       </p:sp>
@@ -6715,9 +6701,6 @@
               </a:rPr>
               <a:t>3</a:t>
             </a:r>
-            <a:endParaRPr lang="en-GB" sz="2200" dirty="0" smtClean="0">
-              <a:latin typeface="AA Zuehlke" pitchFamily="2" charset="0"/>
-            </a:endParaRPr>
           </a:p>
         </p:txBody>
       </p:sp>
@@ -6933,12 +6916,6 @@
               </a:rPr>
               <a:t>Cons</a:t>
             </a:r>
-            <a:endParaRPr lang="en-GB" sz="2200" dirty="0" smtClean="0">
-              <a:solidFill>
-                <a:schemeClr val="tx1"/>
-              </a:solidFill>
-              <a:latin typeface="AA Zuehlke" pitchFamily="2" charset="0"/>
-            </a:endParaRPr>
           </a:p>
         </p:txBody>
       </p:sp>
@@ -7000,12 +6977,6 @@
               </a:rPr>
               <a:t>Nil</a:t>
             </a:r>
-            <a:endParaRPr lang="en-GB" sz="2200" dirty="0" smtClean="0">
-              <a:solidFill>
-                <a:schemeClr val="tx1"/>
-              </a:solidFill>
-              <a:latin typeface="AA Zuehlke" pitchFamily="2" charset="0"/>
-            </a:endParaRPr>
           </a:p>
         </p:txBody>
       </p:sp>
@@ -7932,15 +7903,33 @@
               <a:rPr lang="en-GB" dirty="0" smtClean="0"/>
               <a:t>	</a:t>
             </a:r>
-          </a:p>
-          <a:p>
-            <a:endParaRPr lang="en-GB" dirty="0"/>
-          </a:p>
-          <a:p>
+            <a:r>
+              <a:rPr lang="en-GB" dirty="0" smtClean="0">
+                <a:solidFill>
+                  <a:schemeClr val="accent6">
+                    <a:lumMod val="75000"/>
+                  </a:schemeClr>
+                </a:solidFill>
+              </a:rPr>
+              <a:t>Prepending</a:t>
+            </a:r>
+            <a:r>
+              <a:rPr lang="en-GB" dirty="0" smtClean="0"/>
+              <a:t>: Time &amp; Space O(1)</a:t>
+            </a:r>
             <a:r>
               <a:rPr lang="en-GB" dirty="0" smtClean="0"/>
               <a:t>	</a:t>
             </a:r>
+          </a:p>
+          <a:p>
+            <a:endParaRPr lang="en-GB" dirty="0"/>
+          </a:p>
+          <a:p>
+            <a:r>
+              <a:rPr lang="en-GB" dirty="0" smtClean="0"/>
+              <a:t>	</a:t>
+            </a:r>
             <a:r>
               <a:rPr lang="en-GB" dirty="0" err="1" smtClean="0"/>
               <a:t>val</a:t>
@@ -8075,13 +8064,13 @@
               <a:rPr lang="de-CH" smtClean="0"/>
               <a:t>Slide </a:t>
             </a:r>
-            <a:fld id="{B8897A7C-87B0-4D9C-A935-D4E56808677A}" type="slidenum">
+            <a:fld id="{D6696425-E008-484D-9884-5B64034469B4}" type="slidenum">
               <a:rPr lang="de-CH" smtClean="0"/>
               <a:t>7</a:t>
             </a:fld>
             <a:r>
               <a:rPr lang="de-CH" smtClean="0"/>
-              <a:t> of 8</a:t>
+              <a:t> of 9</a:t>
             </a:r>
             <a:endParaRPr dirty="0"/>
           </a:p>
@@ -8175,9 +8164,6 @@
               </a:rPr>
               <a:t>2</a:t>
             </a:r>
-            <a:endParaRPr lang="en-GB" sz="2200" dirty="0" smtClean="0">
-              <a:latin typeface="AA Zuehlke" pitchFamily="2" charset="0"/>
-            </a:endParaRPr>
           </a:p>
         </p:txBody>
       </p:sp>
@@ -8222,9 +8208,6 @@
               </a:rPr>
               <a:t>3</a:t>
             </a:r>
-            <a:endParaRPr lang="en-GB" sz="2200" dirty="0" smtClean="0">
-              <a:latin typeface="AA Zuehlke" pitchFamily="2" charset="0"/>
-            </a:endParaRPr>
           </a:p>
         </p:txBody>
       </p:sp>
@@ -8427,9 +8410,6 @@
               </a:rPr>
               <a:t>0</a:t>
             </a:r>
-            <a:endParaRPr lang="en-GB" sz="2200" dirty="0" smtClean="0">
-              <a:latin typeface="AA Zuehlke" pitchFamily="2" charset="0"/>
-            </a:endParaRPr>
           </a:p>
         </p:txBody>
       </p:sp>
@@ -8480,9 +8460,6 @@
               </a:rPr>
               <a:t>2</a:t>
             </a:r>
-            <a:endParaRPr lang="en-GB" sz="2200" dirty="0" smtClean="0">
-              <a:latin typeface="AA Zuehlke" pitchFamily="2" charset="0"/>
-            </a:endParaRPr>
           </a:p>
         </p:txBody>
       </p:sp>
@@ -8533,9 +8510,6 @@
               </a:rPr>
               <a:t>3</a:t>
             </a:r>
-            <a:endParaRPr lang="en-GB" sz="2200" dirty="0" smtClean="0">
-              <a:latin typeface="AA Zuehlke" pitchFamily="2" charset="0"/>
-            </a:endParaRPr>
           </a:p>
         </p:txBody>
       </p:sp>
@@ -8727,12 +8701,6 @@
               </a:rPr>
               <a:t>Structural Sharing</a:t>
             </a:r>
-            <a:endParaRPr lang="en-GB" sz="2200" dirty="0" smtClean="0">
-              <a:solidFill>
-                <a:schemeClr val="tx1"/>
-              </a:solidFill>
-              <a:latin typeface="AA Zuehlke" pitchFamily="2" charset="0"/>
-            </a:endParaRPr>
           </a:p>
         </p:txBody>
       </p:sp>
@@ -8829,6 +8797,1034 @@
           <a:p>
             <a:r>
               <a:rPr lang="en-GB" dirty="0" smtClean="0"/>
+              <a:t>Immutability</a:t>
+            </a:r>
+            <a:endParaRPr lang="en-GB" dirty="0"/>
+          </a:p>
+        </p:txBody>
+      </p:sp>
+      <p:sp>
+        <p:nvSpPr>
+          <p:cNvPr id="3" name="Content Placeholder 2"/>
+          <p:cNvSpPr>
+            <a:spLocks noGrp="1"/>
+          </p:cNvSpPr>
+          <p:nvPr>
+            <p:ph idx="1"/>
+          </p:nvPr>
+        </p:nvSpPr>
+        <p:spPr/>
+        <p:txBody>
+          <a:bodyPr/>
+          <a:lstStyle/>
+          <a:p>
+            <a:r>
+              <a:rPr lang="en-GB" dirty="0" smtClean="0"/>
+              <a:t>	</a:t>
+            </a:r>
+            <a:r>
+              <a:rPr lang="en-GB" dirty="0" smtClean="0">
+                <a:solidFill>
+                  <a:schemeClr val="accent6">
+                    <a:lumMod val="75000"/>
+                  </a:schemeClr>
+                </a:solidFill>
+              </a:rPr>
+              <a:t>Appending</a:t>
+            </a:r>
+            <a:r>
+              <a:rPr lang="en-GB" dirty="0" smtClean="0"/>
+              <a:t>: </a:t>
+            </a:r>
+            <a:r>
+              <a:rPr lang="en-GB" dirty="0"/>
+              <a:t>Time &amp; Space </a:t>
+            </a:r>
+            <a:r>
+              <a:rPr lang="en-GB" dirty="0" smtClean="0"/>
+              <a:t>O(n)</a:t>
+            </a:r>
+            <a:r>
+              <a:rPr lang="en-GB" dirty="0"/>
+              <a:t>	</a:t>
+            </a:r>
+            <a:endParaRPr lang="en-GB" dirty="0" smtClean="0"/>
+          </a:p>
+          <a:p>
+            <a:endParaRPr lang="en-GB" dirty="0"/>
+          </a:p>
+          <a:p>
+            <a:r>
+              <a:rPr lang="en-GB" dirty="0" smtClean="0"/>
+              <a:t>	</a:t>
+            </a:r>
+            <a:r>
+              <a:rPr lang="en-GB" dirty="0" err="1" smtClean="0"/>
+              <a:t>val</a:t>
+            </a:r>
+            <a:r>
+              <a:rPr lang="en-GB" dirty="0" smtClean="0"/>
+              <a:t> a = List(1,2,3)</a:t>
+            </a:r>
+          </a:p>
+          <a:p>
+            <a:endParaRPr lang="en-GB" dirty="0"/>
+          </a:p>
+          <a:p>
+            <a:r>
+              <a:rPr lang="en-GB" dirty="0" smtClean="0"/>
+              <a:t>	</a:t>
+            </a:r>
+            <a:r>
+              <a:rPr lang="en-GB" dirty="0" err="1" smtClean="0"/>
+              <a:t>val</a:t>
+            </a:r>
+            <a:r>
+              <a:rPr lang="en-GB" dirty="0" smtClean="0"/>
+              <a:t> b = </a:t>
+            </a:r>
+            <a:r>
+              <a:rPr lang="en-GB" dirty="0" smtClean="0"/>
+              <a:t>a :+ 4</a:t>
+            </a:r>
+            <a:endParaRPr lang="en-GB" dirty="0" smtClean="0"/>
+          </a:p>
+          <a:p>
+            <a:endParaRPr lang="en-GB" dirty="0"/>
+          </a:p>
+          <a:p>
+            <a:r>
+              <a:rPr lang="en-GB" dirty="0" smtClean="0"/>
+              <a:t>	</a:t>
+            </a:r>
+            <a:endParaRPr lang="en-GB" dirty="0"/>
+          </a:p>
+        </p:txBody>
+      </p:sp>
+      <p:sp>
+        <p:nvSpPr>
+          <p:cNvPr id="4" name="Date Placeholder 3"/>
+          <p:cNvSpPr>
+            <a:spLocks noGrp="1"/>
+          </p:cNvSpPr>
+          <p:nvPr>
+            <p:ph type="dt" sz="half" idx="10"/>
+          </p:nvPr>
+        </p:nvSpPr>
+        <p:spPr/>
+        <p:txBody>
+          <a:bodyPr/>
+          <a:lstStyle/>
+          <a:p>
+            <a:r>
+              <a:rPr lang="de-CH" smtClean="0"/>
+              <a:t>14. September 2015</a:t>
+            </a:r>
+            <a:endParaRPr lang="de-CH" dirty="0"/>
+          </a:p>
+        </p:txBody>
+      </p:sp>
+      <p:sp>
+        <p:nvSpPr>
+          <p:cNvPr id="5" name="Footer Placeholder 4"/>
+          <p:cNvSpPr>
+            <a:spLocks noGrp="1"/>
+          </p:cNvSpPr>
+          <p:nvPr>
+            <p:ph type="ftr" sz="quarter" idx="11"/>
+          </p:nvPr>
+        </p:nvSpPr>
+        <p:spPr/>
+        <p:txBody>
+          <a:bodyPr/>
+          <a:lstStyle/>
+          <a:p>
+            <a:r>
+              <a:rPr lang="en-US" smtClean="0"/>
+              <a:t>Functional Design Patterns for OO Practicioners | Hendrik Schöneberg</a:t>
+            </a:r>
+            <a:endParaRPr lang="de-CH" dirty="0"/>
+          </a:p>
+        </p:txBody>
+      </p:sp>
+      <p:sp>
+        <p:nvSpPr>
+          <p:cNvPr id="7" name="Text Placeholder 6"/>
+          <p:cNvSpPr>
+            <a:spLocks noGrp="1"/>
+          </p:cNvSpPr>
+          <p:nvPr>
+            <p:ph type="body" sz="quarter" idx="13"/>
+          </p:nvPr>
+        </p:nvSpPr>
+        <p:spPr/>
+        <p:txBody>
+          <a:bodyPr/>
+          <a:lstStyle/>
+          <a:p>
+            <a:r>
+              <a:rPr lang="en-GB" dirty="0" smtClean="0"/>
+              <a:t>Structural sharing on Lists</a:t>
+            </a:r>
+            <a:endParaRPr lang="en-GB" dirty="0"/>
+          </a:p>
+        </p:txBody>
+      </p:sp>
+      <p:sp>
+        <p:nvSpPr>
+          <p:cNvPr id="16" name="Oval 15"/>
+          <p:cNvSpPr/>
+          <p:nvPr/>
+        </p:nvSpPr>
+        <p:spPr>
+          <a:xfrm>
+            <a:off x="5364088" y="2708920"/>
+            <a:ext cx="432048" cy="432048"/>
+          </a:xfrm>
+          <a:prstGeom prst="ellipse">
+            <a:avLst/>
+          </a:prstGeom>
+          <a:ln/>
+        </p:spPr>
+        <p:style>
+          <a:lnRef idx="2">
+            <a:schemeClr val="accent1"/>
+          </a:lnRef>
+          <a:fillRef idx="1">
+            <a:schemeClr val="lt1"/>
+          </a:fillRef>
+          <a:effectRef idx="0">
+            <a:schemeClr val="accent1"/>
+          </a:effectRef>
+          <a:fontRef idx="minor">
+            <a:schemeClr val="dk1"/>
+          </a:fontRef>
+        </p:style>
+        <p:txBody>
+          <a:bodyPr rtlCol="0" anchor="ctr"/>
+          <a:lstStyle/>
+          <a:p>
+            <a:pPr algn="ctr"/>
+            <a:r>
+              <a:rPr lang="en-GB" sz="2200" dirty="0">
+                <a:latin typeface="AA Zuehlke" pitchFamily="2" charset="0"/>
+              </a:rPr>
+              <a:t>1</a:t>
+            </a:r>
+            <a:endParaRPr lang="en-GB" sz="2200" dirty="0" smtClean="0">
+              <a:latin typeface="AA Zuehlke" pitchFamily="2" charset="0"/>
+            </a:endParaRPr>
+          </a:p>
+        </p:txBody>
+      </p:sp>
+      <p:sp>
+        <p:nvSpPr>
+          <p:cNvPr id="17" name="Oval 16"/>
+          <p:cNvSpPr/>
+          <p:nvPr/>
+        </p:nvSpPr>
+        <p:spPr>
+          <a:xfrm>
+            <a:off x="6084168" y="2708920"/>
+            <a:ext cx="432048" cy="432048"/>
+          </a:xfrm>
+          <a:prstGeom prst="ellipse">
+            <a:avLst/>
+          </a:prstGeom>
+          <a:ln/>
+        </p:spPr>
+        <p:style>
+          <a:lnRef idx="2">
+            <a:schemeClr val="accent1"/>
+          </a:lnRef>
+          <a:fillRef idx="1">
+            <a:schemeClr val="lt1"/>
+          </a:fillRef>
+          <a:effectRef idx="0">
+            <a:schemeClr val="accent1"/>
+          </a:effectRef>
+          <a:fontRef idx="minor">
+            <a:schemeClr val="dk1"/>
+          </a:fontRef>
+        </p:style>
+        <p:txBody>
+          <a:bodyPr rtlCol="0" anchor="ctr"/>
+          <a:lstStyle/>
+          <a:p>
+            <a:pPr algn="ctr"/>
+            <a:r>
+              <a:rPr lang="en-GB" sz="2200" dirty="0" smtClean="0">
+                <a:latin typeface="AA Zuehlke" pitchFamily="2" charset="0"/>
+              </a:rPr>
+              <a:t>2</a:t>
+            </a:r>
+          </a:p>
+        </p:txBody>
+      </p:sp>
+      <p:sp>
+        <p:nvSpPr>
+          <p:cNvPr id="18" name="Oval 17"/>
+          <p:cNvSpPr/>
+          <p:nvPr/>
+        </p:nvSpPr>
+        <p:spPr>
+          <a:xfrm>
+            <a:off x="6804248" y="2708920"/>
+            <a:ext cx="432048" cy="432048"/>
+          </a:xfrm>
+          <a:prstGeom prst="ellipse">
+            <a:avLst/>
+          </a:prstGeom>
+          <a:ln/>
+        </p:spPr>
+        <p:style>
+          <a:lnRef idx="2">
+            <a:schemeClr val="accent1"/>
+          </a:lnRef>
+          <a:fillRef idx="1">
+            <a:schemeClr val="lt1"/>
+          </a:fillRef>
+          <a:effectRef idx="0">
+            <a:schemeClr val="accent1"/>
+          </a:effectRef>
+          <a:fontRef idx="minor">
+            <a:schemeClr val="dk1"/>
+          </a:fontRef>
+        </p:style>
+        <p:txBody>
+          <a:bodyPr rtlCol="0" anchor="ctr"/>
+          <a:lstStyle/>
+          <a:p>
+            <a:pPr algn="ctr"/>
+            <a:r>
+              <a:rPr lang="en-GB" sz="2200" dirty="0" smtClean="0">
+                <a:latin typeface="AA Zuehlke" pitchFamily="2" charset="0"/>
+              </a:rPr>
+              <a:t>3</a:t>
+            </a:r>
+          </a:p>
+        </p:txBody>
+      </p:sp>
+      <p:sp>
+        <p:nvSpPr>
+          <p:cNvPr id="19" name="Oval 18"/>
+          <p:cNvSpPr/>
+          <p:nvPr/>
+        </p:nvSpPr>
+        <p:spPr>
+          <a:xfrm>
+            <a:off x="7524328" y="2708920"/>
+            <a:ext cx="432048" cy="432048"/>
+          </a:xfrm>
+          <a:prstGeom prst="ellipse">
+            <a:avLst/>
+          </a:prstGeom>
+          <a:ln>
+            <a:solidFill>
+              <a:srgbClr val="7030A0"/>
+            </a:solidFill>
+          </a:ln>
+        </p:spPr>
+        <p:style>
+          <a:lnRef idx="2">
+            <a:schemeClr val="accent1"/>
+          </a:lnRef>
+          <a:fillRef idx="1">
+            <a:schemeClr val="lt1"/>
+          </a:fillRef>
+          <a:effectRef idx="0">
+            <a:schemeClr val="accent1"/>
+          </a:effectRef>
+          <a:fontRef idx="minor">
+            <a:schemeClr val="dk1"/>
+          </a:fontRef>
+        </p:style>
+        <p:txBody>
+          <a:bodyPr rtlCol="0" anchor="ctr"/>
+          <a:lstStyle/>
+          <a:p>
+            <a:pPr algn="ctr"/>
+            <a:endParaRPr lang="en-GB" sz="1000" dirty="0" smtClean="0">
+              <a:latin typeface="AA Zuehlke" pitchFamily="2" charset="0"/>
+            </a:endParaRPr>
+          </a:p>
+        </p:txBody>
+      </p:sp>
+      <p:cxnSp>
+        <p:nvCxnSpPr>
+          <p:cNvPr id="20" name="Straight Arrow Connector 19"/>
+          <p:cNvCxnSpPr>
+            <a:stCxn id="16" idx="6"/>
+          </p:cNvCxnSpPr>
+          <p:nvPr/>
+        </p:nvCxnSpPr>
+        <p:spPr>
+          <a:xfrm>
+            <a:off x="5796136" y="2924944"/>
+            <a:ext cx="288032" cy="0"/>
+          </a:xfrm>
+          <a:prstGeom prst="straightConnector1">
+            <a:avLst/>
+          </a:prstGeom>
+          <a:ln w="25400">
+            <a:tailEnd type="triangle"/>
+          </a:ln>
+        </p:spPr>
+        <p:style>
+          <a:lnRef idx="1">
+            <a:schemeClr val="accent1"/>
+          </a:lnRef>
+          <a:fillRef idx="0">
+            <a:schemeClr val="accent1"/>
+          </a:fillRef>
+          <a:effectRef idx="0">
+            <a:schemeClr val="accent1"/>
+          </a:effectRef>
+          <a:fontRef idx="minor">
+            <a:schemeClr val="tx1"/>
+          </a:fontRef>
+        </p:style>
+      </p:cxnSp>
+      <p:cxnSp>
+        <p:nvCxnSpPr>
+          <p:cNvPr id="21" name="Straight Arrow Connector 20"/>
+          <p:cNvCxnSpPr>
+            <a:stCxn id="17" idx="6"/>
+          </p:cNvCxnSpPr>
+          <p:nvPr/>
+        </p:nvCxnSpPr>
+        <p:spPr>
+          <a:xfrm>
+            <a:off x="6516216" y="2924944"/>
+            <a:ext cx="288032" cy="0"/>
+          </a:xfrm>
+          <a:prstGeom prst="straightConnector1">
+            <a:avLst/>
+          </a:prstGeom>
+          <a:ln w="25400">
+            <a:tailEnd type="triangle"/>
+          </a:ln>
+        </p:spPr>
+        <p:style>
+          <a:lnRef idx="1">
+            <a:schemeClr val="accent1"/>
+          </a:lnRef>
+          <a:fillRef idx="0">
+            <a:schemeClr val="accent1"/>
+          </a:fillRef>
+          <a:effectRef idx="0">
+            <a:schemeClr val="accent1"/>
+          </a:effectRef>
+          <a:fontRef idx="minor">
+            <a:schemeClr val="tx1"/>
+          </a:fontRef>
+        </p:style>
+      </p:cxnSp>
+      <p:cxnSp>
+        <p:nvCxnSpPr>
+          <p:cNvPr id="22" name="Straight Arrow Connector 21"/>
+          <p:cNvCxnSpPr>
+            <a:stCxn id="18" idx="6"/>
+            <a:endCxn id="19" idx="2"/>
+          </p:cNvCxnSpPr>
+          <p:nvPr/>
+        </p:nvCxnSpPr>
+        <p:spPr>
+          <a:xfrm>
+            <a:off x="7236296" y="2924944"/>
+            <a:ext cx="288032" cy="0"/>
+          </a:xfrm>
+          <a:prstGeom prst="straightConnector1">
+            <a:avLst/>
+          </a:prstGeom>
+          <a:ln w="25400">
+            <a:solidFill>
+              <a:srgbClr val="7030A0"/>
+            </a:solidFill>
+            <a:tailEnd type="triangle"/>
+          </a:ln>
+        </p:spPr>
+        <p:style>
+          <a:lnRef idx="1">
+            <a:schemeClr val="accent1"/>
+          </a:lnRef>
+          <a:fillRef idx="0">
+            <a:schemeClr val="accent1"/>
+          </a:fillRef>
+          <a:effectRef idx="0">
+            <a:schemeClr val="accent1"/>
+          </a:effectRef>
+          <a:fontRef idx="minor">
+            <a:schemeClr val="tx1"/>
+          </a:fontRef>
+        </p:style>
+      </p:cxnSp>
+      <p:sp>
+        <p:nvSpPr>
+          <p:cNvPr id="24" name="Oval 23"/>
+          <p:cNvSpPr/>
+          <p:nvPr/>
+        </p:nvSpPr>
+        <p:spPr>
+          <a:xfrm>
+            <a:off x="6804248" y="3717032"/>
+            <a:ext cx="432048" cy="432048"/>
+          </a:xfrm>
+          <a:prstGeom prst="ellipse">
+            <a:avLst/>
+          </a:prstGeom>
+          <a:ln>
+            <a:solidFill>
+              <a:srgbClr val="00B0F0"/>
+            </a:solidFill>
+          </a:ln>
+        </p:spPr>
+        <p:style>
+          <a:lnRef idx="2">
+            <a:schemeClr val="accent1"/>
+          </a:lnRef>
+          <a:fillRef idx="1">
+            <a:schemeClr val="lt1"/>
+          </a:fillRef>
+          <a:effectRef idx="0">
+            <a:schemeClr val="accent1"/>
+          </a:effectRef>
+          <a:fontRef idx="minor">
+            <a:schemeClr val="dk1"/>
+          </a:fontRef>
+        </p:style>
+        <p:txBody>
+          <a:bodyPr rtlCol="0" anchor="ctr"/>
+          <a:lstStyle/>
+          <a:p>
+            <a:pPr algn="ctr"/>
+            <a:r>
+              <a:rPr lang="en-GB" sz="2200" dirty="0">
+                <a:latin typeface="AA Zuehlke" pitchFamily="2" charset="0"/>
+              </a:rPr>
+              <a:t>4</a:t>
+            </a:r>
+            <a:endParaRPr lang="en-GB" sz="2200" dirty="0" smtClean="0">
+              <a:latin typeface="AA Zuehlke" pitchFamily="2" charset="0"/>
+            </a:endParaRPr>
+          </a:p>
+        </p:txBody>
+      </p:sp>
+      <p:sp>
+        <p:nvSpPr>
+          <p:cNvPr id="39" name="Rounded Rectangle 38"/>
+          <p:cNvSpPr/>
+          <p:nvPr/>
+        </p:nvSpPr>
+        <p:spPr>
+          <a:xfrm>
+            <a:off x="6089483" y="4529398"/>
+            <a:ext cx="1893260" cy="720080"/>
+          </a:xfrm>
+          <a:prstGeom prst="roundRect">
+            <a:avLst>
+              <a:gd name="adj" fmla="val 12091"/>
+            </a:avLst>
+          </a:prstGeom>
+          <a:solidFill>
+            <a:schemeClr val="bg1"/>
+          </a:solidFill>
+          <a:ln w="12700">
+            <a:solidFill>
+              <a:schemeClr val="tx2">
+                <a:lumMod val="60000"/>
+                <a:lumOff val="40000"/>
+              </a:schemeClr>
+            </a:solidFill>
+          </a:ln>
+        </p:spPr>
+        <p:style>
+          <a:lnRef idx="2">
+            <a:schemeClr val="accent1">
+              <a:shade val="50000"/>
+            </a:schemeClr>
+          </a:lnRef>
+          <a:fillRef idx="1">
+            <a:schemeClr val="accent1"/>
+          </a:fillRef>
+          <a:effectRef idx="0">
+            <a:schemeClr val="accent1"/>
+          </a:effectRef>
+          <a:fontRef idx="minor">
+            <a:schemeClr val="lt1"/>
+          </a:fontRef>
+        </p:style>
+        <p:txBody>
+          <a:bodyPr rtlCol="0" anchor="ctr"/>
+          <a:lstStyle/>
+          <a:p>
+            <a:pPr algn="ctr"/>
+            <a:r>
+              <a:rPr lang="en-GB" sz="2200" dirty="0" smtClean="0">
+                <a:solidFill>
+                  <a:schemeClr val="tx1"/>
+                </a:solidFill>
+                <a:latin typeface="AA Zuehlke" pitchFamily="2" charset="0"/>
+              </a:rPr>
+              <a:t>Structural Sharing</a:t>
+            </a:r>
+          </a:p>
+        </p:txBody>
+      </p:sp>
+      <p:sp>
+        <p:nvSpPr>
+          <p:cNvPr id="6" name="Slide Number Placeholder 5"/>
+          <p:cNvSpPr>
+            <a:spLocks noGrp="1"/>
+          </p:cNvSpPr>
+          <p:nvPr>
+            <p:ph type="sldNum" sz="quarter" idx="12"/>
+          </p:nvPr>
+        </p:nvSpPr>
+        <p:spPr/>
+        <p:txBody>
+          <a:bodyPr/>
+          <a:lstStyle/>
+          <a:p>
+            <a:r>
+              <a:rPr lang="de-CH" smtClean="0"/>
+              <a:t>Slide </a:t>
+            </a:r>
+            <a:fld id="{FFFE2427-F54B-4EB9-AEE6-D494F388C5E2}" type="slidenum">
+              <a:rPr lang="de-CH" smtClean="0"/>
+              <a:t>8</a:t>
+            </a:fld>
+            <a:r>
+              <a:rPr lang="de-CH" smtClean="0"/>
+              <a:t> of 9</a:t>
+            </a:r>
+            <a:endParaRPr dirty="0"/>
+          </a:p>
+        </p:txBody>
+      </p:sp>
+      <p:sp>
+        <p:nvSpPr>
+          <p:cNvPr id="25" name="Oval 24"/>
+          <p:cNvSpPr/>
+          <p:nvPr/>
+        </p:nvSpPr>
+        <p:spPr>
+          <a:xfrm>
+            <a:off x="4644008" y="3717032"/>
+            <a:ext cx="432048" cy="432048"/>
+          </a:xfrm>
+          <a:prstGeom prst="ellipse">
+            <a:avLst/>
+          </a:prstGeom>
+          <a:ln/>
+        </p:spPr>
+        <p:style>
+          <a:lnRef idx="2">
+            <a:schemeClr val="accent1"/>
+          </a:lnRef>
+          <a:fillRef idx="1">
+            <a:schemeClr val="lt1"/>
+          </a:fillRef>
+          <a:effectRef idx="0">
+            <a:schemeClr val="accent1"/>
+          </a:effectRef>
+          <a:fontRef idx="minor">
+            <a:schemeClr val="dk1"/>
+          </a:fontRef>
+        </p:style>
+        <p:txBody>
+          <a:bodyPr rtlCol="0" anchor="ctr"/>
+          <a:lstStyle/>
+          <a:p>
+            <a:pPr algn="ctr"/>
+            <a:r>
+              <a:rPr lang="en-GB" sz="2200" dirty="0">
+                <a:latin typeface="AA Zuehlke" pitchFamily="2" charset="0"/>
+              </a:rPr>
+              <a:t>1</a:t>
+            </a:r>
+            <a:endParaRPr lang="en-GB" sz="2200" dirty="0" smtClean="0">
+              <a:latin typeface="AA Zuehlke" pitchFamily="2" charset="0"/>
+            </a:endParaRPr>
+          </a:p>
+        </p:txBody>
+      </p:sp>
+      <p:sp>
+        <p:nvSpPr>
+          <p:cNvPr id="26" name="Oval 25"/>
+          <p:cNvSpPr/>
+          <p:nvPr/>
+        </p:nvSpPr>
+        <p:spPr>
+          <a:xfrm>
+            <a:off x="5364088" y="3717032"/>
+            <a:ext cx="432048" cy="432048"/>
+          </a:xfrm>
+          <a:prstGeom prst="ellipse">
+            <a:avLst/>
+          </a:prstGeom>
+          <a:ln/>
+        </p:spPr>
+        <p:style>
+          <a:lnRef idx="2">
+            <a:schemeClr val="accent1"/>
+          </a:lnRef>
+          <a:fillRef idx="1">
+            <a:schemeClr val="lt1"/>
+          </a:fillRef>
+          <a:effectRef idx="0">
+            <a:schemeClr val="accent1"/>
+          </a:effectRef>
+          <a:fontRef idx="minor">
+            <a:schemeClr val="dk1"/>
+          </a:fontRef>
+        </p:style>
+        <p:txBody>
+          <a:bodyPr rtlCol="0" anchor="ctr"/>
+          <a:lstStyle/>
+          <a:p>
+            <a:pPr algn="ctr"/>
+            <a:r>
+              <a:rPr lang="en-GB" sz="2200" dirty="0" smtClean="0">
+                <a:latin typeface="AA Zuehlke" pitchFamily="2" charset="0"/>
+              </a:rPr>
+              <a:t>2</a:t>
+            </a:r>
+          </a:p>
+        </p:txBody>
+      </p:sp>
+      <p:sp>
+        <p:nvSpPr>
+          <p:cNvPr id="27" name="Oval 26"/>
+          <p:cNvSpPr/>
+          <p:nvPr/>
+        </p:nvSpPr>
+        <p:spPr>
+          <a:xfrm>
+            <a:off x="6084168" y="3717032"/>
+            <a:ext cx="432048" cy="432048"/>
+          </a:xfrm>
+          <a:prstGeom prst="ellipse">
+            <a:avLst/>
+          </a:prstGeom>
+          <a:ln/>
+        </p:spPr>
+        <p:style>
+          <a:lnRef idx="2">
+            <a:schemeClr val="accent1"/>
+          </a:lnRef>
+          <a:fillRef idx="1">
+            <a:schemeClr val="lt1"/>
+          </a:fillRef>
+          <a:effectRef idx="0">
+            <a:schemeClr val="accent1"/>
+          </a:effectRef>
+          <a:fontRef idx="minor">
+            <a:schemeClr val="dk1"/>
+          </a:fontRef>
+        </p:style>
+        <p:txBody>
+          <a:bodyPr rtlCol="0" anchor="ctr"/>
+          <a:lstStyle/>
+          <a:p>
+            <a:pPr algn="ctr"/>
+            <a:r>
+              <a:rPr lang="en-GB" sz="2200" dirty="0" smtClean="0">
+                <a:latin typeface="AA Zuehlke" pitchFamily="2" charset="0"/>
+              </a:rPr>
+              <a:t>3</a:t>
+            </a:r>
+          </a:p>
+        </p:txBody>
+      </p:sp>
+      <p:sp>
+        <p:nvSpPr>
+          <p:cNvPr id="28" name="Oval 27"/>
+          <p:cNvSpPr/>
+          <p:nvPr/>
+        </p:nvSpPr>
+        <p:spPr>
+          <a:xfrm>
+            <a:off x="7524328" y="3717032"/>
+            <a:ext cx="432048" cy="432048"/>
+          </a:xfrm>
+          <a:prstGeom prst="ellipse">
+            <a:avLst/>
+          </a:prstGeom>
+          <a:ln>
+            <a:solidFill>
+              <a:srgbClr val="7030A0"/>
+            </a:solidFill>
+          </a:ln>
+        </p:spPr>
+        <p:style>
+          <a:lnRef idx="2">
+            <a:schemeClr val="accent1"/>
+          </a:lnRef>
+          <a:fillRef idx="1">
+            <a:schemeClr val="lt1"/>
+          </a:fillRef>
+          <a:effectRef idx="0">
+            <a:schemeClr val="accent1"/>
+          </a:effectRef>
+          <a:fontRef idx="minor">
+            <a:schemeClr val="dk1"/>
+          </a:fontRef>
+        </p:style>
+        <p:txBody>
+          <a:bodyPr rtlCol="0" anchor="ctr"/>
+          <a:lstStyle/>
+          <a:p>
+            <a:pPr algn="ctr"/>
+            <a:endParaRPr lang="en-GB" sz="1000" dirty="0" smtClean="0">
+              <a:latin typeface="AA Zuehlke" pitchFamily="2" charset="0"/>
+            </a:endParaRPr>
+          </a:p>
+        </p:txBody>
+      </p:sp>
+      <p:cxnSp>
+        <p:nvCxnSpPr>
+          <p:cNvPr id="29" name="Straight Arrow Connector 28"/>
+          <p:cNvCxnSpPr>
+            <a:stCxn id="25" idx="6"/>
+          </p:cNvCxnSpPr>
+          <p:nvPr/>
+        </p:nvCxnSpPr>
+        <p:spPr>
+          <a:xfrm>
+            <a:off x="5076056" y="3933056"/>
+            <a:ext cx="288032" cy="0"/>
+          </a:xfrm>
+          <a:prstGeom prst="straightConnector1">
+            <a:avLst/>
+          </a:prstGeom>
+          <a:ln w="25400">
+            <a:tailEnd type="triangle"/>
+          </a:ln>
+        </p:spPr>
+        <p:style>
+          <a:lnRef idx="1">
+            <a:schemeClr val="accent1"/>
+          </a:lnRef>
+          <a:fillRef idx="0">
+            <a:schemeClr val="accent1"/>
+          </a:fillRef>
+          <a:effectRef idx="0">
+            <a:schemeClr val="accent1"/>
+          </a:effectRef>
+          <a:fontRef idx="minor">
+            <a:schemeClr val="tx1"/>
+          </a:fontRef>
+        </p:style>
+      </p:cxnSp>
+      <p:cxnSp>
+        <p:nvCxnSpPr>
+          <p:cNvPr id="30" name="Straight Arrow Connector 29"/>
+          <p:cNvCxnSpPr>
+            <a:stCxn id="26" idx="6"/>
+          </p:cNvCxnSpPr>
+          <p:nvPr/>
+        </p:nvCxnSpPr>
+        <p:spPr>
+          <a:xfrm>
+            <a:off x="5796136" y="3933056"/>
+            <a:ext cx="288032" cy="0"/>
+          </a:xfrm>
+          <a:prstGeom prst="straightConnector1">
+            <a:avLst/>
+          </a:prstGeom>
+          <a:ln w="25400">
+            <a:tailEnd type="triangle"/>
+          </a:ln>
+        </p:spPr>
+        <p:style>
+          <a:lnRef idx="1">
+            <a:schemeClr val="accent1"/>
+          </a:lnRef>
+          <a:fillRef idx="0">
+            <a:schemeClr val="accent1"/>
+          </a:fillRef>
+          <a:effectRef idx="0">
+            <a:schemeClr val="accent1"/>
+          </a:effectRef>
+          <a:fontRef idx="minor">
+            <a:schemeClr val="tx1"/>
+          </a:fontRef>
+        </p:style>
+      </p:cxnSp>
+      <p:cxnSp>
+        <p:nvCxnSpPr>
+          <p:cNvPr id="10" name="Straight Arrow Connector 9"/>
+          <p:cNvCxnSpPr>
+            <a:stCxn id="27" idx="6"/>
+            <a:endCxn id="24" idx="2"/>
+          </p:cNvCxnSpPr>
+          <p:nvPr/>
+        </p:nvCxnSpPr>
+        <p:spPr>
+          <a:xfrm>
+            <a:off x="6516216" y="3933056"/>
+            <a:ext cx="288032" cy="0"/>
+          </a:xfrm>
+          <a:prstGeom prst="straightConnector1">
+            <a:avLst/>
+          </a:prstGeom>
+          <a:ln w="25400">
+            <a:solidFill>
+              <a:srgbClr val="00B0F0"/>
+            </a:solidFill>
+            <a:tailEnd type="triangle"/>
+          </a:ln>
+        </p:spPr>
+        <p:style>
+          <a:lnRef idx="1">
+            <a:schemeClr val="accent1"/>
+          </a:lnRef>
+          <a:fillRef idx="0">
+            <a:schemeClr val="accent1"/>
+          </a:fillRef>
+          <a:effectRef idx="0">
+            <a:schemeClr val="accent1"/>
+          </a:effectRef>
+          <a:fontRef idx="minor">
+            <a:schemeClr val="tx1"/>
+          </a:fontRef>
+        </p:style>
+      </p:cxnSp>
+      <p:cxnSp>
+        <p:nvCxnSpPr>
+          <p:cNvPr id="12" name="Straight Arrow Connector 11"/>
+          <p:cNvCxnSpPr>
+            <a:stCxn id="24" idx="6"/>
+            <a:endCxn id="28" idx="2"/>
+          </p:cNvCxnSpPr>
+          <p:nvPr/>
+        </p:nvCxnSpPr>
+        <p:spPr>
+          <a:xfrm>
+            <a:off x="7236296" y="3933056"/>
+            <a:ext cx="288032" cy="0"/>
+          </a:xfrm>
+          <a:prstGeom prst="straightConnector1">
+            <a:avLst/>
+          </a:prstGeom>
+          <a:ln w="25400">
+            <a:solidFill>
+              <a:srgbClr val="7030A0"/>
+            </a:solidFill>
+            <a:tailEnd type="triangle"/>
+          </a:ln>
+        </p:spPr>
+        <p:style>
+          <a:lnRef idx="1">
+            <a:schemeClr val="accent1"/>
+          </a:lnRef>
+          <a:fillRef idx="0">
+            <a:schemeClr val="accent1"/>
+          </a:fillRef>
+          <a:effectRef idx="0">
+            <a:schemeClr val="accent1"/>
+          </a:effectRef>
+          <a:fontRef idx="minor">
+            <a:schemeClr val="tx1"/>
+          </a:fontRef>
+        </p:style>
+      </p:cxnSp>
+      <p:cxnSp>
+        <p:nvCxnSpPr>
+          <p:cNvPr id="14" name="Straight Connector 13"/>
+          <p:cNvCxnSpPr>
+            <a:stCxn id="27" idx="5"/>
+            <a:endCxn id="39" idx="0"/>
+          </p:cNvCxnSpPr>
+          <p:nvPr/>
+        </p:nvCxnSpPr>
+        <p:spPr>
+          <a:xfrm>
+            <a:off x="6452944" y="4085808"/>
+            <a:ext cx="583169" cy="443590"/>
+          </a:xfrm>
+          <a:prstGeom prst="line">
+            <a:avLst/>
+          </a:prstGeom>
+          <a:ln w="25400">
+            <a:solidFill>
+              <a:schemeClr val="tx2">
+                <a:lumMod val="60000"/>
+                <a:lumOff val="40000"/>
+              </a:schemeClr>
+            </a:solidFill>
+          </a:ln>
+        </p:spPr>
+        <p:style>
+          <a:lnRef idx="1">
+            <a:schemeClr val="accent1"/>
+          </a:lnRef>
+          <a:fillRef idx="0">
+            <a:schemeClr val="accent1"/>
+          </a:fillRef>
+          <a:effectRef idx="0">
+            <a:schemeClr val="accent1"/>
+          </a:effectRef>
+          <a:fontRef idx="minor">
+            <a:schemeClr val="tx1"/>
+          </a:fontRef>
+        </p:style>
+      </p:cxnSp>
+    </p:spTree>
+    <p:extLst>
+      <p:ext uri="{BB962C8B-B14F-4D97-AF65-F5344CB8AC3E}">
+        <p14:creationId xmlns:p14="http://schemas.microsoft.com/office/powerpoint/2010/main" val="3455681646"/>
+      </p:ext>
+    </p:extLst>
+  </p:cSld>
+  <p:clrMapOvr>
+    <a:masterClrMapping/>
+  </p:clrMapOvr>
+  <p:timing>
+    <p:tnLst>
+      <p:par>
+        <p:cTn id="1" dur="indefinite" restart="never" nodeType="tmRoot"/>
+      </p:par>
+    </p:tnLst>
+  </p:timing>
+</p:sld>
+</file>
+
+<file path=ppt/slides/slide9.xml><?xml version="1.0" encoding="utf-8"?>
+<p:sld xmlns:a="http://schemas.openxmlformats.org/drawingml/2006/main" xmlns:r="http://schemas.openxmlformats.org/officeDocument/2006/relationships" xmlns:p="http://schemas.openxmlformats.org/presentationml/2006/main">
+  <p:cSld>
+    <p:spTree>
+      <p:nvGrpSpPr>
+        <p:cNvPr id="1" name=""/>
+        <p:cNvGrpSpPr/>
+        <p:nvPr/>
+      </p:nvGrpSpPr>
+      <p:grpSpPr>
+        <a:xfrm>
+          <a:off x="0" y="0"/>
+          <a:ext cx="0" cy="0"/>
+          <a:chOff x="0" y="0"/>
+          <a:chExt cx="0" cy="0"/>
+        </a:xfrm>
+      </p:grpSpPr>
+      <p:sp>
+        <p:nvSpPr>
+          <p:cNvPr id="2" name="Title 1"/>
+          <p:cNvSpPr>
+            <a:spLocks noGrp="1"/>
+          </p:cNvSpPr>
+          <p:nvPr>
+            <p:ph type="title"/>
+          </p:nvPr>
+        </p:nvSpPr>
+        <p:spPr/>
+        <p:txBody>
+          <a:bodyPr/>
+          <a:lstStyle/>
+          <a:p>
+            <a:r>
+              <a:rPr lang="en-GB" dirty="0" smtClean="0"/>
               <a:t>Sources</a:t>
             </a:r>
             <a:endParaRPr lang="en-GB" dirty="0"/>
@@ -8945,13 +9941,13 @@
               <a:rPr lang="de-CH" smtClean="0"/>
               <a:t>Slide </a:t>
             </a:r>
-            <a:fld id="{685FC7EA-22D2-457D-928A-81150051F383}" type="slidenum">
+            <a:fld id="{3E503769-6203-47E7-BF34-7749744C544D}" type="slidenum">
               <a:rPr lang="de-CH" smtClean="0"/>
-              <a:t>8</a:t>
+              <a:t>9</a:t>
             </a:fld>
             <a:r>
               <a:rPr lang="de-CH" smtClean="0"/>
-              <a:t> of 8</a:t>
+              <a:t> of 9</a:t>
             </a:r>
             <a:endParaRPr dirty="0"/>
           </a:p>

</xml_diff>

<commit_message>
add section for pure functions
</commit_message>
<xml_diff>
--- a/hesc_slides.pptx
+++ b/hesc_slides.pptx
@@ -5,10 +5,10 @@
     <p:sldMasterId id="2147483648" r:id="rId1"/>
   </p:sldMasterIdLst>
   <p:notesMasterIdLst>
-    <p:notesMasterId r:id="rId11"/>
+    <p:notesMasterId r:id="rId15"/>
   </p:notesMasterIdLst>
   <p:handoutMasterIdLst>
-    <p:handoutMasterId r:id="rId12"/>
+    <p:handoutMasterId r:id="rId16"/>
   </p:handoutMasterIdLst>
   <p:sldIdLst>
     <p:sldId id="256" r:id="rId2"/>
@@ -18,20 +18,24 @@
     <p:sldId id="260" r:id="rId6"/>
     <p:sldId id="266" r:id="rId7"/>
     <p:sldId id="267" r:id="rId8"/>
-    <p:sldId id="268" r:id="rId9"/>
-    <p:sldId id="265" r:id="rId10"/>
+    <p:sldId id="269" r:id="rId9"/>
+    <p:sldId id="268" r:id="rId10"/>
+    <p:sldId id="270" r:id="rId11"/>
+    <p:sldId id="271" r:id="rId12"/>
+    <p:sldId id="272" r:id="rId13"/>
+    <p:sldId id="265" r:id="rId14"/>
   </p:sldIdLst>
   <p:sldSz cx="9144000" cy="6858000" type="screen4x3"/>
   <p:notesSz cx="6858000" cy="9144000"/>
   <p:embeddedFontLst>
     <p:embeddedFont>
       <p:font typeface="AA Zuehlke" panose="02000503060000020004" pitchFamily="2" charset="0"/>
-      <p:regular r:id="rId13"/>
-      <p:italic r:id="rId14"/>
+      <p:regular r:id="rId17"/>
+      <p:italic r:id="rId18"/>
     </p:embeddedFont>
   </p:embeddedFontLst>
   <p:custDataLst>
-    <p:tags r:id="rId15"/>
+    <p:tags r:id="rId19"/>
   </p:custDataLst>
   <p:defaultTextStyle>
     <a:defPPr>
@@ -839,14 +843,14 @@
               <a:rPr lang="de-CH" smtClean="0"/>
               <a:t>Slide </a:t>
             </a:r>
-            <a:fld id="{9A8A5ACD-64A8-4254-8D13-7D6DBDC1CEB1}" type="slidenum">
+            <a:fld id="{263397E5-CC26-47BF-B745-3BCD64ED37B3}" type="slidenum">
               <a:rPr smtClean="0"/>
               <a:pPr/>
               <a:t>‹#›</a:t>
             </a:fld>
             <a:r>
               <a:rPr lang="de-CH" smtClean="0"/>
-              <a:t> of 9</a:t>
+              <a:t> of 13</a:t>
             </a:r>
             <a:endParaRPr dirty="0"/>
           </a:p>
@@ -1163,14 +1167,14 @@
               <a:rPr lang="de-CH" smtClean="0"/>
               <a:t>Slide </a:t>
             </a:r>
-            <a:fld id="{DD9BEA67-83DD-4AA9-A8C2-FFD6D6FCAA0E}" type="slidenum">
+            <a:fld id="{74050112-1407-444A-BC8C-F1EA0236BC7D}" type="slidenum">
               <a:rPr smtClean="0"/>
               <a:pPr/>
               <a:t>‹#›</a:t>
             </a:fld>
             <a:r>
               <a:rPr lang="de-CH" smtClean="0"/>
-              <a:t> of 9</a:t>
+              <a:t> of 13</a:t>
             </a:r>
             <a:endParaRPr dirty="0"/>
           </a:p>
@@ -1465,14 +1469,14 @@
               <a:rPr lang="de-CH" smtClean="0"/>
               <a:t>Slide </a:t>
             </a:r>
-            <a:fld id="{BCD9B376-BEBB-4EF4-90A5-8BE10EBE3586}" type="slidenum">
+            <a:fld id="{471EE384-0919-4424-B187-DCC2FBB4897E}" type="slidenum">
               <a:rPr smtClean="0"/>
               <a:pPr/>
               <a:t>‹#›</a:t>
             </a:fld>
             <a:r>
               <a:rPr lang="de-CH" smtClean="0"/>
-              <a:t> of 9</a:t>
+              <a:t> of 13</a:t>
             </a:r>
             <a:endParaRPr dirty="0"/>
           </a:p>
@@ -1797,14 +1801,14 @@
               <a:rPr lang="de-CH" smtClean="0"/>
               <a:t>Slide </a:t>
             </a:r>
-            <a:fld id="{CD8870B2-5CDF-4B86-96FF-AE7F4CCFF6C1}" type="slidenum">
+            <a:fld id="{6FF08E2E-E8F5-40B7-B7F4-3D55059A3E60}" type="slidenum">
               <a:rPr smtClean="0"/>
               <a:pPr/>
               <a:t>‹#›</a:t>
             </a:fld>
             <a:r>
               <a:rPr lang="de-CH" smtClean="0"/>
-              <a:t> of 9</a:t>
+              <a:t> of 13</a:t>
             </a:r>
             <a:endParaRPr dirty="0"/>
           </a:p>
@@ -2131,14 +2135,14 @@
               <a:rPr lang="de-CH" smtClean="0"/>
               <a:t>Slide </a:t>
             </a:r>
-            <a:fld id="{F7D2FE76-DC47-4373-9FBA-3506E2D91D71}" type="slidenum">
+            <a:fld id="{C02005D0-79BE-4024-B5B2-BB78886FC42A}" type="slidenum">
               <a:rPr smtClean="0"/>
               <a:pPr/>
               <a:t>‹#›</a:t>
             </a:fld>
             <a:r>
               <a:rPr lang="de-CH" smtClean="0"/>
-              <a:t> of 9</a:t>
+              <a:t> of 13</a:t>
             </a:r>
             <a:endParaRPr dirty="0"/>
           </a:p>
@@ -2561,14 +2565,14 @@
               <a:rPr lang="de-CH" smtClean="0"/>
               <a:t>Slide </a:t>
             </a:r>
-            <a:fld id="{A33209C4-4EFF-450C-AEA1-851923D14791}" type="slidenum">
+            <a:fld id="{BD59AA28-0103-4B09-9CB1-4F517B4F01E7}" type="slidenum">
               <a:rPr smtClean="0"/>
               <a:pPr/>
               <a:t>‹#›</a:t>
             </a:fld>
             <a:r>
               <a:rPr lang="de-CH" smtClean="0"/>
-              <a:t> of 9</a:t>
+              <a:t> of 13</a:t>
             </a:r>
             <a:endParaRPr dirty="0"/>
           </a:p>
@@ -3279,14 +3283,14 @@
               <a:rPr lang="de-CH" smtClean="0"/>
               <a:t>Slide </a:t>
             </a:r>
-            <a:fld id="{C80DF0E9-E4E6-43B3-9035-EC3239A7782F}" type="slidenum">
+            <a:fld id="{E94FE720-20FC-49E2-BFB5-C0406A3DA632}" type="slidenum">
               <a:rPr smtClean="0"/>
               <a:pPr/>
               <a:t>‹#›</a:t>
             </a:fld>
             <a:r>
               <a:rPr lang="de-CH" smtClean="0"/>
-              <a:t> of 9</a:t>
+              <a:t> of 13</a:t>
             </a:r>
             <a:endParaRPr dirty="0"/>
           </a:p>
@@ -3585,14 +3589,14 @@
               <a:rPr lang="de-CH" smtClean="0"/>
               <a:t>Slide </a:t>
             </a:r>
-            <a:fld id="{32276C3D-631D-48A0-9912-9736F5E24E21}" type="slidenum">
+            <a:fld id="{E4A8FDD1-07FD-4071-9ED2-63CFA909A6B3}" type="slidenum">
               <a:rPr smtClean="0"/>
               <a:pPr/>
               <a:t>‹#›</a:t>
             </a:fld>
             <a:r>
               <a:rPr lang="de-CH" smtClean="0"/>
-              <a:t> of 9</a:t>
+              <a:t> of 13</a:t>
             </a:r>
             <a:endParaRPr dirty="0"/>
           </a:p>
@@ -4112,14 +4116,14 @@
               <a:rPr lang="de-CH" smtClean="0"/>
               <a:t>Slide </a:t>
             </a:r>
-            <a:fld id="{E3EAFAAC-C7E8-41B2-B8BC-93FFB1001235}" type="slidenum">
+            <a:fld id="{76CE308E-33A9-403C-8375-7F2C1442D362}" type="slidenum">
               <a:rPr smtClean="0"/>
               <a:pPr/>
               <a:t>‹#›</a:t>
             </a:fld>
             <a:r>
               <a:rPr lang="de-CH" smtClean="0"/>
-              <a:t> of 9</a:t>
+              <a:t> of 13</a:t>
             </a:r>
             <a:endParaRPr dirty="0"/>
           </a:p>
@@ -4510,14 +4514,14 @@
               <a:rPr lang="de-CH" smtClean="0"/>
               <a:t>Slide </a:t>
             </a:r>
-            <a:fld id="{BE474B26-A8CF-404A-9839-72B9EB1F7342}" type="slidenum">
+            <a:fld id="{B7590106-37DD-4ADB-A4EF-FB60CFDBC9B8}" type="slidenum">
               <a:rPr smtClean="0"/>
               <a:pPr/>
               <a:t>‹#›</a:t>
             </a:fld>
             <a:r>
               <a:rPr lang="de-CH" smtClean="0"/>
-              <a:t> of 9</a:t>
+              <a:t> of 13</a:t>
             </a:r>
             <a:endParaRPr dirty="0"/>
           </a:p>
@@ -4740,14 +4744,14 @@
               <a:rPr lang="de-CH" smtClean="0"/>
               <a:t>Slide </a:t>
             </a:r>
-            <a:fld id="{078419FC-5656-4C4F-A4B2-2DE249960867}" type="slidenum">
+            <a:fld id="{86CF5361-59FD-483C-8B5E-6A680FCB1B8D}" type="slidenum">
               <a:rPr smtClean="0"/>
               <a:pPr/>
               <a:t>‹#›</a:t>
             </a:fld>
             <a:r>
               <a:rPr lang="de-CH" smtClean="0"/>
-              <a:t> of 9</a:t>
+              <a:t> of 13</a:t>
             </a:r>
             <a:endParaRPr dirty="0"/>
           </a:p>
@@ -5018,14 +5022,14 @@
               <a:rPr lang="de-CH" smtClean="0"/>
               <a:t>Slide </a:t>
             </a:r>
-            <a:fld id="{0C67B7AA-86CC-4DE9-9F2E-827B0164D2BF}" type="slidenum">
+            <a:fld id="{3DFF03ED-9DBE-4DA1-A755-3A127E6F4D00}" type="slidenum">
               <a:rPr smtClean="0"/>
               <a:pPr/>
               <a:t>‹#›</a:t>
             </a:fld>
             <a:r>
               <a:rPr lang="de-CH" smtClean="0"/>
-              <a:t> of 9</a:t>
+              <a:t> of 13</a:t>
             </a:r>
             <a:endParaRPr dirty="0"/>
           </a:p>
@@ -5489,13 +5493,13 @@
               <a:rPr lang="de-CH" smtClean="0"/>
               <a:t>Slide </a:t>
             </a:r>
-            <a:fld id="{339EFE05-9E00-4130-99D6-47104AA201F5}" type="slidenum">
+            <a:fld id="{4CBE3C23-89E4-4732-B0CF-F443AFD6B238}" type="slidenum">
               <a:rPr lang="de-CH" smtClean="0"/>
               <a:t>1</a:t>
             </a:fld>
             <a:r>
               <a:rPr lang="de-CH" smtClean="0"/>
-              <a:t> of 9</a:t>
+              <a:t> of 13</a:t>
             </a:r>
             <a:endParaRPr lang="de-CH" dirty="0"/>
           </a:p>
@@ -5505,6 +5509,817 @@
     <p:extLst>
       <p:ext uri="{BB962C8B-B14F-4D97-AF65-F5344CB8AC3E}">
         <p14:creationId xmlns:p14="http://schemas.microsoft.com/office/powerpoint/2010/main" val="4062334564"/>
+      </p:ext>
+    </p:extLst>
+  </p:cSld>
+  <p:clrMapOvr>
+    <a:masterClrMapping/>
+  </p:clrMapOvr>
+</p:sld>
+</file>
+
+<file path=ppt/slides/slide10.xml><?xml version="1.0" encoding="utf-8"?>
+<p:sld xmlns:a="http://schemas.openxmlformats.org/drawingml/2006/main" xmlns:r="http://schemas.openxmlformats.org/officeDocument/2006/relationships" xmlns:p="http://schemas.openxmlformats.org/presentationml/2006/main">
+  <p:cSld>
+    <p:spTree>
+      <p:nvGrpSpPr>
+        <p:cNvPr id="1" name=""/>
+        <p:cNvGrpSpPr/>
+        <p:nvPr/>
+      </p:nvGrpSpPr>
+      <p:grpSpPr>
+        <a:xfrm>
+          <a:off x="0" y="0"/>
+          <a:ext cx="0" cy="0"/>
+          <a:chOff x="0" y="0"/>
+          <a:chExt cx="0" cy="0"/>
+        </a:xfrm>
+      </p:grpSpPr>
+      <p:sp>
+        <p:nvSpPr>
+          <p:cNvPr id="2" name="Title 1"/>
+          <p:cNvSpPr>
+            <a:spLocks noGrp="1"/>
+          </p:cNvSpPr>
+          <p:nvPr>
+            <p:ph type="title"/>
+          </p:nvPr>
+        </p:nvSpPr>
+        <p:spPr/>
+        <p:txBody>
+          <a:bodyPr/>
+          <a:lstStyle/>
+          <a:p>
+            <a:r>
+              <a:rPr lang="en-GB" dirty="0" smtClean="0"/>
+              <a:t>Pure Functions</a:t>
+            </a:r>
+            <a:endParaRPr lang="en-GB" dirty="0"/>
+          </a:p>
+        </p:txBody>
+      </p:sp>
+      <p:sp>
+        <p:nvSpPr>
+          <p:cNvPr id="3" name="Content Placeholder 2"/>
+          <p:cNvSpPr>
+            <a:spLocks noGrp="1"/>
+          </p:cNvSpPr>
+          <p:nvPr>
+            <p:ph idx="1"/>
+          </p:nvPr>
+        </p:nvSpPr>
+        <p:spPr/>
+        <p:txBody>
+          <a:bodyPr/>
+          <a:lstStyle/>
+          <a:p>
+            <a:pPr marL="342900" indent="-342900">
+              <a:buFont typeface="Arial" panose="020B0604020202020204" pitchFamily="34" charset="0"/>
+              <a:buChar char="•"/>
+            </a:pPr>
+            <a:r>
+              <a:rPr lang="en-GB" dirty="0" smtClean="0"/>
+              <a:t>A function, where the return value is only determined by the input value</a:t>
+            </a:r>
+          </a:p>
+          <a:p>
+            <a:pPr marL="342900" indent="-342900">
+              <a:buFont typeface="Arial" panose="020B0604020202020204" pitchFamily="34" charset="0"/>
+              <a:buChar char="•"/>
+            </a:pPr>
+            <a:r>
+              <a:rPr lang="en-GB" dirty="0" smtClean="0"/>
+              <a:t>A function without side effects</a:t>
+            </a:r>
+          </a:p>
+          <a:p>
+            <a:pPr marL="342900" indent="-342900">
+              <a:buFont typeface="Arial" panose="020B0604020202020204" pitchFamily="34" charset="0"/>
+              <a:buChar char="•"/>
+            </a:pPr>
+            <a:r>
+              <a:rPr lang="en-GB" dirty="0" smtClean="0"/>
+              <a:t>An invocation of a pure function can always be replaced with its return value</a:t>
+            </a:r>
+          </a:p>
+          <a:p>
+            <a:pPr lvl="1" indent="0">
+              <a:buNone/>
+            </a:pPr>
+            <a:endParaRPr lang="en-GB" dirty="0"/>
+          </a:p>
+        </p:txBody>
+      </p:sp>
+      <p:sp>
+        <p:nvSpPr>
+          <p:cNvPr id="4" name="Date Placeholder 3"/>
+          <p:cNvSpPr>
+            <a:spLocks noGrp="1"/>
+          </p:cNvSpPr>
+          <p:nvPr>
+            <p:ph type="dt" sz="half" idx="10"/>
+          </p:nvPr>
+        </p:nvSpPr>
+        <p:spPr/>
+        <p:txBody>
+          <a:bodyPr/>
+          <a:lstStyle/>
+          <a:p>
+            <a:r>
+              <a:rPr lang="de-CH" smtClean="0"/>
+              <a:t>14. September 2015</a:t>
+            </a:r>
+            <a:endParaRPr lang="de-CH" dirty="0"/>
+          </a:p>
+        </p:txBody>
+      </p:sp>
+      <p:sp>
+        <p:nvSpPr>
+          <p:cNvPr id="5" name="Footer Placeholder 4"/>
+          <p:cNvSpPr>
+            <a:spLocks noGrp="1"/>
+          </p:cNvSpPr>
+          <p:nvPr>
+            <p:ph type="ftr" sz="quarter" idx="11"/>
+          </p:nvPr>
+        </p:nvSpPr>
+        <p:spPr/>
+        <p:txBody>
+          <a:bodyPr/>
+          <a:lstStyle/>
+          <a:p>
+            <a:r>
+              <a:rPr lang="en-US" smtClean="0"/>
+              <a:t>Functional Design Patterns for OO Practicioners | Hendrik Schöneberg</a:t>
+            </a:r>
+            <a:endParaRPr lang="de-CH" dirty="0"/>
+          </a:p>
+        </p:txBody>
+      </p:sp>
+      <p:sp>
+        <p:nvSpPr>
+          <p:cNvPr id="7" name="Text Placeholder 6"/>
+          <p:cNvSpPr>
+            <a:spLocks noGrp="1"/>
+          </p:cNvSpPr>
+          <p:nvPr>
+            <p:ph type="body" sz="quarter" idx="13"/>
+          </p:nvPr>
+        </p:nvSpPr>
+        <p:spPr/>
+        <p:txBody>
+          <a:bodyPr/>
+          <a:lstStyle/>
+          <a:p>
+            <a:endParaRPr lang="en-GB"/>
+          </a:p>
+        </p:txBody>
+      </p:sp>
+      <p:sp>
+        <p:nvSpPr>
+          <p:cNvPr id="8" name="Slide Number Placeholder 7"/>
+          <p:cNvSpPr>
+            <a:spLocks noGrp="1"/>
+          </p:cNvSpPr>
+          <p:nvPr>
+            <p:ph type="sldNum" sz="quarter" idx="12"/>
+          </p:nvPr>
+        </p:nvSpPr>
+        <p:spPr/>
+        <p:txBody>
+          <a:bodyPr/>
+          <a:lstStyle/>
+          <a:p>
+            <a:r>
+              <a:rPr lang="de-CH" smtClean="0"/>
+              <a:t>Slide </a:t>
+            </a:r>
+            <a:fld id="{98B6CA01-10A4-41C9-BA1F-367CDDF03C61}" type="slidenum">
+              <a:rPr lang="de-CH" smtClean="0"/>
+              <a:t>10</a:t>
+            </a:fld>
+            <a:r>
+              <a:rPr lang="de-CH" smtClean="0"/>
+              <a:t> of 13</a:t>
+            </a:r>
+            <a:endParaRPr dirty="0"/>
+          </a:p>
+        </p:txBody>
+      </p:sp>
+    </p:spTree>
+    <p:extLst>
+      <p:ext uri="{BB962C8B-B14F-4D97-AF65-F5344CB8AC3E}">
+        <p14:creationId xmlns:p14="http://schemas.microsoft.com/office/powerpoint/2010/main" val="248071837"/>
+      </p:ext>
+    </p:extLst>
+  </p:cSld>
+  <p:clrMapOvr>
+    <a:masterClrMapping/>
+  </p:clrMapOvr>
+</p:sld>
+</file>
+
+<file path=ppt/slides/slide11.xml><?xml version="1.0" encoding="utf-8"?>
+<p:sld xmlns:a="http://schemas.openxmlformats.org/drawingml/2006/main" xmlns:r="http://schemas.openxmlformats.org/officeDocument/2006/relationships" xmlns:p="http://schemas.openxmlformats.org/presentationml/2006/main">
+  <p:cSld>
+    <p:spTree>
+      <p:nvGrpSpPr>
+        <p:cNvPr id="1" name=""/>
+        <p:cNvGrpSpPr/>
+        <p:nvPr/>
+      </p:nvGrpSpPr>
+      <p:grpSpPr>
+        <a:xfrm>
+          <a:off x="0" y="0"/>
+          <a:ext cx="0" cy="0"/>
+          <a:chOff x="0" y="0"/>
+          <a:chExt cx="0" cy="0"/>
+        </a:xfrm>
+      </p:grpSpPr>
+      <p:sp>
+        <p:nvSpPr>
+          <p:cNvPr id="2" name="Title 1"/>
+          <p:cNvSpPr>
+            <a:spLocks noGrp="1"/>
+          </p:cNvSpPr>
+          <p:nvPr>
+            <p:ph type="title"/>
+          </p:nvPr>
+        </p:nvSpPr>
+        <p:spPr/>
+        <p:txBody>
+          <a:bodyPr/>
+          <a:lstStyle/>
+          <a:p>
+            <a:r>
+              <a:rPr lang="en-GB" dirty="0" smtClean="0"/>
+              <a:t>Pure Functions</a:t>
+            </a:r>
+            <a:endParaRPr lang="en-GB" dirty="0"/>
+          </a:p>
+        </p:txBody>
+      </p:sp>
+      <p:sp>
+        <p:nvSpPr>
+          <p:cNvPr id="3" name="Content Placeholder 2"/>
+          <p:cNvSpPr>
+            <a:spLocks noGrp="1"/>
+          </p:cNvSpPr>
+          <p:nvPr>
+            <p:ph idx="1"/>
+          </p:nvPr>
+        </p:nvSpPr>
+        <p:spPr/>
+        <p:txBody>
+          <a:bodyPr/>
+          <a:lstStyle/>
+          <a:p>
+            <a:endParaRPr lang="en-GB" dirty="0"/>
+          </a:p>
+        </p:txBody>
+      </p:sp>
+      <p:sp>
+        <p:nvSpPr>
+          <p:cNvPr id="4" name="Date Placeholder 3"/>
+          <p:cNvSpPr>
+            <a:spLocks noGrp="1"/>
+          </p:cNvSpPr>
+          <p:nvPr>
+            <p:ph type="dt" sz="half" idx="10"/>
+          </p:nvPr>
+        </p:nvSpPr>
+        <p:spPr/>
+        <p:txBody>
+          <a:bodyPr/>
+          <a:lstStyle/>
+          <a:p>
+            <a:r>
+              <a:rPr lang="de-CH" smtClean="0"/>
+              <a:t>14. September 2015</a:t>
+            </a:r>
+            <a:endParaRPr lang="de-CH" dirty="0"/>
+          </a:p>
+        </p:txBody>
+      </p:sp>
+      <p:sp>
+        <p:nvSpPr>
+          <p:cNvPr id="5" name="Footer Placeholder 4"/>
+          <p:cNvSpPr>
+            <a:spLocks noGrp="1"/>
+          </p:cNvSpPr>
+          <p:nvPr>
+            <p:ph type="ftr" sz="quarter" idx="11"/>
+          </p:nvPr>
+        </p:nvSpPr>
+        <p:spPr/>
+        <p:txBody>
+          <a:bodyPr/>
+          <a:lstStyle/>
+          <a:p>
+            <a:r>
+              <a:rPr lang="en-US" smtClean="0"/>
+              <a:t>Functional Design Patterns for OO Practicioners | Hendrik Schöneberg</a:t>
+            </a:r>
+            <a:endParaRPr lang="de-CH" dirty="0"/>
+          </a:p>
+        </p:txBody>
+      </p:sp>
+      <p:sp>
+        <p:nvSpPr>
+          <p:cNvPr id="7" name="Text Placeholder 6"/>
+          <p:cNvSpPr>
+            <a:spLocks noGrp="1"/>
+          </p:cNvSpPr>
+          <p:nvPr>
+            <p:ph type="body" sz="quarter" idx="13"/>
+          </p:nvPr>
+        </p:nvSpPr>
+        <p:spPr/>
+        <p:txBody>
+          <a:bodyPr/>
+          <a:lstStyle/>
+          <a:p>
+            <a:r>
+              <a:rPr lang="en-GB" dirty="0" smtClean="0"/>
+              <a:t>Referential Transparency</a:t>
+            </a:r>
+            <a:endParaRPr lang="en-GB" dirty="0"/>
+          </a:p>
+        </p:txBody>
+      </p:sp>
+      <p:sp>
+        <p:nvSpPr>
+          <p:cNvPr id="8" name="Slide Number Placeholder 7"/>
+          <p:cNvSpPr>
+            <a:spLocks noGrp="1"/>
+          </p:cNvSpPr>
+          <p:nvPr>
+            <p:ph type="sldNum" sz="quarter" idx="12"/>
+          </p:nvPr>
+        </p:nvSpPr>
+        <p:spPr/>
+        <p:txBody>
+          <a:bodyPr/>
+          <a:lstStyle/>
+          <a:p>
+            <a:r>
+              <a:rPr lang="de-CH" smtClean="0"/>
+              <a:t>Slide </a:t>
+            </a:r>
+            <a:fld id="{460BB805-AC70-4385-915F-5ECB1F878884}" type="slidenum">
+              <a:rPr lang="de-CH" smtClean="0"/>
+              <a:t>11</a:t>
+            </a:fld>
+            <a:r>
+              <a:rPr lang="de-CH" smtClean="0"/>
+              <a:t> of 13</a:t>
+            </a:r>
+            <a:endParaRPr dirty="0"/>
+          </a:p>
+        </p:txBody>
+      </p:sp>
+    </p:spTree>
+    <p:extLst>
+      <p:ext uri="{BB962C8B-B14F-4D97-AF65-F5344CB8AC3E}">
+        <p14:creationId xmlns:p14="http://schemas.microsoft.com/office/powerpoint/2010/main" val="472272379"/>
+      </p:ext>
+    </p:extLst>
+  </p:cSld>
+  <p:clrMapOvr>
+    <a:masterClrMapping/>
+  </p:clrMapOvr>
+</p:sld>
+</file>
+
+<file path=ppt/slides/slide12.xml><?xml version="1.0" encoding="utf-8"?>
+<p:sld xmlns:a="http://schemas.openxmlformats.org/drawingml/2006/main" xmlns:r="http://schemas.openxmlformats.org/officeDocument/2006/relationships" xmlns:p="http://schemas.openxmlformats.org/presentationml/2006/main">
+  <p:cSld>
+    <p:spTree>
+      <p:nvGrpSpPr>
+        <p:cNvPr id="1" name=""/>
+        <p:cNvGrpSpPr/>
+        <p:nvPr/>
+      </p:nvGrpSpPr>
+      <p:grpSpPr>
+        <a:xfrm>
+          <a:off x="0" y="0"/>
+          <a:ext cx="0" cy="0"/>
+          <a:chOff x="0" y="0"/>
+          <a:chExt cx="0" cy="0"/>
+        </a:xfrm>
+      </p:grpSpPr>
+      <p:sp>
+        <p:nvSpPr>
+          <p:cNvPr id="2" name="Title 1"/>
+          <p:cNvSpPr>
+            <a:spLocks noGrp="1"/>
+          </p:cNvSpPr>
+          <p:nvPr>
+            <p:ph type="title"/>
+          </p:nvPr>
+        </p:nvSpPr>
+        <p:spPr/>
+        <p:txBody>
+          <a:bodyPr/>
+          <a:lstStyle/>
+          <a:p>
+            <a:r>
+              <a:rPr lang="en-GB" dirty="0" smtClean="0"/>
+              <a:t>Pure Functions</a:t>
+            </a:r>
+            <a:endParaRPr lang="en-GB" dirty="0"/>
+          </a:p>
+        </p:txBody>
+      </p:sp>
+      <p:sp>
+        <p:nvSpPr>
+          <p:cNvPr id="3" name="Content Placeholder 2"/>
+          <p:cNvSpPr>
+            <a:spLocks noGrp="1"/>
+          </p:cNvSpPr>
+          <p:nvPr>
+            <p:ph idx="1"/>
+          </p:nvPr>
+        </p:nvSpPr>
+        <p:spPr/>
+        <p:txBody>
+          <a:bodyPr/>
+          <a:lstStyle/>
+          <a:p>
+            <a:pPr marL="342900" indent="-342900">
+              <a:buFont typeface="Arial" panose="020B0604020202020204" pitchFamily="34" charset="0"/>
+              <a:buChar char="•"/>
+            </a:pPr>
+            <a:r>
+              <a:rPr lang="en-GB" dirty="0" smtClean="0"/>
+              <a:t>Go </a:t>
+            </a:r>
+            <a:r>
+              <a:rPr lang="en-GB" dirty="0"/>
+              <a:t>hand in hand with immutable values</a:t>
+            </a:r>
+          </a:p>
+          <a:p>
+            <a:pPr marL="342900" indent="-342900">
+              <a:buFont typeface="Arial" panose="020B0604020202020204" pitchFamily="34" charset="0"/>
+              <a:buChar char="•"/>
+            </a:pPr>
+            <a:r>
+              <a:rPr lang="en-GB" dirty="0"/>
+              <a:t>Functions are easier to test and verify</a:t>
+            </a:r>
+          </a:p>
+          <a:p>
+            <a:pPr marL="342900" indent="-342900">
+              <a:buFont typeface="Arial" panose="020B0604020202020204" pitchFamily="34" charset="0"/>
+              <a:buChar char="•"/>
+            </a:pPr>
+            <a:r>
+              <a:rPr lang="en-GB" dirty="0"/>
+              <a:t>Can simplify systems</a:t>
+            </a:r>
+          </a:p>
+          <a:p>
+            <a:pPr marL="608013" lvl="1" indent="-342900">
+              <a:buFont typeface="Arial" panose="020B0604020202020204" pitchFamily="34" charset="0"/>
+              <a:buChar char="•"/>
+            </a:pPr>
+            <a:r>
+              <a:rPr lang="en-GB" dirty="0"/>
+              <a:t>Especially </a:t>
+            </a:r>
+            <a:r>
+              <a:rPr lang="en-GB" dirty="0" smtClean="0"/>
+              <a:t>concurrency</a:t>
+            </a:r>
+            <a:endParaRPr lang="en-GB" dirty="0"/>
+          </a:p>
+          <a:p>
+            <a:pPr marL="342900" indent="-342900">
+              <a:buFont typeface="Arial" panose="020B0604020202020204" pitchFamily="34" charset="0"/>
+              <a:buChar char="•"/>
+            </a:pPr>
+            <a:r>
+              <a:rPr lang="en-GB" dirty="0" smtClean="0"/>
+              <a:t>Pure function calls can be parallelized</a:t>
+            </a:r>
+          </a:p>
+          <a:p>
+            <a:pPr marL="342900" indent="-342900">
+              <a:buFont typeface="Arial" panose="020B0604020202020204" pitchFamily="34" charset="0"/>
+              <a:buChar char="•"/>
+            </a:pPr>
+            <a:r>
+              <a:rPr lang="en-GB" dirty="0" smtClean="0"/>
+              <a:t>Since the result for a given input is always the same, it only needs to be computed once </a:t>
+            </a:r>
+          </a:p>
+          <a:p>
+            <a:pPr marL="342900" indent="-342900">
+              <a:buFont typeface="Arial" panose="020B0604020202020204" pitchFamily="34" charset="0"/>
+              <a:buChar char="•"/>
+            </a:pPr>
+            <a:r>
+              <a:rPr lang="en-GB" dirty="0" err="1" smtClean="0"/>
+              <a:t>Lazyness</a:t>
+            </a:r>
+            <a:r>
+              <a:rPr lang="en-GB" dirty="0" smtClean="0"/>
+              <a:t>: Since the function does not cause any side effects, we can postpone computation until we actually need </a:t>
+            </a:r>
+            <a:r>
+              <a:rPr lang="en-GB" smtClean="0"/>
+              <a:t>the result</a:t>
+            </a:r>
+          </a:p>
+          <a:p>
+            <a:pPr marL="342900" indent="-342900">
+              <a:buFont typeface="Arial" panose="020B0604020202020204" pitchFamily="34" charset="0"/>
+              <a:buChar char="•"/>
+            </a:pPr>
+            <a:endParaRPr lang="en-GB" dirty="0"/>
+          </a:p>
+        </p:txBody>
+      </p:sp>
+      <p:sp>
+        <p:nvSpPr>
+          <p:cNvPr id="4" name="Date Placeholder 3"/>
+          <p:cNvSpPr>
+            <a:spLocks noGrp="1"/>
+          </p:cNvSpPr>
+          <p:nvPr>
+            <p:ph type="dt" sz="half" idx="10"/>
+          </p:nvPr>
+        </p:nvSpPr>
+        <p:spPr/>
+        <p:txBody>
+          <a:bodyPr/>
+          <a:lstStyle/>
+          <a:p>
+            <a:r>
+              <a:rPr lang="de-CH" smtClean="0"/>
+              <a:t>14. September 2015</a:t>
+            </a:r>
+            <a:endParaRPr lang="de-CH" dirty="0"/>
+          </a:p>
+        </p:txBody>
+      </p:sp>
+      <p:sp>
+        <p:nvSpPr>
+          <p:cNvPr id="5" name="Footer Placeholder 4"/>
+          <p:cNvSpPr>
+            <a:spLocks noGrp="1"/>
+          </p:cNvSpPr>
+          <p:nvPr>
+            <p:ph type="ftr" sz="quarter" idx="11"/>
+          </p:nvPr>
+        </p:nvSpPr>
+        <p:spPr/>
+        <p:txBody>
+          <a:bodyPr/>
+          <a:lstStyle/>
+          <a:p>
+            <a:r>
+              <a:rPr lang="en-US" smtClean="0"/>
+              <a:t>Functional Design Patterns for OO Practicioners | Hendrik Schöneberg</a:t>
+            </a:r>
+            <a:endParaRPr lang="de-CH" dirty="0"/>
+          </a:p>
+        </p:txBody>
+      </p:sp>
+      <p:sp>
+        <p:nvSpPr>
+          <p:cNvPr id="7" name="Text Placeholder 6"/>
+          <p:cNvSpPr>
+            <a:spLocks noGrp="1"/>
+          </p:cNvSpPr>
+          <p:nvPr>
+            <p:ph type="body" sz="quarter" idx="13"/>
+          </p:nvPr>
+        </p:nvSpPr>
+        <p:spPr/>
+        <p:txBody>
+          <a:bodyPr/>
+          <a:lstStyle/>
+          <a:p>
+            <a:r>
+              <a:rPr lang="en-GB" dirty="0" smtClean="0"/>
+              <a:t>Benefits</a:t>
+            </a:r>
+            <a:endParaRPr lang="en-GB" dirty="0"/>
+          </a:p>
+        </p:txBody>
+      </p:sp>
+      <p:sp>
+        <p:nvSpPr>
+          <p:cNvPr id="8" name="Slide Number Placeholder 7"/>
+          <p:cNvSpPr>
+            <a:spLocks noGrp="1"/>
+          </p:cNvSpPr>
+          <p:nvPr>
+            <p:ph type="sldNum" sz="quarter" idx="12"/>
+          </p:nvPr>
+        </p:nvSpPr>
+        <p:spPr/>
+        <p:txBody>
+          <a:bodyPr/>
+          <a:lstStyle/>
+          <a:p>
+            <a:r>
+              <a:rPr lang="de-CH" smtClean="0"/>
+              <a:t>Slide </a:t>
+            </a:r>
+            <a:fld id="{F2526A32-5D68-4C0F-B3C9-26E0EF0A1980}" type="slidenum">
+              <a:rPr lang="de-CH" smtClean="0"/>
+              <a:t>12</a:t>
+            </a:fld>
+            <a:r>
+              <a:rPr lang="de-CH" smtClean="0"/>
+              <a:t> of 13</a:t>
+            </a:r>
+            <a:endParaRPr dirty="0"/>
+          </a:p>
+        </p:txBody>
+      </p:sp>
+    </p:spTree>
+    <p:extLst>
+      <p:ext uri="{BB962C8B-B14F-4D97-AF65-F5344CB8AC3E}">
+        <p14:creationId xmlns:p14="http://schemas.microsoft.com/office/powerpoint/2010/main" val="799228113"/>
+      </p:ext>
+    </p:extLst>
+  </p:cSld>
+  <p:clrMapOvr>
+    <a:masterClrMapping/>
+  </p:clrMapOvr>
+</p:sld>
+</file>
+
+<file path=ppt/slides/slide13.xml><?xml version="1.0" encoding="utf-8"?>
+<p:sld xmlns:a="http://schemas.openxmlformats.org/drawingml/2006/main" xmlns:r="http://schemas.openxmlformats.org/officeDocument/2006/relationships" xmlns:p="http://schemas.openxmlformats.org/presentationml/2006/main">
+  <p:cSld>
+    <p:spTree>
+      <p:nvGrpSpPr>
+        <p:cNvPr id="1" name=""/>
+        <p:cNvGrpSpPr/>
+        <p:nvPr/>
+      </p:nvGrpSpPr>
+      <p:grpSpPr>
+        <a:xfrm>
+          <a:off x="0" y="0"/>
+          <a:ext cx="0" cy="0"/>
+          <a:chOff x="0" y="0"/>
+          <a:chExt cx="0" cy="0"/>
+        </a:xfrm>
+      </p:grpSpPr>
+      <p:sp>
+        <p:nvSpPr>
+          <p:cNvPr id="2" name="Title 1"/>
+          <p:cNvSpPr>
+            <a:spLocks noGrp="1"/>
+          </p:cNvSpPr>
+          <p:nvPr>
+            <p:ph type="title"/>
+          </p:nvPr>
+        </p:nvSpPr>
+        <p:spPr/>
+        <p:txBody>
+          <a:bodyPr/>
+          <a:lstStyle/>
+          <a:p>
+            <a:r>
+              <a:rPr lang="en-GB" dirty="0" smtClean="0"/>
+              <a:t>Sources</a:t>
+            </a:r>
+            <a:endParaRPr lang="en-GB" dirty="0"/>
+          </a:p>
+        </p:txBody>
+      </p:sp>
+      <p:sp>
+        <p:nvSpPr>
+          <p:cNvPr id="3" name="Content Placeholder 2"/>
+          <p:cNvSpPr>
+            <a:spLocks noGrp="1"/>
+          </p:cNvSpPr>
+          <p:nvPr>
+            <p:ph idx="1"/>
+          </p:nvPr>
+        </p:nvSpPr>
+        <p:spPr/>
+        <p:txBody>
+          <a:bodyPr/>
+          <a:lstStyle/>
+          <a:p>
+            <a:pPr marL="342900" indent="-342900">
+              <a:buFont typeface="Arial" panose="020B0604020202020204" pitchFamily="34" charset="0"/>
+              <a:buChar char="•"/>
+            </a:pPr>
+            <a:r>
+              <a:rPr lang="en-GB" dirty="0"/>
+              <a:t>http://de.slideshare.net/vkostyukov/purely-functional-data-structures-in-scala-26175521</a:t>
+            </a:r>
+          </a:p>
+        </p:txBody>
+      </p:sp>
+      <p:sp>
+        <p:nvSpPr>
+          <p:cNvPr id="4" name="Date Placeholder 3"/>
+          <p:cNvSpPr>
+            <a:spLocks noGrp="1"/>
+          </p:cNvSpPr>
+          <p:nvPr>
+            <p:ph type="dt" sz="half" idx="10"/>
+          </p:nvPr>
+        </p:nvSpPr>
+        <p:spPr/>
+        <p:txBody>
+          <a:bodyPr/>
+          <a:lstStyle/>
+          <a:p>
+            <a:r>
+              <a:rPr lang="de-CH" smtClean="0"/>
+              <a:t>14. September 2015</a:t>
+            </a:r>
+            <a:endParaRPr lang="de-CH" dirty="0"/>
+          </a:p>
+        </p:txBody>
+      </p:sp>
+      <p:sp>
+        <p:nvSpPr>
+          <p:cNvPr id="5" name="Footer Placeholder 4"/>
+          <p:cNvSpPr>
+            <a:spLocks noGrp="1"/>
+          </p:cNvSpPr>
+          <p:nvPr>
+            <p:ph type="ftr" sz="quarter" idx="11"/>
+          </p:nvPr>
+        </p:nvSpPr>
+        <p:spPr/>
+        <p:txBody>
+          <a:bodyPr/>
+          <a:lstStyle/>
+          <a:p>
+            <a:r>
+              <a:rPr lang="en-US" smtClean="0"/>
+              <a:t>Functional Design Patterns for OO Practicioners | Hendrik Schöneberg</a:t>
+            </a:r>
+            <a:endParaRPr lang="de-CH" dirty="0"/>
+          </a:p>
+        </p:txBody>
+      </p:sp>
+      <p:sp>
+        <p:nvSpPr>
+          <p:cNvPr id="7" name="Text Placeholder 6"/>
+          <p:cNvSpPr>
+            <a:spLocks noGrp="1"/>
+          </p:cNvSpPr>
+          <p:nvPr>
+            <p:ph type="body" sz="quarter" idx="13"/>
+          </p:nvPr>
+        </p:nvSpPr>
+        <p:spPr/>
+        <p:txBody>
+          <a:bodyPr/>
+          <a:lstStyle/>
+          <a:p>
+            <a:endParaRPr lang="en-GB" dirty="0"/>
+          </a:p>
+        </p:txBody>
+      </p:sp>
+      <p:sp>
+        <p:nvSpPr>
+          <p:cNvPr id="8" name="Slide Number Placeholder 7"/>
+          <p:cNvSpPr>
+            <a:spLocks noGrp="1"/>
+          </p:cNvSpPr>
+          <p:nvPr>
+            <p:ph type="sldNum" sz="quarter" idx="12"/>
+          </p:nvPr>
+        </p:nvSpPr>
+        <p:spPr/>
+        <p:txBody>
+          <a:bodyPr/>
+          <a:lstStyle/>
+          <a:p>
+            <a:r>
+              <a:rPr lang="de-CH" smtClean="0"/>
+              <a:t>Slide </a:t>
+            </a:r>
+            <a:fld id="{AFDA804B-AAAC-4182-8A8F-63CF44CD84E3}" type="slidenum">
+              <a:rPr lang="de-CH" smtClean="0"/>
+              <a:t>13</a:t>
+            </a:fld>
+            <a:r>
+              <a:rPr lang="de-CH" smtClean="0"/>
+              <a:t> of 13</a:t>
+            </a:r>
+            <a:endParaRPr dirty="0"/>
+          </a:p>
+        </p:txBody>
+      </p:sp>
+    </p:spTree>
+    <p:extLst>
+      <p:ext uri="{BB962C8B-B14F-4D97-AF65-F5344CB8AC3E}">
+        <p14:creationId xmlns:p14="http://schemas.microsoft.com/office/powerpoint/2010/main" val="2070841533"/>
       </p:ext>
     </p:extLst>
   </p:cSld>
@@ -5670,13 +6485,13 @@
               <a:rPr lang="de-CH" smtClean="0"/>
               <a:t>Slide </a:t>
             </a:r>
-            <a:fld id="{BEC66708-6AE6-4838-B931-B51DB2D4D18D}" type="slidenum">
+            <a:fld id="{15AE2485-7533-4D46-B1A8-678CB88DAF2E}" type="slidenum">
               <a:rPr lang="de-CH" smtClean="0"/>
               <a:t>2</a:t>
             </a:fld>
             <a:r>
               <a:rPr lang="de-CH" smtClean="0"/>
-              <a:t> of 9</a:t>
+              <a:t> of 13</a:t>
             </a:r>
             <a:endParaRPr lang="de-CH" dirty="0"/>
           </a:p>
@@ -5922,13 +6737,13 @@
               <a:rPr lang="de-CH" smtClean="0"/>
               <a:t>Slide </a:t>
             </a:r>
-            <a:fld id="{63B6B47E-819B-4F4C-A5B1-9E566DA07956}" type="slidenum">
+            <a:fld id="{078263C4-5CAC-4194-85AC-AB4CC728E3FB}" type="slidenum">
               <a:rPr lang="de-CH" smtClean="0"/>
               <a:t>3</a:t>
             </a:fld>
             <a:r>
               <a:rPr lang="de-CH" smtClean="0"/>
-              <a:t> of 9</a:t>
+              <a:t> of 13</a:t>
             </a:r>
             <a:endParaRPr lang="de-CH" dirty="0"/>
           </a:p>
@@ -6165,13 +6980,13 @@
               <a:rPr lang="de-CH" smtClean="0"/>
               <a:t>Slide </a:t>
             </a:r>
-            <a:fld id="{E52876BB-4CE0-4CEF-B8D9-894D9465326A}" type="slidenum">
+            <a:fld id="{25525A9C-FF09-40EB-9C61-9D1D03FB8B13}" type="slidenum">
               <a:rPr lang="de-CH" smtClean="0"/>
               <a:t>4</a:t>
             </a:fld>
             <a:r>
               <a:rPr lang="de-CH" smtClean="0"/>
-              <a:t> of 9</a:t>
+              <a:t> of 13</a:t>
             </a:r>
             <a:endParaRPr lang="de-CH" dirty="0"/>
           </a:p>
@@ -6337,13 +7152,13 @@
               <a:rPr lang="de-CH" smtClean="0"/>
               <a:t>Slide </a:t>
             </a:r>
-            <a:fld id="{97D036FE-72F0-48DE-96C4-D999F280BADC}" type="slidenum">
+            <a:fld id="{F82CED09-1468-4C22-8EF1-4FC4103EDB18}" type="slidenum">
               <a:rPr lang="de-CH" smtClean="0"/>
               <a:t>5</a:t>
             </a:fld>
             <a:r>
               <a:rPr lang="de-CH" smtClean="0"/>
-              <a:t> of 9</a:t>
+              <a:t> of 13</a:t>
             </a:r>
             <a:endParaRPr lang="de-CH" dirty="0"/>
           </a:p>
@@ -7084,13 +7899,13 @@
               <a:rPr lang="de-CH" smtClean="0"/>
               <a:t>Slide </a:t>
             </a:r>
-            <a:fld id="{FCFE8D47-229A-488B-950A-48A88092C6E8}" type="slidenum">
+            <a:fld id="{2B1B3298-BFCC-46C1-86E9-12BB50CB9008}" type="slidenum">
               <a:rPr lang="de-CH" smtClean="0"/>
               <a:t>6</a:t>
             </a:fld>
             <a:r>
               <a:rPr lang="de-CH" smtClean="0"/>
-              <a:t> of 9</a:t>
+              <a:t> of 13</a:t>
             </a:r>
             <a:endParaRPr dirty="0"/>
           </a:p>
@@ -8009,14 +8824,10 @@
           <a:p>
             <a:r>
               <a:rPr lang="en-GB" dirty="0" smtClean="0"/>
-              <a:t>Structural sharing </a:t>
-            </a:r>
-            <a:r>
-              <a:rPr lang="en-GB" smtClean="0"/>
-              <a:t>on </a:t>
-            </a:r>
-            <a:r>
-              <a:rPr lang="en-GB" smtClean="0"/>
+              <a:t>Structural sharing on </a:t>
+            </a:r>
+            <a:r>
+              <a:rPr lang="en-GB" dirty="0" smtClean="0"/>
               <a:t>collections</a:t>
             </a:r>
             <a:endParaRPr lang="en-GB" dirty="0"/>
@@ -8298,13 +9109,13 @@
               <a:rPr lang="de-CH" smtClean="0"/>
               <a:t>Slide </a:t>
             </a:r>
-            <a:fld id="{2F69F36E-E357-4AAE-A5E6-3EB16A56827B}" type="slidenum">
+            <a:fld id="{8F6E7DAF-6B1D-4D6A-A078-F40CD056BFD5}" type="slidenum">
               <a:rPr lang="de-CH" smtClean="0"/>
               <a:t>7</a:t>
             </a:fld>
             <a:r>
               <a:rPr lang="de-CH" smtClean="0"/>
-              <a:t> of 9</a:t>
+              <a:t> of 13</a:t>
             </a:r>
             <a:endParaRPr dirty="0"/>
           </a:p>
@@ -8608,7 +9419,7 @@
           <a:p>
             <a:r>
               <a:rPr lang="en-GB" dirty="0" smtClean="0"/>
-              <a:t>Lenses</a:t>
+              <a:t>Immutability</a:t>
             </a:r>
             <a:endParaRPr lang="en-GB" dirty="0"/>
           </a:p>
@@ -8696,7 +9507,7 @@
           <a:p>
             <a:r>
               <a:rPr lang="en-GB" dirty="0" smtClean="0"/>
-              <a:t>“Modify” immutable data structures</a:t>
+              <a:t>Modifying simple objects</a:t>
             </a:r>
             <a:endParaRPr lang="en-GB" dirty="0"/>
           </a:p>
@@ -8721,13 +9532,13 @@
               <a:rPr lang="de-CH" smtClean="0"/>
               <a:t>Slide </a:t>
             </a:r>
-            <a:fld id="{5834A51A-EE07-455B-A69D-48BC927734C3}" type="slidenum">
+            <a:fld id="{F8E8A325-B407-45D1-BA2C-F24A7A606AE6}" type="slidenum">
               <a:rPr lang="de-CH" smtClean="0"/>
               <a:t>8</a:t>
             </a:fld>
             <a:r>
               <a:rPr lang="de-CH" smtClean="0"/>
-              <a:t> of 9</a:t>
+              <a:t> of 13</a:t>
             </a:r>
             <a:endParaRPr dirty="0"/>
           </a:p>
@@ -8736,20 +9547,13 @@
     </p:spTree>
     <p:extLst>
       <p:ext uri="{BB962C8B-B14F-4D97-AF65-F5344CB8AC3E}">
-        <p14:creationId xmlns:p14="http://schemas.microsoft.com/office/powerpoint/2010/main" val="4267803930"/>
+        <p14:creationId xmlns:p14="http://schemas.microsoft.com/office/powerpoint/2010/main" val="349347434"/>
       </p:ext>
     </p:extLst>
   </p:cSld>
   <p:clrMapOvr>
     <a:masterClrMapping/>
   </p:clrMapOvr>
-  <p:timing>
-    <p:tnLst>
-      <p:par>
-        <p:cTn id="1" dur="indefinite" restart="never" nodeType="tmRoot"/>
-      </p:par>
-    </p:tnLst>
-  </p:timing>
 </p:sld>
 </file>
 
@@ -8787,7 +9591,7 @@
           <a:p>
             <a:r>
               <a:rPr lang="en-GB" dirty="0" smtClean="0"/>
-              <a:t>Sources</a:t>
+              <a:t>Lenses</a:t>
             </a:r>
             <a:endParaRPr lang="en-GB" dirty="0"/>
           </a:p>
@@ -8808,14 +9612,7 @@
           <a:bodyPr/>
           <a:lstStyle/>
           <a:p>
-            <a:pPr marL="342900" indent="-342900">
-              <a:buFont typeface="Arial" panose="020B0604020202020204" pitchFamily="34" charset="0"/>
-              <a:buChar char="•"/>
-            </a:pPr>
-            <a:r>
-              <a:rPr lang="en-GB" dirty="0"/>
-              <a:t>http://de.slideshare.net/vkostyukov/purely-functional-data-structures-in-scala-26175521</a:t>
-            </a:r>
+            <a:endParaRPr lang="en-GB"/>
           </a:p>
         </p:txBody>
       </p:sp>
@@ -8880,6 +9677,10 @@
           <a:bodyPr/>
           <a:lstStyle/>
           <a:p>
+            <a:r>
+              <a:rPr lang="en-GB" dirty="0" smtClean="0"/>
+              <a:t>“Modify” immutable data structures</a:t>
+            </a:r>
             <a:endParaRPr lang="en-GB" dirty="0"/>
           </a:p>
         </p:txBody>
@@ -8903,13 +9704,13 @@
               <a:rPr lang="de-CH" smtClean="0"/>
               <a:t>Slide </a:t>
             </a:r>
-            <a:fld id="{170AC33D-52EA-4BEC-98B5-28C384A7CFB2}" type="slidenum">
+            <a:fld id="{31C9FE4D-0A09-4C09-9EF7-B8CA8197C846}" type="slidenum">
               <a:rPr lang="de-CH" smtClean="0"/>
               <a:t>9</a:t>
             </a:fld>
             <a:r>
               <a:rPr lang="de-CH" smtClean="0"/>
-              <a:t> of 9</a:t>
+              <a:t> of 13</a:t>
             </a:r>
             <a:endParaRPr dirty="0"/>
           </a:p>
@@ -8918,13 +9719,20 @@
     </p:spTree>
     <p:extLst>
       <p:ext uri="{BB962C8B-B14F-4D97-AF65-F5344CB8AC3E}">
-        <p14:creationId xmlns:p14="http://schemas.microsoft.com/office/powerpoint/2010/main" val="2070841533"/>
+        <p14:creationId xmlns:p14="http://schemas.microsoft.com/office/powerpoint/2010/main" val="4267803930"/>
       </p:ext>
     </p:extLst>
   </p:cSld>
   <p:clrMapOvr>
     <a:masterClrMapping/>
   </p:clrMapOvr>
+  <p:timing>
+    <p:tnLst>
+      <p:par>
+        <p:cTn id="1" dur="indefinite" restart="never" nodeType="tmRoot"/>
+      </p:par>
+    </p:tnLst>
+  </p:timing>
 </p:sld>
 </file>
 

</xml_diff>

<commit_message>
reordering of immutability section
</commit_message>
<xml_diff>
--- a/hesc_slides.pptx
+++ b/hesc_slides.pptx
@@ -5,37 +5,45 @@
     <p:sldMasterId id="2147483648" r:id="rId1"/>
   </p:sldMasterIdLst>
   <p:notesMasterIdLst>
-    <p:notesMasterId r:id="rId15"/>
+    <p:notesMasterId r:id="rId16"/>
   </p:notesMasterIdLst>
   <p:handoutMasterIdLst>
-    <p:handoutMasterId r:id="rId16"/>
+    <p:handoutMasterId r:id="rId17"/>
   </p:handoutMasterIdLst>
   <p:sldIdLst>
     <p:sldId id="256" r:id="rId2"/>
     <p:sldId id="257" r:id="rId3"/>
     <p:sldId id="258" r:id="rId4"/>
-    <p:sldId id="259" r:id="rId5"/>
-    <p:sldId id="260" r:id="rId6"/>
-    <p:sldId id="266" r:id="rId7"/>
-    <p:sldId id="267" r:id="rId8"/>
-    <p:sldId id="269" r:id="rId9"/>
+    <p:sldId id="269" r:id="rId5"/>
+    <p:sldId id="259" r:id="rId6"/>
+    <p:sldId id="260" r:id="rId7"/>
+    <p:sldId id="266" r:id="rId8"/>
+    <p:sldId id="267" r:id="rId9"/>
     <p:sldId id="268" r:id="rId10"/>
     <p:sldId id="270" r:id="rId11"/>
-    <p:sldId id="271" r:id="rId12"/>
+    <p:sldId id="274" r:id="rId12"/>
     <p:sldId id="272" r:id="rId13"/>
-    <p:sldId id="265" r:id="rId14"/>
+    <p:sldId id="273" r:id="rId14"/>
+    <p:sldId id="265" r:id="rId15"/>
   </p:sldIdLst>
   <p:sldSz cx="9144000" cy="6858000" type="screen4x3"/>
   <p:notesSz cx="6858000" cy="9144000"/>
   <p:embeddedFontLst>
     <p:embeddedFont>
       <p:font typeface="AA Zuehlke" panose="02000503060000020004" pitchFamily="2" charset="0"/>
-      <p:regular r:id="rId17"/>
-      <p:italic r:id="rId18"/>
+      <p:regular r:id="rId18"/>
+      <p:italic r:id="rId19"/>
+    </p:embeddedFont>
+    <p:embeddedFont>
+      <p:font typeface="Consolas" panose="020B0609020204030204" pitchFamily="49" charset="0"/>
+      <p:regular r:id="rId20"/>
+      <p:bold r:id="rId21"/>
+      <p:italic r:id="rId22"/>
+      <p:boldItalic r:id="rId23"/>
     </p:embeddedFont>
   </p:embeddedFontLst>
   <p:custDataLst>
-    <p:tags r:id="rId19"/>
+    <p:tags r:id="rId24"/>
   </p:custDataLst>
   <p:defaultTextStyle>
     <a:defPPr>
@@ -843,14 +851,14 @@
               <a:rPr lang="de-CH" smtClean="0"/>
               <a:t>Slide </a:t>
             </a:r>
-            <a:fld id="{263397E5-CC26-47BF-B745-3BCD64ED37B3}" type="slidenum">
+            <a:fld id="{896E55A1-94AC-48B2-BB34-CDF414DEA0A2}" type="slidenum">
               <a:rPr smtClean="0"/>
               <a:pPr/>
               <a:t>‹#›</a:t>
             </a:fld>
             <a:r>
               <a:rPr lang="de-CH" smtClean="0"/>
-              <a:t> of 13</a:t>
+              <a:t> of 14</a:t>
             </a:r>
             <a:endParaRPr dirty="0"/>
           </a:p>
@@ -1167,14 +1175,14 @@
               <a:rPr lang="de-CH" smtClean="0"/>
               <a:t>Slide </a:t>
             </a:r>
-            <a:fld id="{74050112-1407-444A-BC8C-F1EA0236BC7D}" type="slidenum">
+            <a:fld id="{D73659C8-85A1-4EC5-9653-926E863D4B58}" type="slidenum">
               <a:rPr smtClean="0"/>
               <a:pPr/>
               <a:t>‹#›</a:t>
             </a:fld>
             <a:r>
               <a:rPr lang="de-CH" smtClean="0"/>
-              <a:t> of 13</a:t>
+              <a:t> of 14</a:t>
             </a:r>
             <a:endParaRPr dirty="0"/>
           </a:p>
@@ -1469,14 +1477,14 @@
               <a:rPr lang="de-CH" smtClean="0"/>
               <a:t>Slide </a:t>
             </a:r>
-            <a:fld id="{471EE384-0919-4424-B187-DCC2FBB4897E}" type="slidenum">
+            <a:fld id="{57607E35-7AF2-4056-93B3-13985AA8BC7A}" type="slidenum">
               <a:rPr smtClean="0"/>
               <a:pPr/>
               <a:t>‹#›</a:t>
             </a:fld>
             <a:r>
               <a:rPr lang="de-CH" smtClean="0"/>
-              <a:t> of 13</a:t>
+              <a:t> of 14</a:t>
             </a:r>
             <a:endParaRPr dirty="0"/>
           </a:p>
@@ -1801,14 +1809,14 @@
               <a:rPr lang="de-CH" smtClean="0"/>
               <a:t>Slide </a:t>
             </a:r>
-            <a:fld id="{6FF08E2E-E8F5-40B7-B7F4-3D55059A3E60}" type="slidenum">
+            <a:fld id="{F4302629-28D9-48AC-963F-735D3813436E}" type="slidenum">
               <a:rPr smtClean="0"/>
               <a:pPr/>
               <a:t>‹#›</a:t>
             </a:fld>
             <a:r>
               <a:rPr lang="de-CH" smtClean="0"/>
-              <a:t> of 13</a:t>
+              <a:t> of 14</a:t>
             </a:r>
             <a:endParaRPr dirty="0"/>
           </a:p>
@@ -2135,14 +2143,14 @@
               <a:rPr lang="de-CH" smtClean="0"/>
               <a:t>Slide </a:t>
             </a:r>
-            <a:fld id="{C02005D0-79BE-4024-B5B2-BB78886FC42A}" type="slidenum">
+            <a:fld id="{21CC7CB0-F343-4CB3-945D-B73DC8DE951F}" type="slidenum">
               <a:rPr smtClean="0"/>
               <a:pPr/>
               <a:t>‹#›</a:t>
             </a:fld>
             <a:r>
               <a:rPr lang="de-CH" smtClean="0"/>
-              <a:t> of 13</a:t>
+              <a:t> of 14</a:t>
             </a:r>
             <a:endParaRPr dirty="0"/>
           </a:p>
@@ -2565,14 +2573,14 @@
               <a:rPr lang="de-CH" smtClean="0"/>
               <a:t>Slide </a:t>
             </a:r>
-            <a:fld id="{BD59AA28-0103-4B09-9CB1-4F517B4F01E7}" type="slidenum">
+            <a:fld id="{A2F4EEB8-DEB9-472F-A1A4-783F708246EA}" type="slidenum">
               <a:rPr smtClean="0"/>
               <a:pPr/>
               <a:t>‹#›</a:t>
             </a:fld>
             <a:r>
               <a:rPr lang="de-CH" smtClean="0"/>
-              <a:t> of 13</a:t>
+              <a:t> of 14</a:t>
             </a:r>
             <a:endParaRPr dirty="0"/>
           </a:p>
@@ -3283,14 +3291,14 @@
               <a:rPr lang="de-CH" smtClean="0"/>
               <a:t>Slide </a:t>
             </a:r>
-            <a:fld id="{E94FE720-20FC-49E2-BFB5-C0406A3DA632}" type="slidenum">
+            <a:fld id="{5A7EBA9B-2CE2-45BA-858B-FC4464D96B8D}" type="slidenum">
               <a:rPr smtClean="0"/>
               <a:pPr/>
               <a:t>‹#›</a:t>
             </a:fld>
             <a:r>
               <a:rPr lang="de-CH" smtClean="0"/>
-              <a:t> of 13</a:t>
+              <a:t> of 14</a:t>
             </a:r>
             <a:endParaRPr dirty="0"/>
           </a:p>
@@ -3589,14 +3597,14 @@
               <a:rPr lang="de-CH" smtClean="0"/>
               <a:t>Slide </a:t>
             </a:r>
-            <a:fld id="{E4A8FDD1-07FD-4071-9ED2-63CFA909A6B3}" type="slidenum">
+            <a:fld id="{79C5F3BE-EA77-43D7-8C14-E0ECD5B33435}" type="slidenum">
               <a:rPr smtClean="0"/>
               <a:pPr/>
               <a:t>‹#›</a:t>
             </a:fld>
             <a:r>
               <a:rPr lang="de-CH" smtClean="0"/>
-              <a:t> of 13</a:t>
+              <a:t> of 14</a:t>
             </a:r>
             <a:endParaRPr dirty="0"/>
           </a:p>
@@ -4116,14 +4124,14 @@
               <a:rPr lang="de-CH" smtClean="0"/>
               <a:t>Slide </a:t>
             </a:r>
-            <a:fld id="{76CE308E-33A9-403C-8375-7F2C1442D362}" type="slidenum">
+            <a:fld id="{B34225D7-BE0E-46A3-B7FA-C41D668F1A62}" type="slidenum">
               <a:rPr smtClean="0"/>
               <a:pPr/>
               <a:t>‹#›</a:t>
             </a:fld>
             <a:r>
               <a:rPr lang="de-CH" smtClean="0"/>
-              <a:t> of 13</a:t>
+              <a:t> of 14</a:t>
             </a:r>
             <a:endParaRPr dirty="0"/>
           </a:p>
@@ -4514,14 +4522,14 @@
               <a:rPr lang="de-CH" smtClean="0"/>
               <a:t>Slide </a:t>
             </a:r>
-            <a:fld id="{B7590106-37DD-4ADB-A4EF-FB60CFDBC9B8}" type="slidenum">
+            <a:fld id="{53EEA307-0F46-4DE5-A960-9BBBFB789B1D}" type="slidenum">
               <a:rPr smtClean="0"/>
               <a:pPr/>
               <a:t>‹#›</a:t>
             </a:fld>
             <a:r>
               <a:rPr lang="de-CH" smtClean="0"/>
-              <a:t> of 13</a:t>
+              <a:t> of 14</a:t>
             </a:r>
             <a:endParaRPr dirty="0"/>
           </a:p>
@@ -4744,14 +4752,14 @@
               <a:rPr lang="de-CH" smtClean="0"/>
               <a:t>Slide </a:t>
             </a:r>
-            <a:fld id="{86CF5361-59FD-483C-8B5E-6A680FCB1B8D}" type="slidenum">
+            <a:fld id="{6EB56A60-887D-4F10-86C1-B93512D29D67}" type="slidenum">
               <a:rPr smtClean="0"/>
               <a:pPr/>
               <a:t>‹#›</a:t>
             </a:fld>
             <a:r>
               <a:rPr lang="de-CH" smtClean="0"/>
-              <a:t> of 13</a:t>
+              <a:t> of 14</a:t>
             </a:r>
             <a:endParaRPr dirty="0"/>
           </a:p>
@@ -5022,14 +5030,14 @@
               <a:rPr lang="de-CH" smtClean="0"/>
               <a:t>Slide </a:t>
             </a:r>
-            <a:fld id="{3DFF03ED-9DBE-4DA1-A755-3A127E6F4D00}" type="slidenum">
+            <a:fld id="{8AE55FD1-BBF6-40C6-BDD4-22AF49DE5C91}" type="slidenum">
               <a:rPr smtClean="0"/>
               <a:pPr/>
               <a:t>‹#›</a:t>
             </a:fld>
             <a:r>
               <a:rPr lang="de-CH" smtClean="0"/>
-              <a:t> of 13</a:t>
+              <a:t> of 14</a:t>
             </a:r>
             <a:endParaRPr dirty="0"/>
           </a:p>
@@ -5493,13 +5501,13 @@
               <a:rPr lang="de-CH" smtClean="0"/>
               <a:t>Slide </a:t>
             </a:r>
-            <a:fld id="{4CBE3C23-89E4-4732-B0CF-F443AFD6B238}" type="slidenum">
+            <a:fld id="{F9071F8D-E6F8-4FD9-A02A-644615A88B0E}" type="slidenum">
               <a:rPr lang="de-CH" smtClean="0"/>
               <a:t>1</a:t>
             </a:fld>
             <a:r>
               <a:rPr lang="de-CH" smtClean="0"/>
-              <a:t> of 13</a:t>
+              <a:t> of 14</a:t>
             </a:r>
             <a:endParaRPr lang="de-CH" dirty="0"/>
           </a:p>
@@ -5573,6 +5581,12 @@
           <a:bodyPr/>
           <a:lstStyle/>
           <a:p>
+            <a:r>
+              <a:rPr lang="en-GB" dirty="0" smtClean="0"/>
+              <a:t>Definition</a:t>
+            </a:r>
+          </a:p>
+          <a:p>
             <a:pPr marL="342900" indent="-342900">
               <a:buFont typeface="Arial" panose="020B0604020202020204" pitchFamily="34" charset="0"/>
               <a:buChar char="•"/>
@@ -5603,6 +5617,16 @@
             </a:r>
           </a:p>
           <a:p>
+            <a:pPr marL="342900" indent="-342900">
+              <a:buFont typeface="Arial" panose="020B0604020202020204" pitchFamily="34" charset="0"/>
+              <a:buChar char="•"/>
+            </a:pPr>
+            <a:r>
+              <a:rPr lang="en-GB" dirty="0" smtClean="0"/>
+              <a:t>A pure function cannot depend on hidden state or value or I/O</a:t>
+            </a:r>
+          </a:p>
+          <a:p>
             <a:pPr lvl="1" indent="0">
               <a:buNone/>
             </a:pPr>
@@ -5671,7 +5695,11 @@
           <a:bodyPr/>
           <a:lstStyle/>
           <a:p>
-            <a:endParaRPr lang="en-GB"/>
+            <a:r>
+              <a:rPr lang="en-GB" dirty="0" smtClean="0"/>
+              <a:t>Introduction</a:t>
+            </a:r>
+            <a:endParaRPr lang="en-GB" dirty="0"/>
           </a:p>
         </p:txBody>
       </p:sp>
@@ -5694,13 +5722,13 @@
               <a:rPr lang="de-CH" smtClean="0"/>
               <a:t>Slide </a:t>
             </a:r>
-            <a:fld id="{98B6CA01-10A4-41C9-BA1F-367CDDF03C61}" type="slidenum">
+            <a:fld id="{7E92FEA4-D085-4EB1-94EA-C092AC6D14CA}" type="slidenum">
               <a:rPr lang="de-CH" smtClean="0"/>
               <a:t>10</a:t>
             </a:fld>
             <a:r>
               <a:rPr lang="de-CH" smtClean="0"/>
-              <a:t> of 13</a:t>
+              <a:t> of 14</a:t>
             </a:r>
             <a:endParaRPr dirty="0"/>
           </a:p>
@@ -5774,6 +5802,30 @@
           <a:bodyPr/>
           <a:lstStyle/>
           <a:p>
+            <a:r>
+              <a:rPr lang="en-GB" dirty="0" smtClean="0"/>
+              <a:t>Definition</a:t>
+            </a:r>
+          </a:p>
+          <a:p>
+            <a:pPr marL="342900" indent="-342900">
+              <a:buFont typeface="Arial" panose="020B0604020202020204" pitchFamily="34" charset="0"/>
+              <a:buChar char="•"/>
+            </a:pPr>
+            <a:r>
+              <a:rPr lang="en-GB" dirty="0" smtClean="0"/>
+              <a:t>An expression is referentially transparent if it can be replaced with its value without changing the behaviour of a program</a:t>
+            </a:r>
+          </a:p>
+          <a:p>
+            <a:pPr marL="342900" indent="-342900">
+              <a:buFont typeface="Arial" panose="020B0604020202020204" pitchFamily="34" charset="0"/>
+              <a:buChar char="•"/>
+            </a:pPr>
+            <a:r>
+              <a:rPr lang="en-GB" dirty="0" smtClean="0"/>
+              <a:t>Usually referential transparency is broken by side effects, dependency on global or hidden state</a:t>
+            </a:r>
             <a:endParaRPr lang="en-GB" dirty="0"/>
           </a:p>
         </p:txBody>
@@ -5866,13 +5918,13 @@
               <a:rPr lang="de-CH" smtClean="0"/>
               <a:t>Slide </a:t>
             </a:r>
-            <a:fld id="{460BB805-AC70-4385-915F-5ECB1F878884}" type="slidenum">
+            <a:fld id="{30CBC17E-8D5F-4516-A8D0-85EFE44386DC}" type="slidenum">
               <a:rPr lang="de-CH" smtClean="0"/>
               <a:t>11</a:t>
             </a:fld>
             <a:r>
               <a:rPr lang="de-CH" smtClean="0"/>
-              <a:t> of 13</a:t>
+              <a:t> of 14</a:t>
             </a:r>
             <a:endParaRPr dirty="0"/>
           </a:p>
@@ -5881,7 +5933,7 @@
     </p:spTree>
     <p:extLst>
       <p:ext uri="{BB962C8B-B14F-4D97-AF65-F5344CB8AC3E}">
-        <p14:creationId xmlns:p14="http://schemas.microsoft.com/office/powerpoint/2010/main" val="472272379"/>
+        <p14:creationId xmlns:p14="http://schemas.microsoft.com/office/powerpoint/2010/main" val="455473412"/>
       </p:ext>
     </p:extLst>
   </p:cSld>
@@ -6025,11 +6077,7 @@
             </a:r>
             <a:r>
               <a:rPr lang="en-GB" dirty="0" smtClean="0"/>
-              <a:t>: Since the function does not cause any side effects, we can postpone computation until we actually need </a:t>
-            </a:r>
-            <a:r>
-              <a:rPr lang="en-GB" smtClean="0"/>
-              <a:t>the result</a:t>
+              <a:t>: Since the function does not cause any side effects, we can postpone computation until we actually need the result</a:t>
             </a:r>
           </a:p>
           <a:p>
@@ -6129,13 +6177,13 @@
               <a:rPr lang="de-CH" smtClean="0"/>
               <a:t>Slide </a:t>
             </a:r>
-            <a:fld id="{F2526A32-5D68-4C0F-B3C9-26E0EF0A1980}" type="slidenum">
+            <a:fld id="{7B6190FE-75A9-42BD-8595-19A0683C0F14}" type="slidenum">
               <a:rPr lang="de-CH" smtClean="0"/>
               <a:t>12</a:t>
             </a:fld>
             <a:r>
               <a:rPr lang="de-CH" smtClean="0"/>
-              <a:t> of 13</a:t>
+              <a:t> of 14</a:t>
             </a:r>
             <a:endParaRPr dirty="0"/>
           </a:p>
@@ -6188,7 +6236,7 @@
           <a:p>
             <a:r>
               <a:rPr lang="en-GB" dirty="0" smtClean="0"/>
-              <a:t>Sources</a:t>
+              <a:t>Pure Functions</a:t>
             </a:r>
             <a:endParaRPr lang="en-GB" dirty="0"/>
           </a:p>
@@ -6214,9 +6262,63 @@
               <a:buChar char="•"/>
             </a:pPr>
             <a:r>
-              <a:rPr lang="en-GB" dirty="0"/>
-              <a:t>http://de.slideshare.net/vkostyukov/purely-functional-data-structures-in-scala-26175521</a:t>
-            </a:r>
+              <a:rPr lang="en-GB" dirty="0" smtClean="0"/>
+              <a:t>Obviously, there will be functions with side effects (I/O, global state, user input …)</a:t>
+            </a:r>
+          </a:p>
+          <a:p>
+            <a:pPr marL="342900" indent="-342900">
+              <a:buFont typeface="Arial" panose="020B0604020202020204" pitchFamily="34" charset="0"/>
+              <a:buChar char="•"/>
+            </a:pPr>
+            <a:r>
+              <a:rPr lang="en-GB" dirty="0" smtClean="0"/>
+              <a:t>The idea is to refactor as many of your functions into pure functions as possible and wrap them into a shell, which handles side effects</a:t>
+            </a:r>
+          </a:p>
+          <a:p>
+            <a:pPr marL="342900" indent="-342900">
+              <a:buFont typeface="Arial" panose="020B0604020202020204" pitchFamily="34" charset="0"/>
+              <a:buChar char="•"/>
+            </a:pPr>
+            <a:r>
+              <a:rPr lang="en-GB" dirty="0" smtClean="0"/>
+              <a:t>Keep a “healthy balance” between pure and impure functions</a:t>
+            </a:r>
+          </a:p>
+          <a:p>
+            <a:pPr marL="342900" indent="-342900">
+              <a:buFont typeface="Arial" panose="020B0604020202020204" pitchFamily="34" charset="0"/>
+              <a:buChar char="•"/>
+            </a:pPr>
+            <a:endParaRPr lang="en-GB" dirty="0" smtClean="0"/>
+          </a:p>
+          <a:p>
+            <a:r>
+              <a:rPr lang="en-GB" dirty="0" smtClean="0"/>
+              <a:t>Useful data structures</a:t>
+            </a:r>
+          </a:p>
+          <a:p>
+            <a:pPr marL="342900" indent="-342900">
+              <a:buFont typeface="Arial" panose="020B0604020202020204" pitchFamily="34" charset="0"/>
+              <a:buChar char="•"/>
+            </a:pPr>
+            <a:r>
+              <a:rPr lang="en-GB" dirty="0" smtClean="0"/>
+              <a:t>Try[T] – Encapsulates exceptions: Disconnects error handling and recovery, forces the caller to deal with the possibility of error.</a:t>
+            </a:r>
+          </a:p>
+          <a:p>
+            <a:pPr marL="342900" indent="-342900">
+              <a:buFont typeface="Arial" panose="020B0604020202020204" pitchFamily="34" charset="0"/>
+              <a:buChar char="•"/>
+            </a:pPr>
+            <a:r>
+              <a:rPr lang="en-GB" dirty="0" smtClean="0"/>
+              <a:t>Option[T] – Represents a value which might be null</a:t>
+            </a:r>
+            <a:endParaRPr lang="en-GB" dirty="0"/>
           </a:p>
         </p:txBody>
       </p:sp>
@@ -6281,6 +6383,10 @@
           <a:bodyPr/>
           <a:lstStyle/>
           <a:p>
+            <a:r>
+              <a:rPr lang="en-GB" dirty="0" smtClean="0"/>
+              <a:t>But how do I get there?</a:t>
+            </a:r>
             <a:endParaRPr lang="en-GB" dirty="0"/>
           </a:p>
         </p:txBody>
@@ -6304,13 +6410,188 @@
               <a:rPr lang="de-CH" smtClean="0"/>
               <a:t>Slide </a:t>
             </a:r>
-            <a:fld id="{AFDA804B-AAAC-4182-8A8F-63CF44CD84E3}" type="slidenum">
+            <a:fld id="{06BAD323-EBFC-4C53-A79C-7407193BBBE8}" type="slidenum">
               <a:rPr lang="de-CH" smtClean="0"/>
               <a:t>13</a:t>
             </a:fld>
             <a:r>
               <a:rPr lang="de-CH" smtClean="0"/>
-              <a:t> of 13</a:t>
+              <a:t> of 14</a:t>
+            </a:r>
+            <a:endParaRPr dirty="0"/>
+          </a:p>
+        </p:txBody>
+      </p:sp>
+    </p:spTree>
+    <p:extLst>
+      <p:ext uri="{BB962C8B-B14F-4D97-AF65-F5344CB8AC3E}">
+        <p14:creationId xmlns:p14="http://schemas.microsoft.com/office/powerpoint/2010/main" val="3426570471"/>
+      </p:ext>
+    </p:extLst>
+  </p:cSld>
+  <p:clrMapOvr>
+    <a:masterClrMapping/>
+  </p:clrMapOvr>
+</p:sld>
+</file>
+
+<file path=ppt/slides/slide14.xml><?xml version="1.0" encoding="utf-8"?>
+<p:sld xmlns:a="http://schemas.openxmlformats.org/drawingml/2006/main" xmlns:r="http://schemas.openxmlformats.org/officeDocument/2006/relationships" xmlns:p="http://schemas.openxmlformats.org/presentationml/2006/main">
+  <p:cSld>
+    <p:spTree>
+      <p:nvGrpSpPr>
+        <p:cNvPr id="1" name=""/>
+        <p:cNvGrpSpPr/>
+        <p:nvPr/>
+      </p:nvGrpSpPr>
+      <p:grpSpPr>
+        <a:xfrm>
+          <a:off x="0" y="0"/>
+          <a:ext cx="0" cy="0"/>
+          <a:chOff x="0" y="0"/>
+          <a:chExt cx="0" cy="0"/>
+        </a:xfrm>
+      </p:grpSpPr>
+      <p:sp>
+        <p:nvSpPr>
+          <p:cNvPr id="2" name="Title 1"/>
+          <p:cNvSpPr>
+            <a:spLocks noGrp="1"/>
+          </p:cNvSpPr>
+          <p:nvPr>
+            <p:ph type="title"/>
+          </p:nvPr>
+        </p:nvSpPr>
+        <p:spPr/>
+        <p:txBody>
+          <a:bodyPr/>
+          <a:lstStyle/>
+          <a:p>
+            <a:r>
+              <a:rPr lang="en-GB" dirty="0" smtClean="0"/>
+              <a:t>Sources</a:t>
+            </a:r>
+            <a:endParaRPr lang="en-GB" dirty="0"/>
+          </a:p>
+        </p:txBody>
+      </p:sp>
+      <p:sp>
+        <p:nvSpPr>
+          <p:cNvPr id="3" name="Content Placeholder 2"/>
+          <p:cNvSpPr>
+            <a:spLocks noGrp="1"/>
+          </p:cNvSpPr>
+          <p:nvPr>
+            <p:ph idx="1"/>
+          </p:nvPr>
+        </p:nvSpPr>
+        <p:spPr/>
+        <p:txBody>
+          <a:bodyPr/>
+          <a:lstStyle/>
+          <a:p>
+            <a:pPr marL="342900" indent="-342900">
+              <a:buFont typeface="Arial" panose="020B0604020202020204" pitchFamily="34" charset="0"/>
+              <a:buChar char="•"/>
+            </a:pPr>
+            <a:r>
+              <a:rPr lang="en-GB" dirty="0"/>
+              <a:t>http://de.slideshare.net/vkostyukov/purely-functional-data-structures-in-scala-26175521</a:t>
+            </a:r>
+          </a:p>
+        </p:txBody>
+      </p:sp>
+      <p:sp>
+        <p:nvSpPr>
+          <p:cNvPr id="4" name="Date Placeholder 3"/>
+          <p:cNvSpPr>
+            <a:spLocks noGrp="1"/>
+          </p:cNvSpPr>
+          <p:nvPr>
+            <p:ph type="dt" sz="half" idx="10"/>
+          </p:nvPr>
+        </p:nvSpPr>
+        <p:spPr/>
+        <p:txBody>
+          <a:bodyPr/>
+          <a:lstStyle/>
+          <a:p>
+            <a:r>
+              <a:rPr lang="de-CH" smtClean="0"/>
+              <a:t>14. September 2015</a:t>
+            </a:r>
+            <a:endParaRPr lang="de-CH" dirty="0"/>
+          </a:p>
+        </p:txBody>
+      </p:sp>
+      <p:sp>
+        <p:nvSpPr>
+          <p:cNvPr id="5" name="Footer Placeholder 4"/>
+          <p:cNvSpPr>
+            <a:spLocks noGrp="1"/>
+          </p:cNvSpPr>
+          <p:nvPr>
+            <p:ph type="ftr" sz="quarter" idx="11"/>
+          </p:nvPr>
+        </p:nvSpPr>
+        <p:spPr/>
+        <p:txBody>
+          <a:bodyPr/>
+          <a:lstStyle/>
+          <a:p>
+            <a:r>
+              <a:rPr lang="en-US" smtClean="0"/>
+              <a:t>Functional Design Patterns for OO Practicioners | Hendrik Schöneberg</a:t>
+            </a:r>
+            <a:endParaRPr lang="de-CH" dirty="0"/>
+          </a:p>
+        </p:txBody>
+      </p:sp>
+      <p:sp>
+        <p:nvSpPr>
+          <p:cNvPr id="7" name="Text Placeholder 6"/>
+          <p:cNvSpPr>
+            <a:spLocks noGrp="1"/>
+          </p:cNvSpPr>
+          <p:nvPr>
+            <p:ph type="body" sz="quarter" idx="13"/>
+          </p:nvPr>
+        </p:nvSpPr>
+        <p:spPr/>
+        <p:txBody>
+          <a:bodyPr/>
+          <a:lstStyle/>
+          <a:p>
+            <a:endParaRPr lang="en-GB" dirty="0"/>
+          </a:p>
+        </p:txBody>
+      </p:sp>
+      <p:sp>
+        <p:nvSpPr>
+          <p:cNvPr id="8" name="Slide Number Placeholder 7"/>
+          <p:cNvSpPr>
+            <a:spLocks noGrp="1"/>
+          </p:cNvSpPr>
+          <p:nvPr>
+            <p:ph type="sldNum" sz="quarter" idx="12"/>
+          </p:nvPr>
+        </p:nvSpPr>
+        <p:spPr/>
+        <p:txBody>
+          <a:bodyPr/>
+          <a:lstStyle/>
+          <a:p>
+            <a:r>
+              <a:rPr lang="de-CH" smtClean="0"/>
+              <a:t>Slide </a:t>
+            </a:r>
+            <a:fld id="{94C16F95-E61C-489F-9B11-E816212478F4}" type="slidenum">
+              <a:rPr lang="de-CH" smtClean="0"/>
+              <a:t>14</a:t>
+            </a:fld>
+            <a:r>
+              <a:rPr lang="de-CH" smtClean="0"/>
+              <a:t> of 14</a:t>
             </a:r>
             <a:endParaRPr dirty="0"/>
           </a:p>
@@ -6485,13 +6766,13 @@
               <a:rPr lang="de-CH" smtClean="0"/>
               <a:t>Slide </a:t>
             </a:r>
-            <a:fld id="{15AE2485-7533-4D46-B1A8-678CB88DAF2E}" type="slidenum">
+            <a:fld id="{AD924F21-016A-4B36-A41F-C00DACE42A34}" type="slidenum">
               <a:rPr lang="de-CH" smtClean="0"/>
               <a:t>2</a:t>
             </a:fld>
             <a:r>
               <a:rPr lang="de-CH" smtClean="0"/>
-              <a:t> of 13</a:t>
+              <a:t> of 14</a:t>
             </a:r>
             <a:endParaRPr lang="de-CH" dirty="0"/>
           </a:p>
@@ -6507,6 +6788,13 @@
   <p:clrMapOvr>
     <a:masterClrMapping/>
   </p:clrMapOvr>
+  <p:timing>
+    <p:tnLst>
+      <p:par>
+        <p:cTn id="1" dur="indefinite" restart="never" nodeType="tmRoot"/>
+      </p:par>
+    </p:tnLst>
+  </p:timing>
 </p:sld>
 </file>
 
@@ -6594,9 +6882,10 @@
               <a:buChar char="•"/>
             </a:pPr>
             <a:r>
-              <a:rPr lang="en-GB" dirty="0" smtClean="0"/>
-              <a:t>Representation of value objects (without identity)</a:t>
-            </a:r>
+              <a:rPr lang="en-GB" dirty="0"/>
+              <a:t>Reduces need for defensive programming </a:t>
+            </a:r>
+            <a:endParaRPr lang="en-GB" dirty="0" smtClean="0"/>
           </a:p>
           <a:p>
             <a:pPr marL="342900" indent="-342900">
@@ -6604,9 +6893,22 @@
               <a:buChar char="•"/>
             </a:pPr>
             <a:r>
+              <a:rPr lang="en-GB" smtClean="0"/>
+              <a:t>Representation </a:t>
+            </a:r>
+            <a:r>
               <a:rPr lang="en-GB" dirty="0" smtClean="0"/>
-              <a:t>Reduces need for defensive programming</a:t>
-            </a:r>
+              <a:t>of value objects (without </a:t>
+            </a:r>
+            <a:r>
+              <a:rPr lang="en-GB" smtClean="0"/>
+              <a:t>identity</a:t>
+            </a:r>
+            <a:r>
+              <a:rPr lang="en-GB" smtClean="0"/>
+              <a:t>)</a:t>
+            </a:r>
+            <a:endParaRPr lang="en-GB" dirty="0" smtClean="0"/>
           </a:p>
           <a:p>
             <a:pPr marL="342900" indent="-342900">
@@ -6643,7 +6945,31 @@
             </a:pPr>
             <a:r>
               <a:rPr lang="en-GB" dirty="0" smtClean="0"/>
-              <a:t>Manipulation of complex objects </a:t>
+              <a:t>Manipulation of complex </a:t>
+            </a:r>
+            <a:r>
+              <a:rPr lang="en-GB" dirty="0" smtClean="0"/>
+              <a:t>objects</a:t>
+            </a:r>
+          </a:p>
+          <a:p>
+            <a:pPr marL="608013" lvl="1" indent="-342900">
+              <a:buFont typeface="Arial" panose="020B0604020202020204" pitchFamily="34" charset="0"/>
+              <a:buChar char="•"/>
+            </a:pPr>
+            <a:r>
+              <a:rPr lang="en-GB" dirty="0" smtClean="0"/>
+              <a:t>Immutable objects do not support destructive updates</a:t>
+            </a:r>
+          </a:p>
+          <a:p>
+            <a:pPr marL="608013" lvl="1" indent="-342900">
+              <a:buFont typeface="Arial" panose="020B0604020202020204" pitchFamily="34" charset="0"/>
+              <a:buChar char="•"/>
+            </a:pPr>
+            <a:r>
+              <a:rPr lang="en-GB" dirty="0" smtClean="0"/>
+              <a:t>Modifications result in an altered copy of the object</a:t>
             </a:r>
             <a:endParaRPr lang="en-GB" dirty="0"/>
           </a:p>
@@ -6737,13 +7063,13 @@
               <a:rPr lang="de-CH" smtClean="0"/>
               <a:t>Slide </a:t>
             </a:r>
-            <a:fld id="{078263C4-5CAC-4194-85AC-AB4CC728E3FB}" type="slidenum">
+            <a:fld id="{B6AE5AC0-FC1D-46C7-9E96-3A649ACA0995}" type="slidenum">
               <a:rPr lang="de-CH" smtClean="0"/>
               <a:t>3</a:t>
             </a:fld>
             <a:r>
               <a:rPr lang="de-CH" smtClean="0"/>
-              <a:t> of 13</a:t>
+              <a:t> of 14</a:t>
             </a:r>
             <a:endParaRPr lang="de-CH" dirty="0"/>
           </a:p>
@@ -6759,6 +7085,13 @@
   <p:clrMapOvr>
     <a:masterClrMapping/>
   </p:clrMapOvr>
+  <p:timing>
+    <p:tnLst>
+      <p:par>
+        <p:cTn id="1" dur="indefinite" restart="never" nodeType="tmRoot"/>
+      </p:par>
+    </p:tnLst>
+  </p:timing>
 </p:sld>
 </file>
 
@@ -6804,12 +7137,12 @@
       </p:sp>
       <p:sp>
         <p:nvSpPr>
-          <p:cNvPr id="3" name="Content Placeholder 2"/>
-          <p:cNvSpPr>
-            <a:spLocks noGrp="1"/>
-          </p:cNvSpPr>
-          <p:nvPr>
-            <p:ph idx="1"/>
+          <p:cNvPr id="4" name="Date Placeholder 3"/>
+          <p:cNvSpPr>
+            <a:spLocks noGrp="1"/>
+          </p:cNvSpPr>
+          <p:nvPr>
+            <p:ph type="dt" sz="half" idx="10"/>
           </p:nvPr>
         </p:nvSpPr>
         <p:spPr/>
@@ -6817,107 +7150,17 @@
           <a:bodyPr/>
           <a:lstStyle/>
           <a:p>
-            <a:pPr marL="342900" indent="-342900">
-              <a:buFont typeface="Arial" panose="020B0604020202020204" pitchFamily="34" charset="0"/>
-              <a:buChar char="•"/>
-            </a:pPr>
-            <a:r>
-              <a:rPr lang="en-GB" dirty="0" smtClean="0"/>
-              <a:t>Scala’s collections come in two (three) flavours:</a:t>
-            </a:r>
-          </a:p>
-          <a:p>
-            <a:pPr marL="608013" lvl="1" indent="-342900">
-              <a:buFont typeface="Arial" panose="020B0604020202020204" pitchFamily="34" charset="0"/>
-              <a:buChar char="•"/>
-            </a:pPr>
-            <a:r>
-              <a:rPr lang="en-GB" dirty="0" err="1" smtClean="0"/>
-              <a:t>scala.collection.immutable.Map</a:t>
-            </a:r>
-            <a:endParaRPr lang="en-GB" dirty="0" smtClean="0"/>
-          </a:p>
-          <a:p>
-            <a:pPr marL="608013" lvl="1" indent="-342900">
-              <a:buFont typeface="Arial" panose="020B0604020202020204" pitchFamily="34" charset="0"/>
-              <a:buChar char="•"/>
-            </a:pPr>
-            <a:r>
-              <a:rPr lang="en-GB" strike="sngStrike" dirty="0" err="1" smtClean="0"/>
-              <a:t>scala.collection.jcl.Map</a:t>
-            </a:r>
-            <a:endParaRPr lang="en-GB" strike="sngStrike" dirty="0" smtClean="0"/>
-          </a:p>
-          <a:p>
-            <a:pPr marL="608013" lvl="1" indent="-342900">
-              <a:buFont typeface="Arial" panose="020B0604020202020204" pitchFamily="34" charset="0"/>
-              <a:buChar char="•"/>
-            </a:pPr>
-            <a:r>
-              <a:rPr lang="en-GB" dirty="0" err="1" smtClean="0"/>
-              <a:t>scala.collection.mutable.Map</a:t>
-            </a:r>
-            <a:endParaRPr lang="en-GB" dirty="0" smtClean="0"/>
-          </a:p>
-          <a:p>
-            <a:pPr marL="342900" indent="-342900">
-              <a:buFont typeface="Arial" panose="020B0604020202020204" pitchFamily="34" charset="0"/>
-              <a:buChar char="•"/>
-            </a:pPr>
-            <a:r>
-              <a:rPr lang="en-GB" dirty="0" smtClean="0"/>
-              <a:t>Immutable collections do not support destructive updates</a:t>
-            </a:r>
-          </a:p>
-          <a:p>
-            <a:pPr lvl="1" indent="0">
-              <a:buNone/>
-            </a:pPr>
-            <a:endParaRPr lang="en-GB" dirty="0"/>
-          </a:p>
-          <a:p>
-            <a:pPr marL="608013" lvl="1" indent="-342900">
-              <a:buFont typeface="Arial" panose="020B0604020202020204" pitchFamily="34" charset="0"/>
-              <a:buChar char="•"/>
-            </a:pPr>
-            <a:endParaRPr lang="en-GB" dirty="0"/>
-          </a:p>
-        </p:txBody>
-      </p:sp>
-      <p:sp>
-        <p:nvSpPr>
-          <p:cNvPr id="6" name="Text Placeholder 5"/>
-          <p:cNvSpPr>
-            <a:spLocks noGrp="1"/>
-          </p:cNvSpPr>
-          <p:nvPr>
-            <p:ph type="body" sz="quarter" idx="13"/>
-          </p:nvPr>
-        </p:nvSpPr>
-        <p:spPr/>
-        <p:txBody>
-          <a:bodyPr/>
-          <a:lstStyle/>
-          <a:p>
-            <a:r>
-              <a:rPr lang="en-GB" dirty="0" smtClean="0"/>
-              <a:t>Immutable </a:t>
-            </a:r>
-            <a:r>
-              <a:rPr lang="en-GB" dirty="0" smtClean="0"/>
-              <a:t>collections </a:t>
-            </a:r>
-            <a:r>
-              <a:rPr lang="en-GB" dirty="0" smtClean="0"/>
-              <a:t>in Scala</a:t>
-            </a:r>
-            <a:endParaRPr lang="en-GB" dirty="0"/>
-          </a:p>
-        </p:txBody>
-      </p:sp>
-      <p:sp>
-        <p:nvSpPr>
-          <p:cNvPr id="9" name="Footer Placeholder 8"/>
+            <a:r>
+              <a:rPr lang="de-CH" smtClean="0"/>
+              <a:t>14. September 2015</a:t>
+            </a:r>
+            <a:endParaRPr lang="de-CH" dirty="0"/>
+          </a:p>
+        </p:txBody>
+      </p:sp>
+      <p:sp>
+        <p:nvSpPr>
+          <p:cNvPr id="5" name="Footer Placeholder 4"/>
           <p:cNvSpPr>
             <a:spLocks noGrp="1"/>
           </p:cNvSpPr>
@@ -6940,12 +7183,12 @@
       </p:sp>
       <p:sp>
         <p:nvSpPr>
-          <p:cNvPr id="10" name="Date Placeholder 9"/>
-          <p:cNvSpPr>
-            <a:spLocks noGrp="1"/>
-          </p:cNvSpPr>
-          <p:nvPr>
-            <p:ph type="dt" sz="half" idx="10"/>
+          <p:cNvPr id="7" name="Text Placeholder 6"/>
+          <p:cNvSpPr>
+            <a:spLocks noGrp="1"/>
+          </p:cNvSpPr>
+          <p:nvPr>
+            <p:ph type="body" sz="quarter" idx="13"/>
           </p:nvPr>
         </p:nvSpPr>
         <p:spPr/>
@@ -6954,16 +7197,16 @@
           <a:lstStyle/>
           <a:p>
             <a:r>
-              <a:rPr lang="de-CH" smtClean="0"/>
-              <a:t>14. September 2015</a:t>
-            </a:r>
-            <a:endParaRPr lang="de-CH" dirty="0"/>
-          </a:p>
-        </p:txBody>
-      </p:sp>
-      <p:sp>
-        <p:nvSpPr>
-          <p:cNvPr id="11" name="Slide Number Placeholder 10"/>
+              <a:rPr lang="en-GB" dirty="0" smtClean="0"/>
+              <a:t>Modifying simple objects</a:t>
+            </a:r>
+            <a:endParaRPr lang="en-GB" dirty="0"/>
+          </a:p>
+        </p:txBody>
+      </p:sp>
+      <p:sp>
+        <p:nvSpPr>
+          <p:cNvPr id="8" name="Slide Number Placeholder 7"/>
           <p:cNvSpPr>
             <a:spLocks noGrp="1"/>
           </p:cNvSpPr>
@@ -6980,22 +7223,721 @@
               <a:rPr lang="de-CH" smtClean="0"/>
               <a:t>Slide </a:t>
             </a:r>
-            <a:fld id="{25525A9C-FF09-40EB-9C61-9D1D03FB8B13}" type="slidenum">
+            <a:fld id="{958EA206-30D4-4EA6-B06D-4CD05AE69ACF}" type="slidenum">
               <a:rPr lang="de-CH" smtClean="0"/>
               <a:t>4</a:t>
             </a:fld>
             <a:r>
               <a:rPr lang="de-CH" smtClean="0"/>
-              <a:t> of 13</a:t>
-            </a:r>
-            <a:endParaRPr lang="de-CH" dirty="0"/>
-          </a:p>
-        </p:txBody>
-      </p:sp>
+              <a:t> of 14</a:t>
+            </a:r>
+            <a:endParaRPr dirty="0"/>
+          </a:p>
+        </p:txBody>
+      </p:sp>
+      <p:sp>
+        <p:nvSpPr>
+          <p:cNvPr id="9" name="Rectangle 8"/>
+          <p:cNvSpPr/>
+          <p:nvPr/>
+        </p:nvSpPr>
+        <p:spPr>
+          <a:xfrm>
+            <a:off x="827584" y="1844824"/>
+            <a:ext cx="2016224" cy="576064"/>
+          </a:xfrm>
+          <a:prstGeom prst="rect">
+            <a:avLst/>
+          </a:prstGeom>
+          <a:ln/>
+        </p:spPr>
+        <p:style>
+          <a:lnRef idx="2">
+            <a:schemeClr val="accent1"/>
+          </a:lnRef>
+          <a:fillRef idx="1">
+            <a:schemeClr val="lt1"/>
+          </a:fillRef>
+          <a:effectRef idx="0">
+            <a:schemeClr val="accent1"/>
+          </a:effectRef>
+          <a:fontRef idx="minor">
+            <a:schemeClr val="dk1"/>
+          </a:fontRef>
+        </p:style>
+        <p:txBody>
+          <a:bodyPr rtlCol="0" anchor="ctr"/>
+          <a:lstStyle/>
+          <a:p>
+            <a:pPr algn="ctr"/>
+            <a:r>
+              <a:rPr lang="en-GB" sz="2200" dirty="0" smtClean="0">
+                <a:latin typeface="AA Zuehlke" pitchFamily="2" charset="0"/>
+              </a:rPr>
+              <a:t>Person</a:t>
+            </a:r>
+            <a:endParaRPr lang="en-GB" sz="2200" dirty="0" smtClean="0">
+              <a:latin typeface="AA Zuehlke" pitchFamily="2" charset="0"/>
+            </a:endParaRPr>
+          </a:p>
+        </p:txBody>
+      </p:sp>
+      <p:sp>
+        <p:nvSpPr>
+          <p:cNvPr id="10" name="Rectangle 9"/>
+          <p:cNvSpPr/>
+          <p:nvPr/>
+        </p:nvSpPr>
+        <p:spPr>
+          <a:xfrm>
+            <a:off x="4788024" y="1844824"/>
+            <a:ext cx="2016224" cy="576064"/>
+          </a:xfrm>
+          <a:prstGeom prst="rect">
+            <a:avLst/>
+          </a:prstGeom>
+          <a:ln/>
+        </p:spPr>
+        <p:style>
+          <a:lnRef idx="2">
+            <a:schemeClr val="accent1"/>
+          </a:lnRef>
+          <a:fillRef idx="1">
+            <a:schemeClr val="lt1"/>
+          </a:fillRef>
+          <a:effectRef idx="0">
+            <a:schemeClr val="accent1"/>
+          </a:effectRef>
+          <a:fontRef idx="minor">
+            <a:schemeClr val="dk1"/>
+          </a:fontRef>
+        </p:style>
+        <p:txBody>
+          <a:bodyPr rtlCol="0" anchor="ctr"/>
+          <a:lstStyle/>
+          <a:p>
+            <a:pPr algn="ctr"/>
+            <a:r>
+              <a:rPr lang="en-GB" sz="2200" dirty="0" smtClean="0">
+                <a:latin typeface="AA Zuehlke" pitchFamily="2" charset="0"/>
+              </a:rPr>
+              <a:t>Address</a:t>
+            </a:r>
+            <a:endParaRPr lang="en-GB" sz="2200" dirty="0" smtClean="0">
+              <a:latin typeface="AA Zuehlke" pitchFamily="2" charset="0"/>
+            </a:endParaRPr>
+          </a:p>
+        </p:txBody>
+      </p:sp>
+      <p:cxnSp>
+        <p:nvCxnSpPr>
+          <p:cNvPr id="12" name="Straight Connector 11"/>
+          <p:cNvCxnSpPr>
+            <a:stCxn id="9" idx="3"/>
+            <a:endCxn id="10" idx="1"/>
+          </p:cNvCxnSpPr>
+          <p:nvPr/>
+        </p:nvCxnSpPr>
+        <p:spPr>
+          <a:xfrm>
+            <a:off x="2843808" y="2132856"/>
+            <a:ext cx="1944216" cy="0"/>
+          </a:xfrm>
+          <a:prstGeom prst="line">
+            <a:avLst/>
+          </a:prstGeom>
+          <a:ln w="25400"/>
+        </p:spPr>
+        <p:style>
+          <a:lnRef idx="1">
+            <a:schemeClr val="accent1"/>
+          </a:lnRef>
+          <a:fillRef idx="0">
+            <a:schemeClr val="accent1"/>
+          </a:fillRef>
+          <a:effectRef idx="0">
+            <a:schemeClr val="accent1"/>
+          </a:effectRef>
+          <a:fontRef idx="minor">
+            <a:schemeClr val="tx1"/>
+          </a:fontRef>
+        </p:style>
+      </p:cxnSp>
+      <p:grpSp>
+        <p:nvGrpSpPr>
+          <p:cNvPr id="15" name="Group 14"/>
+          <p:cNvGrpSpPr/>
+          <p:nvPr/>
+        </p:nvGrpSpPr>
+        <p:grpSpPr>
+          <a:xfrm>
+            <a:off x="827584" y="2564904"/>
+            <a:ext cx="6048672" cy="720080"/>
+            <a:chOff x="827584" y="2564904"/>
+            <a:chExt cx="6048672" cy="720080"/>
+          </a:xfrm>
+        </p:grpSpPr>
+        <p:sp>
+          <p:nvSpPr>
+            <p:cNvPr id="13" name="TextBox 12"/>
+            <p:cNvSpPr txBox="1"/>
+            <p:nvPr/>
+          </p:nvSpPr>
+          <p:spPr>
+            <a:xfrm>
+              <a:off x="827584" y="2564904"/>
+              <a:ext cx="2088232" cy="720080"/>
+            </a:xfrm>
+            <a:prstGeom prst="rect">
+              <a:avLst/>
+            </a:prstGeom>
+            <a:noFill/>
+          </p:spPr>
+          <p:txBody>
+            <a:bodyPr wrap="square" rtlCol="0">
+              <a:noAutofit/>
+            </a:bodyPr>
+            <a:lstStyle/>
+            <a:p>
+              <a:r>
+                <a:rPr lang="en-GB" sz="1600" dirty="0" err="1" smtClean="0">
+                  <a:latin typeface="Consolas" panose="020B0609020204030204" pitchFamily="49" charset="0"/>
+                  <a:cs typeface="Consolas" panose="020B0609020204030204" pitchFamily="49" charset="0"/>
+                </a:rPr>
+                <a:t>firstName</a:t>
+              </a:r>
+              <a:r>
+                <a:rPr lang="en-GB" sz="1600" dirty="0" smtClean="0">
+                  <a:latin typeface="Consolas" panose="020B0609020204030204" pitchFamily="49" charset="0"/>
+                  <a:cs typeface="Consolas" panose="020B0609020204030204" pitchFamily="49" charset="0"/>
+                </a:rPr>
+                <a:t>: String</a:t>
+              </a:r>
+            </a:p>
+            <a:p>
+              <a:r>
+                <a:rPr lang="en-GB" sz="1600" dirty="0" err="1" smtClean="0">
+                  <a:latin typeface="Consolas" panose="020B0609020204030204" pitchFamily="49" charset="0"/>
+                  <a:cs typeface="Consolas" panose="020B0609020204030204" pitchFamily="49" charset="0"/>
+                </a:rPr>
+                <a:t>lastName</a:t>
+              </a:r>
+              <a:r>
+                <a:rPr lang="en-GB" sz="1600" dirty="0" smtClean="0">
+                  <a:latin typeface="Consolas" panose="020B0609020204030204" pitchFamily="49" charset="0"/>
+                  <a:cs typeface="Consolas" panose="020B0609020204030204" pitchFamily="49" charset="0"/>
+                </a:rPr>
+                <a:t>: String</a:t>
+              </a:r>
+              <a:endParaRPr lang="en-GB" sz="1600" dirty="0" smtClean="0">
+                <a:latin typeface="Consolas" panose="020B0609020204030204" pitchFamily="49" charset="0"/>
+                <a:cs typeface="Consolas" panose="020B0609020204030204" pitchFamily="49" charset="0"/>
+              </a:endParaRPr>
+            </a:p>
+          </p:txBody>
+        </p:sp>
+        <p:sp>
+          <p:nvSpPr>
+            <p:cNvPr id="14" name="TextBox 13"/>
+            <p:cNvSpPr txBox="1"/>
+            <p:nvPr/>
+          </p:nvSpPr>
+          <p:spPr>
+            <a:xfrm>
+              <a:off x="4788024" y="2564904"/>
+              <a:ext cx="2088232" cy="720080"/>
+            </a:xfrm>
+            <a:prstGeom prst="rect">
+              <a:avLst/>
+            </a:prstGeom>
+            <a:noFill/>
+          </p:spPr>
+          <p:txBody>
+            <a:bodyPr wrap="square" rtlCol="0">
+              <a:noAutofit/>
+            </a:bodyPr>
+            <a:lstStyle/>
+            <a:p>
+              <a:r>
+                <a:rPr lang="en-GB" sz="1600" dirty="0" smtClean="0">
+                  <a:latin typeface="Consolas" panose="020B0609020204030204" pitchFamily="49" charset="0"/>
+                  <a:cs typeface="Consolas" panose="020B0609020204030204" pitchFamily="49" charset="0"/>
+                </a:rPr>
+                <a:t>street: String</a:t>
+              </a:r>
+            </a:p>
+            <a:p>
+              <a:r>
+                <a:rPr lang="en-GB" sz="1600" dirty="0" smtClean="0">
+                  <a:latin typeface="Consolas" panose="020B0609020204030204" pitchFamily="49" charset="0"/>
+                  <a:cs typeface="Consolas" panose="020B0609020204030204" pitchFamily="49" charset="0"/>
+                </a:rPr>
+                <a:t>city: String</a:t>
+              </a:r>
+              <a:endParaRPr lang="en-GB" sz="1600" dirty="0" smtClean="0">
+                <a:latin typeface="Consolas" panose="020B0609020204030204" pitchFamily="49" charset="0"/>
+                <a:cs typeface="Consolas" panose="020B0609020204030204" pitchFamily="49" charset="0"/>
+              </a:endParaRPr>
+            </a:p>
+          </p:txBody>
+        </p:sp>
+      </p:grpSp>
+      <p:grpSp>
+        <p:nvGrpSpPr>
+          <p:cNvPr id="16" name="Group 15"/>
+          <p:cNvGrpSpPr/>
+          <p:nvPr/>
+        </p:nvGrpSpPr>
+        <p:grpSpPr>
+          <a:xfrm>
+            <a:off x="827584" y="2564904"/>
+            <a:ext cx="6048672" cy="720080"/>
+            <a:chOff x="827584" y="2564904"/>
+            <a:chExt cx="6048672" cy="720080"/>
+          </a:xfrm>
+        </p:grpSpPr>
+        <p:sp>
+          <p:nvSpPr>
+            <p:cNvPr id="17" name="TextBox 16"/>
+            <p:cNvSpPr txBox="1"/>
+            <p:nvPr/>
+          </p:nvSpPr>
+          <p:spPr>
+            <a:xfrm>
+              <a:off x="827584" y="2564904"/>
+              <a:ext cx="2088232" cy="720080"/>
+            </a:xfrm>
+            <a:prstGeom prst="rect">
+              <a:avLst/>
+            </a:prstGeom>
+            <a:noFill/>
+          </p:spPr>
+          <p:txBody>
+            <a:bodyPr wrap="square" rtlCol="0">
+              <a:noAutofit/>
+            </a:bodyPr>
+            <a:lstStyle/>
+            <a:p>
+              <a:r>
+                <a:rPr lang="en-GB" sz="1600" dirty="0" err="1" smtClean="0">
+                  <a:latin typeface="Consolas" panose="020B0609020204030204" pitchFamily="49" charset="0"/>
+                  <a:cs typeface="Consolas" panose="020B0609020204030204" pitchFamily="49" charset="0"/>
+                </a:rPr>
+                <a:t>firstName</a:t>
+              </a:r>
+              <a:r>
+                <a:rPr lang="en-GB" sz="1600" dirty="0" smtClean="0">
+                  <a:latin typeface="Consolas" panose="020B0609020204030204" pitchFamily="49" charset="0"/>
+                  <a:cs typeface="Consolas" panose="020B0609020204030204" pitchFamily="49" charset="0"/>
+                </a:rPr>
+                <a:t>: John</a:t>
+              </a:r>
+            </a:p>
+            <a:p>
+              <a:r>
+                <a:rPr lang="en-GB" sz="1600" dirty="0" err="1" smtClean="0">
+                  <a:latin typeface="Consolas" panose="020B0609020204030204" pitchFamily="49" charset="0"/>
+                  <a:cs typeface="Consolas" panose="020B0609020204030204" pitchFamily="49" charset="0"/>
+                </a:rPr>
+                <a:t>lastName</a:t>
+              </a:r>
+              <a:r>
+                <a:rPr lang="en-GB" sz="1600" dirty="0" smtClean="0">
+                  <a:latin typeface="Consolas" panose="020B0609020204030204" pitchFamily="49" charset="0"/>
+                  <a:cs typeface="Consolas" panose="020B0609020204030204" pitchFamily="49" charset="0"/>
+                </a:rPr>
+                <a:t>: Doe</a:t>
+              </a:r>
+              <a:endParaRPr lang="en-GB" sz="1600" dirty="0" smtClean="0">
+                <a:latin typeface="Consolas" panose="020B0609020204030204" pitchFamily="49" charset="0"/>
+                <a:cs typeface="Consolas" panose="020B0609020204030204" pitchFamily="49" charset="0"/>
+              </a:endParaRPr>
+            </a:p>
+          </p:txBody>
+        </p:sp>
+        <p:sp>
+          <p:nvSpPr>
+            <p:cNvPr id="18" name="TextBox 17"/>
+            <p:cNvSpPr txBox="1"/>
+            <p:nvPr/>
+          </p:nvSpPr>
+          <p:spPr>
+            <a:xfrm>
+              <a:off x="4788024" y="2564904"/>
+              <a:ext cx="2088232" cy="720080"/>
+            </a:xfrm>
+            <a:prstGeom prst="rect">
+              <a:avLst/>
+            </a:prstGeom>
+            <a:noFill/>
+          </p:spPr>
+          <p:txBody>
+            <a:bodyPr wrap="square" rtlCol="0">
+              <a:noAutofit/>
+            </a:bodyPr>
+            <a:lstStyle/>
+            <a:p>
+              <a:r>
+                <a:rPr lang="en-GB" sz="1600" dirty="0" smtClean="0">
+                  <a:latin typeface="Consolas" panose="020B0609020204030204" pitchFamily="49" charset="0"/>
+                  <a:cs typeface="Consolas" panose="020B0609020204030204" pitchFamily="49" charset="0"/>
+                </a:rPr>
+                <a:t>street: </a:t>
+              </a:r>
+              <a:r>
+                <a:rPr lang="en-GB" sz="1600" dirty="0" err="1" smtClean="0">
+                  <a:latin typeface="Consolas" panose="020B0609020204030204" pitchFamily="49" charset="0"/>
+                  <a:cs typeface="Consolas" panose="020B0609020204030204" pitchFamily="49" charset="0"/>
+                </a:rPr>
+                <a:t>Wiesenstrasse</a:t>
+              </a:r>
+              <a:r>
+                <a:rPr lang="en-GB" sz="1600" dirty="0" smtClean="0">
+                  <a:latin typeface="Consolas" panose="020B0609020204030204" pitchFamily="49" charset="0"/>
+                  <a:cs typeface="Consolas" panose="020B0609020204030204" pitchFamily="49" charset="0"/>
+                </a:rPr>
+                <a:t> 10a</a:t>
+              </a:r>
+            </a:p>
+            <a:p>
+              <a:r>
+                <a:rPr lang="en-GB" sz="1600" dirty="0" smtClean="0">
+                  <a:latin typeface="Consolas" panose="020B0609020204030204" pitchFamily="49" charset="0"/>
+                  <a:cs typeface="Consolas" panose="020B0609020204030204" pitchFamily="49" charset="0"/>
+                </a:rPr>
+                <a:t>city: </a:t>
+              </a:r>
+              <a:r>
+                <a:rPr lang="en-GB" sz="1600" dirty="0" err="1" smtClean="0">
+                  <a:latin typeface="Consolas" panose="020B0609020204030204" pitchFamily="49" charset="0"/>
+                  <a:cs typeface="Consolas" panose="020B0609020204030204" pitchFamily="49" charset="0"/>
+                </a:rPr>
+                <a:t>Schlieren</a:t>
+              </a:r>
+              <a:endParaRPr lang="en-GB" sz="1600" dirty="0" smtClean="0">
+                <a:latin typeface="Consolas" panose="020B0609020204030204" pitchFamily="49" charset="0"/>
+                <a:cs typeface="Consolas" panose="020B0609020204030204" pitchFamily="49" charset="0"/>
+              </a:endParaRPr>
+            </a:p>
+          </p:txBody>
+        </p:sp>
+      </p:grpSp>
+      <p:grpSp>
+        <p:nvGrpSpPr>
+          <p:cNvPr id="30" name="Group 29"/>
+          <p:cNvGrpSpPr/>
+          <p:nvPr/>
+        </p:nvGrpSpPr>
+        <p:grpSpPr>
+          <a:xfrm>
+            <a:off x="827584" y="4365104"/>
+            <a:ext cx="2160240" cy="1440160"/>
+            <a:chOff x="827584" y="4365104"/>
+            <a:chExt cx="2160240" cy="1440160"/>
+          </a:xfrm>
+        </p:grpSpPr>
+        <p:sp>
+          <p:nvSpPr>
+            <p:cNvPr id="20" name="Rectangle 19"/>
+            <p:cNvSpPr/>
+            <p:nvPr/>
+          </p:nvSpPr>
+          <p:spPr>
+            <a:xfrm>
+              <a:off x="827584" y="4365104"/>
+              <a:ext cx="2016224" cy="576064"/>
+            </a:xfrm>
+            <a:prstGeom prst="rect">
+              <a:avLst/>
+            </a:prstGeom>
+            <a:ln>
+              <a:solidFill>
+                <a:srgbClr val="7030A0"/>
+              </a:solidFill>
+            </a:ln>
+          </p:spPr>
+          <p:style>
+            <a:lnRef idx="2">
+              <a:schemeClr val="accent1"/>
+            </a:lnRef>
+            <a:fillRef idx="1">
+              <a:schemeClr val="lt1"/>
+            </a:fillRef>
+            <a:effectRef idx="0">
+              <a:schemeClr val="accent1"/>
+            </a:effectRef>
+            <a:fontRef idx="minor">
+              <a:schemeClr val="dk1"/>
+            </a:fontRef>
+          </p:style>
+          <p:txBody>
+            <a:bodyPr rtlCol="0" anchor="ctr"/>
+            <a:lstStyle/>
+            <a:p>
+              <a:pPr algn="ctr"/>
+              <a:r>
+                <a:rPr lang="en-GB" sz="2200" dirty="0" smtClean="0">
+                  <a:latin typeface="AA Zuehlke" pitchFamily="2" charset="0"/>
+                </a:rPr>
+                <a:t>Person’</a:t>
+              </a:r>
+              <a:endParaRPr lang="en-GB" sz="2200" dirty="0" smtClean="0">
+                <a:latin typeface="AA Zuehlke" pitchFamily="2" charset="0"/>
+              </a:endParaRPr>
+            </a:p>
+          </p:txBody>
+        </p:sp>
+        <p:sp>
+          <p:nvSpPr>
+            <p:cNvPr id="22" name="TextBox 21"/>
+            <p:cNvSpPr txBox="1"/>
+            <p:nvPr/>
+          </p:nvSpPr>
+          <p:spPr>
+            <a:xfrm>
+              <a:off x="899592" y="5085184"/>
+              <a:ext cx="2088232" cy="720080"/>
+            </a:xfrm>
+            <a:prstGeom prst="rect">
+              <a:avLst/>
+            </a:prstGeom>
+            <a:noFill/>
+          </p:spPr>
+          <p:txBody>
+            <a:bodyPr wrap="square" rtlCol="0">
+              <a:noAutofit/>
+            </a:bodyPr>
+            <a:lstStyle/>
+            <a:p>
+              <a:r>
+                <a:rPr lang="en-GB" sz="1600" dirty="0" err="1" smtClean="0">
+                  <a:latin typeface="Consolas" panose="020B0609020204030204" pitchFamily="49" charset="0"/>
+                  <a:cs typeface="Consolas" panose="020B0609020204030204" pitchFamily="49" charset="0"/>
+                </a:rPr>
+                <a:t>firstName</a:t>
+              </a:r>
+              <a:r>
+                <a:rPr lang="en-GB" sz="1600" dirty="0" smtClean="0">
+                  <a:latin typeface="Consolas" panose="020B0609020204030204" pitchFamily="49" charset="0"/>
+                  <a:cs typeface="Consolas" panose="020B0609020204030204" pitchFamily="49" charset="0"/>
+                </a:rPr>
+                <a:t>: John</a:t>
+              </a:r>
+            </a:p>
+            <a:p>
+              <a:r>
+                <a:rPr lang="en-GB" sz="1600" dirty="0" err="1" smtClean="0">
+                  <a:latin typeface="Consolas" panose="020B0609020204030204" pitchFamily="49" charset="0"/>
+                  <a:cs typeface="Consolas" panose="020B0609020204030204" pitchFamily="49" charset="0"/>
+                </a:rPr>
+                <a:t>lastName</a:t>
+              </a:r>
+              <a:r>
+                <a:rPr lang="en-GB" sz="1600" dirty="0" smtClean="0">
+                  <a:latin typeface="Consolas" panose="020B0609020204030204" pitchFamily="49" charset="0"/>
+                  <a:cs typeface="Consolas" panose="020B0609020204030204" pitchFamily="49" charset="0"/>
+                </a:rPr>
+                <a:t>: </a:t>
+              </a:r>
+              <a:r>
+                <a:rPr lang="en-GB" sz="1600" b="1" dirty="0" smtClean="0">
+                  <a:latin typeface="Consolas" panose="020B0609020204030204" pitchFamily="49" charset="0"/>
+                  <a:cs typeface="Consolas" panose="020B0609020204030204" pitchFamily="49" charset="0"/>
+                </a:rPr>
+                <a:t>Smith</a:t>
+              </a:r>
+              <a:endParaRPr lang="en-GB" sz="1600" b="1" dirty="0" smtClean="0">
+                <a:latin typeface="Consolas" panose="020B0609020204030204" pitchFamily="49" charset="0"/>
+                <a:cs typeface="Consolas" panose="020B0609020204030204" pitchFamily="49" charset="0"/>
+              </a:endParaRPr>
+            </a:p>
+          </p:txBody>
+        </p:sp>
+      </p:grpSp>
+      <p:cxnSp>
+        <p:nvCxnSpPr>
+          <p:cNvPr id="27" name="Elbow Connector 26"/>
+          <p:cNvCxnSpPr>
+            <a:stCxn id="20" idx="3"/>
+            <a:endCxn id="10" idx="2"/>
+          </p:cNvCxnSpPr>
+          <p:nvPr/>
+        </p:nvCxnSpPr>
+        <p:spPr>
+          <a:xfrm flipV="1">
+            <a:off x="2843808" y="2420888"/>
+            <a:ext cx="2952328" cy="2232248"/>
+          </a:xfrm>
+          <a:prstGeom prst="bentConnector2">
+            <a:avLst/>
+          </a:prstGeom>
+          <a:ln w="25400">
+            <a:solidFill>
+              <a:srgbClr val="7030A0"/>
+            </a:solidFill>
+            <a:prstDash val="sysDash"/>
+          </a:ln>
+        </p:spPr>
+        <p:style>
+          <a:lnRef idx="1">
+            <a:schemeClr val="accent1"/>
+          </a:lnRef>
+          <a:fillRef idx="0">
+            <a:schemeClr val="accent1"/>
+          </a:fillRef>
+          <a:effectRef idx="0">
+            <a:schemeClr val="accent1"/>
+          </a:effectRef>
+          <a:fontRef idx="minor">
+            <a:schemeClr val="tx1"/>
+          </a:fontRef>
+        </p:style>
+      </p:cxnSp>
+      <p:grpSp>
+        <p:nvGrpSpPr>
+          <p:cNvPr id="34" name="Group 33"/>
+          <p:cNvGrpSpPr/>
+          <p:nvPr/>
+        </p:nvGrpSpPr>
+        <p:grpSpPr>
+          <a:xfrm>
+            <a:off x="1835696" y="2420888"/>
+            <a:ext cx="2520280" cy="1944216"/>
+            <a:chOff x="1835696" y="2420888"/>
+            <a:chExt cx="2520280" cy="1944216"/>
+          </a:xfrm>
+        </p:grpSpPr>
+        <p:cxnSp>
+          <p:nvCxnSpPr>
+            <p:cNvPr id="32" name="Straight Arrow Connector 31"/>
+            <p:cNvCxnSpPr>
+              <a:stCxn id="9" idx="2"/>
+              <a:endCxn id="20" idx="0"/>
+            </p:cNvCxnSpPr>
+            <p:nvPr/>
+          </p:nvCxnSpPr>
+          <p:spPr>
+            <a:xfrm>
+              <a:off x="1835696" y="2420888"/>
+              <a:ext cx="0" cy="1944216"/>
+            </a:xfrm>
+            <a:prstGeom prst="straightConnector1">
+              <a:avLst/>
+            </a:prstGeom>
+            <a:ln w="25400">
+              <a:prstDash val="sysDash"/>
+              <a:tailEnd type="triangle"/>
+            </a:ln>
+          </p:spPr>
+          <p:style>
+            <a:lnRef idx="1">
+              <a:schemeClr val="accent1"/>
+            </a:lnRef>
+            <a:fillRef idx="0">
+              <a:schemeClr val="accent1"/>
+            </a:fillRef>
+            <a:effectRef idx="0">
+              <a:schemeClr val="accent1"/>
+            </a:effectRef>
+            <a:fontRef idx="minor">
+              <a:schemeClr val="tx1"/>
+            </a:fontRef>
+          </p:style>
+        </p:cxnSp>
+        <p:sp>
+          <p:nvSpPr>
+            <p:cNvPr id="33" name="TextBox 32"/>
+            <p:cNvSpPr txBox="1"/>
+            <p:nvPr/>
+          </p:nvSpPr>
+          <p:spPr>
+            <a:xfrm>
+              <a:off x="1835696" y="3429000"/>
+              <a:ext cx="2520280" cy="893122"/>
+            </a:xfrm>
+            <a:prstGeom prst="rect">
+              <a:avLst/>
+            </a:prstGeom>
+            <a:noFill/>
+          </p:spPr>
+          <p:txBody>
+            <a:bodyPr wrap="square" rtlCol="0">
+              <a:noAutofit/>
+            </a:bodyPr>
+            <a:lstStyle/>
+            <a:p>
+              <a:r>
+                <a:rPr lang="en-GB" sz="1600" dirty="0" err="1" smtClean="0">
+                  <a:latin typeface="Consolas" panose="020B0609020204030204" pitchFamily="49" charset="0"/>
+                  <a:cs typeface="Consolas" panose="020B0609020204030204" pitchFamily="49" charset="0"/>
+                </a:rPr>
+                <a:t>Person.copy</a:t>
+              </a:r>
+              <a:r>
+                <a:rPr lang="en-GB" sz="1600" dirty="0" smtClean="0">
+                  <a:latin typeface="Consolas" panose="020B0609020204030204" pitchFamily="49" charset="0"/>
+                  <a:cs typeface="Consolas" panose="020B0609020204030204" pitchFamily="49" charset="0"/>
+                </a:rPr>
+                <a:t>(</a:t>
+              </a:r>
+            </a:p>
+            <a:p>
+              <a:r>
+                <a:rPr lang="en-GB" sz="1600" dirty="0" smtClean="0">
+                  <a:latin typeface="Consolas" panose="020B0609020204030204" pitchFamily="49" charset="0"/>
+                  <a:cs typeface="Consolas" panose="020B0609020204030204" pitchFamily="49" charset="0"/>
+                </a:rPr>
+                <a:t>  </a:t>
+              </a:r>
+              <a:r>
+                <a:rPr lang="en-GB" sz="1600" dirty="0" err="1" smtClean="0">
+                  <a:latin typeface="Consolas" panose="020B0609020204030204" pitchFamily="49" charset="0"/>
+                  <a:cs typeface="Consolas" panose="020B0609020204030204" pitchFamily="49" charset="0"/>
+                </a:rPr>
+                <a:t>lastName</a:t>
+              </a:r>
+              <a:r>
+                <a:rPr lang="en-GB" sz="1600" dirty="0">
+                  <a:latin typeface="Consolas" panose="020B0609020204030204" pitchFamily="49" charset="0"/>
+                  <a:cs typeface="Consolas" panose="020B0609020204030204" pitchFamily="49" charset="0"/>
+                </a:rPr>
+                <a:t> </a:t>
+              </a:r>
+              <a:r>
+                <a:rPr lang="en-GB" sz="1600" dirty="0" smtClean="0">
+                  <a:latin typeface="Consolas" panose="020B0609020204030204" pitchFamily="49" charset="0"/>
+                  <a:cs typeface="Consolas" panose="020B0609020204030204" pitchFamily="49" charset="0"/>
+                </a:rPr>
+                <a:t>= “Smith”</a:t>
+              </a:r>
+            </a:p>
+            <a:p>
+              <a:r>
+                <a:rPr lang="en-GB" sz="1600" dirty="0">
+                  <a:latin typeface="Consolas" panose="020B0609020204030204" pitchFamily="49" charset="0"/>
+                  <a:cs typeface="Consolas" panose="020B0609020204030204" pitchFamily="49" charset="0"/>
+                </a:rPr>
+                <a:t>)</a:t>
+              </a:r>
+              <a:r>
+                <a:rPr lang="en-GB" sz="1600" dirty="0" smtClean="0">
+                  <a:latin typeface="Consolas" panose="020B0609020204030204" pitchFamily="49" charset="0"/>
+                  <a:cs typeface="Consolas" panose="020B0609020204030204" pitchFamily="49" charset="0"/>
+                </a:rPr>
+                <a:t> </a:t>
+              </a:r>
+              <a:endParaRPr lang="en-GB" sz="1600" dirty="0" smtClean="0">
+                <a:latin typeface="Consolas" panose="020B0609020204030204" pitchFamily="49" charset="0"/>
+                <a:cs typeface="Consolas" panose="020B0609020204030204" pitchFamily="49" charset="0"/>
+              </a:endParaRPr>
+            </a:p>
+          </p:txBody>
+        </p:sp>
+      </p:grpSp>
     </p:spTree>
     <p:extLst>
       <p:ext uri="{BB962C8B-B14F-4D97-AF65-F5344CB8AC3E}">
-        <p14:creationId xmlns:p14="http://schemas.microsoft.com/office/powerpoint/2010/main" val="2279230263"/>
+        <p14:creationId xmlns:p14="http://schemas.microsoft.com/office/powerpoint/2010/main" val="349347434"/>
       </p:ext>
     </p:extLst>
   </p:cSld>
@@ -7005,7 +7947,246 @@
   <p:timing>
     <p:tnLst>
       <p:par>
-        <p:cTn id="1" dur="indefinite" restart="never" nodeType="tmRoot"/>
+        <p:cTn id="1" dur="indefinite" restart="never" nodeType="tmRoot">
+          <p:childTnLst>
+            <p:seq concurrent="1" nextAc="seek">
+              <p:cTn id="2" dur="indefinite" nodeType="mainSeq">
+                <p:childTnLst>
+                  <p:par>
+                    <p:cTn id="3" fill="hold">
+                      <p:stCondLst>
+                        <p:cond delay="indefinite"/>
+                      </p:stCondLst>
+                      <p:childTnLst>
+                        <p:par>
+                          <p:cTn id="4" fill="hold">
+                            <p:stCondLst>
+                              <p:cond delay="0"/>
+                            </p:stCondLst>
+                            <p:childTnLst>
+                              <p:par>
+                                <p:cTn id="5" presetID="1" presetClass="exit" presetSubtype="0" fill="hold" nodeType="clickEffect">
+                                  <p:stCondLst>
+                                    <p:cond delay="0"/>
+                                  </p:stCondLst>
+                                  <p:childTnLst>
+                                    <p:set>
+                                      <p:cBhvr>
+                                        <p:cTn id="6" dur="1" fill="hold">
+                                          <p:stCondLst>
+                                            <p:cond delay="0"/>
+                                          </p:stCondLst>
+                                        </p:cTn>
+                                        <p:tgtEl>
+                                          <p:spTgt spid="15"/>
+                                        </p:tgtEl>
+                                        <p:attrNameLst>
+                                          <p:attrName>style.visibility</p:attrName>
+                                        </p:attrNameLst>
+                                      </p:cBhvr>
+                                      <p:to>
+                                        <p:strVal val="hidden"/>
+                                      </p:to>
+                                    </p:set>
+                                  </p:childTnLst>
+                                </p:cTn>
+                              </p:par>
+                            </p:childTnLst>
+                          </p:cTn>
+                        </p:par>
+                        <p:par>
+                          <p:cTn id="7" fill="hold">
+                            <p:stCondLst>
+                              <p:cond delay="0"/>
+                            </p:stCondLst>
+                            <p:childTnLst>
+                              <p:par>
+                                <p:cTn id="8" presetID="1" presetClass="entr" presetSubtype="0" fill="hold" nodeType="afterEffect">
+                                  <p:stCondLst>
+                                    <p:cond delay="0"/>
+                                  </p:stCondLst>
+                                  <p:childTnLst>
+                                    <p:set>
+                                      <p:cBhvr>
+                                        <p:cTn id="9" dur="1" fill="hold">
+                                          <p:stCondLst>
+                                            <p:cond delay="0"/>
+                                          </p:stCondLst>
+                                        </p:cTn>
+                                        <p:tgtEl>
+                                          <p:spTgt spid="16"/>
+                                        </p:tgtEl>
+                                        <p:attrNameLst>
+                                          <p:attrName>style.visibility</p:attrName>
+                                        </p:attrNameLst>
+                                      </p:cBhvr>
+                                      <p:to>
+                                        <p:strVal val="visible"/>
+                                      </p:to>
+                                    </p:set>
+                                  </p:childTnLst>
+                                </p:cTn>
+                              </p:par>
+                            </p:childTnLst>
+                          </p:cTn>
+                        </p:par>
+                      </p:childTnLst>
+                    </p:cTn>
+                  </p:par>
+                  <p:par>
+                    <p:cTn id="10" fill="hold">
+                      <p:stCondLst>
+                        <p:cond delay="indefinite"/>
+                      </p:stCondLst>
+                      <p:childTnLst>
+                        <p:par>
+                          <p:cTn id="11" fill="hold">
+                            <p:stCondLst>
+                              <p:cond delay="0"/>
+                            </p:stCondLst>
+                            <p:childTnLst>
+                              <p:par>
+                                <p:cTn id="12" presetID="1" presetClass="entr" presetSubtype="0" fill="hold" nodeType="clickEffect">
+                                  <p:stCondLst>
+                                    <p:cond delay="0"/>
+                                  </p:stCondLst>
+                                  <p:childTnLst>
+                                    <p:set>
+                                      <p:cBhvr>
+                                        <p:cTn id="13" dur="1" fill="hold">
+                                          <p:stCondLst>
+                                            <p:cond delay="0"/>
+                                          </p:stCondLst>
+                                        </p:cTn>
+                                        <p:tgtEl>
+                                          <p:spTgt spid="30"/>
+                                        </p:tgtEl>
+                                        <p:attrNameLst>
+                                          <p:attrName>style.visibility</p:attrName>
+                                        </p:attrNameLst>
+                                      </p:cBhvr>
+                                      <p:to>
+                                        <p:strVal val="visible"/>
+                                      </p:to>
+                                    </p:set>
+                                  </p:childTnLst>
+                                </p:cTn>
+                              </p:par>
+                            </p:childTnLst>
+                          </p:cTn>
+                        </p:par>
+                      </p:childTnLst>
+                    </p:cTn>
+                  </p:par>
+                  <p:par>
+                    <p:cTn id="14" fill="hold">
+                      <p:stCondLst>
+                        <p:cond delay="indefinite"/>
+                      </p:stCondLst>
+                      <p:childTnLst>
+                        <p:par>
+                          <p:cTn id="15" fill="hold">
+                            <p:stCondLst>
+                              <p:cond delay="0"/>
+                            </p:stCondLst>
+                            <p:childTnLst>
+                              <p:par>
+                                <p:cTn id="16" presetID="1" presetClass="entr" presetSubtype="0" fill="hold" nodeType="clickEffect">
+                                  <p:stCondLst>
+                                    <p:cond delay="0"/>
+                                  </p:stCondLst>
+                                  <p:childTnLst>
+                                    <p:set>
+                                      <p:cBhvr>
+                                        <p:cTn id="17" dur="1" fill="hold">
+                                          <p:stCondLst>
+                                            <p:cond delay="0"/>
+                                          </p:stCondLst>
+                                        </p:cTn>
+                                        <p:tgtEl>
+                                          <p:spTgt spid="34"/>
+                                        </p:tgtEl>
+                                        <p:attrNameLst>
+                                          <p:attrName>style.visibility</p:attrName>
+                                        </p:attrNameLst>
+                                      </p:cBhvr>
+                                      <p:to>
+                                        <p:strVal val="visible"/>
+                                      </p:to>
+                                    </p:set>
+                                  </p:childTnLst>
+                                </p:cTn>
+                              </p:par>
+                            </p:childTnLst>
+                          </p:cTn>
+                        </p:par>
+                      </p:childTnLst>
+                    </p:cTn>
+                  </p:par>
+                  <p:par>
+                    <p:cTn id="18" fill="hold">
+                      <p:stCondLst>
+                        <p:cond delay="indefinite"/>
+                      </p:stCondLst>
+                      <p:childTnLst>
+                        <p:par>
+                          <p:cTn id="19" fill="hold">
+                            <p:stCondLst>
+                              <p:cond delay="0"/>
+                            </p:stCondLst>
+                            <p:childTnLst>
+                              <p:par>
+                                <p:cTn id="20" presetID="1" presetClass="entr" presetSubtype="0" fill="hold" nodeType="clickEffect">
+                                  <p:stCondLst>
+                                    <p:cond delay="0"/>
+                                  </p:stCondLst>
+                                  <p:childTnLst>
+                                    <p:set>
+                                      <p:cBhvr>
+                                        <p:cTn id="21" dur="1" fill="hold">
+                                          <p:stCondLst>
+                                            <p:cond delay="0"/>
+                                          </p:stCondLst>
+                                        </p:cTn>
+                                        <p:tgtEl>
+                                          <p:spTgt spid="27"/>
+                                        </p:tgtEl>
+                                        <p:attrNameLst>
+                                          <p:attrName>style.visibility</p:attrName>
+                                        </p:attrNameLst>
+                                      </p:cBhvr>
+                                      <p:to>
+                                        <p:strVal val="visible"/>
+                                      </p:to>
+                                    </p:set>
+                                  </p:childTnLst>
+                                </p:cTn>
+                              </p:par>
+                            </p:childTnLst>
+                          </p:cTn>
+                        </p:par>
+                      </p:childTnLst>
+                    </p:cTn>
+                  </p:par>
+                </p:childTnLst>
+              </p:cTn>
+              <p:prevCondLst>
+                <p:cond evt="onPrev" delay="0">
+                  <p:tgtEl>
+                    <p:sldTgt/>
+                  </p:tgtEl>
+                </p:cond>
+              </p:prevCondLst>
+              <p:nextCondLst>
+                <p:cond evt="onNext" delay="0">
+                  <p:tgtEl>
+                    <p:sldTgt/>
+                  </p:tgtEl>
+                </p:cond>
+              </p:nextCondLst>
+            </p:seq>
+          </p:childTnLst>
+        </p:cTn>
       </p:par>
     </p:tnLst>
   </p:timing>
@@ -7031,7 +8212,7 @@
       </p:grpSpPr>
       <p:sp>
         <p:nvSpPr>
-          <p:cNvPr id="15" name="Title 14"/>
+          <p:cNvPr id="2" name="Title 1"/>
           <p:cNvSpPr>
             <a:spLocks noGrp="1"/>
           </p:cNvSpPr>
@@ -7054,7 +8235,7 @@
       </p:sp>
       <p:sp>
         <p:nvSpPr>
-          <p:cNvPr id="16" name="Content Placeholder 15"/>
+          <p:cNvPr id="3" name="Content Placeholder 2"/>
           <p:cNvSpPr>
             <a:spLocks noGrp="1"/>
           </p:cNvSpPr>
@@ -7067,29 +8248,130 @@
           <a:bodyPr/>
           <a:lstStyle/>
           <a:p>
-            <a:r>
-              <a:rPr lang="en-GB" dirty="0"/>
-              <a:t>Efficient operations on collections by using structural </a:t>
-            </a:r>
+            <a:pPr marL="342900" indent="-342900">
+              <a:buFont typeface="Arial" panose="020B0604020202020204" pitchFamily="34" charset="0"/>
+              <a:buChar char="•"/>
+            </a:pPr>
             <a:r>
               <a:rPr lang="en-GB" dirty="0" smtClean="0"/>
-              <a:t>sharing</a:t>
-            </a:r>
-          </a:p>
-          <a:p>
+              <a:t>Scala’s collections come in two (three) flavours:</a:t>
+            </a:r>
+          </a:p>
+          <a:p>
+            <a:pPr marL="608013" lvl="1" indent="-342900">
+              <a:buFont typeface="Arial" panose="020B0604020202020204" pitchFamily="34" charset="0"/>
+              <a:buChar char="•"/>
+            </a:pPr>
+            <a:r>
+              <a:rPr lang="en-GB" dirty="0" err="1" smtClean="0"/>
+              <a:t>scala.collection.immutable.Map</a:t>
+            </a:r>
+            <a:endParaRPr lang="en-GB" dirty="0" smtClean="0"/>
+          </a:p>
+          <a:p>
+            <a:pPr marL="608013" lvl="1" indent="-342900">
+              <a:buFont typeface="Arial" panose="020B0604020202020204" pitchFamily="34" charset="0"/>
+              <a:buChar char="•"/>
+            </a:pPr>
+            <a:r>
+              <a:rPr lang="en-GB" strike="sngStrike" dirty="0" err="1" smtClean="0"/>
+              <a:t>scala.collection.jcl.Map</a:t>
+            </a:r>
+            <a:endParaRPr lang="en-GB" strike="sngStrike" dirty="0" smtClean="0"/>
+          </a:p>
+          <a:p>
+            <a:pPr marL="608013" lvl="1" indent="-342900">
+              <a:buFont typeface="Arial" panose="020B0604020202020204" pitchFamily="34" charset="0"/>
+              <a:buChar char="•"/>
+            </a:pPr>
+            <a:r>
+              <a:rPr lang="en-GB" dirty="0" err="1" smtClean="0"/>
+              <a:t>scala.collection.mutable.Map</a:t>
+            </a:r>
+            <a:endParaRPr lang="en-GB" dirty="0" smtClean="0"/>
+          </a:p>
+          <a:p>
+            <a:pPr marL="342900" indent="-342900">
+              <a:buFont typeface="Arial" panose="020B0604020202020204" pitchFamily="34" charset="0"/>
+              <a:buChar char="•"/>
+            </a:pPr>
+            <a:r>
+              <a:rPr lang="en-GB" dirty="0" smtClean="0"/>
+              <a:t>Immutable collections do not support destructive updates</a:t>
+            </a:r>
+          </a:p>
+          <a:p>
+            <a:pPr lvl="1" indent="0">
+              <a:buNone/>
+            </a:pPr>
             <a:endParaRPr lang="en-GB" dirty="0"/>
           </a:p>
           <a:p>
+            <a:pPr marL="608013" lvl="1" indent="-342900">
+              <a:buFont typeface="Arial" panose="020B0604020202020204" pitchFamily="34" charset="0"/>
+              <a:buChar char="•"/>
+            </a:pPr>
             <a:endParaRPr lang="en-GB" dirty="0"/>
           </a:p>
-          <a:p>
+        </p:txBody>
+      </p:sp>
+      <p:sp>
+        <p:nvSpPr>
+          <p:cNvPr id="6" name="Text Placeholder 5"/>
+          <p:cNvSpPr>
+            <a:spLocks noGrp="1"/>
+          </p:cNvSpPr>
+          <p:nvPr>
+            <p:ph type="body" sz="quarter" idx="13"/>
+          </p:nvPr>
+        </p:nvSpPr>
+        <p:spPr/>
+        <p:txBody>
+          <a:bodyPr/>
+          <a:lstStyle/>
+          <a:p>
+            <a:r>
+              <a:rPr lang="en-GB" dirty="0" smtClean="0"/>
+              <a:t>Immutable </a:t>
+            </a:r>
+            <a:r>
+              <a:rPr lang="en-GB" dirty="0" smtClean="0"/>
+              <a:t>collections </a:t>
+            </a:r>
+            <a:r>
+              <a:rPr lang="en-GB" dirty="0" smtClean="0"/>
+              <a:t>in Scala</a:t>
+            </a:r>
             <a:endParaRPr lang="en-GB" dirty="0"/>
           </a:p>
         </p:txBody>
       </p:sp>
       <p:sp>
         <p:nvSpPr>
-          <p:cNvPr id="13" name="Date Placeholder 12"/>
+          <p:cNvPr id="9" name="Footer Placeholder 8"/>
+          <p:cNvSpPr>
+            <a:spLocks noGrp="1"/>
+          </p:cNvSpPr>
+          <p:nvPr>
+            <p:ph type="ftr" sz="quarter" idx="11"/>
+          </p:nvPr>
+        </p:nvSpPr>
+        <p:spPr/>
+        <p:txBody>
+          <a:bodyPr/>
+          <a:lstStyle/>
+          <a:p>
+            <a:r>
+              <a:rPr lang="en-US" smtClean="0"/>
+              <a:t>Functional Design Patterns for OO Practicioners | Hendrik Schöneberg</a:t>
+            </a:r>
+            <a:endParaRPr lang="de-CH" dirty="0"/>
+          </a:p>
+        </p:txBody>
+      </p:sp>
+      <p:sp>
+        <p:nvSpPr>
+          <p:cNvPr id="10" name="Date Placeholder 9"/>
           <p:cNvSpPr>
             <a:spLocks noGrp="1"/>
           </p:cNvSpPr>
@@ -7112,30 +8394,7 @@
       </p:sp>
       <p:sp>
         <p:nvSpPr>
-          <p:cNvPr id="12" name="Footer Placeholder 11"/>
-          <p:cNvSpPr>
-            <a:spLocks noGrp="1"/>
-          </p:cNvSpPr>
-          <p:nvPr>
-            <p:ph type="ftr" sz="quarter" idx="11"/>
-          </p:nvPr>
-        </p:nvSpPr>
-        <p:spPr/>
-        <p:txBody>
-          <a:bodyPr/>
-          <a:lstStyle/>
-          <a:p>
-            <a:r>
-              <a:rPr lang="en-US" smtClean="0"/>
-              <a:t>Functional Design Patterns for OO Practicioners | Hendrik Schöneberg</a:t>
-            </a:r>
-            <a:endParaRPr lang="de-CH" dirty="0"/>
-          </a:p>
-        </p:txBody>
-      </p:sp>
-      <p:sp>
-        <p:nvSpPr>
-          <p:cNvPr id="14" name="Slide Number Placeholder 13"/>
+          <p:cNvPr id="11" name="Slide Number Placeholder 10"/>
           <p:cNvSpPr>
             <a:spLocks noGrp="1"/>
           </p:cNvSpPr>
@@ -7152,13 +8411,185 @@
               <a:rPr lang="de-CH" smtClean="0"/>
               <a:t>Slide </a:t>
             </a:r>
-            <a:fld id="{F82CED09-1468-4C22-8EF1-4FC4103EDB18}" type="slidenum">
+            <a:fld id="{BBDD74A2-B39F-4E20-A559-38A405CFA5B2}" type="slidenum">
               <a:rPr lang="de-CH" smtClean="0"/>
               <a:t>5</a:t>
             </a:fld>
             <a:r>
               <a:rPr lang="de-CH" smtClean="0"/>
-              <a:t> of 13</a:t>
+              <a:t> of 14</a:t>
+            </a:r>
+            <a:endParaRPr lang="de-CH" dirty="0"/>
+          </a:p>
+        </p:txBody>
+      </p:sp>
+    </p:spTree>
+    <p:extLst>
+      <p:ext uri="{BB962C8B-B14F-4D97-AF65-F5344CB8AC3E}">
+        <p14:creationId xmlns:p14="http://schemas.microsoft.com/office/powerpoint/2010/main" val="2279230263"/>
+      </p:ext>
+    </p:extLst>
+  </p:cSld>
+  <p:clrMapOvr>
+    <a:masterClrMapping/>
+  </p:clrMapOvr>
+  <p:timing>
+    <p:tnLst>
+      <p:par>
+        <p:cTn id="1" dur="indefinite" restart="never" nodeType="tmRoot"/>
+      </p:par>
+    </p:tnLst>
+  </p:timing>
+</p:sld>
+</file>
+
+<file path=ppt/slides/slide6.xml><?xml version="1.0" encoding="utf-8"?>
+<p:sld xmlns:a="http://schemas.openxmlformats.org/drawingml/2006/main" xmlns:r="http://schemas.openxmlformats.org/officeDocument/2006/relationships" xmlns:p="http://schemas.openxmlformats.org/presentationml/2006/main">
+  <p:cSld>
+    <p:spTree>
+      <p:nvGrpSpPr>
+        <p:cNvPr id="1" name=""/>
+        <p:cNvGrpSpPr/>
+        <p:nvPr/>
+      </p:nvGrpSpPr>
+      <p:grpSpPr>
+        <a:xfrm>
+          <a:off x="0" y="0"/>
+          <a:ext cx="0" cy="0"/>
+          <a:chOff x="0" y="0"/>
+          <a:chExt cx="0" cy="0"/>
+        </a:xfrm>
+      </p:grpSpPr>
+      <p:sp>
+        <p:nvSpPr>
+          <p:cNvPr id="15" name="Title 14"/>
+          <p:cNvSpPr>
+            <a:spLocks noGrp="1"/>
+          </p:cNvSpPr>
+          <p:nvPr>
+            <p:ph type="title"/>
+          </p:nvPr>
+        </p:nvSpPr>
+        <p:spPr/>
+        <p:txBody>
+          <a:bodyPr/>
+          <a:lstStyle/>
+          <a:p>
+            <a:r>
+              <a:rPr lang="en-GB" dirty="0" smtClean="0"/>
+              <a:t>Immutability</a:t>
+            </a:r>
+            <a:endParaRPr lang="en-GB" dirty="0"/>
+          </a:p>
+        </p:txBody>
+      </p:sp>
+      <p:sp>
+        <p:nvSpPr>
+          <p:cNvPr id="16" name="Content Placeholder 15"/>
+          <p:cNvSpPr>
+            <a:spLocks noGrp="1"/>
+          </p:cNvSpPr>
+          <p:nvPr>
+            <p:ph idx="1"/>
+          </p:nvPr>
+        </p:nvSpPr>
+        <p:spPr/>
+        <p:txBody>
+          <a:bodyPr/>
+          <a:lstStyle/>
+          <a:p>
+            <a:r>
+              <a:rPr lang="en-GB" dirty="0"/>
+              <a:t>Efficient operations on collections by using structural </a:t>
+            </a:r>
+            <a:r>
+              <a:rPr lang="en-GB" dirty="0" smtClean="0"/>
+              <a:t>sharing</a:t>
+            </a:r>
+          </a:p>
+          <a:p>
+            <a:endParaRPr lang="en-GB" dirty="0"/>
+          </a:p>
+          <a:p>
+            <a:endParaRPr lang="en-GB" dirty="0"/>
+          </a:p>
+          <a:p>
+            <a:endParaRPr lang="en-GB" dirty="0"/>
+          </a:p>
+        </p:txBody>
+      </p:sp>
+      <p:sp>
+        <p:nvSpPr>
+          <p:cNvPr id="13" name="Date Placeholder 12"/>
+          <p:cNvSpPr>
+            <a:spLocks noGrp="1"/>
+          </p:cNvSpPr>
+          <p:nvPr>
+            <p:ph type="dt" sz="half" idx="10"/>
+          </p:nvPr>
+        </p:nvSpPr>
+        <p:spPr/>
+        <p:txBody>
+          <a:bodyPr/>
+          <a:lstStyle/>
+          <a:p>
+            <a:r>
+              <a:rPr lang="de-CH" smtClean="0"/>
+              <a:t>14. September 2015</a:t>
+            </a:r>
+            <a:endParaRPr lang="de-CH" dirty="0"/>
+          </a:p>
+        </p:txBody>
+      </p:sp>
+      <p:sp>
+        <p:nvSpPr>
+          <p:cNvPr id="12" name="Footer Placeholder 11"/>
+          <p:cNvSpPr>
+            <a:spLocks noGrp="1"/>
+          </p:cNvSpPr>
+          <p:nvPr>
+            <p:ph type="ftr" sz="quarter" idx="11"/>
+          </p:nvPr>
+        </p:nvSpPr>
+        <p:spPr/>
+        <p:txBody>
+          <a:bodyPr/>
+          <a:lstStyle/>
+          <a:p>
+            <a:r>
+              <a:rPr lang="en-US" smtClean="0"/>
+              <a:t>Functional Design Patterns for OO Practicioners | Hendrik Schöneberg</a:t>
+            </a:r>
+            <a:endParaRPr lang="de-CH" dirty="0"/>
+          </a:p>
+        </p:txBody>
+      </p:sp>
+      <p:sp>
+        <p:nvSpPr>
+          <p:cNvPr id="14" name="Slide Number Placeholder 13"/>
+          <p:cNvSpPr>
+            <a:spLocks noGrp="1"/>
+          </p:cNvSpPr>
+          <p:nvPr>
+            <p:ph type="sldNum" sz="quarter" idx="12"/>
+          </p:nvPr>
+        </p:nvSpPr>
+        <p:spPr/>
+        <p:txBody>
+          <a:bodyPr/>
+          <a:lstStyle/>
+          <a:p>
+            <a:r>
+              <a:rPr lang="de-CH" smtClean="0"/>
+              <a:t>Slide </a:t>
+            </a:r>
+            <a:fld id="{4EF01E02-A532-48EE-94DE-A2AF5CAC7385}" type="slidenum">
+              <a:rPr lang="de-CH" smtClean="0"/>
+              <a:t>6</a:t>
+            </a:fld>
+            <a:r>
+              <a:rPr lang="de-CH" smtClean="0"/>
+              <a:t> of 14</a:t>
             </a:r>
             <a:endParaRPr lang="de-CH" dirty="0"/>
           </a:p>
@@ -7670,7 +9101,7 @@
 </p:sld>
 </file>
 
-<file path=ppt/slides/slide6.xml><?xml version="1.0" encoding="utf-8"?>
+<file path=ppt/slides/slide7.xml><?xml version="1.0" encoding="utf-8"?>
 <p:sld xmlns:a="http://schemas.openxmlformats.org/drawingml/2006/main" xmlns:r="http://schemas.openxmlformats.org/officeDocument/2006/relationships" xmlns:p="http://schemas.openxmlformats.org/presentationml/2006/main">
   <p:cSld>
     <p:spTree>
@@ -7899,13 +9330,13 @@
               <a:rPr lang="de-CH" smtClean="0"/>
               <a:t>Slide </a:t>
             </a:r>
-            <a:fld id="{2B1B3298-BFCC-46C1-86E9-12BB50CB9008}" type="slidenum">
+            <a:fld id="{CAA73060-8EBC-4CE9-8C6A-2AB4709BE721}" type="slidenum">
               <a:rPr lang="de-CH" smtClean="0"/>
-              <a:t>6</a:t>
+              <a:t>7</a:t>
             </a:fld>
             <a:r>
               <a:rPr lang="de-CH" smtClean="0"/>
-              <a:t> of 13</a:t>
+              <a:t> of 14</a:t>
             </a:r>
             <a:endParaRPr dirty="0"/>
           </a:p>
@@ -8618,7 +10049,7 @@
 </p:sld>
 </file>
 
-<file path=ppt/slides/slide7.xml><?xml version="1.0" encoding="utf-8"?>
+<file path=ppt/slides/slide8.xml><?xml version="1.0" encoding="utf-8"?>
 <p:sld xmlns:a="http://schemas.openxmlformats.org/drawingml/2006/main" xmlns:r="http://schemas.openxmlformats.org/officeDocument/2006/relationships" xmlns:p="http://schemas.openxmlformats.org/presentationml/2006/main">
   <p:cSld>
     <p:spTree>
@@ -9109,13 +10540,13 @@
               <a:rPr lang="de-CH" smtClean="0"/>
               <a:t>Slide </a:t>
             </a:r>
-            <a:fld id="{8F6E7DAF-6B1D-4D6A-A078-F40CD056BFD5}" type="slidenum">
+            <a:fld id="{7A1D03AE-2984-4948-9033-B11B476291E8}" type="slidenum">
               <a:rPr lang="de-CH" smtClean="0"/>
-              <a:t>7</a:t>
+              <a:t>8</a:t>
             </a:fld>
             <a:r>
               <a:rPr lang="de-CH" smtClean="0"/>
-              <a:t> of 13</a:t>
+              <a:t> of 14</a:t>
             </a:r>
             <a:endParaRPr dirty="0"/>
           </a:p>
@@ -9385,178 +10816,6 @@
 </p:sld>
 </file>
 
-<file path=ppt/slides/slide8.xml><?xml version="1.0" encoding="utf-8"?>
-<p:sld xmlns:a="http://schemas.openxmlformats.org/drawingml/2006/main" xmlns:r="http://schemas.openxmlformats.org/officeDocument/2006/relationships" xmlns:p="http://schemas.openxmlformats.org/presentationml/2006/main">
-  <p:cSld>
-    <p:spTree>
-      <p:nvGrpSpPr>
-        <p:cNvPr id="1" name=""/>
-        <p:cNvGrpSpPr/>
-        <p:nvPr/>
-      </p:nvGrpSpPr>
-      <p:grpSpPr>
-        <a:xfrm>
-          <a:off x="0" y="0"/>
-          <a:ext cx="0" cy="0"/>
-          <a:chOff x="0" y="0"/>
-          <a:chExt cx="0" cy="0"/>
-        </a:xfrm>
-      </p:grpSpPr>
-      <p:sp>
-        <p:nvSpPr>
-          <p:cNvPr id="2" name="Title 1"/>
-          <p:cNvSpPr>
-            <a:spLocks noGrp="1"/>
-          </p:cNvSpPr>
-          <p:nvPr>
-            <p:ph type="title"/>
-          </p:nvPr>
-        </p:nvSpPr>
-        <p:spPr/>
-        <p:txBody>
-          <a:bodyPr/>
-          <a:lstStyle/>
-          <a:p>
-            <a:r>
-              <a:rPr lang="en-GB" dirty="0" smtClean="0"/>
-              <a:t>Immutability</a:t>
-            </a:r>
-            <a:endParaRPr lang="en-GB" dirty="0"/>
-          </a:p>
-        </p:txBody>
-      </p:sp>
-      <p:sp>
-        <p:nvSpPr>
-          <p:cNvPr id="3" name="Content Placeholder 2"/>
-          <p:cNvSpPr>
-            <a:spLocks noGrp="1"/>
-          </p:cNvSpPr>
-          <p:nvPr>
-            <p:ph idx="1"/>
-          </p:nvPr>
-        </p:nvSpPr>
-        <p:spPr/>
-        <p:txBody>
-          <a:bodyPr/>
-          <a:lstStyle/>
-          <a:p>
-            <a:endParaRPr lang="en-GB"/>
-          </a:p>
-        </p:txBody>
-      </p:sp>
-      <p:sp>
-        <p:nvSpPr>
-          <p:cNvPr id="4" name="Date Placeholder 3"/>
-          <p:cNvSpPr>
-            <a:spLocks noGrp="1"/>
-          </p:cNvSpPr>
-          <p:nvPr>
-            <p:ph type="dt" sz="half" idx="10"/>
-          </p:nvPr>
-        </p:nvSpPr>
-        <p:spPr/>
-        <p:txBody>
-          <a:bodyPr/>
-          <a:lstStyle/>
-          <a:p>
-            <a:r>
-              <a:rPr lang="de-CH" smtClean="0"/>
-              <a:t>14. September 2015</a:t>
-            </a:r>
-            <a:endParaRPr lang="de-CH" dirty="0"/>
-          </a:p>
-        </p:txBody>
-      </p:sp>
-      <p:sp>
-        <p:nvSpPr>
-          <p:cNvPr id="5" name="Footer Placeholder 4"/>
-          <p:cNvSpPr>
-            <a:spLocks noGrp="1"/>
-          </p:cNvSpPr>
-          <p:nvPr>
-            <p:ph type="ftr" sz="quarter" idx="11"/>
-          </p:nvPr>
-        </p:nvSpPr>
-        <p:spPr/>
-        <p:txBody>
-          <a:bodyPr/>
-          <a:lstStyle/>
-          <a:p>
-            <a:r>
-              <a:rPr lang="en-US" smtClean="0"/>
-              <a:t>Functional Design Patterns for OO Practicioners | Hendrik Schöneberg</a:t>
-            </a:r>
-            <a:endParaRPr lang="de-CH" dirty="0"/>
-          </a:p>
-        </p:txBody>
-      </p:sp>
-      <p:sp>
-        <p:nvSpPr>
-          <p:cNvPr id="7" name="Text Placeholder 6"/>
-          <p:cNvSpPr>
-            <a:spLocks noGrp="1"/>
-          </p:cNvSpPr>
-          <p:nvPr>
-            <p:ph type="body" sz="quarter" idx="13"/>
-          </p:nvPr>
-        </p:nvSpPr>
-        <p:spPr/>
-        <p:txBody>
-          <a:bodyPr/>
-          <a:lstStyle/>
-          <a:p>
-            <a:r>
-              <a:rPr lang="en-GB" dirty="0" smtClean="0"/>
-              <a:t>Modifying simple objects</a:t>
-            </a:r>
-            <a:endParaRPr lang="en-GB" dirty="0"/>
-          </a:p>
-        </p:txBody>
-      </p:sp>
-      <p:sp>
-        <p:nvSpPr>
-          <p:cNvPr id="8" name="Slide Number Placeholder 7"/>
-          <p:cNvSpPr>
-            <a:spLocks noGrp="1"/>
-          </p:cNvSpPr>
-          <p:nvPr>
-            <p:ph type="sldNum" sz="quarter" idx="12"/>
-          </p:nvPr>
-        </p:nvSpPr>
-        <p:spPr/>
-        <p:txBody>
-          <a:bodyPr/>
-          <a:lstStyle/>
-          <a:p>
-            <a:r>
-              <a:rPr lang="de-CH" smtClean="0"/>
-              <a:t>Slide </a:t>
-            </a:r>
-            <a:fld id="{F8E8A325-B407-45D1-BA2C-F24A7A606AE6}" type="slidenum">
-              <a:rPr lang="de-CH" smtClean="0"/>
-              <a:t>8</a:t>
-            </a:fld>
-            <a:r>
-              <a:rPr lang="de-CH" smtClean="0"/>
-              <a:t> of 13</a:t>
-            </a:r>
-            <a:endParaRPr dirty="0"/>
-          </a:p>
-        </p:txBody>
-      </p:sp>
-    </p:spTree>
-    <p:extLst>
-      <p:ext uri="{BB962C8B-B14F-4D97-AF65-F5344CB8AC3E}">
-        <p14:creationId xmlns:p14="http://schemas.microsoft.com/office/powerpoint/2010/main" val="349347434"/>
-      </p:ext>
-    </p:extLst>
-  </p:cSld>
-  <p:clrMapOvr>
-    <a:masterClrMapping/>
-  </p:clrMapOvr>
-</p:sld>
-</file>
-
 <file path=ppt/slides/slide9.xml><?xml version="1.0" encoding="utf-8"?>
 <p:sld xmlns:a="http://schemas.openxmlformats.org/drawingml/2006/main" xmlns:r="http://schemas.openxmlformats.org/officeDocument/2006/relationships" xmlns:p="http://schemas.openxmlformats.org/presentationml/2006/main">
   <p:cSld>
@@ -9704,13 +10963,13 @@
               <a:rPr lang="de-CH" smtClean="0"/>
               <a:t>Slide </a:t>
             </a:r>
-            <a:fld id="{31C9FE4D-0A09-4C09-9EF7-B8CA8197C846}" type="slidenum">
+            <a:fld id="{7BF048C7-EEFA-4DAD-94F2-3DE9E1F79DEA}" type="slidenum">
               <a:rPr lang="de-CH" smtClean="0"/>
               <a:t>9</a:t>
             </a:fld>
             <a:r>
               <a:rPr lang="de-CH" smtClean="0"/>
-              <a:t> of 13</a:t>
+              <a:t> of 14</a:t>
             </a:r>
             <a:endParaRPr dirty="0"/>
           </a:p>

</xml_diff>

<commit_message>
add lessons learned section for immutability
</commit_message>
<xml_diff>
--- a/hesc_slides.pptx
+++ b/hesc_slides.pptx
@@ -5,10 +5,10 @@
     <p:sldMasterId id="2147483648" r:id="rId1"/>
   </p:sldMasterIdLst>
   <p:notesMasterIdLst>
-    <p:notesMasterId r:id="rId18"/>
+    <p:notesMasterId r:id="rId20"/>
   </p:notesMasterIdLst>
   <p:handoutMasterIdLst>
-    <p:handoutMasterId r:id="rId19"/>
+    <p:handoutMasterId r:id="rId21"/>
   </p:handoutMasterIdLst>
   <p:sldIdLst>
     <p:sldId id="256" r:id="rId2"/>
@@ -20,32 +20,34 @@
     <p:sldId id="266" r:id="rId8"/>
     <p:sldId id="267" r:id="rId9"/>
     <p:sldId id="268" r:id="rId10"/>
-    <p:sldId id="275" r:id="rId11"/>
-    <p:sldId id="270" r:id="rId12"/>
-    <p:sldId id="274" r:id="rId13"/>
-    <p:sldId id="272" r:id="rId14"/>
-    <p:sldId id="273" r:id="rId15"/>
-    <p:sldId id="276" r:id="rId16"/>
-    <p:sldId id="265" r:id="rId17"/>
+    <p:sldId id="277" r:id="rId11"/>
+    <p:sldId id="278" r:id="rId12"/>
+    <p:sldId id="275" r:id="rId13"/>
+    <p:sldId id="270" r:id="rId14"/>
+    <p:sldId id="274" r:id="rId15"/>
+    <p:sldId id="272" r:id="rId16"/>
+    <p:sldId id="273" r:id="rId17"/>
+    <p:sldId id="276" r:id="rId18"/>
+    <p:sldId id="265" r:id="rId19"/>
   </p:sldIdLst>
   <p:sldSz cx="9144000" cy="6858000" type="screen4x3"/>
   <p:notesSz cx="6858000" cy="9144000"/>
   <p:embeddedFontLst>
     <p:embeddedFont>
       <p:font typeface="AA Zuehlke" panose="02000503060000020004" pitchFamily="2" charset="0"/>
-      <p:regular r:id="rId20"/>
-      <p:italic r:id="rId21"/>
+      <p:regular r:id="rId22"/>
+      <p:italic r:id="rId23"/>
     </p:embeddedFont>
     <p:embeddedFont>
       <p:font typeface="Consolas" panose="020B0609020204030204" pitchFamily="49" charset="0"/>
-      <p:regular r:id="rId22"/>
-      <p:bold r:id="rId23"/>
-      <p:italic r:id="rId24"/>
-      <p:boldItalic r:id="rId25"/>
+      <p:regular r:id="rId24"/>
+      <p:bold r:id="rId25"/>
+      <p:italic r:id="rId26"/>
+      <p:boldItalic r:id="rId27"/>
     </p:embeddedFont>
   </p:embeddedFontLst>
   <p:custDataLst>
-    <p:tags r:id="rId26"/>
+    <p:tags r:id="rId28"/>
   </p:custDataLst>
   <p:defaultTextStyle>
     <a:defPPr>
@@ -853,14 +855,14 @@
               <a:rPr lang="de-CH" smtClean="0"/>
               <a:t>Slide </a:t>
             </a:r>
-            <a:fld id="{2B7BFBAA-0093-4901-B918-028DB2B44AC3}" type="slidenum">
+            <a:fld id="{DCF0D9A2-CF23-4998-B1D3-EA910EA804FA}" type="slidenum">
               <a:rPr smtClean="0"/>
               <a:pPr/>
               <a:t>‹#›</a:t>
             </a:fld>
             <a:r>
               <a:rPr lang="de-CH" smtClean="0"/>
-              <a:t> of 16</a:t>
+              <a:t> of 18</a:t>
             </a:r>
             <a:endParaRPr dirty="0"/>
           </a:p>
@@ -1177,14 +1179,14 @@
               <a:rPr lang="de-CH" smtClean="0"/>
               <a:t>Slide </a:t>
             </a:r>
-            <a:fld id="{B4100B9F-54C6-4665-B8E7-7428D84812B7}" type="slidenum">
+            <a:fld id="{172B9C6A-0EBA-4276-9342-C77C76605745}" type="slidenum">
               <a:rPr smtClean="0"/>
               <a:pPr/>
               <a:t>‹#›</a:t>
             </a:fld>
             <a:r>
               <a:rPr lang="de-CH" smtClean="0"/>
-              <a:t> of 16</a:t>
+              <a:t> of 18</a:t>
             </a:r>
             <a:endParaRPr dirty="0"/>
           </a:p>
@@ -1479,14 +1481,14 @@
               <a:rPr lang="de-CH" smtClean="0"/>
               <a:t>Slide </a:t>
             </a:r>
-            <a:fld id="{104781CF-C802-46F6-80B5-BA1DF306E79D}" type="slidenum">
+            <a:fld id="{8B01422B-E74C-426F-A9ED-B41ECC56252E}" type="slidenum">
               <a:rPr smtClean="0"/>
               <a:pPr/>
               <a:t>‹#›</a:t>
             </a:fld>
             <a:r>
               <a:rPr lang="de-CH" smtClean="0"/>
-              <a:t> of 16</a:t>
+              <a:t> of 18</a:t>
             </a:r>
             <a:endParaRPr dirty="0"/>
           </a:p>
@@ -1811,14 +1813,14 @@
               <a:rPr lang="de-CH" smtClean="0"/>
               <a:t>Slide </a:t>
             </a:r>
-            <a:fld id="{08EEAC96-44BA-425E-8892-F4201AA10CBC}" type="slidenum">
+            <a:fld id="{EC84B4B9-FFFF-4050-8F5E-402A498A59E7}" type="slidenum">
               <a:rPr smtClean="0"/>
               <a:pPr/>
               <a:t>‹#›</a:t>
             </a:fld>
             <a:r>
               <a:rPr lang="de-CH" smtClean="0"/>
-              <a:t> of 16</a:t>
+              <a:t> of 18</a:t>
             </a:r>
             <a:endParaRPr dirty="0"/>
           </a:p>
@@ -2145,14 +2147,14 @@
               <a:rPr lang="de-CH" smtClean="0"/>
               <a:t>Slide </a:t>
             </a:r>
-            <a:fld id="{2957AB93-C86D-445F-ADC9-FDE17F7CFF16}" type="slidenum">
+            <a:fld id="{276722E3-6860-435F-9ECB-51A05CCC58A7}" type="slidenum">
               <a:rPr smtClean="0"/>
               <a:pPr/>
               <a:t>‹#›</a:t>
             </a:fld>
             <a:r>
               <a:rPr lang="de-CH" smtClean="0"/>
-              <a:t> of 16</a:t>
+              <a:t> of 18</a:t>
             </a:r>
             <a:endParaRPr dirty="0"/>
           </a:p>
@@ -2575,14 +2577,14 @@
               <a:rPr lang="de-CH" smtClean="0"/>
               <a:t>Slide </a:t>
             </a:r>
-            <a:fld id="{C0FDF2A7-DEF5-4285-91F9-6459601206E5}" type="slidenum">
+            <a:fld id="{51C13657-0A59-4D52-8E89-FD242AF93930}" type="slidenum">
               <a:rPr smtClean="0"/>
               <a:pPr/>
               <a:t>‹#›</a:t>
             </a:fld>
             <a:r>
               <a:rPr lang="de-CH" smtClean="0"/>
-              <a:t> of 16</a:t>
+              <a:t> of 18</a:t>
             </a:r>
             <a:endParaRPr dirty="0"/>
           </a:p>
@@ -3293,14 +3295,14 @@
               <a:rPr lang="de-CH" smtClean="0"/>
               <a:t>Slide </a:t>
             </a:r>
-            <a:fld id="{B433FE80-79F4-48D4-8B62-2F46D35776BB}" type="slidenum">
+            <a:fld id="{3B3BB93E-A1E4-4D70-8206-DEA86A88D042}" type="slidenum">
               <a:rPr smtClean="0"/>
               <a:pPr/>
               <a:t>‹#›</a:t>
             </a:fld>
             <a:r>
               <a:rPr lang="de-CH" smtClean="0"/>
-              <a:t> of 16</a:t>
+              <a:t> of 18</a:t>
             </a:r>
             <a:endParaRPr dirty="0"/>
           </a:p>
@@ -3599,14 +3601,14 @@
               <a:rPr lang="de-CH" smtClean="0"/>
               <a:t>Slide </a:t>
             </a:r>
-            <a:fld id="{A7A76682-0546-450C-9977-728C724B447A}" type="slidenum">
+            <a:fld id="{FDB5EE68-904C-423C-8100-3A9890185EFB}" type="slidenum">
               <a:rPr smtClean="0"/>
               <a:pPr/>
               <a:t>‹#›</a:t>
             </a:fld>
             <a:r>
               <a:rPr lang="de-CH" smtClean="0"/>
-              <a:t> of 16</a:t>
+              <a:t> of 18</a:t>
             </a:r>
             <a:endParaRPr dirty="0"/>
           </a:p>
@@ -4126,14 +4128,14 @@
               <a:rPr lang="de-CH" smtClean="0"/>
               <a:t>Slide </a:t>
             </a:r>
-            <a:fld id="{B212D5F0-AD0E-4815-9FDE-24D999F3DEDA}" type="slidenum">
+            <a:fld id="{6DCD0536-3229-4233-ACAC-EC591E560AFB}" type="slidenum">
               <a:rPr smtClean="0"/>
               <a:pPr/>
               <a:t>‹#›</a:t>
             </a:fld>
             <a:r>
               <a:rPr lang="de-CH" smtClean="0"/>
-              <a:t> of 16</a:t>
+              <a:t> of 18</a:t>
             </a:r>
             <a:endParaRPr dirty="0"/>
           </a:p>
@@ -4524,14 +4526,14 @@
               <a:rPr lang="de-CH" smtClean="0"/>
               <a:t>Slide </a:t>
             </a:r>
-            <a:fld id="{7B465945-1333-4F47-A982-6627F78CF84B}" type="slidenum">
+            <a:fld id="{1D926DB8-96D1-40A8-B7C2-CC77CAB0167C}" type="slidenum">
               <a:rPr smtClean="0"/>
               <a:pPr/>
               <a:t>‹#›</a:t>
             </a:fld>
             <a:r>
               <a:rPr lang="de-CH" smtClean="0"/>
-              <a:t> of 16</a:t>
+              <a:t> of 18</a:t>
             </a:r>
             <a:endParaRPr dirty="0"/>
           </a:p>
@@ -4754,14 +4756,14 @@
               <a:rPr lang="de-CH" smtClean="0"/>
               <a:t>Slide </a:t>
             </a:r>
-            <a:fld id="{6341DC8A-51F2-4376-8ED2-96529E5402EA}" type="slidenum">
+            <a:fld id="{26323A8D-B527-45B6-A1F8-8B95866C29CE}" type="slidenum">
               <a:rPr smtClean="0"/>
               <a:pPr/>
               <a:t>‹#›</a:t>
             </a:fld>
             <a:r>
               <a:rPr lang="de-CH" smtClean="0"/>
-              <a:t> of 16</a:t>
+              <a:t> of 18</a:t>
             </a:r>
             <a:endParaRPr dirty="0"/>
           </a:p>
@@ -5032,14 +5034,14 @@
               <a:rPr lang="de-CH" smtClean="0"/>
               <a:t>Slide </a:t>
             </a:r>
-            <a:fld id="{EF209108-5075-4F49-AA08-824BD8624B51}" type="slidenum">
+            <a:fld id="{A79A9DFA-5F7A-40DE-A409-3225D6CF185C}" type="slidenum">
               <a:rPr smtClean="0"/>
               <a:pPr/>
               <a:t>‹#›</a:t>
             </a:fld>
             <a:r>
               <a:rPr lang="de-CH" smtClean="0"/>
-              <a:t> of 16</a:t>
+              <a:t> of 18</a:t>
             </a:r>
             <a:endParaRPr dirty="0"/>
           </a:p>
@@ -5503,13 +5505,13 @@
               <a:rPr lang="de-CH" smtClean="0"/>
               <a:t>Slide </a:t>
             </a:r>
-            <a:fld id="{40AEDA77-BD73-479E-A54D-4ED30CDE9878}" type="slidenum">
+            <a:fld id="{6D57DEB1-EA01-4DAA-BE55-1BCDF64F2DBD}" type="slidenum">
               <a:rPr lang="de-CH" smtClean="0"/>
               <a:t>1</a:t>
             </a:fld>
             <a:r>
               <a:rPr lang="de-CH" smtClean="0"/>
-              <a:t> of 16</a:t>
+              <a:t> of 18</a:t>
             </a:r>
             <a:endParaRPr lang="de-CH" dirty="0"/>
           </a:p>
@@ -5554,12 +5556,12 @@
       </p:grpSpPr>
       <p:sp>
         <p:nvSpPr>
-          <p:cNvPr id="2" name="Title 1"/>
-          <p:cNvSpPr>
-            <a:spLocks noGrp="1"/>
-          </p:cNvSpPr>
-          <p:nvPr>
-            <p:ph type="title"/>
+          <p:cNvPr id="4" name="Date Placeholder 3"/>
+          <p:cNvSpPr>
+            <a:spLocks noGrp="1"/>
+          </p:cNvSpPr>
+          <p:nvPr>
+            <p:ph type="dt" sz="half" idx="10"/>
           </p:nvPr>
         </p:nvSpPr>
         <p:spPr/>
@@ -5568,21 +5570,21 @@
           <a:lstStyle/>
           <a:p>
             <a:r>
-              <a:rPr lang="en-GB" dirty="0" smtClean="0"/>
-              <a:t>Immutability</a:t>
-            </a:r>
-            <a:endParaRPr lang="en-GB" dirty="0"/>
-          </a:p>
-        </p:txBody>
-      </p:sp>
-      <p:sp>
-        <p:nvSpPr>
-          <p:cNvPr id="3" name="Content Placeholder 2"/>
-          <p:cNvSpPr>
-            <a:spLocks noGrp="1"/>
-          </p:cNvSpPr>
-          <p:nvPr>
-            <p:ph idx="1"/>
+              <a:rPr lang="de-CH" dirty="0" smtClean="0"/>
+              <a:t>14. November 2014</a:t>
+            </a:r>
+            <a:endParaRPr lang="de-CH" dirty="0"/>
+          </a:p>
+        </p:txBody>
+      </p:sp>
+      <p:sp>
+        <p:nvSpPr>
+          <p:cNvPr id="7" name="Footer Placeholder 6"/>
+          <p:cNvSpPr>
+            <a:spLocks noGrp="1"/>
+          </p:cNvSpPr>
+          <p:nvPr>
+            <p:ph type="ftr" sz="quarter" idx="11"/>
           </p:nvPr>
         </p:nvSpPr>
         <p:spPr/>
@@ -5590,28 +5592,13 @@
           <a:bodyPr/>
           <a:lstStyle/>
           <a:p>
-            <a:endParaRPr lang="en-GB"/>
-          </a:p>
-        </p:txBody>
-      </p:sp>
-      <p:sp>
-        <p:nvSpPr>
-          <p:cNvPr id="4" name="Date Placeholder 3"/>
-          <p:cNvSpPr>
-            <a:spLocks noGrp="1"/>
-          </p:cNvSpPr>
-          <p:nvPr>
-            <p:ph type="dt" sz="half" idx="10"/>
-          </p:nvPr>
-        </p:nvSpPr>
-        <p:spPr/>
-        <p:txBody>
-          <a:bodyPr/>
-          <a:lstStyle/>
-          <a:p>
-            <a:r>
-              <a:rPr lang="de-CH" smtClean="0"/>
-              <a:t>14. September 2015</a:t>
+            <a:r>
+              <a:rPr lang="de-CH" dirty="0" smtClean="0"/>
+              <a:t>Rezepte aus der funktionalen Programmierung | </a:t>
+            </a:r>
+            <a:r>
+              <a:rPr lang="de-CH" dirty="0" err="1" smtClean="0"/>
+              <a:t>ico</a:t>
             </a:r>
             <a:endParaRPr lang="de-CH" dirty="0"/>
           </a:p>
@@ -5619,53 +5606,7 @@
       </p:sp>
       <p:sp>
         <p:nvSpPr>
-          <p:cNvPr id="5" name="Footer Placeholder 4"/>
-          <p:cNvSpPr>
-            <a:spLocks noGrp="1"/>
-          </p:cNvSpPr>
-          <p:nvPr>
-            <p:ph type="ftr" sz="quarter" idx="11"/>
-          </p:nvPr>
-        </p:nvSpPr>
-        <p:spPr/>
-        <p:txBody>
-          <a:bodyPr/>
-          <a:lstStyle/>
-          <a:p>
-            <a:r>
-              <a:rPr lang="en-US" smtClean="0"/>
-              <a:t>Functional Design Patterns for OO Practicioners | Hendrik Schöneberg</a:t>
-            </a:r>
-            <a:endParaRPr lang="de-CH" dirty="0"/>
-          </a:p>
-        </p:txBody>
-      </p:sp>
-      <p:sp>
-        <p:nvSpPr>
-          <p:cNvPr id="7" name="Text Placeholder 6"/>
-          <p:cNvSpPr>
-            <a:spLocks noGrp="1"/>
-          </p:cNvSpPr>
-          <p:nvPr>
-            <p:ph type="body" sz="quarter" idx="13"/>
-          </p:nvPr>
-        </p:nvSpPr>
-        <p:spPr/>
-        <p:txBody>
-          <a:bodyPr/>
-          <a:lstStyle/>
-          <a:p>
-            <a:r>
-              <a:rPr lang="en-GB" dirty="0" smtClean="0"/>
-              <a:t>Lessons learned / summary</a:t>
-            </a:r>
-            <a:endParaRPr lang="en-GB" dirty="0"/>
-          </a:p>
-        </p:txBody>
-      </p:sp>
-      <p:sp>
-        <p:nvSpPr>
-          <p:cNvPr id="8" name="Slide Number Placeholder 7"/>
+          <p:cNvPr id="5" name="Slide Number Placeholder 4"/>
           <p:cNvSpPr>
             <a:spLocks noGrp="1"/>
           </p:cNvSpPr>
@@ -5682,22 +5623,1058 @@
               <a:rPr lang="de-CH" smtClean="0"/>
               <a:t>Slide </a:t>
             </a:r>
-            <a:fld id="{62D11BB5-6FA6-42AC-A0FE-0DCDCEB77653}" type="slidenum">
+            <a:fld id="{46D3EF20-6FC0-440C-8F36-1C9C0F08572D}" type="slidenum">
               <a:rPr lang="de-CH" smtClean="0"/>
               <a:t>10</a:t>
             </a:fld>
             <a:r>
               <a:rPr lang="de-CH" smtClean="0"/>
-              <a:t> of 16</a:t>
+              <a:t> of 18</a:t>
             </a:r>
             <a:endParaRPr dirty="0"/>
+          </a:p>
+        </p:txBody>
+      </p:sp>
+      <p:sp>
+        <p:nvSpPr>
+          <p:cNvPr id="6" name="Text Placeholder 5"/>
+          <p:cNvSpPr>
+            <a:spLocks noGrp="1"/>
+          </p:cNvSpPr>
+          <p:nvPr>
+            <p:ph type="body" sz="quarter" idx="13"/>
+          </p:nvPr>
+        </p:nvSpPr>
+        <p:spPr/>
+        <p:txBody>
+          <a:bodyPr/>
+          <a:lstStyle/>
+          <a:p>
+            <a:r>
+              <a:rPr lang="en-GB" dirty="0"/>
+              <a:t>Modify nested immutable objects</a:t>
+            </a:r>
+            <a:endParaRPr lang="en-GB" dirty="0"/>
+          </a:p>
+        </p:txBody>
+      </p:sp>
+      <p:sp>
+        <p:nvSpPr>
+          <p:cNvPr id="13" name="Title 1"/>
+          <p:cNvSpPr>
+            <a:spLocks noGrp="1"/>
+          </p:cNvSpPr>
+          <p:nvPr>
+            <p:ph type="title"/>
+          </p:nvPr>
+        </p:nvSpPr>
+        <p:spPr>
+          <a:xfrm>
+            <a:off x="579439" y="220993"/>
+            <a:ext cx="5845174" cy="712892"/>
+          </a:xfrm>
+        </p:spPr>
+        <p:txBody>
+          <a:bodyPr/>
+          <a:lstStyle/>
+          <a:p>
+            <a:r>
+              <a:rPr lang="en-GB" dirty="0" smtClean="0"/>
+              <a:t>Lenses</a:t>
+            </a:r>
+            <a:endParaRPr lang="en-GB" dirty="0"/>
+          </a:p>
+        </p:txBody>
+      </p:sp>
+      <p:sp>
+        <p:nvSpPr>
+          <p:cNvPr id="14" name="Rectangle 13"/>
+          <p:cNvSpPr/>
+          <p:nvPr/>
+        </p:nvSpPr>
+        <p:spPr>
+          <a:xfrm>
+            <a:off x="576342" y="4361082"/>
+            <a:ext cx="7984368" cy="1559480"/>
+          </a:xfrm>
+          <a:prstGeom prst="rect">
+            <a:avLst/>
+          </a:prstGeom>
+          <a:solidFill>
+            <a:schemeClr val="accent2">
+              <a:lumMod val="40000"/>
+              <a:lumOff val="60000"/>
+            </a:schemeClr>
+          </a:solidFill>
+          <a:ln w="12700">
+            <a:noFill/>
+          </a:ln>
+        </p:spPr>
+        <p:style>
+          <a:lnRef idx="2">
+            <a:schemeClr val="accent1">
+              <a:shade val="50000"/>
+            </a:schemeClr>
+          </a:lnRef>
+          <a:fillRef idx="1">
+            <a:schemeClr val="accent1"/>
+          </a:fillRef>
+          <a:effectRef idx="0">
+            <a:schemeClr val="accent1"/>
+          </a:effectRef>
+          <a:fontRef idx="minor">
+            <a:schemeClr val="lt1"/>
+          </a:fontRef>
+        </p:style>
+        <p:txBody>
+          <a:bodyPr rtlCol="0" anchor="ctr"/>
+          <a:lstStyle>
+            <a:defPPr>
+              <a:defRPr lang="de-DE"/>
+            </a:defPPr>
+            <a:lvl1pPr marL="0" algn="l" defTabSz="914400" rtl="0" eaLnBrk="1" latinLnBrk="0" hangingPunct="1">
+              <a:defRPr sz="1800" kern="1200">
+                <a:solidFill>
+                  <a:schemeClr val="lt1"/>
+                </a:solidFill>
+                <a:latin typeface="+mn-lt"/>
+                <a:ea typeface="+mn-ea"/>
+                <a:cs typeface="+mn-cs"/>
+              </a:defRPr>
+            </a:lvl1pPr>
+            <a:lvl2pPr marL="457200" algn="l" defTabSz="914400" rtl="0" eaLnBrk="1" latinLnBrk="0" hangingPunct="1">
+              <a:defRPr sz="1800" kern="1200">
+                <a:solidFill>
+                  <a:schemeClr val="lt1"/>
+                </a:solidFill>
+                <a:latin typeface="+mn-lt"/>
+                <a:ea typeface="+mn-ea"/>
+                <a:cs typeface="+mn-cs"/>
+              </a:defRPr>
+            </a:lvl2pPr>
+            <a:lvl3pPr marL="914400" algn="l" defTabSz="914400" rtl="0" eaLnBrk="1" latinLnBrk="0" hangingPunct="1">
+              <a:defRPr sz="1800" kern="1200">
+                <a:solidFill>
+                  <a:schemeClr val="lt1"/>
+                </a:solidFill>
+                <a:latin typeface="+mn-lt"/>
+                <a:ea typeface="+mn-ea"/>
+                <a:cs typeface="+mn-cs"/>
+              </a:defRPr>
+            </a:lvl3pPr>
+            <a:lvl4pPr marL="1371600" algn="l" defTabSz="914400" rtl="0" eaLnBrk="1" latinLnBrk="0" hangingPunct="1">
+              <a:defRPr sz="1800" kern="1200">
+                <a:solidFill>
+                  <a:schemeClr val="lt1"/>
+                </a:solidFill>
+                <a:latin typeface="+mn-lt"/>
+                <a:ea typeface="+mn-ea"/>
+                <a:cs typeface="+mn-cs"/>
+              </a:defRPr>
+            </a:lvl4pPr>
+            <a:lvl5pPr marL="1828800" algn="l" defTabSz="914400" rtl="0" eaLnBrk="1" latinLnBrk="0" hangingPunct="1">
+              <a:defRPr sz="1800" kern="1200">
+                <a:solidFill>
+                  <a:schemeClr val="lt1"/>
+                </a:solidFill>
+                <a:latin typeface="+mn-lt"/>
+                <a:ea typeface="+mn-ea"/>
+                <a:cs typeface="+mn-cs"/>
+              </a:defRPr>
+            </a:lvl5pPr>
+            <a:lvl6pPr marL="2286000" algn="l" defTabSz="914400" rtl="0" eaLnBrk="1" latinLnBrk="0" hangingPunct="1">
+              <a:defRPr sz="1800" kern="1200">
+                <a:solidFill>
+                  <a:schemeClr val="lt1"/>
+                </a:solidFill>
+                <a:latin typeface="+mn-lt"/>
+                <a:ea typeface="+mn-ea"/>
+                <a:cs typeface="+mn-cs"/>
+              </a:defRPr>
+            </a:lvl6pPr>
+            <a:lvl7pPr marL="2743200" algn="l" defTabSz="914400" rtl="0" eaLnBrk="1" latinLnBrk="0" hangingPunct="1">
+              <a:defRPr sz="1800" kern="1200">
+                <a:solidFill>
+                  <a:schemeClr val="lt1"/>
+                </a:solidFill>
+                <a:latin typeface="+mn-lt"/>
+                <a:ea typeface="+mn-ea"/>
+                <a:cs typeface="+mn-cs"/>
+              </a:defRPr>
+            </a:lvl7pPr>
+            <a:lvl8pPr marL="3200400" algn="l" defTabSz="914400" rtl="0" eaLnBrk="1" latinLnBrk="0" hangingPunct="1">
+              <a:defRPr sz="1800" kern="1200">
+                <a:solidFill>
+                  <a:schemeClr val="lt1"/>
+                </a:solidFill>
+                <a:latin typeface="+mn-lt"/>
+                <a:ea typeface="+mn-ea"/>
+                <a:cs typeface="+mn-cs"/>
+              </a:defRPr>
+            </a:lvl8pPr>
+            <a:lvl9pPr marL="3657600" algn="l" defTabSz="914400" rtl="0" eaLnBrk="1" latinLnBrk="0" hangingPunct="1">
+              <a:defRPr sz="1800" kern="1200">
+                <a:solidFill>
+                  <a:schemeClr val="lt1"/>
+                </a:solidFill>
+                <a:latin typeface="+mn-lt"/>
+                <a:ea typeface="+mn-ea"/>
+                <a:cs typeface="+mn-cs"/>
+              </a:defRPr>
+            </a:lvl9pPr>
+          </a:lstStyle>
+          <a:p>
+            <a:pPr algn="ctr"/>
+            <a:endParaRPr lang="de-CH" sz="2200" dirty="0" err="1" smtClean="0">
+              <a:latin typeface="AA Zuehlke" pitchFamily="2" charset="0"/>
+            </a:endParaRPr>
+          </a:p>
+        </p:txBody>
+      </p:sp>
+      <p:sp>
+        <p:nvSpPr>
+          <p:cNvPr id="15" name="Rectangle 14"/>
+          <p:cNvSpPr/>
+          <p:nvPr/>
+        </p:nvSpPr>
+        <p:spPr>
+          <a:xfrm>
+            <a:off x="576342" y="1857089"/>
+            <a:ext cx="7984368" cy="427734"/>
+          </a:xfrm>
+          <a:prstGeom prst="rect">
+            <a:avLst/>
+          </a:prstGeom>
+          <a:solidFill>
+            <a:schemeClr val="accent2">
+              <a:lumMod val="40000"/>
+              <a:lumOff val="60000"/>
+            </a:schemeClr>
+          </a:solidFill>
+          <a:ln w="12700">
+            <a:noFill/>
+          </a:ln>
+        </p:spPr>
+        <p:style>
+          <a:lnRef idx="2">
+            <a:schemeClr val="accent1">
+              <a:shade val="50000"/>
+            </a:schemeClr>
+          </a:lnRef>
+          <a:fillRef idx="1">
+            <a:schemeClr val="accent1"/>
+          </a:fillRef>
+          <a:effectRef idx="0">
+            <a:schemeClr val="accent1"/>
+          </a:effectRef>
+          <a:fontRef idx="minor">
+            <a:schemeClr val="lt1"/>
+          </a:fontRef>
+        </p:style>
+        <p:txBody>
+          <a:bodyPr rtlCol="0" anchor="ctr"/>
+          <a:lstStyle>
+            <a:defPPr>
+              <a:defRPr lang="de-DE"/>
+            </a:defPPr>
+            <a:lvl1pPr marL="0" algn="l" defTabSz="914400" rtl="0" eaLnBrk="1" latinLnBrk="0" hangingPunct="1">
+              <a:defRPr sz="1800" kern="1200">
+                <a:solidFill>
+                  <a:schemeClr val="lt1"/>
+                </a:solidFill>
+                <a:latin typeface="+mn-lt"/>
+                <a:ea typeface="+mn-ea"/>
+                <a:cs typeface="+mn-cs"/>
+              </a:defRPr>
+            </a:lvl1pPr>
+            <a:lvl2pPr marL="457200" algn="l" defTabSz="914400" rtl="0" eaLnBrk="1" latinLnBrk="0" hangingPunct="1">
+              <a:defRPr sz="1800" kern="1200">
+                <a:solidFill>
+                  <a:schemeClr val="lt1"/>
+                </a:solidFill>
+                <a:latin typeface="+mn-lt"/>
+                <a:ea typeface="+mn-ea"/>
+                <a:cs typeface="+mn-cs"/>
+              </a:defRPr>
+            </a:lvl2pPr>
+            <a:lvl3pPr marL="914400" algn="l" defTabSz="914400" rtl="0" eaLnBrk="1" latinLnBrk="0" hangingPunct="1">
+              <a:defRPr sz="1800" kern="1200">
+                <a:solidFill>
+                  <a:schemeClr val="lt1"/>
+                </a:solidFill>
+                <a:latin typeface="+mn-lt"/>
+                <a:ea typeface="+mn-ea"/>
+                <a:cs typeface="+mn-cs"/>
+              </a:defRPr>
+            </a:lvl3pPr>
+            <a:lvl4pPr marL="1371600" algn="l" defTabSz="914400" rtl="0" eaLnBrk="1" latinLnBrk="0" hangingPunct="1">
+              <a:defRPr sz="1800" kern="1200">
+                <a:solidFill>
+                  <a:schemeClr val="lt1"/>
+                </a:solidFill>
+                <a:latin typeface="+mn-lt"/>
+                <a:ea typeface="+mn-ea"/>
+                <a:cs typeface="+mn-cs"/>
+              </a:defRPr>
+            </a:lvl4pPr>
+            <a:lvl5pPr marL="1828800" algn="l" defTabSz="914400" rtl="0" eaLnBrk="1" latinLnBrk="0" hangingPunct="1">
+              <a:defRPr sz="1800" kern="1200">
+                <a:solidFill>
+                  <a:schemeClr val="lt1"/>
+                </a:solidFill>
+                <a:latin typeface="+mn-lt"/>
+                <a:ea typeface="+mn-ea"/>
+                <a:cs typeface="+mn-cs"/>
+              </a:defRPr>
+            </a:lvl5pPr>
+            <a:lvl6pPr marL="2286000" algn="l" defTabSz="914400" rtl="0" eaLnBrk="1" latinLnBrk="0" hangingPunct="1">
+              <a:defRPr sz="1800" kern="1200">
+                <a:solidFill>
+                  <a:schemeClr val="lt1"/>
+                </a:solidFill>
+                <a:latin typeface="+mn-lt"/>
+                <a:ea typeface="+mn-ea"/>
+                <a:cs typeface="+mn-cs"/>
+              </a:defRPr>
+            </a:lvl6pPr>
+            <a:lvl7pPr marL="2743200" algn="l" defTabSz="914400" rtl="0" eaLnBrk="1" latinLnBrk="0" hangingPunct="1">
+              <a:defRPr sz="1800" kern="1200">
+                <a:solidFill>
+                  <a:schemeClr val="lt1"/>
+                </a:solidFill>
+                <a:latin typeface="+mn-lt"/>
+                <a:ea typeface="+mn-ea"/>
+                <a:cs typeface="+mn-cs"/>
+              </a:defRPr>
+            </a:lvl7pPr>
+            <a:lvl8pPr marL="3200400" algn="l" defTabSz="914400" rtl="0" eaLnBrk="1" latinLnBrk="0" hangingPunct="1">
+              <a:defRPr sz="1800" kern="1200">
+                <a:solidFill>
+                  <a:schemeClr val="lt1"/>
+                </a:solidFill>
+                <a:latin typeface="+mn-lt"/>
+                <a:ea typeface="+mn-ea"/>
+                <a:cs typeface="+mn-cs"/>
+              </a:defRPr>
+            </a:lvl8pPr>
+            <a:lvl9pPr marL="3657600" algn="l" defTabSz="914400" rtl="0" eaLnBrk="1" latinLnBrk="0" hangingPunct="1">
+              <a:defRPr sz="1800" kern="1200">
+                <a:solidFill>
+                  <a:schemeClr val="lt1"/>
+                </a:solidFill>
+                <a:latin typeface="+mn-lt"/>
+                <a:ea typeface="+mn-ea"/>
+                <a:cs typeface="+mn-cs"/>
+              </a:defRPr>
+            </a:lvl9pPr>
+          </a:lstStyle>
+          <a:p>
+            <a:pPr algn="ctr"/>
+            <a:endParaRPr lang="de-CH" sz="2200" dirty="0" err="1" smtClean="0">
+              <a:latin typeface="AA Zuehlke" pitchFamily="2" charset="0"/>
+            </a:endParaRPr>
+          </a:p>
+        </p:txBody>
+      </p:sp>
+      <p:sp>
+        <p:nvSpPr>
+          <p:cNvPr id="16" name="Rectangle 15"/>
+          <p:cNvSpPr/>
+          <p:nvPr/>
+        </p:nvSpPr>
+        <p:spPr>
+          <a:xfrm>
+            <a:off x="576342" y="2650146"/>
+            <a:ext cx="7984368" cy="1559480"/>
+          </a:xfrm>
+          <a:prstGeom prst="rect">
+            <a:avLst/>
+          </a:prstGeom>
+          <a:solidFill>
+            <a:schemeClr val="accent2">
+              <a:lumMod val="40000"/>
+              <a:lumOff val="60000"/>
+            </a:schemeClr>
+          </a:solidFill>
+          <a:ln w="12700">
+            <a:noFill/>
+          </a:ln>
+        </p:spPr>
+        <p:style>
+          <a:lnRef idx="2">
+            <a:schemeClr val="accent1">
+              <a:shade val="50000"/>
+            </a:schemeClr>
+          </a:lnRef>
+          <a:fillRef idx="1">
+            <a:schemeClr val="accent1"/>
+          </a:fillRef>
+          <a:effectRef idx="0">
+            <a:schemeClr val="accent1"/>
+          </a:effectRef>
+          <a:fontRef idx="minor">
+            <a:schemeClr val="lt1"/>
+          </a:fontRef>
+        </p:style>
+        <p:txBody>
+          <a:bodyPr rtlCol="0" anchor="ctr"/>
+          <a:lstStyle>
+            <a:defPPr>
+              <a:defRPr lang="de-DE"/>
+            </a:defPPr>
+            <a:lvl1pPr marL="0" algn="l" defTabSz="914400" rtl="0" eaLnBrk="1" latinLnBrk="0" hangingPunct="1">
+              <a:defRPr sz="1800" kern="1200">
+                <a:solidFill>
+                  <a:schemeClr val="lt1"/>
+                </a:solidFill>
+                <a:latin typeface="+mn-lt"/>
+                <a:ea typeface="+mn-ea"/>
+                <a:cs typeface="+mn-cs"/>
+              </a:defRPr>
+            </a:lvl1pPr>
+            <a:lvl2pPr marL="457200" algn="l" defTabSz="914400" rtl="0" eaLnBrk="1" latinLnBrk="0" hangingPunct="1">
+              <a:defRPr sz="1800" kern="1200">
+                <a:solidFill>
+                  <a:schemeClr val="lt1"/>
+                </a:solidFill>
+                <a:latin typeface="+mn-lt"/>
+                <a:ea typeface="+mn-ea"/>
+                <a:cs typeface="+mn-cs"/>
+              </a:defRPr>
+            </a:lvl2pPr>
+            <a:lvl3pPr marL="914400" algn="l" defTabSz="914400" rtl="0" eaLnBrk="1" latinLnBrk="0" hangingPunct="1">
+              <a:defRPr sz="1800" kern="1200">
+                <a:solidFill>
+                  <a:schemeClr val="lt1"/>
+                </a:solidFill>
+                <a:latin typeface="+mn-lt"/>
+                <a:ea typeface="+mn-ea"/>
+                <a:cs typeface="+mn-cs"/>
+              </a:defRPr>
+            </a:lvl3pPr>
+            <a:lvl4pPr marL="1371600" algn="l" defTabSz="914400" rtl="0" eaLnBrk="1" latinLnBrk="0" hangingPunct="1">
+              <a:defRPr sz="1800" kern="1200">
+                <a:solidFill>
+                  <a:schemeClr val="lt1"/>
+                </a:solidFill>
+                <a:latin typeface="+mn-lt"/>
+                <a:ea typeface="+mn-ea"/>
+                <a:cs typeface="+mn-cs"/>
+              </a:defRPr>
+            </a:lvl4pPr>
+            <a:lvl5pPr marL="1828800" algn="l" defTabSz="914400" rtl="0" eaLnBrk="1" latinLnBrk="0" hangingPunct="1">
+              <a:defRPr sz="1800" kern="1200">
+                <a:solidFill>
+                  <a:schemeClr val="lt1"/>
+                </a:solidFill>
+                <a:latin typeface="+mn-lt"/>
+                <a:ea typeface="+mn-ea"/>
+                <a:cs typeface="+mn-cs"/>
+              </a:defRPr>
+            </a:lvl5pPr>
+            <a:lvl6pPr marL="2286000" algn="l" defTabSz="914400" rtl="0" eaLnBrk="1" latinLnBrk="0" hangingPunct="1">
+              <a:defRPr sz="1800" kern="1200">
+                <a:solidFill>
+                  <a:schemeClr val="lt1"/>
+                </a:solidFill>
+                <a:latin typeface="+mn-lt"/>
+                <a:ea typeface="+mn-ea"/>
+                <a:cs typeface="+mn-cs"/>
+              </a:defRPr>
+            </a:lvl6pPr>
+            <a:lvl7pPr marL="2743200" algn="l" defTabSz="914400" rtl="0" eaLnBrk="1" latinLnBrk="0" hangingPunct="1">
+              <a:defRPr sz="1800" kern="1200">
+                <a:solidFill>
+                  <a:schemeClr val="lt1"/>
+                </a:solidFill>
+                <a:latin typeface="+mn-lt"/>
+                <a:ea typeface="+mn-ea"/>
+                <a:cs typeface="+mn-cs"/>
+              </a:defRPr>
+            </a:lvl7pPr>
+            <a:lvl8pPr marL="3200400" algn="l" defTabSz="914400" rtl="0" eaLnBrk="1" latinLnBrk="0" hangingPunct="1">
+              <a:defRPr sz="1800" kern="1200">
+                <a:solidFill>
+                  <a:schemeClr val="lt1"/>
+                </a:solidFill>
+                <a:latin typeface="+mn-lt"/>
+                <a:ea typeface="+mn-ea"/>
+                <a:cs typeface="+mn-cs"/>
+              </a:defRPr>
+            </a:lvl8pPr>
+            <a:lvl9pPr marL="3657600" algn="l" defTabSz="914400" rtl="0" eaLnBrk="1" latinLnBrk="0" hangingPunct="1">
+              <a:defRPr sz="1800" kern="1200">
+                <a:solidFill>
+                  <a:schemeClr val="lt1"/>
+                </a:solidFill>
+                <a:latin typeface="+mn-lt"/>
+                <a:ea typeface="+mn-ea"/>
+                <a:cs typeface="+mn-cs"/>
+              </a:defRPr>
+            </a:lvl9pPr>
+          </a:lstStyle>
+          <a:p>
+            <a:pPr algn="ctr"/>
+            <a:endParaRPr lang="de-CH" sz="2200" dirty="0" err="1" smtClean="0">
+              <a:latin typeface="AA Zuehlke" pitchFamily="2" charset="0"/>
+            </a:endParaRPr>
+          </a:p>
+        </p:txBody>
+      </p:sp>
+      <p:sp>
+        <p:nvSpPr>
+          <p:cNvPr id="17" name="Rectangle 16"/>
+          <p:cNvSpPr/>
+          <p:nvPr/>
+        </p:nvSpPr>
+        <p:spPr>
+          <a:xfrm>
+            <a:off x="576342" y="1484784"/>
+            <a:ext cx="7984368" cy="4555093"/>
+          </a:xfrm>
+          <a:prstGeom prst="rect">
+            <a:avLst/>
+          </a:prstGeom>
+        </p:spPr>
+        <p:txBody>
+          <a:bodyPr wrap="square">
+            <a:spAutoFit/>
+          </a:bodyPr>
+          <a:lstStyle/>
+          <a:p>
+            <a:r>
+              <a:rPr lang="de-CH" b="1" dirty="0" err="1"/>
+              <a:t>Lenses</a:t>
+            </a:r>
+            <a:r>
+              <a:rPr lang="de-CH" b="1" dirty="0"/>
+              <a:t> </a:t>
+            </a:r>
+            <a:r>
+              <a:rPr lang="de-CH" b="1" dirty="0" err="1"/>
+              <a:t>to</a:t>
+            </a:r>
+            <a:r>
+              <a:rPr lang="de-CH" b="1" dirty="0"/>
+              <a:t> </a:t>
+            </a:r>
+            <a:r>
+              <a:rPr lang="de-CH" b="1" dirty="0" err="1"/>
+              <a:t>the</a:t>
+            </a:r>
+            <a:r>
+              <a:rPr lang="de-CH" b="1" dirty="0"/>
+              <a:t> </a:t>
+            </a:r>
+            <a:r>
+              <a:rPr lang="de-CH" b="1" dirty="0" err="1"/>
+              <a:t>rescue</a:t>
+            </a:r>
+            <a:r>
+              <a:rPr lang="de-CH" b="1" dirty="0"/>
+              <a:t>!</a:t>
+            </a:r>
+          </a:p>
+          <a:p>
+            <a:pPr marL="177800">
+              <a:spcBef>
+                <a:spcPts val="1200"/>
+              </a:spcBef>
+            </a:pPr>
+            <a:r>
+              <a:rPr lang="de-CH" b="1" dirty="0" err="1">
+                <a:latin typeface="Consolas" panose="020B0609020204030204" pitchFamily="49" charset="0"/>
+                <a:cs typeface="Consolas" panose="020B0609020204030204" pitchFamily="49" charset="0"/>
+              </a:rPr>
+              <a:t>case</a:t>
+            </a:r>
+            <a:r>
+              <a:rPr lang="de-CH" b="1" dirty="0">
+                <a:latin typeface="Consolas" panose="020B0609020204030204" pitchFamily="49" charset="0"/>
+                <a:cs typeface="Consolas" panose="020B0609020204030204" pitchFamily="49" charset="0"/>
+              </a:rPr>
+              <a:t> </a:t>
+            </a:r>
+            <a:r>
+              <a:rPr lang="de-CH" b="1" dirty="0" err="1">
+                <a:latin typeface="Consolas" panose="020B0609020204030204" pitchFamily="49" charset="0"/>
+                <a:cs typeface="Consolas" panose="020B0609020204030204" pitchFamily="49" charset="0"/>
+              </a:rPr>
+              <a:t>class</a:t>
+            </a:r>
+            <a:r>
+              <a:rPr lang="de-CH" b="1" dirty="0">
+                <a:latin typeface="Consolas" panose="020B0609020204030204" pitchFamily="49" charset="0"/>
+                <a:cs typeface="Consolas" panose="020B0609020204030204" pitchFamily="49" charset="0"/>
+              </a:rPr>
+              <a:t> </a:t>
+            </a:r>
+            <a:r>
+              <a:rPr lang="de-CH" dirty="0">
+                <a:latin typeface="Consolas" panose="020B0609020204030204" pitchFamily="49" charset="0"/>
+                <a:cs typeface="Consolas" panose="020B0609020204030204" pitchFamily="49" charset="0"/>
+              </a:rPr>
+              <a:t>Lens[O,V](</a:t>
+            </a:r>
+            <a:r>
+              <a:rPr lang="de-CH" dirty="0" err="1">
+                <a:latin typeface="Consolas" panose="020B0609020204030204" pitchFamily="49" charset="0"/>
+                <a:cs typeface="Consolas" panose="020B0609020204030204" pitchFamily="49" charset="0"/>
+              </a:rPr>
+              <a:t>get</a:t>
+            </a:r>
+            <a:r>
+              <a:rPr lang="de-CH" dirty="0">
+                <a:latin typeface="Consolas" panose="020B0609020204030204" pitchFamily="49" charset="0"/>
+                <a:cs typeface="Consolas" panose="020B0609020204030204" pitchFamily="49" charset="0"/>
+              </a:rPr>
+              <a:t>: O =&gt; V, </a:t>
+            </a:r>
+            <a:r>
+              <a:rPr lang="de-CH" dirty="0" err="1">
+                <a:latin typeface="Consolas" panose="020B0609020204030204" pitchFamily="49" charset="0"/>
+                <a:cs typeface="Consolas" panose="020B0609020204030204" pitchFamily="49" charset="0"/>
+              </a:rPr>
+              <a:t>set</a:t>
+            </a:r>
+            <a:r>
+              <a:rPr lang="de-CH" dirty="0">
+                <a:latin typeface="Consolas" panose="020B0609020204030204" pitchFamily="49" charset="0"/>
+                <a:cs typeface="Consolas" panose="020B0609020204030204" pitchFamily="49" charset="0"/>
+              </a:rPr>
+              <a:t>: (O,V) =&gt; O)</a:t>
+            </a:r>
+          </a:p>
+          <a:p>
+            <a:pPr marL="177800">
+              <a:spcBef>
+                <a:spcPts val="1200"/>
+              </a:spcBef>
+            </a:pPr>
+            <a:endParaRPr lang="de-CH" dirty="0">
+              <a:latin typeface="Consolas" panose="020B0609020204030204" pitchFamily="49" charset="0"/>
+              <a:cs typeface="Consolas" panose="020B0609020204030204" pitchFamily="49" charset="0"/>
+            </a:endParaRPr>
+          </a:p>
+          <a:p>
+            <a:pPr marL="177800">
+              <a:spcBef>
+                <a:spcPts val="600"/>
+              </a:spcBef>
+              <a:tabLst>
+                <a:tab pos="541338" algn="l"/>
+              </a:tabLst>
+            </a:pPr>
+            <a:r>
+              <a:rPr lang="de-CH" b="1" dirty="0" err="1">
+                <a:latin typeface="Consolas" panose="020B0609020204030204" pitchFamily="49" charset="0"/>
+                <a:cs typeface="Consolas" panose="020B0609020204030204" pitchFamily="49" charset="0"/>
+              </a:rPr>
+              <a:t>val</a:t>
+            </a:r>
+            <a:r>
+              <a:rPr lang="de-CH" dirty="0">
+                <a:latin typeface="Consolas" panose="020B0609020204030204" pitchFamily="49" charset="0"/>
+                <a:cs typeface="Consolas" panose="020B0609020204030204" pitchFamily="49" charset="0"/>
+              </a:rPr>
+              <a:t> </a:t>
+            </a:r>
+            <a:r>
+              <a:rPr lang="de-CH" dirty="0" err="1">
+                <a:latin typeface="Consolas" panose="020B0609020204030204" pitchFamily="49" charset="0"/>
+                <a:cs typeface="Consolas" panose="020B0609020204030204" pitchFamily="49" charset="0"/>
+              </a:rPr>
+              <a:t>streetLens</a:t>
+            </a:r>
+            <a:r>
+              <a:rPr lang="de-CH" dirty="0">
+                <a:latin typeface="Consolas" panose="020B0609020204030204" pitchFamily="49" charset="0"/>
+                <a:cs typeface="Consolas" panose="020B0609020204030204" pitchFamily="49" charset="0"/>
+              </a:rPr>
+              <a:t> = Lens[</a:t>
+            </a:r>
+            <a:r>
+              <a:rPr lang="de-CH" dirty="0" err="1">
+                <a:latin typeface="Consolas" panose="020B0609020204030204" pitchFamily="49" charset="0"/>
+                <a:cs typeface="Consolas" panose="020B0609020204030204" pitchFamily="49" charset="0"/>
+              </a:rPr>
+              <a:t>Address,String</a:t>
+            </a:r>
+            <a:r>
+              <a:rPr lang="de-CH" dirty="0">
+                <a:latin typeface="Consolas" panose="020B0609020204030204" pitchFamily="49" charset="0"/>
+                <a:cs typeface="Consolas" panose="020B0609020204030204" pitchFamily="49" charset="0"/>
+              </a:rPr>
+              <a:t>](</a:t>
+            </a:r>
+          </a:p>
+          <a:p>
+            <a:pPr marL="177800">
+              <a:spcBef>
+                <a:spcPts val="600"/>
+              </a:spcBef>
+              <a:tabLst>
+                <a:tab pos="541338" algn="l"/>
+              </a:tabLst>
+            </a:pPr>
+            <a:r>
+              <a:rPr lang="de-CH" dirty="0">
+                <a:latin typeface="Consolas" panose="020B0609020204030204" pitchFamily="49" charset="0"/>
+                <a:cs typeface="Consolas" panose="020B0609020204030204" pitchFamily="49" charset="0"/>
+              </a:rPr>
+              <a:t>	</a:t>
+            </a:r>
+            <a:r>
+              <a:rPr lang="de-CH" dirty="0" err="1">
+                <a:latin typeface="Consolas" panose="020B0609020204030204" pitchFamily="49" charset="0"/>
+                <a:cs typeface="Consolas" panose="020B0609020204030204" pitchFamily="49" charset="0"/>
+              </a:rPr>
+              <a:t>address</a:t>
+            </a:r>
+            <a:r>
+              <a:rPr lang="de-CH" dirty="0">
+                <a:latin typeface="Consolas" panose="020B0609020204030204" pitchFamily="49" charset="0"/>
+                <a:cs typeface="Consolas" panose="020B0609020204030204" pitchFamily="49" charset="0"/>
+              </a:rPr>
+              <a:t> =&gt; </a:t>
+            </a:r>
+            <a:r>
+              <a:rPr lang="de-CH" dirty="0" err="1">
+                <a:latin typeface="Consolas" panose="020B0609020204030204" pitchFamily="49" charset="0"/>
+                <a:cs typeface="Consolas" panose="020B0609020204030204" pitchFamily="49" charset="0"/>
+              </a:rPr>
+              <a:t>address.street</a:t>
+            </a:r>
+            <a:r>
+              <a:rPr lang="de-CH" dirty="0">
+                <a:latin typeface="Consolas" panose="020B0609020204030204" pitchFamily="49" charset="0"/>
+                <a:cs typeface="Consolas" panose="020B0609020204030204" pitchFamily="49" charset="0"/>
+              </a:rPr>
+              <a:t>,</a:t>
+            </a:r>
+          </a:p>
+          <a:p>
+            <a:pPr marL="177800" lvl="0">
+              <a:spcBef>
+                <a:spcPts val="600"/>
+              </a:spcBef>
+              <a:tabLst>
+                <a:tab pos="541338" algn="l"/>
+              </a:tabLst>
+            </a:pPr>
+            <a:r>
+              <a:rPr lang="de-CH" dirty="0">
+                <a:latin typeface="Consolas" panose="020B0609020204030204" pitchFamily="49" charset="0"/>
+                <a:cs typeface="Consolas" panose="020B0609020204030204" pitchFamily="49" charset="0"/>
+              </a:rPr>
+              <a:t>	(</a:t>
+            </a:r>
+            <a:r>
+              <a:rPr lang="de-CH" dirty="0" err="1">
+                <a:latin typeface="Consolas" panose="020B0609020204030204" pitchFamily="49" charset="0"/>
+                <a:cs typeface="Consolas" panose="020B0609020204030204" pitchFamily="49" charset="0"/>
+              </a:rPr>
+              <a:t>address</a:t>
+            </a:r>
+            <a:r>
+              <a:rPr lang="de-CH" dirty="0">
+                <a:latin typeface="Consolas" panose="020B0609020204030204" pitchFamily="49" charset="0"/>
+                <a:cs typeface="Consolas" panose="020B0609020204030204" pitchFamily="49" charset="0"/>
+              </a:rPr>
+              <a:t>, </a:t>
+            </a:r>
+            <a:r>
+              <a:rPr lang="de-CH" dirty="0" err="1">
+                <a:latin typeface="Consolas" panose="020B0609020204030204" pitchFamily="49" charset="0"/>
+                <a:cs typeface="Consolas" panose="020B0609020204030204" pitchFamily="49" charset="0"/>
+              </a:rPr>
+              <a:t>street</a:t>
+            </a:r>
+            <a:r>
+              <a:rPr lang="de-CH" dirty="0">
+                <a:latin typeface="Consolas" panose="020B0609020204030204" pitchFamily="49" charset="0"/>
+                <a:cs typeface="Consolas" panose="020B0609020204030204" pitchFamily="49" charset="0"/>
+              </a:rPr>
+              <a:t>) =&gt; </a:t>
+            </a:r>
+            <a:r>
+              <a:rPr lang="de-CH" dirty="0" err="1">
+                <a:latin typeface="Consolas" panose="020B0609020204030204" pitchFamily="49" charset="0"/>
+                <a:cs typeface="Consolas" panose="020B0609020204030204" pitchFamily="49" charset="0"/>
+              </a:rPr>
+              <a:t>address.copy</a:t>
+            </a:r>
+            <a:r>
+              <a:rPr lang="de-CH" dirty="0">
+                <a:latin typeface="Consolas" panose="020B0609020204030204" pitchFamily="49" charset="0"/>
+                <a:cs typeface="Consolas" panose="020B0609020204030204" pitchFamily="49" charset="0"/>
+              </a:rPr>
+              <a:t>(</a:t>
+            </a:r>
+            <a:r>
+              <a:rPr lang="de-CH" dirty="0" err="1">
+                <a:latin typeface="Consolas" panose="020B0609020204030204" pitchFamily="49" charset="0"/>
+                <a:cs typeface="Consolas" panose="020B0609020204030204" pitchFamily="49" charset="0"/>
+              </a:rPr>
+              <a:t>street</a:t>
+            </a:r>
+            <a:r>
+              <a:rPr lang="de-CH" dirty="0">
+                <a:latin typeface="Consolas" panose="020B0609020204030204" pitchFamily="49" charset="0"/>
+                <a:cs typeface="Consolas" panose="020B0609020204030204" pitchFamily="49" charset="0"/>
+              </a:rPr>
+              <a:t> = </a:t>
+            </a:r>
+            <a:r>
+              <a:rPr lang="de-CH" dirty="0" err="1">
+                <a:latin typeface="Consolas" panose="020B0609020204030204" pitchFamily="49" charset="0"/>
+                <a:cs typeface="Consolas" panose="020B0609020204030204" pitchFamily="49" charset="0"/>
+              </a:rPr>
+              <a:t>street</a:t>
+            </a:r>
+            <a:r>
+              <a:rPr lang="de-CH" dirty="0">
+                <a:latin typeface="Consolas" panose="020B0609020204030204" pitchFamily="49" charset="0"/>
+                <a:cs typeface="Consolas" panose="020B0609020204030204" pitchFamily="49" charset="0"/>
+              </a:rPr>
+              <a:t>)</a:t>
+            </a:r>
+          </a:p>
+          <a:p>
+            <a:pPr marL="177800" lvl="0">
+              <a:spcBef>
+                <a:spcPts val="600"/>
+              </a:spcBef>
+              <a:tabLst>
+                <a:tab pos="541338" algn="l"/>
+              </a:tabLst>
+            </a:pPr>
+            <a:r>
+              <a:rPr lang="de-CH" dirty="0">
+                <a:latin typeface="Consolas" panose="020B0609020204030204" pitchFamily="49" charset="0"/>
+                <a:cs typeface="Consolas" panose="020B0609020204030204" pitchFamily="49" charset="0"/>
+              </a:rPr>
+              <a:t>)</a:t>
+            </a:r>
+          </a:p>
+          <a:p>
+            <a:pPr marL="177800">
+              <a:spcBef>
+                <a:spcPts val="1200"/>
+              </a:spcBef>
+            </a:pPr>
+            <a:endParaRPr lang="de-CH" sz="400" dirty="0"/>
+          </a:p>
+          <a:p>
+            <a:pPr marL="177800" lvl="0">
+              <a:spcBef>
+                <a:spcPts val="600"/>
+              </a:spcBef>
+              <a:tabLst>
+                <a:tab pos="541338" algn="l"/>
+              </a:tabLst>
+            </a:pPr>
+            <a:r>
+              <a:rPr lang="de-CH" b="1" dirty="0" err="1">
+                <a:latin typeface="Consolas" panose="020B0609020204030204" pitchFamily="49" charset="0"/>
+                <a:cs typeface="Consolas" panose="020B0609020204030204" pitchFamily="49" charset="0"/>
+              </a:rPr>
+              <a:t>val</a:t>
+            </a:r>
+            <a:r>
+              <a:rPr lang="de-CH" dirty="0">
+                <a:latin typeface="Consolas" panose="020B0609020204030204" pitchFamily="49" charset="0"/>
+                <a:cs typeface="Consolas" panose="020B0609020204030204" pitchFamily="49" charset="0"/>
+              </a:rPr>
+              <a:t> </a:t>
+            </a:r>
+            <a:r>
+              <a:rPr lang="de-CH" dirty="0" err="1">
+                <a:latin typeface="Consolas" panose="020B0609020204030204" pitchFamily="49" charset="0"/>
+                <a:cs typeface="Consolas" panose="020B0609020204030204" pitchFamily="49" charset="0"/>
+              </a:rPr>
+              <a:t>addressLens</a:t>
+            </a:r>
+            <a:r>
+              <a:rPr lang="de-CH" dirty="0">
+                <a:latin typeface="Consolas" panose="020B0609020204030204" pitchFamily="49" charset="0"/>
+                <a:cs typeface="Consolas" panose="020B0609020204030204" pitchFamily="49" charset="0"/>
+              </a:rPr>
+              <a:t> = Lens[</a:t>
+            </a:r>
+            <a:r>
+              <a:rPr lang="de-CH" dirty="0" err="1">
+                <a:latin typeface="Consolas" panose="020B0609020204030204" pitchFamily="49" charset="0"/>
+                <a:cs typeface="Consolas" panose="020B0609020204030204" pitchFamily="49" charset="0"/>
+              </a:rPr>
+              <a:t>Contact,Address</a:t>
+            </a:r>
+            <a:r>
+              <a:rPr lang="de-CH" dirty="0">
+                <a:latin typeface="Consolas" panose="020B0609020204030204" pitchFamily="49" charset="0"/>
+                <a:cs typeface="Consolas" panose="020B0609020204030204" pitchFamily="49" charset="0"/>
+              </a:rPr>
+              <a:t>](</a:t>
+            </a:r>
+          </a:p>
+          <a:p>
+            <a:pPr marL="177800" lvl="0">
+              <a:spcBef>
+                <a:spcPts val="600"/>
+              </a:spcBef>
+              <a:tabLst>
+                <a:tab pos="541338" algn="l"/>
+              </a:tabLst>
+            </a:pPr>
+            <a:r>
+              <a:rPr lang="de-CH" dirty="0">
+                <a:latin typeface="Consolas" panose="020B0609020204030204" pitchFamily="49" charset="0"/>
+                <a:cs typeface="Consolas" panose="020B0609020204030204" pitchFamily="49" charset="0"/>
+              </a:rPr>
+              <a:t>	</a:t>
+            </a:r>
+            <a:r>
+              <a:rPr lang="de-CH" dirty="0" err="1">
+                <a:latin typeface="Consolas" panose="020B0609020204030204" pitchFamily="49" charset="0"/>
+                <a:cs typeface="Consolas" panose="020B0609020204030204" pitchFamily="49" charset="0"/>
+              </a:rPr>
+              <a:t>contact</a:t>
+            </a:r>
+            <a:r>
+              <a:rPr lang="de-CH" dirty="0">
+                <a:latin typeface="Consolas" panose="020B0609020204030204" pitchFamily="49" charset="0"/>
+                <a:cs typeface="Consolas" panose="020B0609020204030204" pitchFamily="49" charset="0"/>
+              </a:rPr>
+              <a:t> =&gt; </a:t>
+            </a:r>
+            <a:r>
+              <a:rPr lang="de-CH" dirty="0" err="1">
+                <a:latin typeface="Consolas" panose="020B0609020204030204" pitchFamily="49" charset="0"/>
+                <a:cs typeface="Consolas" panose="020B0609020204030204" pitchFamily="49" charset="0"/>
+              </a:rPr>
+              <a:t>contact.address</a:t>
+            </a:r>
+            <a:r>
+              <a:rPr lang="de-CH" dirty="0">
+                <a:latin typeface="Consolas" panose="020B0609020204030204" pitchFamily="49" charset="0"/>
+                <a:cs typeface="Consolas" panose="020B0609020204030204" pitchFamily="49" charset="0"/>
+              </a:rPr>
+              <a:t>,</a:t>
+            </a:r>
+          </a:p>
+          <a:p>
+            <a:pPr marL="177800" lvl="0">
+              <a:spcBef>
+                <a:spcPts val="600"/>
+              </a:spcBef>
+              <a:tabLst>
+                <a:tab pos="541338" algn="l"/>
+              </a:tabLst>
+            </a:pPr>
+            <a:r>
+              <a:rPr lang="de-CH" dirty="0">
+                <a:latin typeface="Consolas" panose="020B0609020204030204" pitchFamily="49" charset="0"/>
+                <a:cs typeface="Consolas" panose="020B0609020204030204" pitchFamily="49" charset="0"/>
+              </a:rPr>
+              <a:t>	(</a:t>
+            </a:r>
+            <a:r>
+              <a:rPr lang="de-CH" dirty="0" err="1">
+                <a:latin typeface="Consolas" panose="020B0609020204030204" pitchFamily="49" charset="0"/>
+                <a:cs typeface="Consolas" panose="020B0609020204030204" pitchFamily="49" charset="0"/>
+              </a:rPr>
+              <a:t>contact</a:t>
+            </a:r>
+            <a:r>
+              <a:rPr lang="de-CH" dirty="0">
+                <a:latin typeface="Consolas" panose="020B0609020204030204" pitchFamily="49" charset="0"/>
+                <a:cs typeface="Consolas" panose="020B0609020204030204" pitchFamily="49" charset="0"/>
+              </a:rPr>
+              <a:t>, </a:t>
+            </a:r>
+            <a:r>
+              <a:rPr lang="de-CH" dirty="0" err="1">
+                <a:latin typeface="Consolas" panose="020B0609020204030204" pitchFamily="49" charset="0"/>
+                <a:cs typeface="Consolas" panose="020B0609020204030204" pitchFamily="49" charset="0"/>
+              </a:rPr>
+              <a:t>address</a:t>
+            </a:r>
+            <a:r>
+              <a:rPr lang="de-CH" dirty="0">
+                <a:latin typeface="Consolas" panose="020B0609020204030204" pitchFamily="49" charset="0"/>
+                <a:cs typeface="Consolas" panose="020B0609020204030204" pitchFamily="49" charset="0"/>
+              </a:rPr>
+              <a:t>) =&gt; </a:t>
+            </a:r>
+            <a:r>
+              <a:rPr lang="de-CH" dirty="0" err="1">
+                <a:latin typeface="Consolas" panose="020B0609020204030204" pitchFamily="49" charset="0"/>
+                <a:cs typeface="Consolas" panose="020B0609020204030204" pitchFamily="49" charset="0"/>
+              </a:rPr>
+              <a:t>contact.copy</a:t>
+            </a:r>
+            <a:r>
+              <a:rPr lang="de-CH" dirty="0">
+                <a:latin typeface="Consolas" panose="020B0609020204030204" pitchFamily="49" charset="0"/>
+                <a:cs typeface="Consolas" panose="020B0609020204030204" pitchFamily="49" charset="0"/>
+              </a:rPr>
+              <a:t>(</a:t>
+            </a:r>
+            <a:r>
+              <a:rPr lang="de-CH" dirty="0" err="1">
+                <a:latin typeface="Consolas" panose="020B0609020204030204" pitchFamily="49" charset="0"/>
+                <a:cs typeface="Consolas" panose="020B0609020204030204" pitchFamily="49" charset="0"/>
+              </a:rPr>
+              <a:t>address</a:t>
+            </a:r>
+            <a:r>
+              <a:rPr lang="de-CH" dirty="0">
+                <a:latin typeface="Consolas" panose="020B0609020204030204" pitchFamily="49" charset="0"/>
+                <a:cs typeface="Consolas" panose="020B0609020204030204" pitchFamily="49" charset="0"/>
+              </a:rPr>
+              <a:t> = </a:t>
+            </a:r>
+            <a:r>
+              <a:rPr lang="de-CH" dirty="0" err="1">
+                <a:latin typeface="Consolas" panose="020B0609020204030204" pitchFamily="49" charset="0"/>
+                <a:cs typeface="Consolas" panose="020B0609020204030204" pitchFamily="49" charset="0"/>
+              </a:rPr>
+              <a:t>address</a:t>
+            </a:r>
+            <a:r>
+              <a:rPr lang="de-CH" dirty="0">
+                <a:latin typeface="Consolas" panose="020B0609020204030204" pitchFamily="49" charset="0"/>
+                <a:cs typeface="Consolas" panose="020B0609020204030204" pitchFamily="49" charset="0"/>
+              </a:rPr>
+              <a:t>)</a:t>
+            </a:r>
+          </a:p>
+          <a:p>
+            <a:pPr marL="177800" lvl="0">
+              <a:spcBef>
+                <a:spcPts val="600"/>
+              </a:spcBef>
+              <a:tabLst>
+                <a:tab pos="541338" algn="l"/>
+              </a:tabLst>
+            </a:pPr>
+            <a:r>
+              <a:rPr lang="de-CH" dirty="0">
+                <a:latin typeface="Consolas" panose="020B0609020204030204" pitchFamily="49" charset="0"/>
+                <a:cs typeface="Consolas" panose="020B0609020204030204" pitchFamily="49" charset="0"/>
+              </a:rPr>
+              <a:t>)</a:t>
+            </a:r>
+          </a:p>
+          <a:p>
+            <a:endParaRPr lang="de-CH" dirty="0"/>
           </a:p>
         </p:txBody>
       </p:sp>
     </p:spTree>
     <p:extLst>
       <p:ext uri="{BB962C8B-B14F-4D97-AF65-F5344CB8AC3E}">
-        <p14:creationId xmlns:p14="http://schemas.microsoft.com/office/powerpoint/2010/main" val="2202274962"/>
+        <p14:creationId xmlns:p14="http://schemas.microsoft.com/office/powerpoint/2010/main" val="2671929620"/>
       </p:ext>
     </p:extLst>
   </p:cSld>
@@ -5733,7 +6710,535 @@
       </p:grpSpPr>
       <p:sp>
         <p:nvSpPr>
-          <p:cNvPr id="2" name="Title 1"/>
+          <p:cNvPr id="10" name="Rectangle 9"/>
+          <p:cNvSpPr/>
+          <p:nvPr/>
+        </p:nvSpPr>
+        <p:spPr>
+          <a:xfrm>
+            <a:off x="579816" y="2217087"/>
+            <a:ext cx="7984368" cy="3707028"/>
+          </a:xfrm>
+          <a:prstGeom prst="rect">
+            <a:avLst/>
+          </a:prstGeom>
+          <a:solidFill>
+            <a:schemeClr val="accent2">
+              <a:lumMod val="40000"/>
+              <a:lumOff val="60000"/>
+            </a:schemeClr>
+          </a:solidFill>
+          <a:ln w="12700">
+            <a:noFill/>
+          </a:ln>
+        </p:spPr>
+        <p:style>
+          <a:lnRef idx="2">
+            <a:schemeClr val="accent1">
+              <a:shade val="50000"/>
+            </a:schemeClr>
+          </a:lnRef>
+          <a:fillRef idx="1">
+            <a:schemeClr val="accent1"/>
+          </a:fillRef>
+          <a:effectRef idx="0">
+            <a:schemeClr val="accent1"/>
+          </a:effectRef>
+          <a:fontRef idx="minor">
+            <a:schemeClr val="lt1"/>
+          </a:fontRef>
+        </p:style>
+        <p:txBody>
+          <a:bodyPr rtlCol="0" anchor="ctr"/>
+          <a:lstStyle/>
+          <a:p>
+            <a:pPr algn="ctr"/>
+            <a:endParaRPr lang="de-CH" sz="2200" dirty="0" err="1" smtClean="0">
+              <a:latin typeface="AA Zuehlke" pitchFamily="2" charset="0"/>
+            </a:endParaRPr>
+          </a:p>
+        </p:txBody>
+      </p:sp>
+      <p:sp>
+        <p:nvSpPr>
+          <p:cNvPr id="3" name="Content Placeholder 2"/>
+          <p:cNvSpPr>
+            <a:spLocks noGrp="1"/>
+          </p:cNvSpPr>
+          <p:nvPr>
+            <p:ph idx="1"/>
+          </p:nvPr>
+        </p:nvSpPr>
+        <p:spPr/>
+        <p:txBody>
+          <a:bodyPr/>
+          <a:lstStyle/>
+          <a:p>
+            <a:r>
+              <a:rPr lang="de-CH" sz="2000" b="1" dirty="0" err="1"/>
+              <a:t>Compose</a:t>
+            </a:r>
+            <a:r>
+              <a:rPr lang="de-CH" sz="2000" b="1" dirty="0"/>
+              <a:t> </a:t>
+            </a:r>
+            <a:r>
+              <a:rPr lang="de-CH" sz="2000" b="1" dirty="0" err="1"/>
+              <a:t>and</a:t>
+            </a:r>
+            <a:r>
+              <a:rPr lang="de-CH" sz="2000" b="1" dirty="0"/>
+              <a:t> </a:t>
+            </a:r>
+            <a:r>
+              <a:rPr lang="de-CH" sz="2000" b="1" dirty="0" err="1"/>
+              <a:t>conquer</a:t>
+            </a:r>
+            <a:endParaRPr lang="de-CH" sz="2000" b="1" dirty="0"/>
+          </a:p>
+          <a:p>
+            <a:pPr marL="177800">
+              <a:spcBef>
+                <a:spcPts val="1200"/>
+              </a:spcBef>
+              <a:tabLst>
+                <a:tab pos="541338" algn="l"/>
+              </a:tabLst>
+            </a:pPr>
+            <a:r>
+              <a:rPr lang="en-US" sz="2000" b="1" dirty="0" err="1" smtClean="0">
+                <a:latin typeface="Consolas" panose="020B0609020204030204" pitchFamily="49" charset="0"/>
+                <a:cs typeface="Consolas" panose="020B0609020204030204" pitchFamily="49" charset="0"/>
+              </a:rPr>
+              <a:t>val</a:t>
+            </a:r>
+            <a:r>
+              <a:rPr lang="en-US" sz="2000" dirty="0" smtClean="0">
+                <a:latin typeface="Consolas" panose="020B0609020204030204" pitchFamily="49" charset="0"/>
+                <a:cs typeface="Consolas" panose="020B0609020204030204" pitchFamily="49" charset="0"/>
+              </a:rPr>
+              <a:t> </a:t>
+            </a:r>
+            <a:r>
+              <a:rPr lang="en-US" sz="2000" dirty="0" err="1">
+                <a:latin typeface="Consolas" panose="020B0609020204030204" pitchFamily="49" charset="0"/>
+                <a:cs typeface="Consolas" panose="020B0609020204030204" pitchFamily="49" charset="0"/>
+              </a:rPr>
+              <a:t>customerStreetLens</a:t>
+            </a:r>
+            <a:r>
+              <a:rPr lang="en-US" sz="2000" dirty="0">
+                <a:latin typeface="Consolas" panose="020B0609020204030204" pitchFamily="49" charset="0"/>
+                <a:cs typeface="Consolas" panose="020B0609020204030204" pitchFamily="49" charset="0"/>
+              </a:rPr>
+              <a:t> = </a:t>
+            </a:r>
+            <a:endParaRPr lang="en-US" sz="2000" dirty="0" smtClean="0">
+              <a:latin typeface="Consolas" panose="020B0609020204030204" pitchFamily="49" charset="0"/>
+              <a:cs typeface="Consolas" panose="020B0609020204030204" pitchFamily="49" charset="0"/>
+            </a:endParaRPr>
+          </a:p>
+          <a:p>
+            <a:pPr marL="177800">
+              <a:spcBef>
+                <a:spcPts val="600"/>
+              </a:spcBef>
+              <a:tabLst>
+                <a:tab pos="541338" algn="l"/>
+              </a:tabLst>
+            </a:pPr>
+            <a:r>
+              <a:rPr lang="en-US" sz="2000" dirty="0" smtClean="0">
+                <a:latin typeface="Consolas" panose="020B0609020204030204" pitchFamily="49" charset="0"/>
+                <a:cs typeface="Consolas" panose="020B0609020204030204" pitchFamily="49" charset="0"/>
+              </a:rPr>
+              <a:t>	compose(</a:t>
+            </a:r>
+            <a:r>
+              <a:rPr lang="en-US" sz="2000" dirty="0" err="1" smtClean="0">
+                <a:latin typeface="Consolas" panose="020B0609020204030204" pitchFamily="49" charset="0"/>
+                <a:cs typeface="Consolas" panose="020B0609020204030204" pitchFamily="49" charset="0"/>
+              </a:rPr>
+              <a:t>contactLens,compose</a:t>
+            </a:r>
+            <a:r>
+              <a:rPr lang="en-US" sz="2000" dirty="0" smtClean="0">
+                <a:latin typeface="Consolas" panose="020B0609020204030204" pitchFamily="49" charset="0"/>
+                <a:cs typeface="Consolas" panose="020B0609020204030204" pitchFamily="49" charset="0"/>
+              </a:rPr>
+              <a:t>(</a:t>
+            </a:r>
+            <a:r>
+              <a:rPr lang="en-US" sz="2000" dirty="0" err="1" smtClean="0">
+                <a:latin typeface="Consolas" panose="020B0609020204030204" pitchFamily="49" charset="0"/>
+                <a:cs typeface="Consolas" panose="020B0609020204030204" pitchFamily="49" charset="0"/>
+              </a:rPr>
+              <a:t>addressLens</a:t>
+            </a:r>
+            <a:r>
+              <a:rPr lang="en-US" sz="2000" dirty="0">
+                <a:latin typeface="Consolas" panose="020B0609020204030204" pitchFamily="49" charset="0"/>
+                <a:cs typeface="Consolas" panose="020B0609020204030204" pitchFamily="49" charset="0"/>
+              </a:rPr>
+              <a:t>, </a:t>
+            </a:r>
+            <a:r>
+              <a:rPr lang="en-US" sz="2000" dirty="0" err="1">
+                <a:latin typeface="Consolas" panose="020B0609020204030204" pitchFamily="49" charset="0"/>
+                <a:cs typeface="Consolas" panose="020B0609020204030204" pitchFamily="49" charset="0"/>
+              </a:rPr>
+              <a:t>streetLens</a:t>
+            </a:r>
+            <a:r>
+              <a:rPr lang="en-US" sz="2000" dirty="0" smtClean="0">
+                <a:latin typeface="Consolas" panose="020B0609020204030204" pitchFamily="49" charset="0"/>
+                <a:cs typeface="Consolas" panose="020B0609020204030204" pitchFamily="49" charset="0"/>
+              </a:rPr>
+              <a:t>))</a:t>
+            </a:r>
+          </a:p>
+          <a:p>
+            <a:pPr marL="177800">
+              <a:spcBef>
+                <a:spcPts val="600"/>
+              </a:spcBef>
+              <a:tabLst>
+                <a:tab pos="541338" algn="l"/>
+              </a:tabLst>
+            </a:pPr>
+            <a:endParaRPr lang="en-US" sz="2000" dirty="0">
+              <a:latin typeface="Consolas" panose="020B0609020204030204" pitchFamily="49" charset="0"/>
+              <a:cs typeface="Consolas" panose="020B0609020204030204" pitchFamily="49" charset="0"/>
+            </a:endParaRPr>
+          </a:p>
+          <a:p>
+            <a:pPr marL="177800">
+              <a:spcBef>
+                <a:spcPts val="600"/>
+              </a:spcBef>
+              <a:tabLst>
+                <a:tab pos="541338" algn="l"/>
+              </a:tabLst>
+            </a:pPr>
+            <a:r>
+              <a:rPr lang="de-CH" sz="2000" dirty="0" err="1">
+                <a:latin typeface="Consolas" panose="020B0609020204030204" pitchFamily="49" charset="0"/>
+                <a:cs typeface="Consolas" panose="020B0609020204030204" pitchFamily="49" charset="0"/>
+              </a:rPr>
+              <a:t>customerStreetLens.get</a:t>
+            </a:r>
+            <a:r>
+              <a:rPr lang="de-CH" sz="2000" dirty="0">
+                <a:latin typeface="Consolas" panose="020B0609020204030204" pitchFamily="49" charset="0"/>
+                <a:cs typeface="Consolas" panose="020B0609020204030204" pitchFamily="49" charset="0"/>
+              </a:rPr>
+              <a:t>(</a:t>
+            </a:r>
+            <a:r>
+              <a:rPr lang="de-CH" sz="2000" dirty="0" err="1">
+                <a:latin typeface="Consolas" panose="020B0609020204030204" pitchFamily="49" charset="0"/>
+                <a:cs typeface="Consolas" panose="020B0609020204030204" pitchFamily="49" charset="0"/>
+              </a:rPr>
+              <a:t>zuehlke</a:t>
+            </a:r>
+            <a:r>
+              <a:rPr lang="de-CH" sz="2000" dirty="0" smtClean="0">
+                <a:latin typeface="Consolas" panose="020B0609020204030204" pitchFamily="49" charset="0"/>
+                <a:cs typeface="Consolas" panose="020B0609020204030204" pitchFamily="49" charset="0"/>
+              </a:rPr>
+              <a:t>)</a:t>
+            </a:r>
+          </a:p>
+          <a:p>
+            <a:pPr marL="177800">
+              <a:spcBef>
+                <a:spcPts val="600"/>
+              </a:spcBef>
+              <a:tabLst>
+                <a:tab pos="541338" algn="l"/>
+              </a:tabLst>
+            </a:pPr>
+            <a:r>
+              <a:rPr lang="de-CH" sz="2000" dirty="0" smtClean="0">
+                <a:latin typeface="Consolas" panose="020B0609020204030204" pitchFamily="49" charset="0"/>
+                <a:cs typeface="Consolas" panose="020B0609020204030204" pitchFamily="49" charset="0"/>
+              </a:rPr>
+              <a:t>&gt;&gt; res0</a:t>
+            </a:r>
+            <a:r>
+              <a:rPr lang="de-CH" sz="2000" dirty="0">
+                <a:latin typeface="Consolas" panose="020B0609020204030204" pitchFamily="49" charset="0"/>
+                <a:cs typeface="Consolas" panose="020B0609020204030204" pitchFamily="49" charset="0"/>
+              </a:rPr>
+              <a:t>: String = Wiesenstrasse 10a</a:t>
+            </a:r>
+          </a:p>
+          <a:p>
+            <a:pPr marL="177800">
+              <a:spcBef>
+                <a:spcPts val="600"/>
+              </a:spcBef>
+              <a:tabLst>
+                <a:tab pos="541338" algn="l"/>
+              </a:tabLst>
+            </a:pPr>
+            <a:endParaRPr lang="de-CH" sz="2000" dirty="0" smtClean="0">
+              <a:latin typeface="Consolas" panose="020B0609020204030204" pitchFamily="49" charset="0"/>
+              <a:cs typeface="Consolas" panose="020B0609020204030204" pitchFamily="49" charset="0"/>
+            </a:endParaRPr>
+          </a:p>
+          <a:p>
+            <a:pPr marL="177800">
+              <a:spcBef>
+                <a:spcPts val="600"/>
+              </a:spcBef>
+              <a:tabLst>
+                <a:tab pos="541338" algn="l"/>
+              </a:tabLst>
+            </a:pPr>
+            <a:r>
+              <a:rPr lang="de-CH" sz="2000" dirty="0" err="1" smtClean="0">
+                <a:latin typeface="Consolas" panose="020B0609020204030204" pitchFamily="49" charset="0"/>
+                <a:cs typeface="Consolas" panose="020B0609020204030204" pitchFamily="49" charset="0"/>
+              </a:rPr>
+              <a:t>customerStreetLens.set</a:t>
+            </a:r>
+            <a:r>
+              <a:rPr lang="de-CH" sz="2000" dirty="0" smtClean="0">
+                <a:latin typeface="Consolas" panose="020B0609020204030204" pitchFamily="49" charset="0"/>
+                <a:cs typeface="Consolas" panose="020B0609020204030204" pitchFamily="49" charset="0"/>
+              </a:rPr>
+              <a:t>(</a:t>
+            </a:r>
+            <a:r>
+              <a:rPr lang="de-CH" sz="2000" dirty="0" err="1" smtClean="0">
+                <a:latin typeface="Consolas" panose="020B0609020204030204" pitchFamily="49" charset="0"/>
+                <a:cs typeface="Consolas" panose="020B0609020204030204" pitchFamily="49" charset="0"/>
+              </a:rPr>
+              <a:t>zuehlke</a:t>
+            </a:r>
+            <a:r>
+              <a:rPr lang="de-CH" sz="2000" dirty="0">
+                <a:latin typeface="Consolas" panose="020B0609020204030204" pitchFamily="49" charset="0"/>
+                <a:cs typeface="Consolas" panose="020B0609020204030204" pitchFamily="49" charset="0"/>
+              </a:rPr>
+              <a:t>, "</a:t>
+            </a:r>
+            <a:r>
+              <a:rPr lang="de-CH" sz="2000" dirty="0" err="1">
+                <a:latin typeface="Consolas" panose="020B0609020204030204" pitchFamily="49" charset="0"/>
+                <a:cs typeface="Consolas" panose="020B0609020204030204" pitchFamily="49" charset="0"/>
+              </a:rPr>
+              <a:t>Zühlkestrasse</a:t>
+            </a:r>
+            <a:r>
+              <a:rPr lang="de-CH" sz="2000" dirty="0">
+                <a:latin typeface="Consolas" panose="020B0609020204030204" pitchFamily="49" charset="0"/>
+                <a:cs typeface="Consolas" panose="020B0609020204030204" pitchFamily="49" charset="0"/>
+              </a:rPr>
+              <a:t> 1</a:t>
+            </a:r>
+            <a:r>
+              <a:rPr lang="de-CH" sz="2000" dirty="0" smtClean="0">
+                <a:latin typeface="Consolas" panose="020B0609020204030204" pitchFamily="49" charset="0"/>
+                <a:cs typeface="Consolas" panose="020B0609020204030204" pitchFamily="49" charset="0"/>
+              </a:rPr>
+              <a:t>")</a:t>
+            </a:r>
+          </a:p>
+          <a:p>
+            <a:pPr marL="177800">
+              <a:spcBef>
+                <a:spcPts val="600"/>
+              </a:spcBef>
+              <a:tabLst>
+                <a:tab pos="541338" algn="l"/>
+              </a:tabLst>
+            </a:pPr>
+            <a:r>
+              <a:rPr lang="de-CH" sz="2000" dirty="0">
+                <a:latin typeface="Consolas" panose="020B0609020204030204" pitchFamily="49" charset="0"/>
+                <a:cs typeface="Consolas" panose="020B0609020204030204" pitchFamily="49" charset="0"/>
+              </a:rPr>
+              <a:t>&gt;&gt; res1: Customer = </a:t>
+            </a:r>
+            <a:r>
+              <a:rPr lang="de-CH" sz="2000" dirty="0" smtClean="0">
+                <a:latin typeface="Consolas" panose="020B0609020204030204" pitchFamily="49" charset="0"/>
+                <a:cs typeface="Consolas" panose="020B0609020204030204" pitchFamily="49" charset="0"/>
+              </a:rPr>
+              <a:t>Customer(SME, </a:t>
+            </a:r>
+            <a:r>
+              <a:rPr lang="de-CH" sz="2000" dirty="0" err="1" smtClean="0">
+                <a:latin typeface="Consolas" panose="020B0609020204030204" pitchFamily="49" charset="0"/>
+                <a:cs typeface="Consolas" panose="020B0609020204030204" pitchFamily="49" charset="0"/>
+              </a:rPr>
+              <a:t>Contact</a:t>
+            </a:r>
+            <a:r>
+              <a:rPr lang="de-CH" sz="2000" dirty="0" smtClean="0">
+                <a:latin typeface="Consolas" panose="020B0609020204030204" pitchFamily="49" charset="0"/>
+                <a:cs typeface="Consolas" panose="020B0609020204030204" pitchFamily="49" charset="0"/>
+              </a:rPr>
+              <a:t>(</a:t>
+            </a:r>
+            <a:r>
+              <a:rPr lang="de-CH" sz="2000" dirty="0" err="1" smtClean="0">
+                <a:latin typeface="Consolas" panose="020B0609020204030204" pitchFamily="49" charset="0"/>
+                <a:cs typeface="Consolas" panose="020B0609020204030204" pitchFamily="49" charset="0"/>
+              </a:rPr>
+              <a:t>Zühlke</a:t>
+            </a:r>
+            <a:r>
+              <a:rPr lang="de-CH" sz="2000" dirty="0" smtClean="0">
+                <a:latin typeface="Consolas" panose="020B0609020204030204" pitchFamily="49" charset="0"/>
+                <a:cs typeface="Consolas" panose="020B0609020204030204" pitchFamily="49" charset="0"/>
+              </a:rPr>
+              <a:t> </a:t>
+            </a:r>
+            <a:r>
+              <a:rPr lang="de-CH" sz="2000" dirty="0">
+                <a:latin typeface="Consolas" panose="020B0609020204030204" pitchFamily="49" charset="0"/>
+                <a:cs typeface="Consolas" panose="020B0609020204030204" pitchFamily="49" charset="0"/>
+              </a:rPr>
+              <a:t>Engineering </a:t>
+            </a:r>
+            <a:r>
+              <a:rPr lang="de-CH" sz="2000" dirty="0" smtClean="0">
+                <a:latin typeface="Consolas" panose="020B0609020204030204" pitchFamily="49" charset="0"/>
+                <a:cs typeface="Consolas" panose="020B0609020204030204" pitchFamily="49" charset="0"/>
+              </a:rPr>
+              <a:t>AG, </a:t>
+            </a:r>
+            <a:r>
+              <a:rPr lang="de-CH" sz="2000" dirty="0" err="1" smtClean="0">
+                <a:latin typeface="Consolas" panose="020B0609020204030204" pitchFamily="49" charset="0"/>
+                <a:cs typeface="Consolas" panose="020B0609020204030204" pitchFamily="49" charset="0"/>
+              </a:rPr>
+              <a:t>Address</a:t>
+            </a:r>
+            <a:r>
+              <a:rPr lang="de-CH" sz="2000" dirty="0" smtClean="0">
+                <a:latin typeface="Consolas" panose="020B0609020204030204" pitchFamily="49" charset="0"/>
+                <a:cs typeface="Consolas" panose="020B0609020204030204" pitchFamily="49" charset="0"/>
+              </a:rPr>
+              <a:t>(</a:t>
+            </a:r>
+            <a:r>
+              <a:rPr lang="de-CH" sz="2000" dirty="0" err="1" smtClean="0">
+                <a:latin typeface="Consolas" panose="020B0609020204030204" pitchFamily="49" charset="0"/>
+                <a:cs typeface="Consolas" panose="020B0609020204030204" pitchFamily="49" charset="0"/>
+              </a:rPr>
+              <a:t>Zühlkestrasse</a:t>
+            </a:r>
+            <a:r>
+              <a:rPr lang="de-CH" sz="2000" dirty="0" smtClean="0">
+                <a:latin typeface="Consolas" panose="020B0609020204030204" pitchFamily="49" charset="0"/>
+                <a:cs typeface="Consolas" panose="020B0609020204030204" pitchFamily="49" charset="0"/>
+              </a:rPr>
+              <a:t> </a:t>
+            </a:r>
+            <a:r>
+              <a:rPr lang="de-CH" sz="2000" dirty="0">
+                <a:latin typeface="Consolas" panose="020B0609020204030204" pitchFamily="49" charset="0"/>
+                <a:cs typeface="Consolas" panose="020B0609020204030204" pitchFamily="49" charset="0"/>
+              </a:rPr>
+              <a:t>1</a:t>
+            </a:r>
+            <a:r>
+              <a:rPr lang="de-CH" sz="2000" dirty="0" smtClean="0">
+                <a:latin typeface="Consolas" panose="020B0609020204030204" pitchFamily="49" charset="0"/>
+                <a:cs typeface="Consolas" panose="020B0609020204030204" pitchFamily="49" charset="0"/>
+              </a:rPr>
+              <a:t>, 8952 </a:t>
+            </a:r>
+            <a:r>
+              <a:rPr lang="de-CH" sz="2000" dirty="0">
+                <a:latin typeface="Consolas" panose="020B0609020204030204" pitchFamily="49" charset="0"/>
+                <a:cs typeface="Consolas" panose="020B0609020204030204" pitchFamily="49" charset="0"/>
+              </a:rPr>
+              <a:t>Schlieren)))</a:t>
+            </a:r>
+          </a:p>
+        </p:txBody>
+      </p:sp>
+      <p:sp>
+        <p:nvSpPr>
+          <p:cNvPr id="4" name="Date Placeholder 3"/>
+          <p:cNvSpPr>
+            <a:spLocks noGrp="1"/>
+          </p:cNvSpPr>
+          <p:nvPr>
+            <p:ph type="dt" sz="half" idx="10"/>
+          </p:nvPr>
+        </p:nvSpPr>
+        <p:spPr/>
+        <p:txBody>
+          <a:bodyPr/>
+          <a:lstStyle/>
+          <a:p>
+            <a:r>
+              <a:rPr lang="de-CH" dirty="0" smtClean="0"/>
+              <a:t>14. November 2014</a:t>
+            </a:r>
+            <a:endParaRPr lang="de-CH" dirty="0"/>
+          </a:p>
+        </p:txBody>
+      </p:sp>
+      <p:sp>
+        <p:nvSpPr>
+          <p:cNvPr id="7" name="Footer Placeholder 6"/>
+          <p:cNvSpPr>
+            <a:spLocks noGrp="1"/>
+          </p:cNvSpPr>
+          <p:nvPr>
+            <p:ph type="ftr" sz="quarter" idx="11"/>
+          </p:nvPr>
+        </p:nvSpPr>
+        <p:spPr/>
+        <p:txBody>
+          <a:bodyPr/>
+          <a:lstStyle/>
+          <a:p>
+            <a:r>
+              <a:rPr lang="de-CH" dirty="0" smtClean="0"/>
+              <a:t>Rezepte aus der funktionalen Programmierung | </a:t>
+            </a:r>
+            <a:r>
+              <a:rPr lang="de-CH" dirty="0" err="1" smtClean="0"/>
+              <a:t>ico</a:t>
+            </a:r>
+            <a:endParaRPr lang="de-CH" dirty="0"/>
+          </a:p>
+        </p:txBody>
+      </p:sp>
+      <p:sp>
+        <p:nvSpPr>
+          <p:cNvPr id="6" name="Text Placeholder 5"/>
+          <p:cNvSpPr>
+            <a:spLocks noGrp="1"/>
+          </p:cNvSpPr>
+          <p:nvPr>
+            <p:ph type="body" sz="quarter" idx="13"/>
+          </p:nvPr>
+        </p:nvSpPr>
+        <p:spPr/>
+        <p:txBody>
+          <a:bodyPr/>
+          <a:lstStyle/>
+          <a:p>
+            <a:r>
+              <a:rPr lang="en-GB" dirty="0"/>
+              <a:t>Modify nested immutable objects</a:t>
+            </a:r>
+            <a:endParaRPr lang="en-GB" dirty="0"/>
+          </a:p>
+        </p:txBody>
+      </p:sp>
+      <p:sp>
+        <p:nvSpPr>
+          <p:cNvPr id="13" name="Title 1"/>
           <p:cNvSpPr>
             <a:spLocks noGrp="1"/>
           </p:cNvSpPr>
@@ -5741,14 +7246,19 @@
             <p:ph type="title"/>
           </p:nvPr>
         </p:nvSpPr>
-        <p:spPr/>
+        <p:spPr>
+          <a:xfrm>
+            <a:off x="579439" y="220993"/>
+            <a:ext cx="5845174" cy="712892"/>
+          </a:xfrm>
+        </p:spPr>
         <p:txBody>
           <a:bodyPr/>
           <a:lstStyle/>
           <a:p>
             <a:r>
               <a:rPr lang="en-GB" dirty="0" smtClean="0"/>
-              <a:t>Pure Functions</a:t>
+              <a:t>Lenses</a:t>
             </a:r>
             <a:endParaRPr lang="en-GB" dirty="0"/>
           </a:p>
@@ -5756,147 +7266,7 @@
       </p:sp>
       <p:sp>
         <p:nvSpPr>
-          <p:cNvPr id="3" name="Content Placeholder 2"/>
-          <p:cNvSpPr>
-            <a:spLocks noGrp="1"/>
-          </p:cNvSpPr>
-          <p:nvPr>
-            <p:ph idx="1"/>
-          </p:nvPr>
-        </p:nvSpPr>
-        <p:spPr/>
-        <p:txBody>
-          <a:bodyPr/>
-          <a:lstStyle/>
-          <a:p>
-            <a:r>
-              <a:rPr lang="en-GB" dirty="0" smtClean="0"/>
-              <a:t>Definition</a:t>
-            </a:r>
-          </a:p>
-          <a:p>
-            <a:pPr marL="342900" indent="-342900">
-              <a:buFont typeface="Arial" panose="020B0604020202020204" pitchFamily="34" charset="0"/>
-              <a:buChar char="•"/>
-            </a:pPr>
-            <a:r>
-              <a:rPr lang="en-GB" dirty="0" smtClean="0"/>
-              <a:t>A function, where the return value is only determined by the input value</a:t>
-            </a:r>
-          </a:p>
-          <a:p>
-            <a:pPr marL="342900" indent="-342900">
-              <a:buFont typeface="Arial" panose="020B0604020202020204" pitchFamily="34" charset="0"/>
-              <a:buChar char="•"/>
-            </a:pPr>
-            <a:r>
-              <a:rPr lang="en-GB" dirty="0" smtClean="0"/>
-              <a:t>A function without side effects</a:t>
-            </a:r>
-          </a:p>
-          <a:p>
-            <a:pPr marL="342900" indent="-342900">
-              <a:buFont typeface="Arial" panose="020B0604020202020204" pitchFamily="34" charset="0"/>
-              <a:buChar char="•"/>
-            </a:pPr>
-            <a:r>
-              <a:rPr lang="en-GB" dirty="0" smtClean="0"/>
-              <a:t>A pure function cannot depend on hidden state or value or I/O</a:t>
-            </a:r>
-          </a:p>
-          <a:p>
-            <a:pPr marL="342900" indent="-342900">
-              <a:buFont typeface="Arial" panose="020B0604020202020204" pitchFamily="34" charset="0"/>
-              <a:buChar char="•"/>
-            </a:pPr>
-            <a:r>
-              <a:rPr lang="en-GB" dirty="0"/>
-              <a:t>An invocation of a pure function can always be replaced with its return value</a:t>
-            </a:r>
-          </a:p>
-          <a:p>
-            <a:endParaRPr lang="en-GB" dirty="0" smtClean="0"/>
-          </a:p>
-          <a:p>
-            <a:pPr lvl="1" indent="0">
-              <a:buNone/>
-            </a:pPr>
-            <a:endParaRPr lang="en-GB" dirty="0"/>
-          </a:p>
-        </p:txBody>
-      </p:sp>
-      <p:sp>
-        <p:nvSpPr>
-          <p:cNvPr id="4" name="Date Placeholder 3"/>
-          <p:cNvSpPr>
-            <a:spLocks noGrp="1"/>
-          </p:cNvSpPr>
-          <p:nvPr>
-            <p:ph type="dt" sz="half" idx="10"/>
-          </p:nvPr>
-        </p:nvSpPr>
-        <p:spPr/>
-        <p:txBody>
-          <a:bodyPr/>
-          <a:lstStyle/>
-          <a:p>
-            <a:r>
-              <a:rPr lang="de-CH" smtClean="0"/>
-              <a:t>14. September 2015</a:t>
-            </a:r>
-            <a:endParaRPr lang="de-CH" dirty="0"/>
-          </a:p>
-        </p:txBody>
-      </p:sp>
-      <p:sp>
-        <p:nvSpPr>
-          <p:cNvPr id="5" name="Footer Placeholder 4"/>
-          <p:cNvSpPr>
-            <a:spLocks noGrp="1"/>
-          </p:cNvSpPr>
-          <p:nvPr>
-            <p:ph type="ftr" sz="quarter" idx="11"/>
-          </p:nvPr>
-        </p:nvSpPr>
-        <p:spPr/>
-        <p:txBody>
-          <a:bodyPr/>
-          <a:lstStyle/>
-          <a:p>
-            <a:r>
-              <a:rPr lang="en-US" smtClean="0"/>
-              <a:t>Functional Design Patterns for OO Practicioners | Hendrik Schöneberg</a:t>
-            </a:r>
-            <a:endParaRPr lang="de-CH" dirty="0"/>
-          </a:p>
-        </p:txBody>
-      </p:sp>
-      <p:sp>
-        <p:nvSpPr>
-          <p:cNvPr id="7" name="Text Placeholder 6"/>
-          <p:cNvSpPr>
-            <a:spLocks noGrp="1"/>
-          </p:cNvSpPr>
-          <p:nvPr>
-            <p:ph type="body" sz="quarter" idx="13"/>
-          </p:nvPr>
-        </p:nvSpPr>
-        <p:spPr/>
-        <p:txBody>
-          <a:bodyPr/>
-          <a:lstStyle/>
-          <a:p>
-            <a:r>
-              <a:rPr lang="en-GB" dirty="0" smtClean="0"/>
-              <a:t>Introduction</a:t>
-            </a:r>
-            <a:endParaRPr lang="en-GB" dirty="0"/>
-          </a:p>
-        </p:txBody>
-      </p:sp>
-      <p:sp>
-        <p:nvSpPr>
-          <p:cNvPr id="8" name="Slide Number Placeholder 7"/>
+          <p:cNvPr id="2" name="Slide Number Placeholder 1"/>
           <p:cNvSpPr>
             <a:spLocks noGrp="1"/>
           </p:cNvSpPr>
@@ -5913,13 +7283,13 @@
               <a:rPr lang="de-CH" smtClean="0"/>
               <a:t>Slide </a:t>
             </a:r>
-            <a:fld id="{EE512DFC-0999-41B9-8850-1AA1E3804027}" type="slidenum">
+            <a:fld id="{E64627FD-4AAD-4869-9460-34B559B072F2}" type="slidenum">
               <a:rPr lang="de-CH" smtClean="0"/>
               <a:t>11</a:t>
             </a:fld>
             <a:r>
               <a:rPr lang="de-CH" smtClean="0"/>
-              <a:t> of 16</a:t>
+              <a:t> of 18</a:t>
             </a:r>
             <a:endParaRPr dirty="0"/>
           </a:p>
@@ -5928,7 +7298,7 @@
     </p:spTree>
     <p:extLst>
       <p:ext uri="{BB962C8B-B14F-4D97-AF65-F5344CB8AC3E}">
-        <p14:creationId xmlns:p14="http://schemas.microsoft.com/office/powerpoint/2010/main" val="248071837"/>
+        <p14:creationId xmlns:p14="http://schemas.microsoft.com/office/powerpoint/2010/main" val="80887030"/>
       </p:ext>
     </p:extLst>
   </p:cSld>
@@ -5979,7 +7349,7 @@
           <a:p>
             <a:r>
               <a:rPr lang="en-GB" dirty="0" smtClean="0"/>
-              <a:t>Pure Functions</a:t>
+              <a:t>Immutability</a:t>
             </a:r>
             <a:endParaRPr lang="en-GB" dirty="0"/>
           </a:p>
@@ -5999,12 +7369,6 @@
         <p:txBody>
           <a:bodyPr/>
           <a:lstStyle/>
-          <a:p>
-            <a:r>
-              <a:rPr lang="en-GB" dirty="0" smtClean="0"/>
-              <a:t>Definition</a:t>
-            </a:r>
-          </a:p>
           <a:p>
             <a:pPr marL="342900" indent="-342900">
               <a:buFont typeface="Arial" panose="020B0604020202020204" pitchFamily="34" charset="0"/>
@@ -6012,7 +7376,7 @@
             </a:pPr>
             <a:r>
               <a:rPr lang="en-GB" dirty="0" smtClean="0"/>
-              <a:t>An expression is referentially transparent if it can be replaced with its value without changing the behaviour of a program</a:t>
+              <a:t>Immutability is generally desirable</a:t>
             </a:r>
           </a:p>
           <a:p>
@@ -6022,7 +7386,17 @@
             </a:pPr>
             <a:r>
               <a:rPr lang="en-GB" dirty="0" smtClean="0"/>
-              <a:t>Usually referential transparency is broken by side effects or dependency on global or hidden state</a:t>
+              <a:t>Existing code should be refactored or new code should be written with immutability in mind</a:t>
+            </a:r>
+          </a:p>
+          <a:p>
+            <a:pPr marL="342900" indent="-342900">
+              <a:buFont typeface="Arial" panose="020B0604020202020204" pitchFamily="34" charset="0"/>
+              <a:buChar char="•"/>
+            </a:pPr>
+            <a:r>
+              <a:rPr lang="en-GB" dirty="0" smtClean="0"/>
+              <a:t>Helpers like lenses can mitigate the added complexity when dealing with destructive updates</a:t>
             </a:r>
             <a:endParaRPr lang="en-GB" dirty="0"/>
           </a:p>
@@ -6091,7 +7465,7 @@
           <a:p>
             <a:r>
               <a:rPr lang="en-GB" dirty="0" smtClean="0"/>
-              <a:t>Referential Transparency</a:t>
+              <a:t>Lessons learned / summary</a:t>
             </a:r>
             <a:endParaRPr lang="en-GB" dirty="0"/>
           </a:p>
@@ -6116,13 +7490,13 @@
               <a:rPr lang="de-CH" smtClean="0"/>
               <a:t>Slide </a:t>
             </a:r>
-            <a:fld id="{9E1EEF86-882C-46DE-A5A3-62A883B95156}" type="slidenum">
+            <a:fld id="{50A7F31E-8121-4D59-903F-4EBACBAE654A}" type="slidenum">
               <a:rPr lang="de-CH" smtClean="0"/>
               <a:t>12</a:t>
             </a:fld>
             <a:r>
               <a:rPr lang="de-CH" smtClean="0"/>
-              <a:t> of 16</a:t>
+              <a:t> of 18</a:t>
             </a:r>
             <a:endParaRPr dirty="0"/>
           </a:p>
@@ -6131,7 +7505,7 @@
     </p:spTree>
     <p:extLst>
       <p:ext uri="{BB962C8B-B14F-4D97-AF65-F5344CB8AC3E}">
-        <p14:creationId xmlns:p14="http://schemas.microsoft.com/office/powerpoint/2010/main" val="455473412"/>
+        <p14:creationId xmlns:p14="http://schemas.microsoft.com/office/powerpoint/2010/main" val="2202274962"/>
       </p:ext>
     </p:extLst>
   </p:cSld>
@@ -6203,17 +7577,19 @@
           <a:bodyPr/>
           <a:lstStyle/>
           <a:p>
+            <a:r>
+              <a:rPr lang="en-GB" dirty="0" smtClean="0"/>
+              <a:t>Definition</a:t>
+            </a:r>
+          </a:p>
+          <a:p>
             <a:pPr marL="342900" indent="-342900">
               <a:buFont typeface="Arial" panose="020B0604020202020204" pitchFamily="34" charset="0"/>
               <a:buChar char="•"/>
             </a:pPr>
             <a:r>
               <a:rPr lang="en-GB" dirty="0" smtClean="0"/>
-              <a:t>Go </a:t>
-            </a:r>
-            <a:r>
-              <a:rPr lang="en-GB" dirty="0"/>
-              <a:t>hand in hand with immutable values</a:t>
+              <a:t>A function, where the return value is only determined by the input value</a:t>
             </a:r>
           </a:p>
           <a:p>
@@ -6222,8 +7598,8 @@
               <a:buChar char="•"/>
             </a:pPr>
             <a:r>
-              <a:rPr lang="en-GB" dirty="0"/>
-              <a:t>Functions are easier to test and verify</a:t>
+              <a:rPr lang="en-GB" dirty="0" smtClean="0"/>
+              <a:t>A function without side effects</a:t>
             </a:r>
           </a:p>
           <a:p>
@@ -6232,8 +7608,8 @@
               <a:buChar char="•"/>
             </a:pPr>
             <a:r>
-              <a:rPr lang="en-GB" dirty="0"/>
-              <a:t>Can simplify systems</a:t>
+              <a:rPr lang="en-GB" dirty="0" smtClean="0"/>
+              <a:t>A pure function cannot depend on hidden state or value or I/O</a:t>
             </a:r>
           </a:p>
           <a:p>
@@ -6242,49 +7618,16 @@
               <a:buChar char="•"/>
             </a:pPr>
             <a:r>
-              <a:rPr lang="en-GB" dirty="0" smtClean="0"/>
-              <a:t>Simplifies concurrency</a:t>
-            </a:r>
-            <a:endParaRPr lang="en-GB" dirty="0"/>
-          </a:p>
-          <a:p>
-            <a:pPr marL="342900" indent="-342900">
-              <a:buFont typeface="Arial" panose="020B0604020202020204" pitchFamily="34" charset="0"/>
-              <a:buChar char="•"/>
-            </a:pPr>
-            <a:r>
-              <a:rPr lang="en-GB" dirty="0" smtClean="0"/>
-              <a:t>Calls to pure functions can be parallelized</a:t>
-            </a:r>
-          </a:p>
-          <a:p>
-            <a:pPr marL="342900" indent="-342900">
-              <a:buFont typeface="Arial" panose="020B0604020202020204" pitchFamily="34" charset="0"/>
-              <a:buChar char="•"/>
-            </a:pPr>
-            <a:r>
-              <a:rPr lang="en-GB" dirty="0" smtClean="0"/>
-              <a:t>Caching: Since the result for a given input is always the same, it only needs to be computed once</a:t>
-            </a:r>
-          </a:p>
-          <a:p>
-            <a:pPr marL="342900" indent="-342900">
-              <a:buFont typeface="Arial" panose="020B0604020202020204" pitchFamily="34" charset="0"/>
-              <a:buChar char="•"/>
-            </a:pPr>
-            <a:r>
-              <a:rPr lang="en-GB" dirty="0" err="1" smtClean="0"/>
-              <a:t>Lazyness</a:t>
-            </a:r>
-            <a:r>
-              <a:rPr lang="en-GB" dirty="0" smtClean="0"/>
-              <a:t>: Since the function does not cause any side effects, we can postpone computation until we actually need the result</a:t>
-            </a:r>
-          </a:p>
-          <a:p>
-            <a:pPr marL="342900" indent="-342900">
-              <a:buFont typeface="Arial" panose="020B0604020202020204" pitchFamily="34" charset="0"/>
-              <a:buChar char="•"/>
+              <a:rPr lang="en-GB" dirty="0"/>
+              <a:t>An invocation of a pure function can always be replaced with its return value</a:t>
+            </a:r>
+          </a:p>
+          <a:p>
+            <a:endParaRPr lang="en-GB" dirty="0" smtClean="0"/>
+          </a:p>
+          <a:p>
+            <a:pPr lvl="1" indent="0">
+              <a:buNone/>
             </a:pPr>
             <a:endParaRPr lang="en-GB" dirty="0"/>
           </a:p>
@@ -6353,7 +7696,7 @@
           <a:p>
             <a:r>
               <a:rPr lang="en-GB" dirty="0" smtClean="0"/>
-              <a:t>Benefits</a:t>
+              <a:t>Introduction</a:t>
             </a:r>
             <a:endParaRPr lang="en-GB" dirty="0"/>
           </a:p>
@@ -6378,13 +7721,13 @@
               <a:rPr lang="de-CH" smtClean="0"/>
               <a:t>Slide </a:t>
             </a:r>
-            <a:fld id="{075C5EDD-935C-430C-9C02-7B52783F82BB}" type="slidenum">
+            <a:fld id="{8E72CE87-C99E-480E-8D6B-EAA751751E2E}" type="slidenum">
               <a:rPr lang="de-CH" smtClean="0"/>
               <a:t>13</a:t>
             </a:fld>
             <a:r>
               <a:rPr lang="de-CH" smtClean="0"/>
-              <a:t> of 16</a:t>
+              <a:t> of 18</a:t>
             </a:r>
             <a:endParaRPr dirty="0"/>
           </a:p>
@@ -6393,7 +7736,7 @@
     </p:spTree>
     <p:extLst>
       <p:ext uri="{BB962C8B-B14F-4D97-AF65-F5344CB8AC3E}">
-        <p14:creationId xmlns:p14="http://schemas.microsoft.com/office/powerpoint/2010/main" val="799228113"/>
+        <p14:creationId xmlns:p14="http://schemas.microsoft.com/office/powerpoint/2010/main" val="248071837"/>
       </p:ext>
     </p:extLst>
   </p:cSld>
@@ -6465,13 +7808,19 @@
           <a:bodyPr/>
           <a:lstStyle/>
           <a:p>
+            <a:r>
+              <a:rPr lang="en-GB" dirty="0" smtClean="0"/>
+              <a:t>Definition</a:t>
+            </a:r>
+          </a:p>
+          <a:p>
             <a:pPr marL="342900" indent="-342900">
               <a:buFont typeface="Arial" panose="020B0604020202020204" pitchFamily="34" charset="0"/>
               <a:buChar char="•"/>
             </a:pPr>
             <a:r>
               <a:rPr lang="en-GB" dirty="0" smtClean="0"/>
-              <a:t>Obviously, there will be functions with side effects (I/O, global state, user input …)</a:t>
+              <a:t>An expression is referentially transparent if it can be replaced with its value without changing the behaviour of a program</a:t>
             </a:r>
           </a:p>
           <a:p>
@@ -6481,50 +7830,7 @@
             </a:pPr>
             <a:r>
               <a:rPr lang="en-GB" dirty="0" smtClean="0"/>
-              <a:t>The idea is to refactor as many of your functions into pure functions as possible and wrap them into a shell, which handles side effects</a:t>
-            </a:r>
-          </a:p>
-          <a:p>
-            <a:pPr marL="342900" indent="-342900">
-              <a:buFont typeface="Arial" panose="020B0604020202020204" pitchFamily="34" charset="0"/>
-              <a:buChar char="•"/>
-            </a:pPr>
-            <a:r>
-              <a:rPr lang="en-GB" dirty="0" smtClean="0"/>
-              <a:t>Keep a “healthy balance” between pure and impure functions</a:t>
-            </a:r>
-          </a:p>
-          <a:p>
-            <a:pPr marL="342900" indent="-342900">
-              <a:buFont typeface="Arial" panose="020B0604020202020204" pitchFamily="34" charset="0"/>
-              <a:buChar char="•"/>
-            </a:pPr>
-            <a:endParaRPr lang="en-GB" dirty="0" smtClean="0"/>
-          </a:p>
-          <a:p>
-            <a:r>
-              <a:rPr lang="en-GB" dirty="0" smtClean="0"/>
-              <a:t>Useful data structures</a:t>
-            </a:r>
-          </a:p>
-          <a:p>
-            <a:pPr marL="342900" indent="-342900">
-              <a:buFont typeface="Arial" panose="020B0604020202020204" pitchFamily="34" charset="0"/>
-              <a:buChar char="•"/>
-            </a:pPr>
-            <a:r>
-              <a:rPr lang="en-GB" dirty="0" smtClean="0"/>
-              <a:t>Try[T] – Encapsulates exceptions: Disconnects error handling and recovery, forces the caller to deal with the possibility of error.</a:t>
-            </a:r>
-          </a:p>
-          <a:p>
-            <a:pPr marL="342900" indent="-342900">
-              <a:buFont typeface="Arial" panose="020B0604020202020204" pitchFamily="34" charset="0"/>
-              <a:buChar char="•"/>
-            </a:pPr>
-            <a:r>
-              <a:rPr lang="en-GB" dirty="0" smtClean="0"/>
-              <a:t>Option[T] – Represents a value which might be null</a:t>
+              <a:t>Usually referential transparency is broken by side effects or dependency on global or hidden state</a:t>
             </a:r>
             <a:endParaRPr lang="en-GB" dirty="0"/>
           </a:p>
@@ -6593,7 +7899,7 @@
           <a:p>
             <a:r>
               <a:rPr lang="en-GB" dirty="0" smtClean="0"/>
-              <a:t>But how do I get there?</a:t>
+              <a:t>Referential Transparency</a:t>
             </a:r>
             <a:endParaRPr lang="en-GB" dirty="0"/>
           </a:p>
@@ -6618,13 +7924,13 @@
               <a:rPr lang="de-CH" smtClean="0"/>
               <a:t>Slide </a:t>
             </a:r>
-            <a:fld id="{5E159128-CEC6-41B6-B7D6-90E36C3AB3D5}" type="slidenum">
+            <a:fld id="{B588109E-4DE6-4A31-BFA0-B76037148F3D}" type="slidenum">
               <a:rPr lang="de-CH" smtClean="0"/>
               <a:t>14</a:t>
             </a:fld>
             <a:r>
               <a:rPr lang="de-CH" smtClean="0"/>
-              <a:t> of 16</a:t>
+              <a:t> of 18</a:t>
             </a:r>
             <a:endParaRPr dirty="0"/>
           </a:p>
@@ -6633,7 +7939,7 @@
     </p:spTree>
     <p:extLst>
       <p:ext uri="{BB962C8B-B14F-4D97-AF65-F5344CB8AC3E}">
-        <p14:creationId xmlns:p14="http://schemas.microsoft.com/office/powerpoint/2010/main" val="3426570471"/>
+        <p14:creationId xmlns:p14="http://schemas.microsoft.com/office/powerpoint/2010/main" val="455473412"/>
       </p:ext>
     </p:extLst>
   </p:cSld>
@@ -6705,7 +8011,90 @@
           <a:bodyPr/>
           <a:lstStyle/>
           <a:p>
-            <a:endParaRPr lang="en-GB"/>
+            <a:pPr marL="342900" indent="-342900">
+              <a:buFont typeface="Arial" panose="020B0604020202020204" pitchFamily="34" charset="0"/>
+              <a:buChar char="•"/>
+            </a:pPr>
+            <a:r>
+              <a:rPr lang="en-GB" dirty="0" smtClean="0"/>
+              <a:t>Go </a:t>
+            </a:r>
+            <a:r>
+              <a:rPr lang="en-GB" dirty="0"/>
+              <a:t>hand in hand with immutable values</a:t>
+            </a:r>
+          </a:p>
+          <a:p>
+            <a:pPr marL="342900" indent="-342900">
+              <a:buFont typeface="Arial" panose="020B0604020202020204" pitchFamily="34" charset="0"/>
+              <a:buChar char="•"/>
+            </a:pPr>
+            <a:r>
+              <a:rPr lang="en-GB" dirty="0"/>
+              <a:t>Functions are easier to test and verify</a:t>
+            </a:r>
+          </a:p>
+          <a:p>
+            <a:pPr marL="342900" indent="-342900">
+              <a:buFont typeface="Arial" panose="020B0604020202020204" pitchFamily="34" charset="0"/>
+              <a:buChar char="•"/>
+            </a:pPr>
+            <a:r>
+              <a:rPr lang="en-GB" dirty="0"/>
+              <a:t>Can simplify systems</a:t>
+            </a:r>
+          </a:p>
+          <a:p>
+            <a:pPr marL="342900" indent="-342900">
+              <a:buFont typeface="Arial" panose="020B0604020202020204" pitchFamily="34" charset="0"/>
+              <a:buChar char="•"/>
+            </a:pPr>
+            <a:r>
+              <a:rPr lang="en-GB" dirty="0" smtClean="0"/>
+              <a:t>Simplifies concurrency</a:t>
+            </a:r>
+            <a:endParaRPr lang="en-GB" dirty="0"/>
+          </a:p>
+          <a:p>
+            <a:pPr marL="342900" indent="-342900">
+              <a:buFont typeface="Arial" panose="020B0604020202020204" pitchFamily="34" charset="0"/>
+              <a:buChar char="•"/>
+            </a:pPr>
+            <a:r>
+              <a:rPr lang="en-GB" dirty="0" smtClean="0"/>
+              <a:t>Calls to pure functions can be parallelized</a:t>
+            </a:r>
+          </a:p>
+          <a:p>
+            <a:pPr marL="342900" indent="-342900">
+              <a:buFont typeface="Arial" panose="020B0604020202020204" pitchFamily="34" charset="0"/>
+              <a:buChar char="•"/>
+            </a:pPr>
+            <a:r>
+              <a:rPr lang="en-GB" dirty="0" smtClean="0"/>
+              <a:t>Caching: Since the result for a given input is always the same, it only needs to be computed once</a:t>
+            </a:r>
+          </a:p>
+          <a:p>
+            <a:pPr marL="342900" indent="-342900">
+              <a:buFont typeface="Arial" panose="020B0604020202020204" pitchFamily="34" charset="0"/>
+              <a:buChar char="•"/>
+            </a:pPr>
+            <a:r>
+              <a:rPr lang="en-GB" dirty="0" err="1" smtClean="0"/>
+              <a:t>Lazyness</a:t>
+            </a:r>
+            <a:r>
+              <a:rPr lang="en-GB" dirty="0" smtClean="0"/>
+              <a:t>: Since the function does not cause any side effects, we can postpone computation until we actually need the result</a:t>
+            </a:r>
+          </a:p>
+          <a:p>
+            <a:pPr marL="342900" indent="-342900">
+              <a:buFont typeface="Arial" panose="020B0604020202020204" pitchFamily="34" charset="0"/>
+              <a:buChar char="•"/>
+            </a:pPr>
+            <a:endParaRPr lang="en-GB" dirty="0"/>
           </a:p>
         </p:txBody>
       </p:sp>
@@ -6772,7 +8161,7 @@
           <a:p>
             <a:r>
               <a:rPr lang="en-GB" dirty="0" smtClean="0"/>
-              <a:t>Lessons learned / summary</a:t>
+              <a:t>Benefits</a:t>
             </a:r>
             <a:endParaRPr lang="en-GB" dirty="0"/>
           </a:p>
@@ -6797,13 +8186,13 @@
               <a:rPr lang="de-CH" smtClean="0"/>
               <a:t>Slide </a:t>
             </a:r>
-            <a:fld id="{AC414180-5DCA-4A62-ABA9-AFBA950B3D21}" type="slidenum">
+            <a:fld id="{39211C95-BBEF-4666-AA42-B0A19763FDC5}" type="slidenum">
               <a:rPr lang="de-CH" smtClean="0"/>
               <a:t>15</a:t>
             </a:fld>
             <a:r>
               <a:rPr lang="de-CH" smtClean="0"/>
-              <a:t> of 16</a:t>
+              <a:t> of 18</a:t>
             </a:r>
             <a:endParaRPr dirty="0"/>
           </a:p>
@@ -6812,7 +8201,7 @@
     </p:spTree>
     <p:extLst>
       <p:ext uri="{BB962C8B-B14F-4D97-AF65-F5344CB8AC3E}">
-        <p14:creationId xmlns:p14="http://schemas.microsoft.com/office/powerpoint/2010/main" val="351525945"/>
+        <p14:creationId xmlns:p14="http://schemas.microsoft.com/office/powerpoint/2010/main" val="799228113"/>
       </p:ext>
     </p:extLst>
   </p:cSld>
@@ -6863,7 +8252,7 @@
           <a:p>
             <a:r>
               <a:rPr lang="en-GB" dirty="0" smtClean="0"/>
-              <a:t>Sources</a:t>
+              <a:t>Pure Functions</a:t>
             </a:r>
             <a:endParaRPr lang="en-GB" dirty="0"/>
           </a:p>
@@ -6889,9 +8278,63 @@
               <a:buChar char="•"/>
             </a:pPr>
             <a:r>
-              <a:rPr lang="en-GB" dirty="0"/>
-              <a:t>http://de.slideshare.net/vkostyukov/purely-functional-data-structures-in-scala-26175521</a:t>
-            </a:r>
+              <a:rPr lang="en-GB" dirty="0" smtClean="0"/>
+              <a:t>Obviously, there will be functions with side effects (I/O, global state, user input …)</a:t>
+            </a:r>
+          </a:p>
+          <a:p>
+            <a:pPr marL="342900" indent="-342900">
+              <a:buFont typeface="Arial" panose="020B0604020202020204" pitchFamily="34" charset="0"/>
+              <a:buChar char="•"/>
+            </a:pPr>
+            <a:r>
+              <a:rPr lang="en-GB" dirty="0" smtClean="0"/>
+              <a:t>The idea is to refactor as many of your functions into pure functions as possible and wrap them into a shell, which handles side effects</a:t>
+            </a:r>
+          </a:p>
+          <a:p>
+            <a:pPr marL="342900" indent="-342900">
+              <a:buFont typeface="Arial" panose="020B0604020202020204" pitchFamily="34" charset="0"/>
+              <a:buChar char="•"/>
+            </a:pPr>
+            <a:r>
+              <a:rPr lang="en-GB" dirty="0" smtClean="0"/>
+              <a:t>Keep a “healthy balance” between pure and impure functions</a:t>
+            </a:r>
+          </a:p>
+          <a:p>
+            <a:pPr marL="342900" indent="-342900">
+              <a:buFont typeface="Arial" panose="020B0604020202020204" pitchFamily="34" charset="0"/>
+              <a:buChar char="•"/>
+            </a:pPr>
+            <a:endParaRPr lang="en-GB" dirty="0" smtClean="0"/>
+          </a:p>
+          <a:p>
+            <a:r>
+              <a:rPr lang="en-GB" dirty="0" smtClean="0"/>
+              <a:t>Useful data structures</a:t>
+            </a:r>
+          </a:p>
+          <a:p>
+            <a:pPr marL="342900" indent="-342900">
+              <a:buFont typeface="Arial" panose="020B0604020202020204" pitchFamily="34" charset="0"/>
+              <a:buChar char="•"/>
+            </a:pPr>
+            <a:r>
+              <a:rPr lang="en-GB" dirty="0" smtClean="0"/>
+              <a:t>Try[T] – Encapsulates exceptions: Disconnects error handling and recovery, forces the caller to deal with the possibility of error.</a:t>
+            </a:r>
+          </a:p>
+          <a:p>
+            <a:pPr marL="342900" indent="-342900">
+              <a:buFont typeface="Arial" panose="020B0604020202020204" pitchFamily="34" charset="0"/>
+              <a:buChar char="•"/>
+            </a:pPr>
+            <a:r>
+              <a:rPr lang="en-GB" dirty="0" smtClean="0"/>
+              <a:t>Option[T] – Represents a value which might be null</a:t>
+            </a:r>
+            <a:endParaRPr lang="en-GB" dirty="0"/>
           </a:p>
         </p:txBody>
       </p:sp>
@@ -6956,6 +8399,10 @@
           <a:bodyPr/>
           <a:lstStyle/>
           <a:p>
+            <a:r>
+              <a:rPr lang="en-GB" dirty="0" smtClean="0"/>
+              <a:t>But how do I get there?</a:t>
+            </a:r>
             <a:endParaRPr lang="en-GB" dirty="0"/>
           </a:p>
         </p:txBody>
@@ -6979,13 +8426,374 @@
               <a:rPr lang="de-CH" smtClean="0"/>
               <a:t>Slide </a:t>
             </a:r>
-            <a:fld id="{528E1E5F-0771-4A67-9931-BE430C8C1244}" type="slidenum">
+            <a:fld id="{484819BD-779B-442D-ADED-D82C7CEA5069}" type="slidenum">
               <a:rPr lang="de-CH" smtClean="0"/>
               <a:t>16</a:t>
             </a:fld>
             <a:r>
               <a:rPr lang="de-CH" smtClean="0"/>
-              <a:t> of 16</a:t>
+              <a:t> of 18</a:t>
+            </a:r>
+            <a:endParaRPr dirty="0"/>
+          </a:p>
+        </p:txBody>
+      </p:sp>
+    </p:spTree>
+    <p:extLst>
+      <p:ext uri="{BB962C8B-B14F-4D97-AF65-F5344CB8AC3E}">
+        <p14:creationId xmlns:p14="http://schemas.microsoft.com/office/powerpoint/2010/main" val="3426570471"/>
+      </p:ext>
+    </p:extLst>
+  </p:cSld>
+  <p:clrMapOvr>
+    <a:masterClrMapping/>
+  </p:clrMapOvr>
+  <p:timing>
+    <p:tnLst>
+      <p:par>
+        <p:cTn id="1" dur="indefinite" restart="never" nodeType="tmRoot"/>
+      </p:par>
+    </p:tnLst>
+  </p:timing>
+</p:sld>
+</file>
+
+<file path=ppt/slides/slide17.xml><?xml version="1.0" encoding="utf-8"?>
+<p:sld xmlns:a="http://schemas.openxmlformats.org/drawingml/2006/main" xmlns:r="http://schemas.openxmlformats.org/officeDocument/2006/relationships" xmlns:p="http://schemas.openxmlformats.org/presentationml/2006/main">
+  <p:cSld>
+    <p:spTree>
+      <p:nvGrpSpPr>
+        <p:cNvPr id="1" name=""/>
+        <p:cNvGrpSpPr/>
+        <p:nvPr/>
+      </p:nvGrpSpPr>
+      <p:grpSpPr>
+        <a:xfrm>
+          <a:off x="0" y="0"/>
+          <a:ext cx="0" cy="0"/>
+          <a:chOff x="0" y="0"/>
+          <a:chExt cx="0" cy="0"/>
+        </a:xfrm>
+      </p:grpSpPr>
+      <p:sp>
+        <p:nvSpPr>
+          <p:cNvPr id="2" name="Title 1"/>
+          <p:cNvSpPr>
+            <a:spLocks noGrp="1"/>
+          </p:cNvSpPr>
+          <p:nvPr>
+            <p:ph type="title"/>
+          </p:nvPr>
+        </p:nvSpPr>
+        <p:spPr/>
+        <p:txBody>
+          <a:bodyPr/>
+          <a:lstStyle/>
+          <a:p>
+            <a:r>
+              <a:rPr lang="en-GB" dirty="0" smtClean="0"/>
+              <a:t>Pure Functions</a:t>
+            </a:r>
+            <a:endParaRPr lang="en-GB" dirty="0"/>
+          </a:p>
+        </p:txBody>
+      </p:sp>
+      <p:sp>
+        <p:nvSpPr>
+          <p:cNvPr id="3" name="Content Placeholder 2"/>
+          <p:cNvSpPr>
+            <a:spLocks noGrp="1"/>
+          </p:cNvSpPr>
+          <p:nvPr>
+            <p:ph idx="1"/>
+          </p:nvPr>
+        </p:nvSpPr>
+        <p:spPr/>
+        <p:txBody>
+          <a:bodyPr/>
+          <a:lstStyle/>
+          <a:p>
+            <a:endParaRPr lang="en-GB" dirty="0"/>
+          </a:p>
+        </p:txBody>
+      </p:sp>
+      <p:sp>
+        <p:nvSpPr>
+          <p:cNvPr id="4" name="Date Placeholder 3"/>
+          <p:cNvSpPr>
+            <a:spLocks noGrp="1"/>
+          </p:cNvSpPr>
+          <p:nvPr>
+            <p:ph type="dt" sz="half" idx="10"/>
+          </p:nvPr>
+        </p:nvSpPr>
+        <p:spPr/>
+        <p:txBody>
+          <a:bodyPr/>
+          <a:lstStyle/>
+          <a:p>
+            <a:r>
+              <a:rPr lang="de-CH" smtClean="0"/>
+              <a:t>14. September 2015</a:t>
+            </a:r>
+            <a:endParaRPr lang="de-CH" dirty="0"/>
+          </a:p>
+        </p:txBody>
+      </p:sp>
+      <p:sp>
+        <p:nvSpPr>
+          <p:cNvPr id="5" name="Footer Placeholder 4"/>
+          <p:cNvSpPr>
+            <a:spLocks noGrp="1"/>
+          </p:cNvSpPr>
+          <p:nvPr>
+            <p:ph type="ftr" sz="quarter" idx="11"/>
+          </p:nvPr>
+        </p:nvSpPr>
+        <p:spPr/>
+        <p:txBody>
+          <a:bodyPr/>
+          <a:lstStyle/>
+          <a:p>
+            <a:r>
+              <a:rPr lang="en-US" smtClean="0"/>
+              <a:t>Functional Design Patterns for OO Practicioners | Hendrik Schöneberg</a:t>
+            </a:r>
+            <a:endParaRPr lang="de-CH" dirty="0"/>
+          </a:p>
+        </p:txBody>
+      </p:sp>
+      <p:sp>
+        <p:nvSpPr>
+          <p:cNvPr id="7" name="Text Placeholder 6"/>
+          <p:cNvSpPr>
+            <a:spLocks noGrp="1"/>
+          </p:cNvSpPr>
+          <p:nvPr>
+            <p:ph type="body" sz="quarter" idx="13"/>
+          </p:nvPr>
+        </p:nvSpPr>
+        <p:spPr/>
+        <p:txBody>
+          <a:bodyPr/>
+          <a:lstStyle/>
+          <a:p>
+            <a:r>
+              <a:rPr lang="en-GB" dirty="0" smtClean="0"/>
+              <a:t>Lessons learned / summary</a:t>
+            </a:r>
+            <a:endParaRPr lang="en-GB" dirty="0"/>
+          </a:p>
+        </p:txBody>
+      </p:sp>
+      <p:sp>
+        <p:nvSpPr>
+          <p:cNvPr id="8" name="Slide Number Placeholder 7"/>
+          <p:cNvSpPr>
+            <a:spLocks noGrp="1"/>
+          </p:cNvSpPr>
+          <p:nvPr>
+            <p:ph type="sldNum" sz="quarter" idx="12"/>
+          </p:nvPr>
+        </p:nvSpPr>
+        <p:spPr/>
+        <p:txBody>
+          <a:bodyPr/>
+          <a:lstStyle/>
+          <a:p>
+            <a:r>
+              <a:rPr lang="de-CH" smtClean="0"/>
+              <a:t>Slide </a:t>
+            </a:r>
+            <a:fld id="{16C09E7D-4688-4431-B32E-CC39F02BF15F}" type="slidenum">
+              <a:rPr lang="de-CH" smtClean="0"/>
+              <a:t>17</a:t>
+            </a:fld>
+            <a:r>
+              <a:rPr lang="de-CH" smtClean="0"/>
+              <a:t> of 18</a:t>
+            </a:r>
+            <a:endParaRPr dirty="0"/>
+          </a:p>
+        </p:txBody>
+      </p:sp>
+    </p:spTree>
+    <p:extLst>
+      <p:ext uri="{BB962C8B-B14F-4D97-AF65-F5344CB8AC3E}">
+        <p14:creationId xmlns:p14="http://schemas.microsoft.com/office/powerpoint/2010/main" val="351525945"/>
+      </p:ext>
+    </p:extLst>
+  </p:cSld>
+  <p:clrMapOvr>
+    <a:masterClrMapping/>
+  </p:clrMapOvr>
+  <p:timing>
+    <p:tnLst>
+      <p:par>
+        <p:cTn id="1" dur="indefinite" restart="never" nodeType="tmRoot"/>
+      </p:par>
+    </p:tnLst>
+  </p:timing>
+</p:sld>
+</file>
+
+<file path=ppt/slides/slide18.xml><?xml version="1.0" encoding="utf-8"?>
+<p:sld xmlns:a="http://schemas.openxmlformats.org/drawingml/2006/main" xmlns:r="http://schemas.openxmlformats.org/officeDocument/2006/relationships" xmlns:p="http://schemas.openxmlformats.org/presentationml/2006/main">
+  <p:cSld>
+    <p:spTree>
+      <p:nvGrpSpPr>
+        <p:cNvPr id="1" name=""/>
+        <p:cNvGrpSpPr/>
+        <p:nvPr/>
+      </p:nvGrpSpPr>
+      <p:grpSpPr>
+        <a:xfrm>
+          <a:off x="0" y="0"/>
+          <a:ext cx="0" cy="0"/>
+          <a:chOff x="0" y="0"/>
+          <a:chExt cx="0" cy="0"/>
+        </a:xfrm>
+      </p:grpSpPr>
+      <p:sp>
+        <p:nvSpPr>
+          <p:cNvPr id="2" name="Title 1"/>
+          <p:cNvSpPr>
+            <a:spLocks noGrp="1"/>
+          </p:cNvSpPr>
+          <p:nvPr>
+            <p:ph type="title"/>
+          </p:nvPr>
+        </p:nvSpPr>
+        <p:spPr/>
+        <p:txBody>
+          <a:bodyPr/>
+          <a:lstStyle/>
+          <a:p>
+            <a:r>
+              <a:rPr lang="en-GB" dirty="0" smtClean="0"/>
+              <a:t>Sources</a:t>
+            </a:r>
+            <a:endParaRPr lang="en-GB" dirty="0"/>
+          </a:p>
+        </p:txBody>
+      </p:sp>
+      <p:sp>
+        <p:nvSpPr>
+          <p:cNvPr id="3" name="Content Placeholder 2"/>
+          <p:cNvSpPr>
+            <a:spLocks noGrp="1"/>
+          </p:cNvSpPr>
+          <p:nvPr>
+            <p:ph idx="1"/>
+          </p:nvPr>
+        </p:nvSpPr>
+        <p:spPr/>
+        <p:txBody>
+          <a:bodyPr/>
+          <a:lstStyle/>
+          <a:p>
+            <a:pPr marL="342900" indent="-342900">
+              <a:buFont typeface="Arial" panose="020B0604020202020204" pitchFamily="34" charset="0"/>
+              <a:buChar char="•"/>
+            </a:pPr>
+            <a:r>
+              <a:rPr lang="en-GB" dirty="0"/>
+              <a:t>http://de.slideshare.net/vkostyukov/purely-functional-data-structures-in-scala-26175521</a:t>
+            </a:r>
+          </a:p>
+        </p:txBody>
+      </p:sp>
+      <p:sp>
+        <p:nvSpPr>
+          <p:cNvPr id="4" name="Date Placeholder 3"/>
+          <p:cNvSpPr>
+            <a:spLocks noGrp="1"/>
+          </p:cNvSpPr>
+          <p:nvPr>
+            <p:ph type="dt" sz="half" idx="10"/>
+          </p:nvPr>
+        </p:nvSpPr>
+        <p:spPr/>
+        <p:txBody>
+          <a:bodyPr/>
+          <a:lstStyle/>
+          <a:p>
+            <a:r>
+              <a:rPr lang="de-CH" smtClean="0"/>
+              <a:t>14. September 2015</a:t>
+            </a:r>
+            <a:endParaRPr lang="de-CH" dirty="0"/>
+          </a:p>
+        </p:txBody>
+      </p:sp>
+      <p:sp>
+        <p:nvSpPr>
+          <p:cNvPr id="5" name="Footer Placeholder 4"/>
+          <p:cNvSpPr>
+            <a:spLocks noGrp="1"/>
+          </p:cNvSpPr>
+          <p:nvPr>
+            <p:ph type="ftr" sz="quarter" idx="11"/>
+          </p:nvPr>
+        </p:nvSpPr>
+        <p:spPr/>
+        <p:txBody>
+          <a:bodyPr/>
+          <a:lstStyle/>
+          <a:p>
+            <a:r>
+              <a:rPr lang="en-US" smtClean="0"/>
+              <a:t>Functional Design Patterns for OO Practicioners | Hendrik Schöneberg</a:t>
+            </a:r>
+            <a:endParaRPr lang="de-CH" dirty="0"/>
+          </a:p>
+        </p:txBody>
+      </p:sp>
+      <p:sp>
+        <p:nvSpPr>
+          <p:cNvPr id="7" name="Text Placeholder 6"/>
+          <p:cNvSpPr>
+            <a:spLocks noGrp="1"/>
+          </p:cNvSpPr>
+          <p:nvPr>
+            <p:ph type="body" sz="quarter" idx="13"/>
+          </p:nvPr>
+        </p:nvSpPr>
+        <p:spPr/>
+        <p:txBody>
+          <a:bodyPr/>
+          <a:lstStyle/>
+          <a:p>
+            <a:endParaRPr lang="en-GB" dirty="0"/>
+          </a:p>
+        </p:txBody>
+      </p:sp>
+      <p:sp>
+        <p:nvSpPr>
+          <p:cNvPr id="8" name="Slide Number Placeholder 7"/>
+          <p:cNvSpPr>
+            <a:spLocks noGrp="1"/>
+          </p:cNvSpPr>
+          <p:nvPr>
+            <p:ph type="sldNum" sz="quarter" idx="12"/>
+          </p:nvPr>
+        </p:nvSpPr>
+        <p:spPr/>
+        <p:txBody>
+          <a:bodyPr/>
+          <a:lstStyle/>
+          <a:p>
+            <a:r>
+              <a:rPr lang="de-CH" smtClean="0"/>
+              <a:t>Slide </a:t>
+            </a:r>
+            <a:fld id="{7E94BD52-0220-4EFF-84B9-5E7458EA3070}" type="slidenum">
+              <a:rPr lang="de-CH" smtClean="0"/>
+              <a:t>18</a:t>
+            </a:fld>
+            <a:r>
+              <a:rPr lang="de-CH" smtClean="0"/>
+              <a:t> of 18</a:t>
             </a:r>
             <a:endParaRPr dirty="0"/>
           </a:p>
@@ -7167,13 +8975,13 @@
               <a:rPr lang="de-CH" smtClean="0"/>
               <a:t>Slide </a:t>
             </a:r>
-            <a:fld id="{59F7E0BC-2031-4946-AFC1-8C113535E497}" type="slidenum">
+            <a:fld id="{6935C892-E99F-4566-9FBF-313733757B67}" type="slidenum">
               <a:rPr lang="de-CH" smtClean="0"/>
               <a:t>2</a:t>
             </a:fld>
             <a:r>
               <a:rPr lang="de-CH" smtClean="0"/>
-              <a:t> of 16</a:t>
+              <a:t> of 18</a:t>
             </a:r>
             <a:endParaRPr lang="de-CH" dirty="0"/>
           </a:p>
@@ -7460,13 +9268,13 @@
               <a:rPr lang="de-CH" smtClean="0"/>
               <a:t>Slide </a:t>
             </a:r>
-            <a:fld id="{94539F3D-6128-4850-BEE0-414BCD6A87F3}" type="slidenum">
+            <a:fld id="{275BA05D-B004-4679-A43F-B45386FB546C}" type="slidenum">
               <a:rPr lang="de-CH" smtClean="0"/>
               <a:t>3</a:t>
             </a:fld>
             <a:r>
               <a:rPr lang="de-CH" smtClean="0"/>
-              <a:t> of 16</a:t>
+              <a:t> of 18</a:t>
             </a:r>
             <a:endParaRPr lang="de-CH" dirty="0"/>
           </a:p>
@@ -7620,13 +9428,13 @@
               <a:rPr lang="de-CH" smtClean="0"/>
               <a:t>Slide </a:t>
             </a:r>
-            <a:fld id="{3C6980A2-719B-48C1-939A-B096D44D54C3}" type="slidenum">
+            <a:fld id="{D11B590F-B93D-4545-BF67-5E65FF5FCD5B}" type="slidenum">
               <a:rPr lang="de-CH" smtClean="0"/>
               <a:t>4</a:t>
             </a:fld>
             <a:r>
               <a:rPr lang="de-CH" smtClean="0"/>
-              <a:t> of 16</a:t>
+              <a:t> of 18</a:t>
             </a:r>
             <a:endParaRPr dirty="0"/>
           </a:p>
@@ -8811,13 +10619,13 @@
               <a:rPr lang="de-CH" smtClean="0"/>
               <a:t>Slide </a:t>
             </a:r>
-            <a:fld id="{54307195-FC9C-43C1-A990-CDEF90C0D718}" type="slidenum">
+            <a:fld id="{CE037749-75A8-41DB-9BA7-97C4580CB96D}" type="slidenum">
               <a:rPr lang="de-CH" smtClean="0"/>
               <a:t>5</a:t>
             </a:fld>
             <a:r>
               <a:rPr lang="de-CH" smtClean="0"/>
-              <a:t> of 16</a:t>
+              <a:t> of 18</a:t>
             </a:r>
             <a:endParaRPr lang="de-CH" dirty="0"/>
           </a:p>
@@ -8983,13 +10791,13 @@
               <a:rPr lang="de-CH" smtClean="0"/>
               <a:t>Slide </a:t>
             </a:r>
-            <a:fld id="{A04E7E7B-0202-4D55-935A-82C648693F30}" type="slidenum">
+            <a:fld id="{863974D0-D4CE-4A51-8348-512AA4709750}" type="slidenum">
               <a:rPr lang="de-CH" smtClean="0"/>
               <a:t>6</a:t>
             </a:fld>
             <a:r>
               <a:rPr lang="de-CH" smtClean="0"/>
-              <a:t> of 16</a:t>
+              <a:t> of 18</a:t>
             </a:r>
             <a:endParaRPr lang="de-CH" dirty="0"/>
           </a:p>
@@ -9730,13 +11538,13 @@
               <a:rPr lang="de-CH" smtClean="0"/>
               <a:t>Slide </a:t>
             </a:r>
-            <a:fld id="{D5924256-8618-46AB-82D1-D314ED88453B}" type="slidenum">
+            <a:fld id="{0D23A9E8-018D-4D47-AECF-49F68D1E1CF5}" type="slidenum">
               <a:rPr lang="de-CH" smtClean="0"/>
               <a:t>7</a:t>
             </a:fld>
             <a:r>
               <a:rPr lang="de-CH" smtClean="0"/>
-              <a:t> of 16</a:t>
+              <a:t> of 18</a:t>
             </a:r>
             <a:endParaRPr dirty="0"/>
           </a:p>
@@ -10940,13 +12748,13 @@
               <a:rPr lang="de-CH" smtClean="0"/>
               <a:t>Slide </a:t>
             </a:r>
-            <a:fld id="{4F979BB0-3855-47A3-97C8-5FE9D152A0F9}" type="slidenum">
+            <a:fld id="{8705A771-FA01-4A59-948E-F1C278E3D1EE}" type="slidenum">
               <a:rPr lang="de-CH" smtClean="0"/>
               <a:t>8</a:t>
             </a:fld>
             <a:r>
               <a:rPr lang="de-CH" smtClean="0"/>
-              <a:t> of 16</a:t>
+              <a:t> of 18</a:t>
             </a:r>
             <a:endParaRPr dirty="0"/>
           </a:p>
@@ -11344,13 +13152,13 @@
               <a:rPr lang="de-CH" smtClean="0"/>
               <a:t>Slide </a:t>
             </a:r>
-            <a:fld id="{A63BC457-E396-41ED-8D47-5735F24E1085}" type="slidenum">
+            <a:fld id="{B75737A2-8693-476B-901D-10A56CAAA92D}" type="slidenum">
               <a:rPr lang="de-CH" smtClean="0"/>
               <a:t>9</a:t>
             </a:fld>
             <a:r>
               <a:rPr lang="de-CH" smtClean="0"/>
-              <a:t> of 16</a:t>
+              <a:t> of 18</a:t>
             </a:r>
             <a:endParaRPr dirty="0"/>
           </a:p>
@@ -11364,7 +13172,7 @@
         </p:nvSpPr>
         <p:spPr>
           <a:xfrm>
-            <a:off x="899592" y="2348880"/>
+            <a:off x="2339752" y="2060848"/>
             <a:ext cx="1152128" cy="720080"/>
           </a:xfrm>
           <a:prstGeom prst="rect">
@@ -11401,13 +13209,13 @@
           <a:p>
             <a:pPr algn="ctr"/>
             <a:r>
-              <a:rPr lang="en-GB" sz="2200" dirty="0">
+              <a:rPr lang="en-GB" sz="2200" dirty="0" smtClean="0">
                 <a:solidFill>
                   <a:schemeClr val="tx2"/>
                 </a:solidFill>
                 <a:latin typeface="AA Zuehlke" pitchFamily="2" charset="0"/>
               </a:rPr>
-              <a:t>A</a:t>
+              <a:t>Person</a:t>
             </a:r>
             <a:endParaRPr lang="en-GB" sz="2200" dirty="0" smtClean="0">
               <a:solidFill>
@@ -11426,7 +13234,7 @@
         </p:nvSpPr>
         <p:spPr>
           <a:xfrm>
-            <a:off x="2411760" y="2348880"/>
+            <a:off x="3851920" y="2060848"/>
             <a:ext cx="1152128" cy="720080"/>
           </a:xfrm>
           <a:prstGeom prst="rect">
@@ -11469,7 +13277,7 @@
                 </a:solidFill>
                 <a:latin typeface="AA Zuehlke" pitchFamily="2" charset="0"/>
               </a:rPr>
-              <a:t>B</a:t>
+              <a:t>Contact</a:t>
             </a:r>
             <a:endParaRPr lang="en-GB" sz="2200" dirty="0" smtClean="0">
               <a:solidFill>
@@ -11488,7 +13296,7 @@
         </p:nvSpPr>
         <p:spPr>
           <a:xfrm>
-            <a:off x="3923928" y="2348880"/>
+            <a:off x="5364088" y="2060848"/>
             <a:ext cx="1152128" cy="720080"/>
           </a:xfrm>
           <a:prstGeom prst="rect">
@@ -11531,131 +13339,7 @@
                 </a:solidFill>
                 <a:latin typeface="AA Zuehlke" pitchFamily="2" charset="0"/>
               </a:rPr>
-              <a:t>C</a:t>
-            </a:r>
-            <a:endParaRPr lang="en-GB" sz="2200" dirty="0" smtClean="0">
-              <a:solidFill>
-                <a:schemeClr val="tx2"/>
-              </a:solidFill>
-              <a:latin typeface="AA Zuehlke" pitchFamily="2" charset="0"/>
-            </a:endParaRPr>
-          </a:p>
-        </p:txBody>
-      </p:sp>
-      <p:sp>
-        <p:nvSpPr>
-          <p:cNvPr id="12" name="Rectangle 11"/>
-          <p:cNvSpPr/>
-          <p:nvPr/>
-        </p:nvSpPr>
-        <p:spPr>
-          <a:xfrm>
-            <a:off x="5436096" y="2348880"/>
-            <a:ext cx="1152128" cy="720080"/>
-          </a:xfrm>
-          <a:prstGeom prst="rect">
-            <a:avLst/>
-          </a:prstGeom>
-          <a:solidFill>
-            <a:schemeClr val="bg1"/>
-          </a:solidFill>
-          <a:ln w="12700">
-            <a:solidFill>
-              <a:schemeClr val="accent1"/>
-            </a:solidFill>
-          </a:ln>
-        </p:spPr>
-        <p:style>
-          <a:lnRef idx="2">
-            <a:schemeClr val="accent1">
-              <a:shade val="50000"/>
-            </a:schemeClr>
-          </a:lnRef>
-          <a:fillRef idx="1">
-            <a:schemeClr val="accent1"/>
-          </a:fillRef>
-          <a:effectRef idx="0">
-            <a:schemeClr val="accent1"/>
-          </a:effectRef>
-          <a:fontRef idx="minor">
-            <a:schemeClr val="lt1"/>
-          </a:fontRef>
-        </p:style>
-        <p:txBody>
-          <a:bodyPr rtlCol="0" anchor="ctr"/>
-          <a:lstStyle/>
-          <a:p>
-            <a:pPr algn="ctr"/>
-            <a:r>
-              <a:rPr lang="en-GB" sz="2200" dirty="0" smtClean="0">
-                <a:solidFill>
-                  <a:schemeClr val="tx2"/>
-                </a:solidFill>
-                <a:latin typeface="AA Zuehlke" pitchFamily="2" charset="0"/>
-              </a:rPr>
-              <a:t>D</a:t>
-            </a:r>
-            <a:endParaRPr lang="en-GB" sz="2200" dirty="0" smtClean="0">
-              <a:solidFill>
-                <a:schemeClr val="tx2"/>
-              </a:solidFill>
-              <a:latin typeface="AA Zuehlke" pitchFamily="2" charset="0"/>
-            </a:endParaRPr>
-          </a:p>
-        </p:txBody>
-      </p:sp>
-      <p:sp>
-        <p:nvSpPr>
-          <p:cNvPr id="13" name="Rectangle 12"/>
-          <p:cNvSpPr/>
-          <p:nvPr/>
-        </p:nvSpPr>
-        <p:spPr>
-          <a:xfrm>
-            <a:off x="6948264" y="2348880"/>
-            <a:ext cx="1152128" cy="720080"/>
-          </a:xfrm>
-          <a:prstGeom prst="rect">
-            <a:avLst/>
-          </a:prstGeom>
-          <a:solidFill>
-            <a:schemeClr val="bg1"/>
-          </a:solidFill>
-          <a:ln w="12700">
-            <a:solidFill>
-              <a:schemeClr val="accent1"/>
-            </a:solidFill>
-          </a:ln>
-        </p:spPr>
-        <p:style>
-          <a:lnRef idx="2">
-            <a:schemeClr val="accent1">
-              <a:shade val="50000"/>
-            </a:schemeClr>
-          </a:lnRef>
-          <a:fillRef idx="1">
-            <a:schemeClr val="accent1"/>
-          </a:fillRef>
-          <a:effectRef idx="0">
-            <a:schemeClr val="accent1"/>
-          </a:effectRef>
-          <a:fontRef idx="minor">
-            <a:schemeClr val="lt1"/>
-          </a:fontRef>
-        </p:style>
-        <p:txBody>
-          <a:bodyPr rtlCol="0" anchor="ctr"/>
-          <a:lstStyle/>
-          <a:p>
-            <a:pPr algn="ctr"/>
-            <a:r>
-              <a:rPr lang="en-GB" sz="2200" dirty="0" smtClean="0">
-                <a:solidFill>
-                  <a:schemeClr val="tx2"/>
-                </a:solidFill>
-                <a:latin typeface="AA Zuehlke" pitchFamily="2" charset="0"/>
-              </a:rPr>
-              <a:t>E</a:t>
+              <a:t>Address</a:t>
             </a:r>
             <a:endParaRPr lang="en-GB" sz="2200" dirty="0" smtClean="0">
               <a:solidFill>
@@ -11674,7 +13358,7 @@
         </p:nvCxnSpPr>
         <p:spPr>
           <a:xfrm>
-            <a:off x="2051720" y="2708920"/>
+            <a:off x="3491880" y="2420888"/>
             <a:ext cx="360040" cy="0"/>
           </a:xfrm>
           <a:prstGeom prst="straightConnector1">
@@ -11709,7 +13393,7 @@
         </p:nvCxnSpPr>
         <p:spPr>
           <a:xfrm>
-            <a:off x="3563888" y="2708920"/>
+            <a:off x="5004048" y="2420888"/>
             <a:ext cx="360040" cy="0"/>
           </a:xfrm>
           <a:prstGeom prst="straightConnector1">
@@ -11734,75 +13418,6 @@
           </a:fontRef>
         </p:style>
       </p:cxnSp>
-      <p:cxnSp>
-        <p:nvCxnSpPr>
-          <p:cNvPr id="19" name="Straight Arrow Connector 18"/>
-          <p:cNvCxnSpPr>
-            <a:stCxn id="11" idx="3"/>
-            <a:endCxn id="12" idx="1"/>
-          </p:cNvCxnSpPr>
-          <p:nvPr/>
-        </p:nvCxnSpPr>
-        <p:spPr>
-          <a:xfrm>
-            <a:off x="5076056" y="2708920"/>
-            <a:ext cx="360040" cy="0"/>
-          </a:xfrm>
-          <a:prstGeom prst="straightConnector1">
-            <a:avLst/>
-          </a:prstGeom>
-          <a:ln w="25400">
-            <a:tailEnd type="triangle"/>
-          </a:ln>
-        </p:spPr>
-        <p:style>
-          <a:lnRef idx="1">
-            <a:schemeClr val="accent1"/>
-          </a:lnRef>
-          <a:fillRef idx="0">
-            <a:schemeClr val="accent1"/>
-          </a:fillRef>
-          <a:effectRef idx="0">
-            <a:schemeClr val="accent1"/>
-          </a:effectRef>
-          <a:fontRef idx="minor">
-            <a:schemeClr val="tx1"/>
-          </a:fontRef>
-        </p:style>
-      </p:cxnSp>
-      <p:cxnSp>
-        <p:nvCxnSpPr>
-          <p:cNvPr id="21" name="Straight Arrow Connector 20"/>
-          <p:cNvCxnSpPr/>
-          <p:nvPr/>
-        </p:nvCxnSpPr>
-        <p:spPr>
-          <a:xfrm>
-            <a:off x="6588224" y="2708920"/>
-            <a:ext cx="360040" cy="0"/>
-          </a:xfrm>
-          <a:prstGeom prst="straightConnector1">
-            <a:avLst/>
-          </a:prstGeom>
-          <a:ln w="25400">
-            <a:tailEnd type="triangle"/>
-          </a:ln>
-        </p:spPr>
-        <p:style>
-          <a:lnRef idx="1">
-            <a:schemeClr val="accent1"/>
-          </a:lnRef>
-          <a:fillRef idx="0">
-            <a:schemeClr val="accent1"/>
-          </a:fillRef>
-          <a:effectRef idx="0">
-            <a:schemeClr val="accent1"/>
-          </a:effectRef>
-          <a:fontRef idx="minor">
-            <a:schemeClr val="tx1"/>
-          </a:fontRef>
-        </p:style>
-      </p:cxnSp>
       <p:sp>
         <p:nvSpPr>
           <p:cNvPr id="24" name="TextBox 23"/>
@@ -11811,8 +13426,8 @@
         </p:nvSpPr>
         <p:spPr>
           <a:xfrm>
-            <a:off x="6948264" y="3068960"/>
-            <a:ext cx="1296144" cy="360040"/>
+            <a:off x="5354474" y="2777174"/>
+            <a:ext cx="1737805" cy="360040"/>
           </a:xfrm>
           <a:prstGeom prst="rect">
             <a:avLst/>
@@ -11829,13 +13444,7 @@
               <a:rPr lang="en-GB" sz="2200" dirty="0" smtClean="0">
                 <a:latin typeface="AA Zuehlke" pitchFamily="2" charset="0"/>
               </a:rPr>
-              <a:t>value: </a:t>
-            </a:r>
-            <a:r>
-              <a:rPr lang="en-GB" sz="2200" dirty="0" err="1" smtClean="0">
-                <a:latin typeface="AA Zuehlke" pitchFamily="2" charset="0"/>
-              </a:rPr>
-              <a:t>Int</a:t>
+              <a:t>street: String</a:t>
             </a:r>
             <a:endParaRPr lang="en-GB" sz="2200" dirty="0" smtClean="0">
               <a:latin typeface="AA Zuehlke" pitchFamily="2" charset="0"/>
@@ -11878,13 +13487,13 @@
                 </a:solidFill>
                 <a:latin typeface="AA Zuehlke" pitchFamily="2" charset="0"/>
               </a:rPr>
-              <a:t>value</a:t>
+              <a:t>street </a:t>
             </a:r>
             <a:r>
               <a:rPr lang="en-GB" sz="2200" dirty="0" smtClean="0">
                 <a:latin typeface="AA Zuehlke" pitchFamily="2" charset="0"/>
               </a:rPr>
-              <a:t> imperatively:</a:t>
+              <a:t>imperatively:</a:t>
             </a:r>
           </a:p>
           <a:p>
@@ -11897,13 +13506,25 @@
               <a:rPr lang="en-GB" sz="2200" dirty="0" err="1" smtClean="0">
                 <a:latin typeface="AA Zuehlke" pitchFamily="2" charset="0"/>
               </a:rPr>
-              <a:t>a.b.c.d.e</a:t>
+              <a:t>person.contact.address.street</a:t>
             </a:r>
             <a:r>
               <a:rPr lang="en-GB" sz="2200" dirty="0" smtClean="0">
                 <a:latin typeface="AA Zuehlke" pitchFamily="2" charset="0"/>
               </a:rPr>
-              <a:t> += 1</a:t>
+              <a:t> = “</a:t>
+            </a:r>
+            <a:r>
+              <a:rPr lang="en-GB" sz="2200" dirty="0" err="1" smtClean="0">
+                <a:latin typeface="AA Zuehlke" pitchFamily="2" charset="0"/>
+              </a:rPr>
+              <a:t>Wiesenstrasse</a:t>
+            </a:r>
+            <a:r>
+              <a:rPr lang="en-GB" sz="2200" dirty="0" smtClean="0">
+                <a:latin typeface="AA Zuehlke" pitchFamily="2" charset="0"/>
+              </a:rPr>
+              <a:t>”</a:t>
             </a:r>
             <a:endParaRPr lang="en-GB" sz="2200" dirty="0" smtClean="0">
               <a:latin typeface="AA Zuehlke" pitchFamily="2" charset="0"/>
@@ -11946,13 +13567,13 @@
                 </a:solidFill>
                 <a:latin typeface="AA Zuehlke" pitchFamily="2" charset="0"/>
               </a:rPr>
-              <a:t>value</a:t>
+              <a:t>street </a:t>
             </a:r>
             <a:r>
               <a:rPr lang="en-GB" sz="2200" dirty="0" smtClean="0">
                 <a:latin typeface="AA Zuehlke" pitchFamily="2" charset="0"/>
               </a:rPr>
-              <a:t> functional:</a:t>
+              <a:t>functionally:</a:t>
             </a:r>
           </a:p>
           <a:p>
@@ -11965,7 +13586,7 @@
               <a:rPr lang="en-GB" sz="2200" dirty="0" err="1" smtClean="0">
                 <a:latin typeface="AA Zuehlke" pitchFamily="2" charset="0"/>
               </a:rPr>
-              <a:t>a.copy</a:t>
+              <a:t>person.copy</a:t>
             </a:r>
             <a:r>
               <a:rPr lang="en-GB" sz="2200" dirty="0" smtClean="0">
@@ -11985,13 +13606,13 @@
               <a:rPr lang="en-GB" sz="2200" dirty="0" smtClean="0">
                 <a:latin typeface="AA Zuehlke" pitchFamily="2" charset="0"/>
               </a:rPr>
-              <a:t> b = </a:t>
+              <a:t> contact = </a:t>
             </a:r>
             <a:r>
               <a:rPr lang="en-GB" sz="2200" dirty="0" err="1" smtClean="0">
                 <a:latin typeface="AA Zuehlke" pitchFamily="2" charset="0"/>
               </a:rPr>
-              <a:t>a.b.copy</a:t>
+              <a:t>person.contact.copy</a:t>
             </a:r>
             <a:r>
               <a:rPr lang="en-GB" sz="2200" dirty="0" smtClean="0">
@@ -12005,13 +13626,13 @@
               <a:rPr lang="en-GB" sz="2200" dirty="0" smtClean="0">
                 <a:latin typeface="AA Zuehlke" pitchFamily="2" charset="0"/>
               </a:rPr>
-              <a:t>    c = </a:t>
+              <a:t>    address = </a:t>
             </a:r>
             <a:r>
               <a:rPr lang="en-GB" sz="2200" dirty="0" err="1" smtClean="0">
                 <a:latin typeface="AA Zuehlke" pitchFamily="2" charset="0"/>
               </a:rPr>
-              <a:t>a.b.c.copy</a:t>
+              <a:t>person.contact.address.copy</a:t>
             </a:r>
             <a:r>
               <a:rPr lang="en-GB" sz="2200" dirty="0" smtClean="0">
@@ -12031,53 +13652,27 @@
               <a:rPr lang="en-GB" sz="2200" dirty="0" smtClean="0">
                 <a:latin typeface="AA Zuehlke" pitchFamily="2" charset="0"/>
               </a:rPr>
-              <a:t>     d = </a:t>
+              <a:t>     street = “</a:t>
             </a:r>
             <a:r>
               <a:rPr lang="en-GB" sz="2200" dirty="0" err="1" smtClean="0">
                 <a:latin typeface="AA Zuehlke" pitchFamily="2" charset="0"/>
               </a:rPr>
-              <a:t>a.b.c.d.copy</a:t>
+              <a:t>Wiesenstrasse</a:t>
             </a:r>
             <a:r>
               <a:rPr lang="en-GB" sz="2200" dirty="0" smtClean="0">
                 <a:latin typeface="AA Zuehlke" pitchFamily="2" charset="0"/>
               </a:rPr>
-              <a:t>(</a:t>
-            </a:r>
-          </a:p>
-          <a:p>
-            <a:r>
-              <a:rPr lang="en-GB" sz="2200" dirty="0">
-                <a:latin typeface="AA Zuehlke" pitchFamily="2" charset="0"/>
-              </a:rPr>
-              <a:t> </a:t>
-            </a:r>
+              <a:t>”</a:t>
+            </a:r>
+          </a:p>
+          <a:p>
             <a:r>
               <a:rPr lang="en-GB" sz="2200" dirty="0" smtClean="0">
                 <a:latin typeface="AA Zuehlke" pitchFamily="2" charset="0"/>
               </a:rPr>
-              <a:t>       e = </a:t>
-            </a:r>
-            <a:r>
-              <a:rPr lang="en-GB" sz="2200" dirty="0" err="1" smtClean="0">
-                <a:latin typeface="AA Zuehlke" pitchFamily="2" charset="0"/>
-              </a:rPr>
-              <a:t>a.b.c.d.e</a:t>
-            </a:r>
-            <a:r>
-              <a:rPr lang="en-GB" sz="2200" dirty="0" smtClean="0">
-                <a:latin typeface="AA Zuehlke" pitchFamily="2" charset="0"/>
-              </a:rPr>
-              <a:t> + 1</a:t>
-            </a:r>
-          </a:p>
-          <a:p>
-            <a:r>
-              <a:rPr lang="en-GB" sz="2200" dirty="0" smtClean="0">
-                <a:latin typeface="AA Zuehlke" pitchFamily="2" charset="0"/>
-              </a:rPr>
-              <a:t>))))</a:t>
+              <a:t>)))</a:t>
             </a:r>
             <a:endParaRPr lang="en-GB" sz="2200" dirty="0">
               <a:latin typeface="AA Zuehlke" pitchFamily="2" charset="0"/>

</xml_diff>

<commit_message>
add ivos lenses slides and example
</commit_message>
<xml_diff>
--- a/hesc_slides.pptx
+++ b/hesc_slides.pptx
@@ -5,10 +5,10 @@
     <p:sldMasterId id="2147483648" r:id="rId1"/>
   </p:sldMasterIdLst>
   <p:notesMasterIdLst>
-    <p:notesMasterId r:id="rId20"/>
+    <p:notesMasterId r:id="rId21"/>
   </p:notesMasterIdLst>
   <p:handoutMasterIdLst>
-    <p:handoutMasterId r:id="rId21"/>
+    <p:handoutMasterId r:id="rId22"/>
   </p:handoutMasterIdLst>
   <p:sldIdLst>
     <p:sldId id="256" r:id="rId2"/>
@@ -22,32 +22,33 @@
     <p:sldId id="268" r:id="rId10"/>
     <p:sldId id="277" r:id="rId11"/>
     <p:sldId id="278" r:id="rId12"/>
-    <p:sldId id="275" r:id="rId13"/>
-    <p:sldId id="270" r:id="rId14"/>
-    <p:sldId id="274" r:id="rId15"/>
-    <p:sldId id="272" r:id="rId16"/>
-    <p:sldId id="273" r:id="rId17"/>
-    <p:sldId id="276" r:id="rId18"/>
-    <p:sldId id="265" r:id="rId19"/>
+    <p:sldId id="279" r:id="rId13"/>
+    <p:sldId id="275" r:id="rId14"/>
+    <p:sldId id="270" r:id="rId15"/>
+    <p:sldId id="274" r:id="rId16"/>
+    <p:sldId id="272" r:id="rId17"/>
+    <p:sldId id="273" r:id="rId18"/>
+    <p:sldId id="276" r:id="rId19"/>
+    <p:sldId id="265" r:id="rId20"/>
   </p:sldIdLst>
   <p:sldSz cx="9144000" cy="6858000" type="screen4x3"/>
   <p:notesSz cx="6858000" cy="9144000"/>
   <p:embeddedFontLst>
     <p:embeddedFont>
       <p:font typeface="AA Zuehlke" panose="02000503060000020004" pitchFamily="2" charset="0"/>
-      <p:regular r:id="rId22"/>
-      <p:italic r:id="rId23"/>
+      <p:regular r:id="rId23"/>
+      <p:italic r:id="rId24"/>
     </p:embeddedFont>
     <p:embeddedFont>
       <p:font typeface="Consolas" panose="020B0609020204030204" pitchFamily="49" charset="0"/>
-      <p:regular r:id="rId24"/>
-      <p:bold r:id="rId25"/>
-      <p:italic r:id="rId26"/>
-      <p:boldItalic r:id="rId27"/>
+      <p:regular r:id="rId25"/>
+      <p:bold r:id="rId26"/>
+      <p:italic r:id="rId27"/>
+      <p:boldItalic r:id="rId28"/>
     </p:embeddedFont>
   </p:embeddedFontLst>
   <p:custDataLst>
-    <p:tags r:id="rId28"/>
+    <p:tags r:id="rId29"/>
   </p:custDataLst>
   <p:defaultTextStyle>
     <a:defPPr>
@@ -288,7 +289,7 @@
               <a:rPr lang="de-DE" smtClean="0">
                 <a:latin typeface="AA Zuehlke" pitchFamily="2" charset="0"/>
               </a:rPr>
-              <a:t>14.09.2015</a:t>
+              <a:t>16.09.2015</a:t>
             </a:fld>
             <a:endParaRPr lang="de-DE">
               <a:latin typeface="AA Zuehlke" pitchFamily="2" charset="0"/>
@@ -466,7 +467,7 @@
             <a:fld id="{A6966AE6-B72D-4967-9CA3-8469D2863705}" type="datetimeFigureOut">
               <a:rPr lang="en-US" smtClean="0"/>
               <a:pPr/>
-              <a:t>9/14/2015</a:t>
+              <a:t>9/16/2015</a:t>
             </a:fld>
             <a:endParaRPr lang="en-US" dirty="0"/>
           </a:p>
@@ -855,14 +856,14 @@
               <a:rPr lang="de-CH" smtClean="0"/>
               <a:t>Slide </a:t>
             </a:r>
-            <a:fld id="{DCF0D9A2-CF23-4998-B1D3-EA910EA804FA}" type="slidenum">
+            <a:fld id="{CD2C778A-4BF0-4B25-9B66-27D4E2550857}" type="slidenum">
               <a:rPr smtClean="0"/>
               <a:pPr/>
               <a:t>‹#›</a:t>
             </a:fld>
             <a:r>
               <a:rPr lang="de-CH" smtClean="0"/>
-              <a:t> of 18</a:t>
+              <a:t> of 19</a:t>
             </a:r>
             <a:endParaRPr dirty="0"/>
           </a:p>
@@ -1179,14 +1180,14 @@
               <a:rPr lang="de-CH" smtClean="0"/>
               <a:t>Slide </a:t>
             </a:r>
-            <a:fld id="{172B9C6A-0EBA-4276-9342-C77C76605745}" type="slidenum">
+            <a:fld id="{875A64B9-98BF-45E6-864B-7B97294AB740}" type="slidenum">
               <a:rPr smtClean="0"/>
               <a:pPr/>
               <a:t>‹#›</a:t>
             </a:fld>
             <a:r>
               <a:rPr lang="de-CH" smtClean="0"/>
-              <a:t> of 18</a:t>
+              <a:t> of 19</a:t>
             </a:r>
             <a:endParaRPr dirty="0"/>
           </a:p>
@@ -1481,14 +1482,14 @@
               <a:rPr lang="de-CH" smtClean="0"/>
               <a:t>Slide </a:t>
             </a:r>
-            <a:fld id="{8B01422B-E74C-426F-A9ED-B41ECC56252E}" type="slidenum">
+            <a:fld id="{0E329646-FC6D-4124-8041-B9CDD11D8EE0}" type="slidenum">
               <a:rPr smtClean="0"/>
               <a:pPr/>
               <a:t>‹#›</a:t>
             </a:fld>
             <a:r>
               <a:rPr lang="de-CH" smtClean="0"/>
-              <a:t> of 18</a:t>
+              <a:t> of 19</a:t>
             </a:r>
             <a:endParaRPr dirty="0"/>
           </a:p>
@@ -1813,14 +1814,14 @@
               <a:rPr lang="de-CH" smtClean="0"/>
               <a:t>Slide </a:t>
             </a:r>
-            <a:fld id="{EC84B4B9-FFFF-4050-8F5E-402A498A59E7}" type="slidenum">
+            <a:fld id="{5EFB52B4-2A20-4E85-9CCD-17DB75DB1CD9}" type="slidenum">
               <a:rPr smtClean="0"/>
               <a:pPr/>
               <a:t>‹#›</a:t>
             </a:fld>
             <a:r>
               <a:rPr lang="de-CH" smtClean="0"/>
-              <a:t> of 18</a:t>
+              <a:t> of 19</a:t>
             </a:r>
             <a:endParaRPr dirty="0"/>
           </a:p>
@@ -2147,14 +2148,14 @@
               <a:rPr lang="de-CH" smtClean="0"/>
               <a:t>Slide </a:t>
             </a:r>
-            <a:fld id="{276722E3-6860-435F-9ECB-51A05CCC58A7}" type="slidenum">
+            <a:fld id="{E068726E-4A47-45B6-A894-6860790194A7}" type="slidenum">
               <a:rPr smtClean="0"/>
               <a:pPr/>
               <a:t>‹#›</a:t>
             </a:fld>
             <a:r>
               <a:rPr lang="de-CH" smtClean="0"/>
-              <a:t> of 18</a:t>
+              <a:t> of 19</a:t>
             </a:r>
             <a:endParaRPr dirty="0"/>
           </a:p>
@@ -2577,14 +2578,14 @@
               <a:rPr lang="de-CH" smtClean="0"/>
               <a:t>Slide </a:t>
             </a:r>
-            <a:fld id="{51C13657-0A59-4D52-8E89-FD242AF93930}" type="slidenum">
+            <a:fld id="{DB2B279F-DBC0-4F93-A7ED-007679C59D5D}" type="slidenum">
               <a:rPr smtClean="0"/>
               <a:pPr/>
               <a:t>‹#›</a:t>
             </a:fld>
             <a:r>
               <a:rPr lang="de-CH" smtClean="0"/>
-              <a:t> of 18</a:t>
+              <a:t> of 19</a:t>
             </a:r>
             <a:endParaRPr dirty="0"/>
           </a:p>
@@ -3295,14 +3296,14 @@
               <a:rPr lang="de-CH" smtClean="0"/>
               <a:t>Slide </a:t>
             </a:r>
-            <a:fld id="{3B3BB93E-A1E4-4D70-8206-DEA86A88D042}" type="slidenum">
+            <a:fld id="{D8354731-416F-493C-ACCD-51C1E1A37E4F}" type="slidenum">
               <a:rPr smtClean="0"/>
               <a:pPr/>
               <a:t>‹#›</a:t>
             </a:fld>
             <a:r>
               <a:rPr lang="de-CH" smtClean="0"/>
-              <a:t> of 18</a:t>
+              <a:t> of 19</a:t>
             </a:r>
             <a:endParaRPr dirty="0"/>
           </a:p>
@@ -3601,14 +3602,14 @@
               <a:rPr lang="de-CH" smtClean="0"/>
               <a:t>Slide </a:t>
             </a:r>
-            <a:fld id="{FDB5EE68-904C-423C-8100-3A9890185EFB}" type="slidenum">
+            <a:fld id="{9DB49E20-0210-46C1-B0E3-130D876F1A11}" type="slidenum">
               <a:rPr smtClean="0"/>
               <a:pPr/>
               <a:t>‹#›</a:t>
             </a:fld>
             <a:r>
               <a:rPr lang="de-CH" smtClean="0"/>
-              <a:t> of 18</a:t>
+              <a:t> of 19</a:t>
             </a:r>
             <a:endParaRPr dirty="0"/>
           </a:p>
@@ -4128,14 +4129,14 @@
               <a:rPr lang="de-CH" smtClean="0"/>
               <a:t>Slide </a:t>
             </a:r>
-            <a:fld id="{6DCD0536-3229-4233-ACAC-EC591E560AFB}" type="slidenum">
+            <a:fld id="{2B1A5FCC-4CB7-4CA5-A447-9C2EF1D0BFF5}" type="slidenum">
               <a:rPr smtClean="0"/>
               <a:pPr/>
               <a:t>‹#›</a:t>
             </a:fld>
             <a:r>
               <a:rPr lang="de-CH" smtClean="0"/>
-              <a:t> of 18</a:t>
+              <a:t> of 19</a:t>
             </a:r>
             <a:endParaRPr dirty="0"/>
           </a:p>
@@ -4526,14 +4527,14 @@
               <a:rPr lang="de-CH" smtClean="0"/>
               <a:t>Slide </a:t>
             </a:r>
-            <a:fld id="{1D926DB8-96D1-40A8-B7C2-CC77CAB0167C}" type="slidenum">
+            <a:fld id="{68BE7717-AF40-452C-B837-14EF2812D93A}" type="slidenum">
               <a:rPr smtClean="0"/>
               <a:pPr/>
               <a:t>‹#›</a:t>
             </a:fld>
             <a:r>
               <a:rPr lang="de-CH" smtClean="0"/>
-              <a:t> of 18</a:t>
+              <a:t> of 19</a:t>
             </a:r>
             <a:endParaRPr dirty="0"/>
           </a:p>
@@ -4756,14 +4757,14 @@
               <a:rPr lang="de-CH" smtClean="0"/>
               <a:t>Slide </a:t>
             </a:r>
-            <a:fld id="{26323A8D-B527-45B6-A1F8-8B95866C29CE}" type="slidenum">
+            <a:fld id="{150CD44E-8185-4A8A-B23D-764DE233E68E}" type="slidenum">
               <a:rPr smtClean="0"/>
               <a:pPr/>
               <a:t>‹#›</a:t>
             </a:fld>
             <a:r>
               <a:rPr lang="de-CH" smtClean="0"/>
-              <a:t> of 18</a:t>
+              <a:t> of 19</a:t>
             </a:r>
             <a:endParaRPr dirty="0"/>
           </a:p>
@@ -5034,14 +5035,14 @@
               <a:rPr lang="de-CH" smtClean="0"/>
               <a:t>Slide </a:t>
             </a:r>
-            <a:fld id="{A79A9DFA-5F7A-40DE-A409-3225D6CF185C}" type="slidenum">
+            <a:fld id="{E9FC2FF4-4403-4B96-9AD6-C4E510E1B03D}" type="slidenum">
               <a:rPr smtClean="0"/>
               <a:pPr/>
               <a:t>‹#›</a:t>
             </a:fld>
             <a:r>
               <a:rPr lang="de-CH" smtClean="0"/>
-              <a:t> of 18</a:t>
+              <a:t> of 19</a:t>
             </a:r>
             <a:endParaRPr dirty="0"/>
           </a:p>
@@ -5505,13 +5506,13 @@
               <a:rPr lang="de-CH" smtClean="0"/>
               <a:t>Slide </a:t>
             </a:r>
-            <a:fld id="{6D57DEB1-EA01-4DAA-BE55-1BCDF64F2DBD}" type="slidenum">
+            <a:fld id="{C15F6703-8EFF-4BB0-B378-C8A1FE12EB60}" type="slidenum">
               <a:rPr lang="de-CH" smtClean="0"/>
               <a:t>1</a:t>
             </a:fld>
             <a:r>
               <a:rPr lang="de-CH" smtClean="0"/>
-              <a:t> of 18</a:t>
+              <a:t> of 19</a:t>
             </a:r>
             <a:endParaRPr lang="de-CH" dirty="0"/>
           </a:p>
@@ -5623,13 +5624,13 @@
               <a:rPr lang="de-CH" smtClean="0"/>
               <a:t>Slide </a:t>
             </a:r>
-            <a:fld id="{46D3EF20-6FC0-440C-8F36-1C9C0F08572D}" type="slidenum">
+            <a:fld id="{DC742340-A5F0-4A24-A22E-8FCA14028772}" type="slidenum">
               <a:rPr lang="de-CH" smtClean="0"/>
               <a:t>10</a:t>
             </a:fld>
             <a:r>
               <a:rPr lang="de-CH" smtClean="0"/>
-              <a:t> of 18</a:t>
+              <a:t> of 19</a:t>
             </a:r>
             <a:endParaRPr dirty="0"/>
           </a:p>
@@ -5654,7 +5655,6 @@
               <a:rPr lang="en-GB" dirty="0"/>
               <a:t>Modify nested immutable objects</a:t>
             </a:r>
-            <a:endParaRPr lang="en-GB" dirty="0"/>
           </a:p>
         </p:txBody>
       </p:sp>
@@ -7232,7 +7232,6 @@
               <a:rPr lang="en-GB" dirty="0"/>
               <a:t>Modify nested immutable objects</a:t>
             </a:r>
-            <a:endParaRPr lang="en-GB" dirty="0"/>
           </a:p>
         </p:txBody>
       </p:sp>
@@ -7283,13 +7282,13 @@
               <a:rPr lang="de-CH" smtClean="0"/>
               <a:t>Slide </a:t>
             </a:r>
-            <a:fld id="{E64627FD-4AAD-4869-9460-34B559B072F2}" type="slidenum">
+            <a:fld id="{869EECD8-EB26-4EC6-A546-5E213E273806}" type="slidenum">
               <a:rPr lang="de-CH" smtClean="0"/>
               <a:t>11</a:t>
             </a:fld>
             <a:r>
               <a:rPr lang="de-CH" smtClean="0"/>
-              <a:t> of 18</a:t>
+              <a:t> of 19</a:t>
             </a:r>
             <a:endParaRPr dirty="0"/>
           </a:p>
@@ -7334,7 +7333,58 @@
       </p:grpSpPr>
       <p:sp>
         <p:nvSpPr>
-          <p:cNvPr id="2" name="Title 1"/>
+          <p:cNvPr id="10" name="Rectangle 9"/>
+          <p:cNvSpPr/>
+          <p:nvPr/>
+        </p:nvSpPr>
+        <p:spPr>
+          <a:xfrm>
+            <a:off x="579816" y="2217087"/>
+            <a:ext cx="7984368" cy="1639647"/>
+          </a:xfrm>
+          <a:prstGeom prst="rect">
+            <a:avLst/>
+          </a:prstGeom>
+          <a:solidFill>
+            <a:schemeClr val="accent2">
+              <a:lumMod val="40000"/>
+              <a:lumOff val="60000"/>
+            </a:schemeClr>
+          </a:solidFill>
+          <a:ln w="12700">
+            <a:noFill/>
+          </a:ln>
+        </p:spPr>
+        <p:style>
+          <a:lnRef idx="2">
+            <a:schemeClr val="accent1">
+              <a:shade val="50000"/>
+            </a:schemeClr>
+          </a:lnRef>
+          <a:fillRef idx="1">
+            <a:schemeClr val="accent1"/>
+          </a:fillRef>
+          <a:effectRef idx="0">
+            <a:schemeClr val="accent1"/>
+          </a:effectRef>
+          <a:fontRef idx="minor">
+            <a:schemeClr val="lt1"/>
+          </a:fontRef>
+        </p:style>
+        <p:txBody>
+          <a:bodyPr rtlCol="0" anchor="ctr"/>
+          <a:lstStyle/>
+          <a:p>
+            <a:pPr algn="ctr"/>
+            <a:endParaRPr lang="de-CH" sz="2200" dirty="0" err="1" smtClean="0">
+              <a:latin typeface="AA Zuehlke" pitchFamily="2" charset="0"/>
+            </a:endParaRPr>
+          </a:p>
+        </p:txBody>
+      </p:sp>
+      <p:sp>
+        <p:nvSpPr>
+          <p:cNvPr id="17" name="Title 1"/>
           <p:cNvSpPr>
             <a:spLocks noGrp="1"/>
           </p:cNvSpPr>
@@ -7349,7 +7399,7 @@
           <a:p>
             <a:r>
               <a:rPr lang="en-GB" dirty="0" smtClean="0"/>
-              <a:t>Immutability</a:t>
+              <a:t>Lenses</a:t>
             </a:r>
             <a:endParaRPr lang="en-GB" dirty="0"/>
           </a:p>
@@ -7370,35 +7420,172 @@
           <a:bodyPr/>
           <a:lstStyle/>
           <a:p>
-            <a:pPr marL="342900" indent="-342900">
-              <a:buFont typeface="Arial" panose="020B0604020202020204" pitchFamily="34" charset="0"/>
-              <a:buChar char="•"/>
+            <a:r>
+              <a:rPr lang="de-CH" sz="2000" b="1" dirty="0" smtClean="0"/>
+              <a:t>Libraries</a:t>
+            </a:r>
+            <a:endParaRPr lang="de-CH" sz="2000" b="1" dirty="0"/>
+          </a:p>
+          <a:p>
+            <a:pPr marL="177800">
+              <a:spcBef>
+                <a:spcPts val="1200"/>
+              </a:spcBef>
+              <a:tabLst>
+                <a:tab pos="541338" algn="l"/>
+              </a:tabLst>
             </a:pPr>
             <a:r>
-              <a:rPr lang="en-GB" dirty="0" smtClean="0"/>
-              <a:t>Immutability is generally desirable</a:t>
-            </a:r>
-          </a:p>
-          <a:p>
-            <a:pPr marL="342900" indent="-342900">
-              <a:buFont typeface="Arial" panose="020B0604020202020204" pitchFamily="34" charset="0"/>
-              <a:buChar char="•"/>
+              <a:rPr lang="de-CH" sz="2000" b="1" dirty="0" err="1" smtClean="0">
+                <a:latin typeface="Consolas" panose="020B0609020204030204" pitchFamily="49" charset="0"/>
+                <a:cs typeface="Consolas" panose="020B0609020204030204" pitchFamily="49" charset="0"/>
+              </a:rPr>
+              <a:t>import</a:t>
+            </a:r>
+            <a:r>
+              <a:rPr lang="de-CH" sz="2000" b="1" dirty="0" smtClean="0">
+                <a:latin typeface="Consolas" panose="020B0609020204030204" pitchFamily="49" charset="0"/>
+                <a:cs typeface="Consolas" panose="020B0609020204030204" pitchFamily="49" charset="0"/>
+              </a:rPr>
+              <a:t> </a:t>
+            </a:r>
+            <a:r>
+              <a:rPr lang="de-CH" sz="2000" dirty="0" err="1" smtClean="0">
+                <a:latin typeface="Consolas" panose="020B0609020204030204" pitchFamily="49" charset="0"/>
+                <a:cs typeface="Consolas" panose="020B0609020204030204" pitchFamily="49" charset="0"/>
+              </a:rPr>
+              <a:t>rillit.Lenser</a:t>
+            </a:r>
+            <a:r>
+              <a:rPr lang="de-CH" sz="2000" dirty="0" smtClean="0">
+                <a:latin typeface="Consolas" panose="020B0609020204030204" pitchFamily="49" charset="0"/>
+                <a:cs typeface="Consolas" panose="020B0609020204030204" pitchFamily="49" charset="0"/>
+              </a:rPr>
+              <a:t>, </a:t>
+            </a:r>
+            <a:r>
+              <a:rPr lang="de-CH" sz="2000" dirty="0" err="1" smtClean="0">
+                <a:latin typeface="Consolas" panose="020B0609020204030204" pitchFamily="49" charset="0"/>
+                <a:cs typeface="Consolas" panose="020B0609020204030204" pitchFamily="49" charset="0"/>
+              </a:rPr>
+              <a:t>shapeless.Lens</a:t>
+            </a:r>
+            <a:endParaRPr lang="de-CH" sz="2000" dirty="0" smtClean="0">
+              <a:latin typeface="Consolas" panose="020B0609020204030204" pitchFamily="49" charset="0"/>
+              <a:cs typeface="Consolas" panose="020B0609020204030204" pitchFamily="49" charset="0"/>
+            </a:endParaRPr>
+          </a:p>
+          <a:p>
+            <a:pPr marL="177800">
+              <a:spcBef>
+                <a:spcPts val="600"/>
+              </a:spcBef>
+              <a:tabLst>
+                <a:tab pos="541338" algn="l"/>
+              </a:tabLst>
             </a:pPr>
-            <a:r>
-              <a:rPr lang="en-GB" dirty="0" smtClean="0"/>
-              <a:t>Existing code should be refactored or new code should be written with immutability in mind</a:t>
-            </a:r>
-          </a:p>
-          <a:p>
-            <a:pPr marL="342900" indent="-342900">
-              <a:buFont typeface="Arial" panose="020B0604020202020204" pitchFamily="34" charset="0"/>
-              <a:buChar char="•"/>
+            <a:endParaRPr lang="en-US" sz="2000" b="1" dirty="0" smtClean="0">
+              <a:latin typeface="Consolas" panose="020B0609020204030204" pitchFamily="49" charset="0"/>
+              <a:cs typeface="Consolas" panose="020B0609020204030204" pitchFamily="49" charset="0"/>
+            </a:endParaRPr>
+          </a:p>
+          <a:p>
+            <a:pPr marL="177800">
+              <a:spcBef>
+                <a:spcPts val="600"/>
+              </a:spcBef>
+              <a:tabLst>
+                <a:tab pos="541338" algn="l"/>
+              </a:tabLst>
             </a:pPr>
             <a:r>
-              <a:rPr lang="en-GB" dirty="0" smtClean="0"/>
-              <a:t>Helpers like lenses can mitigate the added complexity when dealing with destructive updates</a:t>
-            </a:r>
-            <a:endParaRPr lang="en-GB" dirty="0"/>
+              <a:rPr lang="en-US" sz="2000" b="1" dirty="0" err="1" smtClean="0">
+                <a:latin typeface="Consolas" panose="020B0609020204030204" pitchFamily="49" charset="0"/>
+                <a:cs typeface="Consolas" panose="020B0609020204030204" pitchFamily="49" charset="0"/>
+              </a:rPr>
+              <a:t>val</a:t>
+            </a:r>
+            <a:r>
+              <a:rPr lang="en-US" sz="2000" dirty="0" smtClean="0">
+                <a:latin typeface="Consolas" panose="020B0609020204030204" pitchFamily="49" charset="0"/>
+                <a:cs typeface="Consolas" panose="020B0609020204030204" pitchFamily="49" charset="0"/>
+              </a:rPr>
+              <a:t> </a:t>
+            </a:r>
+            <a:r>
+              <a:rPr lang="en-US" sz="2000" dirty="0" err="1">
+                <a:latin typeface="Consolas" panose="020B0609020204030204" pitchFamily="49" charset="0"/>
+                <a:cs typeface="Consolas" panose="020B0609020204030204" pitchFamily="49" charset="0"/>
+              </a:rPr>
+              <a:t>customerStreetLens</a:t>
+            </a:r>
+            <a:r>
+              <a:rPr lang="en-US" sz="2000" dirty="0">
+                <a:latin typeface="Consolas" panose="020B0609020204030204" pitchFamily="49" charset="0"/>
+                <a:cs typeface="Consolas" panose="020B0609020204030204" pitchFamily="49" charset="0"/>
+              </a:rPr>
+              <a:t> = </a:t>
+            </a:r>
+            <a:endParaRPr lang="en-US" sz="2000" dirty="0" smtClean="0">
+              <a:latin typeface="Consolas" panose="020B0609020204030204" pitchFamily="49" charset="0"/>
+              <a:cs typeface="Consolas" panose="020B0609020204030204" pitchFamily="49" charset="0"/>
+            </a:endParaRPr>
+          </a:p>
+          <a:p>
+            <a:pPr marL="177800">
+              <a:spcBef>
+                <a:spcPts val="600"/>
+              </a:spcBef>
+              <a:tabLst>
+                <a:tab pos="541338" algn="l"/>
+              </a:tabLst>
+            </a:pPr>
+            <a:r>
+              <a:rPr lang="en-US" sz="2000" dirty="0">
+                <a:latin typeface="Consolas" panose="020B0609020204030204" pitchFamily="49" charset="0"/>
+                <a:cs typeface="Consolas" panose="020B0609020204030204" pitchFamily="49" charset="0"/>
+              </a:rPr>
+              <a:t>	</a:t>
+            </a:r>
+            <a:r>
+              <a:rPr lang="de-CH" sz="2000" dirty="0" err="1" smtClean="0">
+                <a:latin typeface="Consolas" panose="020B0609020204030204" pitchFamily="49" charset="0"/>
+                <a:cs typeface="Consolas" panose="020B0609020204030204" pitchFamily="49" charset="0"/>
+              </a:rPr>
+              <a:t>Lenser</a:t>
+            </a:r>
+            <a:r>
+              <a:rPr lang="de-CH" sz="2000" dirty="0" smtClean="0">
+                <a:latin typeface="Consolas" panose="020B0609020204030204" pitchFamily="49" charset="0"/>
+                <a:cs typeface="Consolas" panose="020B0609020204030204" pitchFamily="49" charset="0"/>
+              </a:rPr>
+              <a:t>[Customer].</a:t>
+            </a:r>
+            <a:r>
+              <a:rPr lang="de-CH" sz="2000" dirty="0" err="1" smtClean="0">
+                <a:latin typeface="Consolas" panose="020B0609020204030204" pitchFamily="49" charset="0"/>
+                <a:cs typeface="Consolas" panose="020B0609020204030204" pitchFamily="49" charset="0"/>
+              </a:rPr>
+              <a:t>contact.address.street</a:t>
+            </a:r>
+            <a:endParaRPr lang="de-CH" sz="2000" dirty="0" smtClean="0">
+              <a:latin typeface="Consolas" panose="020B0609020204030204" pitchFamily="49" charset="0"/>
+              <a:cs typeface="Consolas" panose="020B0609020204030204" pitchFamily="49" charset="0"/>
+            </a:endParaRPr>
+          </a:p>
+          <a:p>
+            <a:pPr marL="177800">
+              <a:spcBef>
+                <a:spcPts val="600"/>
+              </a:spcBef>
+              <a:tabLst>
+                <a:tab pos="541338" algn="l"/>
+              </a:tabLst>
+            </a:pPr>
+            <a:endParaRPr lang="en-US" sz="2000" dirty="0">
+              <a:latin typeface="Consolas" panose="020B0609020204030204" pitchFamily="49" charset="0"/>
+              <a:cs typeface="Consolas" panose="020B0609020204030204" pitchFamily="49" charset="0"/>
+            </a:endParaRPr>
           </a:p>
         </p:txBody>
       </p:sp>
@@ -7418,8 +7605,8 @@
           <a:lstStyle/>
           <a:p>
             <a:r>
-              <a:rPr lang="de-CH" smtClean="0"/>
-              <a:t>14. September 2015</a:t>
+              <a:rPr lang="de-CH" dirty="0" smtClean="0"/>
+              <a:t>14. November 2014</a:t>
             </a:r>
             <a:endParaRPr lang="de-CH" dirty="0"/>
           </a:p>
@@ -7427,7 +7614,7 @@
       </p:sp>
       <p:sp>
         <p:nvSpPr>
-          <p:cNvPr id="5" name="Footer Placeholder 4"/>
+          <p:cNvPr id="7" name="Footer Placeholder 6"/>
           <p:cNvSpPr>
             <a:spLocks noGrp="1"/>
           </p:cNvSpPr>
@@ -7441,8 +7628,12 @@
           <a:lstStyle/>
           <a:p>
             <a:r>
-              <a:rPr lang="en-US" smtClean="0"/>
-              <a:t>Functional Design Patterns for OO Practicioners | Hendrik Schöneberg</a:t>
+              <a:rPr lang="de-CH" dirty="0" smtClean="0"/>
+              <a:t>Rezepte aus der funktionalen Programmierung | </a:t>
+            </a:r>
+            <a:r>
+              <a:rPr lang="de-CH" dirty="0" err="1" smtClean="0"/>
+              <a:t>ico</a:t>
             </a:r>
             <a:endParaRPr lang="de-CH" dirty="0"/>
           </a:p>
@@ -7450,30 +7641,7 @@
       </p:sp>
       <p:sp>
         <p:nvSpPr>
-          <p:cNvPr id="7" name="Text Placeholder 6"/>
-          <p:cNvSpPr>
-            <a:spLocks noGrp="1"/>
-          </p:cNvSpPr>
-          <p:nvPr>
-            <p:ph type="body" sz="quarter" idx="13"/>
-          </p:nvPr>
-        </p:nvSpPr>
-        <p:spPr/>
-        <p:txBody>
-          <a:bodyPr/>
-          <a:lstStyle/>
-          <a:p>
-            <a:r>
-              <a:rPr lang="en-GB" dirty="0" smtClean="0"/>
-              <a:t>Lessons learned / summary</a:t>
-            </a:r>
-            <a:endParaRPr lang="en-GB" dirty="0"/>
-          </a:p>
-        </p:txBody>
-      </p:sp>
-      <p:sp>
-        <p:nvSpPr>
-          <p:cNvPr id="8" name="Slide Number Placeholder 7"/>
+          <p:cNvPr id="5" name="Slide Number Placeholder 4"/>
           <p:cNvSpPr>
             <a:spLocks noGrp="1"/>
           </p:cNvSpPr>
@@ -7490,22 +7658,44 @@
               <a:rPr lang="de-CH" smtClean="0"/>
               <a:t>Slide </a:t>
             </a:r>
-            <a:fld id="{50A7F31E-8121-4D59-903F-4EBACBAE654A}" type="slidenum">
+            <a:fld id="{5C09D807-AFB9-44D9-B6F8-343159B16D59}" type="slidenum">
               <a:rPr lang="de-CH" smtClean="0"/>
               <a:t>12</a:t>
             </a:fld>
             <a:r>
               <a:rPr lang="de-CH" smtClean="0"/>
-              <a:t> of 18</a:t>
+              <a:t> of 19</a:t>
             </a:r>
             <a:endParaRPr dirty="0"/>
+          </a:p>
+        </p:txBody>
+      </p:sp>
+      <p:sp>
+        <p:nvSpPr>
+          <p:cNvPr id="16" name="Text Placeholder 5"/>
+          <p:cNvSpPr>
+            <a:spLocks noGrp="1"/>
+          </p:cNvSpPr>
+          <p:nvPr>
+            <p:ph type="body" sz="quarter" idx="13"/>
+          </p:nvPr>
+        </p:nvSpPr>
+        <p:spPr/>
+        <p:txBody>
+          <a:bodyPr/>
+          <a:lstStyle/>
+          <a:p>
+            <a:r>
+              <a:rPr lang="en-GB" dirty="0"/>
+              <a:t>Modify nested immutable objects</a:t>
+            </a:r>
           </a:p>
         </p:txBody>
       </p:sp>
     </p:spTree>
     <p:extLst>
       <p:ext uri="{BB962C8B-B14F-4D97-AF65-F5344CB8AC3E}">
-        <p14:creationId xmlns:p14="http://schemas.microsoft.com/office/powerpoint/2010/main" val="2202274962"/>
+        <p14:creationId xmlns:p14="http://schemas.microsoft.com/office/powerpoint/2010/main" val="4163302255"/>
       </p:ext>
     </p:extLst>
   </p:cSld>
@@ -7556,7 +7746,7 @@
           <a:p>
             <a:r>
               <a:rPr lang="en-GB" dirty="0" smtClean="0"/>
-              <a:t>Pure Functions</a:t>
+              <a:t>Immutability</a:t>
             </a:r>
             <a:endParaRPr lang="en-GB" dirty="0"/>
           </a:p>
@@ -7576,12 +7766,6 @@
         <p:txBody>
           <a:bodyPr/>
           <a:lstStyle/>
-          <a:p>
-            <a:r>
-              <a:rPr lang="en-GB" dirty="0" smtClean="0"/>
-              <a:t>Definition</a:t>
-            </a:r>
-          </a:p>
           <a:p>
             <a:pPr marL="342900" indent="-342900">
               <a:buFont typeface="Arial" panose="020B0604020202020204" pitchFamily="34" charset="0"/>
@@ -7589,7 +7773,7 @@
             </a:pPr>
             <a:r>
               <a:rPr lang="en-GB" dirty="0" smtClean="0"/>
-              <a:t>A function, where the return value is only determined by the input value</a:t>
+              <a:t>Immutability is generally desirable</a:t>
             </a:r>
           </a:p>
           <a:p>
@@ -7599,7 +7783,11 @@
             </a:pPr>
             <a:r>
               <a:rPr lang="en-GB" dirty="0" smtClean="0"/>
-              <a:t>A function without side effects</a:t>
+              <a:t>Existing code should be refactored or new code should be written with immutability in </a:t>
+            </a:r>
+            <a:r>
+              <a:rPr lang="en-GB" dirty="0" smtClean="0"/>
+              <a:t>mind</a:t>
             </a:r>
           </a:p>
           <a:p>
@@ -7607,10 +7795,7 @@
               <a:buFont typeface="Arial" panose="020B0604020202020204" pitchFamily="34" charset="0"/>
               <a:buChar char="•"/>
             </a:pPr>
-            <a:r>
-              <a:rPr lang="en-GB" dirty="0" smtClean="0"/>
-              <a:t>A pure function cannot depend on hidden state or value or I/O</a:t>
-            </a:r>
+            <a:endParaRPr lang="en-GB" dirty="0" smtClean="0"/>
           </a:p>
           <a:p>
             <a:pPr marL="342900" indent="-342900">
@@ -7618,17 +7803,13 @@
               <a:buChar char="•"/>
             </a:pPr>
             <a:r>
-              <a:rPr lang="en-GB" dirty="0"/>
-              <a:t>An invocation of a pure function can always be replaced with its return value</a:t>
-            </a:r>
-          </a:p>
-          <a:p>
-            <a:endParaRPr lang="en-GB" dirty="0" smtClean="0"/>
-          </a:p>
-          <a:p>
-            <a:pPr lvl="1" indent="0">
-              <a:buNone/>
-            </a:pPr>
+              <a:rPr lang="en-GB" dirty="0" smtClean="0"/>
+              <a:t>Patterns like </a:t>
+            </a:r>
+            <a:r>
+              <a:rPr lang="en-GB" dirty="0" smtClean="0"/>
+              <a:t>lenses can mitigate the added complexity when dealing with destructive updates</a:t>
+            </a:r>
             <a:endParaRPr lang="en-GB" dirty="0"/>
           </a:p>
         </p:txBody>
@@ -7696,7 +7877,7 @@
           <a:p>
             <a:r>
               <a:rPr lang="en-GB" dirty="0" smtClean="0"/>
-              <a:t>Introduction</a:t>
+              <a:t>Lessons learned / summary</a:t>
             </a:r>
             <a:endParaRPr lang="en-GB" dirty="0"/>
           </a:p>
@@ -7721,13 +7902,13 @@
               <a:rPr lang="de-CH" smtClean="0"/>
               <a:t>Slide </a:t>
             </a:r>
-            <a:fld id="{8E72CE87-C99E-480E-8D6B-EAA751751E2E}" type="slidenum">
+            <a:fld id="{9EBAC766-2F6B-475B-B765-EA730519365A}" type="slidenum">
               <a:rPr lang="de-CH" smtClean="0"/>
               <a:t>13</a:t>
             </a:fld>
             <a:r>
               <a:rPr lang="de-CH" smtClean="0"/>
-              <a:t> of 18</a:t>
+              <a:t> of 19</a:t>
             </a:r>
             <a:endParaRPr dirty="0"/>
           </a:p>
@@ -7736,7 +7917,7 @@
     </p:spTree>
     <p:extLst>
       <p:ext uri="{BB962C8B-B14F-4D97-AF65-F5344CB8AC3E}">
-        <p14:creationId xmlns:p14="http://schemas.microsoft.com/office/powerpoint/2010/main" val="248071837"/>
+        <p14:creationId xmlns:p14="http://schemas.microsoft.com/office/powerpoint/2010/main" val="2202274962"/>
       </p:ext>
     </p:extLst>
   </p:cSld>
@@ -7820,7 +8001,7 @@
             </a:pPr>
             <a:r>
               <a:rPr lang="en-GB" dirty="0" smtClean="0"/>
-              <a:t>An expression is referentially transparent if it can be replaced with its value without changing the behaviour of a program</a:t>
+              <a:t>A function, where the return value is only determined by the input value</a:t>
             </a:r>
           </a:p>
           <a:p>
@@ -7830,8 +8011,36 @@
             </a:pPr>
             <a:r>
               <a:rPr lang="en-GB" dirty="0" smtClean="0"/>
-              <a:t>Usually referential transparency is broken by side effects or dependency on global or hidden state</a:t>
-            </a:r>
+              <a:t>A function without side effects</a:t>
+            </a:r>
+          </a:p>
+          <a:p>
+            <a:pPr marL="342900" indent="-342900">
+              <a:buFont typeface="Arial" panose="020B0604020202020204" pitchFamily="34" charset="0"/>
+              <a:buChar char="•"/>
+            </a:pPr>
+            <a:r>
+              <a:rPr lang="en-GB" dirty="0" smtClean="0"/>
+              <a:t>A pure function cannot depend on hidden state or value or I/O</a:t>
+            </a:r>
+          </a:p>
+          <a:p>
+            <a:pPr marL="342900" indent="-342900">
+              <a:buFont typeface="Arial" panose="020B0604020202020204" pitchFamily="34" charset="0"/>
+              <a:buChar char="•"/>
+            </a:pPr>
+            <a:r>
+              <a:rPr lang="en-GB" dirty="0"/>
+              <a:t>An invocation of a pure function can always be replaced with its return value</a:t>
+            </a:r>
+          </a:p>
+          <a:p>
+            <a:endParaRPr lang="en-GB" dirty="0" smtClean="0"/>
+          </a:p>
+          <a:p>
+            <a:pPr lvl="1" indent="0">
+              <a:buNone/>
+            </a:pPr>
             <a:endParaRPr lang="en-GB" dirty="0"/>
           </a:p>
         </p:txBody>
@@ -7899,7 +8108,7 @@
           <a:p>
             <a:r>
               <a:rPr lang="en-GB" dirty="0" smtClean="0"/>
-              <a:t>Referential Transparency</a:t>
+              <a:t>Introduction</a:t>
             </a:r>
             <a:endParaRPr lang="en-GB" dirty="0"/>
           </a:p>
@@ -7924,13 +8133,13 @@
               <a:rPr lang="de-CH" smtClean="0"/>
               <a:t>Slide </a:t>
             </a:r>
-            <a:fld id="{B588109E-4DE6-4A31-BFA0-B76037148F3D}" type="slidenum">
+            <a:fld id="{C6F3A95D-1EC6-4101-A7F2-8E759AB9123C}" type="slidenum">
               <a:rPr lang="de-CH" smtClean="0"/>
               <a:t>14</a:t>
             </a:fld>
             <a:r>
               <a:rPr lang="de-CH" smtClean="0"/>
-              <a:t> of 18</a:t>
+              <a:t> of 19</a:t>
             </a:r>
             <a:endParaRPr dirty="0"/>
           </a:p>
@@ -7939,7 +8148,7 @@
     </p:spTree>
     <p:extLst>
       <p:ext uri="{BB962C8B-B14F-4D97-AF65-F5344CB8AC3E}">
-        <p14:creationId xmlns:p14="http://schemas.microsoft.com/office/powerpoint/2010/main" val="455473412"/>
+        <p14:creationId xmlns:p14="http://schemas.microsoft.com/office/powerpoint/2010/main" val="248071837"/>
       </p:ext>
     </p:extLst>
   </p:cSld>
@@ -8011,17 +8220,19 @@
           <a:bodyPr/>
           <a:lstStyle/>
           <a:p>
+            <a:r>
+              <a:rPr lang="en-GB" dirty="0" smtClean="0"/>
+              <a:t>Definition</a:t>
+            </a:r>
+          </a:p>
+          <a:p>
             <a:pPr marL="342900" indent="-342900">
               <a:buFont typeface="Arial" panose="020B0604020202020204" pitchFamily="34" charset="0"/>
               <a:buChar char="•"/>
             </a:pPr>
             <a:r>
               <a:rPr lang="en-GB" dirty="0" smtClean="0"/>
-              <a:t>Go </a:t>
-            </a:r>
-            <a:r>
-              <a:rPr lang="en-GB" dirty="0"/>
-              <a:t>hand in hand with immutable values</a:t>
+              <a:t>An expression is referentially transparent if it can be replaced with its value without changing the behaviour of a program</a:t>
             </a:r>
           </a:p>
           <a:p>
@@ -8030,70 +8241,9 @@
               <a:buChar char="•"/>
             </a:pPr>
             <a:r>
-              <a:rPr lang="en-GB" dirty="0"/>
-              <a:t>Functions are easier to test and verify</a:t>
-            </a:r>
-          </a:p>
-          <a:p>
-            <a:pPr marL="342900" indent="-342900">
-              <a:buFont typeface="Arial" panose="020B0604020202020204" pitchFamily="34" charset="0"/>
-              <a:buChar char="•"/>
-            </a:pPr>
-            <a:r>
-              <a:rPr lang="en-GB" dirty="0"/>
-              <a:t>Can simplify systems</a:t>
-            </a:r>
-          </a:p>
-          <a:p>
-            <a:pPr marL="342900" indent="-342900">
-              <a:buFont typeface="Arial" panose="020B0604020202020204" pitchFamily="34" charset="0"/>
-              <a:buChar char="•"/>
-            </a:pPr>
-            <a:r>
               <a:rPr lang="en-GB" dirty="0" smtClean="0"/>
-              <a:t>Simplifies concurrency</a:t>
-            </a:r>
-            <a:endParaRPr lang="en-GB" dirty="0"/>
-          </a:p>
-          <a:p>
-            <a:pPr marL="342900" indent="-342900">
-              <a:buFont typeface="Arial" panose="020B0604020202020204" pitchFamily="34" charset="0"/>
-              <a:buChar char="•"/>
-            </a:pPr>
-            <a:r>
-              <a:rPr lang="en-GB" dirty="0" smtClean="0"/>
-              <a:t>Calls to pure functions can be parallelized</a:t>
-            </a:r>
-          </a:p>
-          <a:p>
-            <a:pPr marL="342900" indent="-342900">
-              <a:buFont typeface="Arial" panose="020B0604020202020204" pitchFamily="34" charset="0"/>
-              <a:buChar char="•"/>
-            </a:pPr>
-            <a:r>
-              <a:rPr lang="en-GB" dirty="0" smtClean="0"/>
-              <a:t>Caching: Since the result for a given input is always the same, it only needs to be computed once</a:t>
-            </a:r>
-          </a:p>
-          <a:p>
-            <a:pPr marL="342900" indent="-342900">
-              <a:buFont typeface="Arial" panose="020B0604020202020204" pitchFamily="34" charset="0"/>
-              <a:buChar char="•"/>
-            </a:pPr>
-            <a:r>
-              <a:rPr lang="en-GB" dirty="0" err="1" smtClean="0"/>
-              <a:t>Lazyness</a:t>
-            </a:r>
-            <a:r>
-              <a:rPr lang="en-GB" dirty="0" smtClean="0"/>
-              <a:t>: Since the function does not cause any side effects, we can postpone computation until we actually need the result</a:t>
-            </a:r>
-          </a:p>
-          <a:p>
-            <a:pPr marL="342900" indent="-342900">
-              <a:buFont typeface="Arial" panose="020B0604020202020204" pitchFamily="34" charset="0"/>
-              <a:buChar char="•"/>
-            </a:pPr>
+              <a:t>Usually referential transparency is broken by side effects or dependency on global or hidden state</a:t>
+            </a:r>
             <a:endParaRPr lang="en-GB" dirty="0"/>
           </a:p>
         </p:txBody>
@@ -8161,7 +8311,7 @@
           <a:p>
             <a:r>
               <a:rPr lang="en-GB" dirty="0" smtClean="0"/>
-              <a:t>Benefits</a:t>
+              <a:t>Referential Transparency</a:t>
             </a:r>
             <a:endParaRPr lang="en-GB" dirty="0"/>
           </a:p>
@@ -8186,13 +8336,13 @@
               <a:rPr lang="de-CH" smtClean="0"/>
               <a:t>Slide </a:t>
             </a:r>
-            <a:fld id="{39211C95-BBEF-4666-AA42-B0A19763FDC5}" type="slidenum">
+            <a:fld id="{07896F1B-5070-47AC-92A5-8DF1AC0F8FEE}" type="slidenum">
               <a:rPr lang="de-CH" smtClean="0"/>
               <a:t>15</a:t>
             </a:fld>
             <a:r>
               <a:rPr lang="de-CH" smtClean="0"/>
-              <a:t> of 18</a:t>
+              <a:t> of 19</a:t>
             </a:r>
             <a:endParaRPr dirty="0"/>
           </a:p>
@@ -8201,7 +8351,7 @@
     </p:spTree>
     <p:extLst>
       <p:ext uri="{BB962C8B-B14F-4D97-AF65-F5344CB8AC3E}">
-        <p14:creationId xmlns:p14="http://schemas.microsoft.com/office/powerpoint/2010/main" val="799228113"/>
+        <p14:creationId xmlns:p14="http://schemas.microsoft.com/office/powerpoint/2010/main" val="455473412"/>
       </p:ext>
     </p:extLst>
   </p:cSld>
@@ -8279,7 +8429,11 @@
             </a:pPr>
             <a:r>
               <a:rPr lang="en-GB" dirty="0" smtClean="0"/>
-              <a:t>Obviously, there will be functions with side effects (I/O, global state, user input …)</a:t>
+              <a:t>Go </a:t>
+            </a:r>
+            <a:r>
+              <a:rPr lang="en-GB" dirty="0"/>
+              <a:t>hand in hand with immutable values</a:t>
             </a:r>
           </a:p>
           <a:p>
@@ -8288,8 +8442,8 @@
               <a:buChar char="•"/>
             </a:pPr>
             <a:r>
-              <a:rPr lang="en-GB" dirty="0" smtClean="0"/>
-              <a:t>The idea is to refactor as many of your functions into pure functions as possible and wrap them into a shell, which handles side effects</a:t>
+              <a:rPr lang="en-GB" dirty="0"/>
+              <a:t>Functions are easier to test and verify</a:t>
             </a:r>
           </a:p>
           <a:p>
@@ -8298,8 +8452,8 @@
               <a:buChar char="•"/>
             </a:pPr>
             <a:r>
-              <a:rPr lang="en-GB" dirty="0" smtClean="0"/>
-              <a:t>Keep a “healthy balance” between pure and impure functions</a:t>
+              <a:rPr lang="en-GB" dirty="0"/>
+              <a:t>Can simplify systems</a:t>
             </a:r>
           </a:p>
           <a:p>
@@ -8307,13 +8461,11 @@
               <a:buFont typeface="Arial" panose="020B0604020202020204" pitchFamily="34" charset="0"/>
               <a:buChar char="•"/>
             </a:pPr>
-            <a:endParaRPr lang="en-GB" dirty="0" smtClean="0"/>
-          </a:p>
-          <a:p>
             <a:r>
               <a:rPr lang="en-GB" dirty="0" smtClean="0"/>
-              <a:t>Useful data structures</a:t>
-            </a:r>
+              <a:t>Simplifies concurrency</a:t>
+            </a:r>
+            <a:endParaRPr lang="en-GB" dirty="0"/>
           </a:p>
           <a:p>
             <a:pPr marL="342900" indent="-342900">
@@ -8322,7 +8474,7 @@
             </a:pPr>
             <a:r>
               <a:rPr lang="en-GB" dirty="0" smtClean="0"/>
-              <a:t>Try[T] – Encapsulates exceptions: Disconnects error handling and recovery, forces the caller to deal with the possibility of error.</a:t>
+              <a:t>Calls to pure functions can be parallelized</a:t>
             </a:r>
           </a:p>
           <a:p>
@@ -8332,8 +8484,28 @@
             </a:pPr>
             <a:r>
               <a:rPr lang="en-GB" dirty="0" smtClean="0"/>
-              <a:t>Option[T] – Represents a value which might be null</a:t>
-            </a:r>
+              <a:t>Caching: Since the result for a given input is always the same, it only needs to be computed once</a:t>
+            </a:r>
+          </a:p>
+          <a:p>
+            <a:pPr marL="342900" indent="-342900">
+              <a:buFont typeface="Arial" panose="020B0604020202020204" pitchFamily="34" charset="0"/>
+              <a:buChar char="•"/>
+            </a:pPr>
+            <a:r>
+              <a:rPr lang="en-GB" dirty="0" err="1" smtClean="0"/>
+              <a:t>Lazyness</a:t>
+            </a:r>
+            <a:r>
+              <a:rPr lang="en-GB" dirty="0" smtClean="0"/>
+              <a:t>: Since the function does not cause any side effects, we can postpone computation until we actually need the result</a:t>
+            </a:r>
+          </a:p>
+          <a:p>
+            <a:pPr marL="342900" indent="-342900">
+              <a:buFont typeface="Arial" panose="020B0604020202020204" pitchFamily="34" charset="0"/>
+              <a:buChar char="•"/>
+            </a:pPr>
             <a:endParaRPr lang="en-GB" dirty="0"/>
           </a:p>
         </p:txBody>
@@ -8401,7 +8573,7 @@
           <a:p>
             <a:r>
               <a:rPr lang="en-GB" dirty="0" smtClean="0"/>
-              <a:t>But how do I get there?</a:t>
+              <a:t>Benefits</a:t>
             </a:r>
             <a:endParaRPr lang="en-GB" dirty="0"/>
           </a:p>
@@ -8426,13 +8598,13 @@
               <a:rPr lang="de-CH" smtClean="0"/>
               <a:t>Slide </a:t>
             </a:r>
-            <a:fld id="{484819BD-779B-442D-ADED-D82C7CEA5069}" type="slidenum">
+            <a:fld id="{F2C20B9C-14DC-4423-9E86-9A5823DE9C4A}" type="slidenum">
               <a:rPr lang="de-CH" smtClean="0"/>
               <a:t>16</a:t>
             </a:fld>
             <a:r>
               <a:rPr lang="de-CH" smtClean="0"/>
-              <a:t> of 18</a:t>
+              <a:t> of 19</a:t>
             </a:r>
             <a:endParaRPr dirty="0"/>
           </a:p>
@@ -8441,7 +8613,7 @@
     </p:spTree>
     <p:extLst>
       <p:ext uri="{BB962C8B-B14F-4D97-AF65-F5344CB8AC3E}">
-        <p14:creationId xmlns:p14="http://schemas.microsoft.com/office/powerpoint/2010/main" val="3426570471"/>
+        <p14:creationId xmlns:p14="http://schemas.microsoft.com/office/powerpoint/2010/main" val="799228113"/>
       </p:ext>
     </p:extLst>
   </p:cSld>
@@ -8513,6 +8685,67 @@
           <a:bodyPr/>
           <a:lstStyle/>
           <a:p>
+            <a:pPr marL="342900" indent="-342900">
+              <a:buFont typeface="Arial" panose="020B0604020202020204" pitchFamily="34" charset="0"/>
+              <a:buChar char="•"/>
+            </a:pPr>
+            <a:r>
+              <a:rPr lang="en-GB" dirty="0" smtClean="0"/>
+              <a:t>Obviously, there will be functions with side effects (I/O, global state, user input …)</a:t>
+            </a:r>
+          </a:p>
+          <a:p>
+            <a:pPr marL="342900" indent="-342900">
+              <a:buFont typeface="Arial" panose="020B0604020202020204" pitchFamily="34" charset="0"/>
+              <a:buChar char="•"/>
+            </a:pPr>
+            <a:r>
+              <a:rPr lang="en-GB" dirty="0" smtClean="0"/>
+              <a:t>The idea is to refactor as many of your functions into pure functions as possible and wrap them into a shell, which handles side effects</a:t>
+            </a:r>
+          </a:p>
+          <a:p>
+            <a:pPr marL="342900" indent="-342900">
+              <a:buFont typeface="Arial" panose="020B0604020202020204" pitchFamily="34" charset="0"/>
+              <a:buChar char="•"/>
+            </a:pPr>
+            <a:r>
+              <a:rPr lang="en-GB" dirty="0" smtClean="0"/>
+              <a:t>Keep a “healthy balance” between pure and impure functions</a:t>
+            </a:r>
+          </a:p>
+          <a:p>
+            <a:pPr marL="342900" indent="-342900">
+              <a:buFont typeface="Arial" panose="020B0604020202020204" pitchFamily="34" charset="0"/>
+              <a:buChar char="•"/>
+            </a:pPr>
+            <a:endParaRPr lang="en-GB" dirty="0" smtClean="0"/>
+          </a:p>
+          <a:p>
+            <a:r>
+              <a:rPr lang="en-GB" dirty="0" smtClean="0"/>
+              <a:t>Useful data structures</a:t>
+            </a:r>
+          </a:p>
+          <a:p>
+            <a:pPr marL="342900" indent="-342900">
+              <a:buFont typeface="Arial" panose="020B0604020202020204" pitchFamily="34" charset="0"/>
+              <a:buChar char="•"/>
+            </a:pPr>
+            <a:r>
+              <a:rPr lang="en-GB" dirty="0" smtClean="0"/>
+              <a:t>Try[T] – Encapsulates exceptions: Disconnects error handling and recovery, forces the caller to deal with the possibility of error.</a:t>
+            </a:r>
+          </a:p>
+          <a:p>
+            <a:pPr marL="342900" indent="-342900">
+              <a:buFont typeface="Arial" panose="020B0604020202020204" pitchFamily="34" charset="0"/>
+              <a:buChar char="•"/>
+            </a:pPr>
+            <a:r>
+              <a:rPr lang="en-GB" dirty="0" smtClean="0"/>
+              <a:t>Option[T] – Represents a value which might be null</a:t>
+            </a:r>
             <a:endParaRPr lang="en-GB" dirty="0"/>
           </a:p>
         </p:txBody>
@@ -8580,7 +8813,7 @@
           <a:p>
             <a:r>
               <a:rPr lang="en-GB" dirty="0" smtClean="0"/>
-              <a:t>Lessons learned / summary</a:t>
+              <a:t>But how do I get there?</a:t>
             </a:r>
             <a:endParaRPr lang="en-GB" dirty="0"/>
           </a:p>
@@ -8605,13 +8838,13 @@
               <a:rPr lang="de-CH" smtClean="0"/>
               <a:t>Slide </a:t>
             </a:r>
-            <a:fld id="{16C09E7D-4688-4431-B32E-CC39F02BF15F}" type="slidenum">
+            <a:fld id="{DBB24CFE-61A6-4940-B4CB-B47C4E6AE1A3}" type="slidenum">
               <a:rPr lang="de-CH" smtClean="0"/>
               <a:t>17</a:t>
             </a:fld>
             <a:r>
               <a:rPr lang="de-CH" smtClean="0"/>
-              <a:t> of 18</a:t>
+              <a:t> of 19</a:t>
             </a:r>
             <a:endParaRPr dirty="0"/>
           </a:p>
@@ -8620,7 +8853,7 @@
     </p:spTree>
     <p:extLst>
       <p:ext uri="{BB962C8B-B14F-4D97-AF65-F5344CB8AC3E}">
-        <p14:creationId xmlns:p14="http://schemas.microsoft.com/office/powerpoint/2010/main" val="351525945"/>
+        <p14:creationId xmlns:p14="http://schemas.microsoft.com/office/powerpoint/2010/main" val="3426570471"/>
       </p:ext>
     </p:extLst>
   </p:cSld>
@@ -8671,6 +8904,185 @@
           <a:p>
             <a:r>
               <a:rPr lang="en-GB" dirty="0" smtClean="0"/>
+              <a:t>Pure Functions</a:t>
+            </a:r>
+            <a:endParaRPr lang="en-GB" dirty="0"/>
+          </a:p>
+        </p:txBody>
+      </p:sp>
+      <p:sp>
+        <p:nvSpPr>
+          <p:cNvPr id="3" name="Content Placeholder 2"/>
+          <p:cNvSpPr>
+            <a:spLocks noGrp="1"/>
+          </p:cNvSpPr>
+          <p:nvPr>
+            <p:ph idx="1"/>
+          </p:nvPr>
+        </p:nvSpPr>
+        <p:spPr/>
+        <p:txBody>
+          <a:bodyPr/>
+          <a:lstStyle/>
+          <a:p>
+            <a:endParaRPr lang="en-GB" dirty="0"/>
+          </a:p>
+        </p:txBody>
+      </p:sp>
+      <p:sp>
+        <p:nvSpPr>
+          <p:cNvPr id="4" name="Date Placeholder 3"/>
+          <p:cNvSpPr>
+            <a:spLocks noGrp="1"/>
+          </p:cNvSpPr>
+          <p:nvPr>
+            <p:ph type="dt" sz="half" idx="10"/>
+          </p:nvPr>
+        </p:nvSpPr>
+        <p:spPr/>
+        <p:txBody>
+          <a:bodyPr/>
+          <a:lstStyle/>
+          <a:p>
+            <a:r>
+              <a:rPr lang="de-CH" smtClean="0"/>
+              <a:t>14. September 2015</a:t>
+            </a:r>
+            <a:endParaRPr lang="de-CH" dirty="0"/>
+          </a:p>
+        </p:txBody>
+      </p:sp>
+      <p:sp>
+        <p:nvSpPr>
+          <p:cNvPr id="5" name="Footer Placeholder 4"/>
+          <p:cNvSpPr>
+            <a:spLocks noGrp="1"/>
+          </p:cNvSpPr>
+          <p:nvPr>
+            <p:ph type="ftr" sz="quarter" idx="11"/>
+          </p:nvPr>
+        </p:nvSpPr>
+        <p:spPr/>
+        <p:txBody>
+          <a:bodyPr/>
+          <a:lstStyle/>
+          <a:p>
+            <a:r>
+              <a:rPr lang="en-US" smtClean="0"/>
+              <a:t>Functional Design Patterns for OO Practicioners | Hendrik Schöneberg</a:t>
+            </a:r>
+            <a:endParaRPr lang="de-CH" dirty="0"/>
+          </a:p>
+        </p:txBody>
+      </p:sp>
+      <p:sp>
+        <p:nvSpPr>
+          <p:cNvPr id="7" name="Text Placeholder 6"/>
+          <p:cNvSpPr>
+            <a:spLocks noGrp="1"/>
+          </p:cNvSpPr>
+          <p:nvPr>
+            <p:ph type="body" sz="quarter" idx="13"/>
+          </p:nvPr>
+        </p:nvSpPr>
+        <p:spPr/>
+        <p:txBody>
+          <a:bodyPr/>
+          <a:lstStyle/>
+          <a:p>
+            <a:r>
+              <a:rPr lang="en-GB" dirty="0" smtClean="0"/>
+              <a:t>Lessons learned / summary</a:t>
+            </a:r>
+            <a:endParaRPr lang="en-GB" dirty="0"/>
+          </a:p>
+        </p:txBody>
+      </p:sp>
+      <p:sp>
+        <p:nvSpPr>
+          <p:cNvPr id="8" name="Slide Number Placeholder 7"/>
+          <p:cNvSpPr>
+            <a:spLocks noGrp="1"/>
+          </p:cNvSpPr>
+          <p:nvPr>
+            <p:ph type="sldNum" sz="quarter" idx="12"/>
+          </p:nvPr>
+        </p:nvSpPr>
+        <p:spPr/>
+        <p:txBody>
+          <a:bodyPr/>
+          <a:lstStyle/>
+          <a:p>
+            <a:r>
+              <a:rPr lang="de-CH" smtClean="0"/>
+              <a:t>Slide </a:t>
+            </a:r>
+            <a:fld id="{C42AE054-550B-4D4A-B04E-FF9A00918C20}" type="slidenum">
+              <a:rPr lang="de-CH" smtClean="0"/>
+              <a:t>18</a:t>
+            </a:fld>
+            <a:r>
+              <a:rPr lang="de-CH" smtClean="0"/>
+              <a:t> of 19</a:t>
+            </a:r>
+            <a:endParaRPr dirty="0"/>
+          </a:p>
+        </p:txBody>
+      </p:sp>
+    </p:spTree>
+    <p:extLst>
+      <p:ext uri="{BB962C8B-B14F-4D97-AF65-F5344CB8AC3E}">
+        <p14:creationId xmlns:p14="http://schemas.microsoft.com/office/powerpoint/2010/main" val="351525945"/>
+      </p:ext>
+    </p:extLst>
+  </p:cSld>
+  <p:clrMapOvr>
+    <a:masterClrMapping/>
+  </p:clrMapOvr>
+  <p:timing>
+    <p:tnLst>
+      <p:par>
+        <p:cTn id="1" dur="indefinite" restart="never" nodeType="tmRoot"/>
+      </p:par>
+    </p:tnLst>
+  </p:timing>
+</p:sld>
+</file>
+
+<file path=ppt/slides/slide19.xml><?xml version="1.0" encoding="utf-8"?>
+<p:sld xmlns:a="http://schemas.openxmlformats.org/drawingml/2006/main" xmlns:r="http://schemas.openxmlformats.org/officeDocument/2006/relationships" xmlns:p="http://schemas.openxmlformats.org/presentationml/2006/main">
+  <p:cSld>
+    <p:spTree>
+      <p:nvGrpSpPr>
+        <p:cNvPr id="1" name=""/>
+        <p:cNvGrpSpPr/>
+        <p:nvPr/>
+      </p:nvGrpSpPr>
+      <p:grpSpPr>
+        <a:xfrm>
+          <a:off x="0" y="0"/>
+          <a:ext cx="0" cy="0"/>
+          <a:chOff x="0" y="0"/>
+          <a:chExt cx="0" cy="0"/>
+        </a:xfrm>
+      </p:grpSpPr>
+      <p:sp>
+        <p:nvSpPr>
+          <p:cNvPr id="2" name="Title 1"/>
+          <p:cNvSpPr>
+            <a:spLocks noGrp="1"/>
+          </p:cNvSpPr>
+          <p:nvPr>
+            <p:ph type="title"/>
+          </p:nvPr>
+        </p:nvSpPr>
+        <p:spPr/>
+        <p:txBody>
+          <a:bodyPr/>
+          <a:lstStyle/>
+          <a:p>
+            <a:r>
+              <a:rPr lang="en-GB" dirty="0" smtClean="0"/>
               <a:t>Sources</a:t>
             </a:r>
             <a:endParaRPr lang="en-GB" dirty="0"/>
@@ -8787,13 +9199,13 @@
               <a:rPr lang="de-CH" smtClean="0"/>
               <a:t>Slide </a:t>
             </a:r>
-            <a:fld id="{7E94BD52-0220-4EFF-84B9-5E7458EA3070}" type="slidenum">
+            <a:fld id="{FBB0470D-3EDD-42A1-BE35-3B5FC519A367}" type="slidenum">
               <a:rPr lang="de-CH" smtClean="0"/>
-              <a:t>18</a:t>
+              <a:t>19</a:t>
             </a:fld>
             <a:r>
               <a:rPr lang="de-CH" smtClean="0"/>
-              <a:t> of 18</a:t>
+              <a:t> of 19</a:t>
             </a:r>
             <a:endParaRPr dirty="0"/>
           </a:p>
@@ -8975,13 +9387,13 @@
               <a:rPr lang="de-CH" smtClean="0"/>
               <a:t>Slide </a:t>
             </a:r>
-            <a:fld id="{6935C892-E99F-4566-9FBF-313733757B67}" type="slidenum">
+            <a:fld id="{1ADCE570-ED42-468F-AC0E-A5B08361254E}" type="slidenum">
               <a:rPr lang="de-CH" smtClean="0"/>
               <a:t>2</a:t>
             </a:fld>
             <a:r>
               <a:rPr lang="de-CH" smtClean="0"/>
-              <a:t> of 18</a:t>
+              <a:t> of 19</a:t>
             </a:r>
             <a:endParaRPr lang="de-CH" dirty="0"/>
           </a:p>
@@ -9103,17 +9515,8 @@
             </a:pPr>
             <a:r>
               <a:rPr lang="en-GB" dirty="0" smtClean="0"/>
-              <a:t>Representation </a:t>
-            </a:r>
-            <a:r>
-              <a:rPr lang="en-GB" dirty="0" smtClean="0"/>
-              <a:t>of value objects (without identity</a:t>
-            </a:r>
-            <a:r>
-              <a:rPr lang="en-GB" dirty="0" smtClean="0"/>
-              <a:t>)</a:t>
-            </a:r>
-            <a:endParaRPr lang="en-GB" dirty="0" smtClean="0"/>
+              <a:t>Representation of value objects (without identity)</a:t>
+            </a:r>
           </a:p>
           <a:p>
             <a:pPr marL="342900" indent="-342900">
@@ -9122,13 +9525,8 @@
             </a:pPr>
             <a:r>
               <a:rPr lang="en-GB" dirty="0" smtClean="0"/>
-              <a:t>Code can be reasoned </a:t>
-            </a:r>
-            <a:r>
-              <a:rPr lang="en-GB" dirty="0" smtClean="0"/>
-              <a:t>about (referential transparency)</a:t>
-            </a:r>
-            <a:endParaRPr lang="en-GB" dirty="0" smtClean="0"/>
+              <a:t>Code can be reasoned about (referential transparency)</a:t>
+            </a:r>
           </a:p>
           <a:p>
             <a:pPr marL="342900" indent="-342900">
@@ -9150,11 +9548,7 @@
             </a:pPr>
             <a:r>
               <a:rPr lang="en-GB" dirty="0" smtClean="0"/>
-              <a:t>Manipulation of complex </a:t>
-            </a:r>
-            <a:r>
-              <a:rPr lang="en-GB" dirty="0" smtClean="0"/>
-              <a:t>objects</a:t>
+              <a:t>Manipulation of complex objects</a:t>
             </a:r>
           </a:p>
           <a:p>
@@ -9268,13 +9662,13 @@
               <a:rPr lang="de-CH" smtClean="0"/>
               <a:t>Slide </a:t>
             </a:r>
-            <a:fld id="{275BA05D-B004-4679-A43F-B45386FB546C}" type="slidenum">
+            <a:fld id="{340A20F0-C708-49DF-8EA7-057908EE5B8B}" type="slidenum">
               <a:rPr lang="de-CH" smtClean="0"/>
               <a:t>3</a:t>
             </a:fld>
             <a:r>
               <a:rPr lang="de-CH" smtClean="0"/>
-              <a:t> of 18</a:t>
+              <a:t> of 19</a:t>
             </a:r>
             <a:endParaRPr lang="de-CH" dirty="0"/>
           </a:p>
@@ -9428,13 +9822,13 @@
               <a:rPr lang="de-CH" smtClean="0"/>
               <a:t>Slide </a:t>
             </a:r>
-            <a:fld id="{D11B590F-B93D-4545-BF67-5E65FF5FCD5B}" type="slidenum">
+            <a:fld id="{07091AD6-83D6-43CD-B58F-99A25F269215}" type="slidenum">
               <a:rPr lang="de-CH" smtClean="0"/>
               <a:t>4</a:t>
             </a:fld>
             <a:r>
               <a:rPr lang="de-CH" smtClean="0"/>
-              <a:t> of 18</a:t>
+              <a:t> of 19</a:t>
             </a:r>
             <a:endParaRPr dirty="0"/>
           </a:p>
@@ -9481,9 +9875,6 @@
               </a:rPr>
               <a:t>Person</a:t>
             </a:r>
-            <a:endParaRPr lang="en-GB" sz="2200" dirty="0" smtClean="0">
-              <a:latin typeface="AA Zuehlke" pitchFamily="2" charset="0"/>
-            </a:endParaRPr>
           </a:p>
         </p:txBody>
       </p:sp>
@@ -9528,9 +9919,6 @@
               </a:rPr>
               <a:t>Address</a:t>
             </a:r>
-            <a:endParaRPr lang="en-GB" sz="2200" dirty="0" smtClean="0">
-              <a:latin typeface="AA Zuehlke" pitchFamily="2" charset="0"/>
-            </a:endParaRPr>
           </a:p>
         </p:txBody>
       </p:sp>
@@ -9636,10 +10024,6 @@
                 </a:rPr>
                 <a:t>: String</a:t>
               </a:r>
-              <a:endParaRPr lang="en-GB" sz="1600" dirty="0" smtClean="0">
-                <a:latin typeface="Consolas" panose="020B0609020204030204" pitchFamily="49" charset="0"/>
-                <a:cs typeface="Consolas" panose="020B0609020204030204" pitchFamily="49" charset="0"/>
-              </a:endParaRPr>
             </a:p>
           </p:txBody>
         </p:sp>
@@ -9681,10 +10065,6 @@
                 </a:rPr>
                 <a:t>city: String</a:t>
               </a:r>
-              <a:endParaRPr lang="en-GB" sz="1600" dirty="0" smtClean="0">
-                <a:latin typeface="Consolas" panose="020B0609020204030204" pitchFamily="49" charset="0"/>
-                <a:cs typeface="Consolas" panose="020B0609020204030204" pitchFamily="49" charset="0"/>
-              </a:endParaRPr>
             </a:p>
           </p:txBody>
         </p:sp>
@@ -9755,10 +10135,6 @@
                 </a:rPr>
                 <a:t>: Doe</a:t>
               </a:r>
-              <a:endParaRPr lang="en-GB" sz="1600" dirty="0" smtClean="0">
-                <a:latin typeface="Consolas" panose="020B0609020204030204" pitchFamily="49" charset="0"/>
-                <a:cs typeface="Consolas" panose="020B0609020204030204" pitchFamily="49" charset="0"/>
-              </a:endParaRPr>
             </a:p>
           </p:txBody>
         </p:sp>
@@ -9888,9 +10264,6 @@
                 </a:rPr>
                 <a:t>Person’</a:t>
               </a:r>
-              <a:endParaRPr lang="en-GB" sz="2200" dirty="0" smtClean="0">
-                <a:latin typeface="AA Zuehlke" pitchFamily="2" charset="0"/>
-              </a:endParaRPr>
             </a:p>
           </p:txBody>
         </p:sp>
@@ -9953,10 +10326,6 @@
                 </a:rPr>
                 <a:t>Smith</a:t>
               </a:r>
-              <a:endParaRPr lang="en-GB" sz="1600" b="1" dirty="0" smtClean="0">
-                <a:latin typeface="Consolas" panose="020B0609020204030204" pitchFamily="49" charset="0"/>
-                <a:cs typeface="Consolas" panose="020B0609020204030204" pitchFamily="49" charset="0"/>
-              </a:endParaRPr>
             </a:p>
           </p:txBody>
         </p:sp>
@@ -10134,10 +10503,6 @@
                 </a:rPr>
                 <a:t> </a:t>
               </a:r>
-              <a:endParaRPr lang="en-GB" sz="1600" dirty="0" smtClean="0">
-                <a:latin typeface="Consolas" panose="020B0609020204030204" pitchFamily="49" charset="0"/>
-                <a:cs typeface="Consolas" panose="020B0609020204030204" pitchFamily="49" charset="0"/>
-              </a:endParaRPr>
             </a:p>
           </p:txBody>
         </p:sp>
@@ -10540,15 +10905,7 @@
           <a:p>
             <a:r>
               <a:rPr lang="en-GB" dirty="0" smtClean="0"/>
-              <a:t>Immutable </a:t>
-            </a:r>
-            <a:r>
-              <a:rPr lang="en-GB" dirty="0" smtClean="0"/>
-              <a:t>collections </a:t>
-            </a:r>
-            <a:r>
-              <a:rPr lang="en-GB" dirty="0" smtClean="0"/>
-              <a:t>in Scala</a:t>
+              <a:t>Immutable collections in Scala</a:t>
             </a:r>
             <a:endParaRPr lang="en-GB" dirty="0"/>
           </a:p>
@@ -10619,13 +10976,13 @@
               <a:rPr lang="de-CH" smtClean="0"/>
               <a:t>Slide </a:t>
             </a:r>
-            <a:fld id="{CE037749-75A8-41DB-9BA7-97C4580CB96D}" type="slidenum">
+            <a:fld id="{615D0F17-0645-4711-A07C-AD0D8E36622A}" type="slidenum">
               <a:rPr lang="de-CH" smtClean="0"/>
               <a:t>5</a:t>
             </a:fld>
             <a:r>
               <a:rPr lang="de-CH" smtClean="0"/>
-              <a:t> of 18</a:t>
+              <a:t> of 19</a:t>
             </a:r>
             <a:endParaRPr lang="de-CH" dirty="0"/>
           </a:p>
@@ -10791,13 +11148,13 @@
               <a:rPr lang="de-CH" smtClean="0"/>
               <a:t>Slide </a:t>
             </a:r>
-            <a:fld id="{863974D0-D4CE-4A51-8348-512AA4709750}" type="slidenum">
+            <a:fld id="{B3ABCDC8-1DA2-4CAB-89D6-6B3DA9BDC7B2}" type="slidenum">
               <a:rPr lang="de-CH" smtClean="0"/>
               <a:t>6</a:t>
             </a:fld>
             <a:r>
               <a:rPr lang="de-CH" smtClean="0"/>
-              <a:t> of 18</a:t>
+              <a:t> of 19</a:t>
             </a:r>
             <a:endParaRPr lang="de-CH" dirty="0"/>
           </a:p>
@@ -10820,11 +11177,7 @@
           <a:p>
             <a:r>
               <a:rPr lang="en-GB" dirty="0" smtClean="0"/>
-              <a:t>Structural sharing on </a:t>
-            </a:r>
-            <a:r>
-              <a:rPr lang="en-GB" dirty="0" smtClean="0"/>
-              <a:t>collections</a:t>
+              <a:t>Structural sharing on collections</a:t>
             </a:r>
             <a:endParaRPr lang="en-GB" dirty="0"/>
           </a:p>
@@ -11093,12 +11446,6 @@
               </a:rPr>
               <a:t>Head</a:t>
             </a:r>
-            <a:endParaRPr lang="en-GB" sz="2200" dirty="0" smtClean="0">
-              <a:solidFill>
-                <a:schemeClr val="tx1"/>
-              </a:solidFill>
-              <a:latin typeface="AA Zuehlke" pitchFamily="2" charset="0"/>
-            </a:endParaRPr>
           </a:p>
         </p:txBody>
       </p:sp>
@@ -11160,12 +11507,6 @@
               </a:rPr>
               <a:t>Tail</a:t>
             </a:r>
-            <a:endParaRPr lang="en-GB" sz="2200" dirty="0" smtClean="0">
-              <a:solidFill>
-                <a:schemeClr val="tx1"/>
-              </a:solidFill>
-              <a:latin typeface="AA Zuehlke" pitchFamily="2" charset="0"/>
-            </a:endParaRPr>
           </a:p>
         </p:txBody>
       </p:sp>
@@ -11380,12 +11721,25 @@
             </a:r>
             <a:r>
               <a:rPr lang="en-GB" dirty="0" smtClean="0"/>
-              <a:t>: Time &amp; Space O(1)</a:t>
-            </a:r>
+              <a:t>: Time &amp; Space O(1)	</a:t>
+            </a:r>
+          </a:p>
+          <a:p>
+            <a:endParaRPr lang="en-GB" dirty="0"/>
+          </a:p>
+          <a:p>
             <a:r>
               <a:rPr lang="en-GB" dirty="0" smtClean="0"/>
               <a:t>	</a:t>
             </a:r>
+            <a:r>
+              <a:rPr lang="en-GB" dirty="0" err="1" smtClean="0"/>
+              <a:t>val</a:t>
+            </a:r>
+            <a:r>
+              <a:rPr lang="en-GB" dirty="0" smtClean="0"/>
+              <a:t> a = List(1,2,3,4)</a:t>
+            </a:r>
           </a:p>
           <a:p>
             <a:endParaRPr lang="en-GB" dirty="0"/>
@@ -11401,13 +11755,8 @@
             </a:r>
             <a:r>
               <a:rPr lang="en-GB" dirty="0" smtClean="0"/>
-              <a:t> a = </a:t>
-            </a:r>
-            <a:r>
-              <a:rPr lang="en-GB" dirty="0" smtClean="0"/>
-              <a:t>List(1,2,3,4)</a:t>
-            </a:r>
-            <a:endParaRPr lang="en-GB" dirty="0" smtClean="0"/>
+              <a:t> b = 0 :: a </a:t>
+            </a:r>
           </a:p>
           <a:p>
             <a:endParaRPr lang="en-GB" dirty="0"/>
@@ -11423,23 +11772,6 @@
             </a:r>
             <a:r>
               <a:rPr lang="en-GB" dirty="0" smtClean="0"/>
-              <a:t> b = 0 :: a </a:t>
-            </a:r>
-          </a:p>
-          <a:p>
-            <a:endParaRPr lang="en-GB" dirty="0"/>
-          </a:p>
-          <a:p>
-            <a:r>
-              <a:rPr lang="en-GB" dirty="0" smtClean="0"/>
-              <a:t>	</a:t>
-            </a:r>
-            <a:r>
-              <a:rPr lang="en-GB" dirty="0" err="1" smtClean="0"/>
-              <a:t>val</a:t>
-            </a:r>
-            <a:r>
-              <a:rPr lang="en-GB" dirty="0" smtClean="0"/>
               <a:t> c = 2 :: 3 :: b</a:t>
             </a:r>
             <a:endParaRPr lang="en-GB" dirty="0"/>
@@ -11509,11 +11841,7 @@
           <a:p>
             <a:r>
               <a:rPr lang="en-GB" dirty="0" smtClean="0"/>
-              <a:t>Structural sharing on </a:t>
-            </a:r>
-            <a:r>
-              <a:rPr lang="en-GB" dirty="0" smtClean="0"/>
-              <a:t>collections</a:t>
+              <a:t>Structural sharing on collections</a:t>
             </a:r>
             <a:endParaRPr lang="en-GB" dirty="0"/>
           </a:p>
@@ -11538,13 +11866,13 @@
               <a:rPr lang="de-CH" smtClean="0"/>
               <a:t>Slide </a:t>
             </a:r>
-            <a:fld id="{0D23A9E8-018D-4D47-AECF-49F68D1E1CF5}" type="slidenum">
+            <a:fld id="{6BB1B4BD-2667-463C-BAA7-8AD419A6383F}" type="slidenum">
               <a:rPr lang="de-CH" smtClean="0"/>
               <a:t>7</a:t>
             </a:fld>
             <a:r>
               <a:rPr lang="de-CH" smtClean="0"/>
-              <a:t> of 18</a:t>
+              <a:t> of 19</a:t>
             </a:r>
             <a:endParaRPr dirty="0"/>
           </a:p>
@@ -11733,12 +12061,6 @@
               </a:rPr>
               <a:t>4</a:t>
             </a:r>
-            <a:endParaRPr lang="en-GB" sz="2200" dirty="0" smtClean="0">
-              <a:solidFill>
-                <a:schemeClr val="tx2"/>
-              </a:solidFill>
-              <a:latin typeface="AA Zuehlke" pitchFamily="2" charset="0"/>
-            </a:endParaRPr>
           </a:p>
         </p:txBody>
       </p:sp>
@@ -12239,11 +12561,11 @@
   <p:clrMapOvr>
     <a:masterClrMapping/>
   </p:clrMapOvr>
-  <mc:AlternateContent xmlns:mc="http://schemas.openxmlformats.org/markup-compatibility/2006">
-    <mc:Choice xmlns:p14="http://schemas.microsoft.com/office/powerpoint/2010/main" Requires="p14">
+  <mc:AlternateContent xmlns:mc="http://schemas.openxmlformats.org/markup-compatibility/2006" xmlns:p14="http://schemas.microsoft.com/office/powerpoint/2010/main">
+    <mc:Choice Requires="p14">
       <p:transition p14:dur="0"/>
     </mc:Choice>
-    <mc:Fallback>
+    <mc:Fallback xmlns="">
       <p:transition/>
     </mc:Fallback>
   </mc:AlternateContent>
@@ -12358,13 +12680,8 @@
             </a:r>
             <a:r>
               <a:rPr lang="en-GB" dirty="0" smtClean="0"/>
-              <a:t> a = </a:t>
-            </a:r>
-            <a:r>
-              <a:rPr lang="en-GB" dirty="0" smtClean="0"/>
-              <a:t>List(1,2,3)</a:t>
-            </a:r>
-            <a:endParaRPr lang="en-GB" dirty="0" smtClean="0"/>
+              <a:t> a = List(1,2,3)</a:t>
+            </a:r>
           </a:p>
           <a:p>
             <a:endParaRPr lang="en-GB" dirty="0"/>
@@ -12380,13 +12697,8 @@
             </a:r>
             <a:r>
               <a:rPr lang="en-GB" dirty="0" smtClean="0"/>
-              <a:t> b = </a:t>
-            </a:r>
-            <a:r>
-              <a:rPr lang="en-GB" dirty="0" smtClean="0"/>
-              <a:t>a :+ 4</a:t>
-            </a:r>
-            <a:endParaRPr lang="en-GB" dirty="0" smtClean="0"/>
+              <a:t> b = a :+ 4</a:t>
+            </a:r>
           </a:p>
           <a:p>
             <a:endParaRPr lang="en-GB" dirty="0"/>
@@ -12463,11 +12775,7 @@
           <a:p>
             <a:r>
               <a:rPr lang="en-GB" dirty="0" smtClean="0"/>
-              <a:t>Structural sharing on </a:t>
-            </a:r>
-            <a:r>
-              <a:rPr lang="en-GB" dirty="0" smtClean="0"/>
-              <a:t>collections</a:t>
+              <a:t>Structural sharing on collections</a:t>
             </a:r>
             <a:endParaRPr lang="en-GB" dirty="0"/>
           </a:p>
@@ -12748,13 +13056,13 @@
               <a:rPr lang="de-CH" smtClean="0"/>
               <a:t>Slide </a:t>
             </a:r>
-            <a:fld id="{8705A771-FA01-4A59-948E-F1C278E3D1EE}" type="slidenum">
+            <a:fld id="{682EDB52-5033-44C0-A533-8C33DD9680C0}" type="slidenum">
               <a:rPr lang="de-CH" smtClean="0"/>
               <a:t>8</a:t>
             </a:fld>
             <a:r>
               <a:rPr lang="de-CH" smtClean="0"/>
-              <a:t> of 18</a:t>
+              <a:t> of 19</a:t>
             </a:r>
             <a:endParaRPr dirty="0"/>
           </a:p>
@@ -13058,7 +13366,7 @@
           <a:p>
             <a:r>
               <a:rPr lang="en-GB" dirty="0" smtClean="0"/>
-              <a:t>Lenses</a:t>
+              <a:t>Immutability</a:t>
             </a:r>
             <a:endParaRPr lang="en-GB" dirty="0"/>
           </a:p>
@@ -13152,13 +13460,13 @@
               <a:rPr lang="de-CH" smtClean="0"/>
               <a:t>Slide </a:t>
             </a:r>
-            <a:fld id="{B75737A2-8693-476B-901D-10A56CAAA92D}" type="slidenum">
+            <a:fld id="{FACE1756-71B5-4462-BF00-D67D9822DDE3}" type="slidenum">
               <a:rPr lang="de-CH" smtClean="0"/>
               <a:t>9</a:t>
             </a:fld>
             <a:r>
               <a:rPr lang="de-CH" smtClean="0"/>
-              <a:t> of 18</a:t>
+              <a:t> of 19</a:t>
             </a:r>
             <a:endParaRPr dirty="0"/>
           </a:p>
@@ -13217,12 +13525,6 @@
               </a:rPr>
               <a:t>Person</a:t>
             </a:r>
-            <a:endParaRPr lang="en-GB" sz="2200" dirty="0" smtClean="0">
-              <a:solidFill>
-                <a:schemeClr val="tx2"/>
-              </a:solidFill>
-              <a:latin typeface="AA Zuehlke" pitchFamily="2" charset="0"/>
-            </a:endParaRPr>
           </a:p>
         </p:txBody>
       </p:sp>
@@ -13279,12 +13581,6 @@
               </a:rPr>
               <a:t>Contact</a:t>
             </a:r>
-            <a:endParaRPr lang="en-GB" sz="2200" dirty="0" smtClean="0">
-              <a:solidFill>
-                <a:schemeClr val="tx2"/>
-              </a:solidFill>
-              <a:latin typeface="AA Zuehlke" pitchFamily="2" charset="0"/>
-            </a:endParaRPr>
           </a:p>
         </p:txBody>
       </p:sp>
@@ -13341,12 +13637,6 @@
               </a:rPr>
               <a:t>Address</a:t>
             </a:r>
-            <a:endParaRPr lang="en-GB" sz="2200" dirty="0" smtClean="0">
-              <a:solidFill>
-                <a:schemeClr val="tx2"/>
-              </a:solidFill>
-              <a:latin typeface="AA Zuehlke" pitchFamily="2" charset="0"/>
-            </a:endParaRPr>
           </a:p>
         </p:txBody>
       </p:sp>
@@ -13446,9 +13736,6 @@
               </a:rPr>
               <a:t>street: String</a:t>
             </a:r>
-            <a:endParaRPr lang="en-GB" sz="2200" dirty="0" smtClean="0">
-              <a:latin typeface="AA Zuehlke" pitchFamily="2" charset="0"/>
-            </a:endParaRPr>
           </a:p>
         </p:txBody>
       </p:sp>
@@ -13493,8 +13780,11 @@
               <a:rPr lang="en-GB" sz="2200" dirty="0" smtClean="0">
                 <a:latin typeface="AA Zuehlke" pitchFamily="2" charset="0"/>
               </a:rPr>
-              <a:t>imperatively:</a:t>
-            </a:r>
+              <a:t>with mutable state:</a:t>
+            </a:r>
+            <a:endParaRPr lang="en-GB" sz="2200" dirty="0" smtClean="0">
+              <a:latin typeface="AA Zuehlke" pitchFamily="2" charset="0"/>
+            </a:endParaRPr>
           </a:p>
           <a:p>
             <a:endParaRPr lang="en-GB" sz="2200" dirty="0">
@@ -13526,9 +13816,6 @@
               </a:rPr>
               <a:t>”</a:t>
             </a:r>
-            <a:endParaRPr lang="en-GB" sz="2200" dirty="0" smtClean="0">
-              <a:latin typeface="AA Zuehlke" pitchFamily="2" charset="0"/>
-            </a:endParaRPr>
           </a:p>
         </p:txBody>
       </p:sp>
@@ -13573,8 +13860,11 @@
               <a:rPr lang="en-GB" sz="2200" dirty="0" smtClean="0">
                 <a:latin typeface="AA Zuehlke" pitchFamily="2" charset="0"/>
               </a:rPr>
-              <a:t>functionally:</a:t>
-            </a:r>
+              <a:t>with immutable state:</a:t>
+            </a:r>
+            <a:endParaRPr lang="en-GB" sz="2200" dirty="0" smtClean="0">
+              <a:latin typeface="AA Zuehlke" pitchFamily="2" charset="0"/>
+            </a:endParaRPr>
           </a:p>
           <a:p>
             <a:endParaRPr lang="en-GB" sz="2200" dirty="0" smtClean="0">

</xml_diff>

<commit_message>
add some slides to the pure functions chapter
</commit_message>
<xml_diff>
--- a/hesc_slides.pptx
+++ b/hesc_slides.pptx
@@ -5,10 +5,10 @@
     <p:sldMasterId id="2147483648" r:id="rId1"/>
   </p:sldMasterIdLst>
   <p:notesMasterIdLst>
-    <p:notesMasterId r:id="rId21"/>
+    <p:notesMasterId r:id="rId25"/>
   </p:notesMasterIdLst>
   <p:handoutMasterIdLst>
-    <p:handoutMasterId r:id="rId22"/>
+    <p:handoutMasterId r:id="rId26"/>
   </p:handoutMasterIdLst>
   <p:sldIdLst>
     <p:sldId id="256" r:id="rId2"/>
@@ -21,34 +21,38 @@
     <p:sldId id="267" r:id="rId9"/>
     <p:sldId id="268" r:id="rId10"/>
     <p:sldId id="277" r:id="rId11"/>
-    <p:sldId id="278" r:id="rId12"/>
-    <p:sldId id="279" r:id="rId13"/>
-    <p:sldId id="275" r:id="rId14"/>
-    <p:sldId id="270" r:id="rId15"/>
-    <p:sldId id="274" r:id="rId16"/>
-    <p:sldId id="272" r:id="rId17"/>
-    <p:sldId id="273" r:id="rId18"/>
-    <p:sldId id="276" r:id="rId19"/>
-    <p:sldId id="265" r:id="rId20"/>
+    <p:sldId id="280" r:id="rId12"/>
+    <p:sldId id="278" r:id="rId13"/>
+    <p:sldId id="279" r:id="rId14"/>
+    <p:sldId id="275" r:id="rId15"/>
+    <p:sldId id="282" r:id="rId16"/>
+    <p:sldId id="270" r:id="rId17"/>
+    <p:sldId id="274" r:id="rId18"/>
+    <p:sldId id="272" r:id="rId19"/>
+    <p:sldId id="273" r:id="rId20"/>
+    <p:sldId id="276" r:id="rId21"/>
+    <p:sldId id="281" r:id="rId22"/>
+    <p:sldId id="283" r:id="rId23"/>
+    <p:sldId id="265" r:id="rId24"/>
   </p:sldIdLst>
   <p:sldSz cx="9144000" cy="6858000" type="screen4x3"/>
   <p:notesSz cx="6858000" cy="9144000"/>
   <p:embeddedFontLst>
     <p:embeddedFont>
       <p:font typeface="Consolas" panose="020B0609020204030204" pitchFamily="49" charset="0"/>
-      <p:regular r:id="rId23"/>
-      <p:bold r:id="rId24"/>
-      <p:italic r:id="rId25"/>
-      <p:boldItalic r:id="rId26"/>
+      <p:regular r:id="rId27"/>
+      <p:bold r:id="rId28"/>
+      <p:italic r:id="rId29"/>
+      <p:boldItalic r:id="rId30"/>
     </p:embeddedFont>
     <p:embeddedFont>
       <p:font typeface="AA Zuehlke" panose="02000503060000020004" pitchFamily="2" charset="0"/>
-      <p:regular r:id="rId27"/>
-      <p:italic r:id="rId28"/>
+      <p:regular r:id="rId31"/>
+      <p:italic r:id="rId32"/>
     </p:embeddedFont>
   </p:embeddedFontLst>
   <p:custDataLst>
-    <p:tags r:id="rId29"/>
+    <p:tags r:id="rId33"/>
   </p:custDataLst>
   <p:defaultTextStyle>
     <a:defPPr>
@@ -856,14 +860,14 @@
               <a:rPr lang="de-CH" smtClean="0"/>
               <a:t>Slide </a:t>
             </a:r>
-            <a:fld id="{DCFE94A7-E697-4F59-9D74-C0E545AC410F}" type="slidenum">
+            <a:fld id="{3D1A2854-0CE5-4335-919F-D69751835E8D}" type="slidenum">
               <a:rPr smtClean="0"/>
               <a:pPr/>
               <a:t>‹#›</a:t>
             </a:fld>
             <a:r>
               <a:rPr lang="de-CH" smtClean="0"/>
-              <a:t> of 19</a:t>
+              <a:t> of 23</a:t>
             </a:r>
             <a:endParaRPr dirty="0"/>
           </a:p>
@@ -1180,14 +1184,14 @@
               <a:rPr lang="de-CH" smtClean="0"/>
               <a:t>Slide </a:t>
             </a:r>
-            <a:fld id="{C828A8C2-5783-4687-88EB-0DFE0E1CA99B}" type="slidenum">
+            <a:fld id="{E303F8DB-41B3-479C-AF9C-BDF59BC241DC}" type="slidenum">
               <a:rPr smtClean="0"/>
               <a:pPr/>
               <a:t>‹#›</a:t>
             </a:fld>
             <a:r>
               <a:rPr lang="de-CH" smtClean="0"/>
-              <a:t> of 19</a:t>
+              <a:t> of 23</a:t>
             </a:r>
             <a:endParaRPr dirty="0"/>
           </a:p>
@@ -1482,14 +1486,14 @@
               <a:rPr lang="de-CH" smtClean="0"/>
               <a:t>Slide </a:t>
             </a:r>
-            <a:fld id="{0838D651-29F0-465E-9554-35107275D9B1}" type="slidenum">
+            <a:fld id="{A9F383E3-7DC1-43C3-AC10-C194B89E755E}" type="slidenum">
               <a:rPr smtClean="0"/>
               <a:pPr/>
               <a:t>‹#›</a:t>
             </a:fld>
             <a:r>
               <a:rPr lang="de-CH" smtClean="0"/>
-              <a:t> of 19</a:t>
+              <a:t> of 23</a:t>
             </a:r>
             <a:endParaRPr dirty="0"/>
           </a:p>
@@ -1814,14 +1818,14 @@
               <a:rPr lang="de-CH" smtClean="0"/>
               <a:t>Slide </a:t>
             </a:r>
-            <a:fld id="{4106EBB0-D07A-4E02-8097-BE863E1B2037}" type="slidenum">
+            <a:fld id="{FD9F57AA-893A-40F9-835B-EACC06EFED7E}" type="slidenum">
               <a:rPr smtClean="0"/>
               <a:pPr/>
               <a:t>‹#›</a:t>
             </a:fld>
             <a:r>
               <a:rPr lang="de-CH" smtClean="0"/>
-              <a:t> of 19</a:t>
+              <a:t> of 23</a:t>
             </a:r>
             <a:endParaRPr dirty="0"/>
           </a:p>
@@ -2148,14 +2152,14 @@
               <a:rPr lang="de-CH" smtClean="0"/>
               <a:t>Slide </a:t>
             </a:r>
-            <a:fld id="{C5343A7B-B30A-4EE7-884A-9877463849C2}" type="slidenum">
+            <a:fld id="{6022496C-B864-4769-87DF-5AC538E6A595}" type="slidenum">
               <a:rPr smtClean="0"/>
               <a:pPr/>
               <a:t>‹#›</a:t>
             </a:fld>
             <a:r>
               <a:rPr lang="de-CH" smtClean="0"/>
-              <a:t> of 19</a:t>
+              <a:t> of 23</a:t>
             </a:r>
             <a:endParaRPr dirty="0"/>
           </a:p>
@@ -2578,14 +2582,14 @@
               <a:rPr lang="de-CH" smtClean="0"/>
               <a:t>Slide </a:t>
             </a:r>
-            <a:fld id="{0E50342E-68E4-4AF5-A053-852CA74F3850}" type="slidenum">
+            <a:fld id="{D9C5AB5A-8099-405D-ABD7-CC037C7175FA}" type="slidenum">
               <a:rPr smtClean="0"/>
               <a:pPr/>
               <a:t>‹#›</a:t>
             </a:fld>
             <a:r>
               <a:rPr lang="de-CH" smtClean="0"/>
-              <a:t> of 19</a:t>
+              <a:t> of 23</a:t>
             </a:r>
             <a:endParaRPr dirty="0"/>
           </a:p>
@@ -3296,14 +3300,14 @@
               <a:rPr lang="de-CH" smtClean="0"/>
               <a:t>Slide </a:t>
             </a:r>
-            <a:fld id="{F644AC26-0CBB-499F-BF54-3FD3FEB6FF9E}" type="slidenum">
+            <a:fld id="{E55CE28B-A6F1-486C-BB18-9189FAE3EFC5}" type="slidenum">
               <a:rPr smtClean="0"/>
               <a:pPr/>
               <a:t>‹#›</a:t>
             </a:fld>
             <a:r>
               <a:rPr lang="de-CH" smtClean="0"/>
-              <a:t> of 19</a:t>
+              <a:t> of 23</a:t>
             </a:r>
             <a:endParaRPr dirty="0"/>
           </a:p>
@@ -3602,14 +3606,14 @@
               <a:rPr lang="de-CH" smtClean="0"/>
               <a:t>Slide </a:t>
             </a:r>
-            <a:fld id="{C621AB32-B06F-4B5A-8D71-093ACBCFEE77}" type="slidenum">
+            <a:fld id="{EF701CF1-0747-4CC5-A924-8878E8387893}" type="slidenum">
               <a:rPr smtClean="0"/>
               <a:pPr/>
               <a:t>‹#›</a:t>
             </a:fld>
             <a:r>
               <a:rPr lang="de-CH" smtClean="0"/>
-              <a:t> of 19</a:t>
+              <a:t> of 23</a:t>
             </a:r>
             <a:endParaRPr dirty="0"/>
           </a:p>
@@ -4129,14 +4133,14 @@
               <a:rPr lang="de-CH" smtClean="0"/>
               <a:t>Slide </a:t>
             </a:r>
-            <a:fld id="{89D1645B-26DA-425C-8D5E-99EC647C0AAC}" type="slidenum">
+            <a:fld id="{A58681A4-C188-43D5-8507-698AA10F0E06}" type="slidenum">
               <a:rPr smtClean="0"/>
               <a:pPr/>
               <a:t>‹#›</a:t>
             </a:fld>
             <a:r>
               <a:rPr lang="de-CH" smtClean="0"/>
-              <a:t> of 19</a:t>
+              <a:t> of 23</a:t>
             </a:r>
             <a:endParaRPr dirty="0"/>
           </a:p>
@@ -4527,14 +4531,14 @@
               <a:rPr lang="de-CH" smtClean="0"/>
               <a:t>Slide </a:t>
             </a:r>
-            <a:fld id="{4B09E606-A231-4814-AE2E-ADB611B7D8E8}" type="slidenum">
+            <a:fld id="{D40F2D72-84D4-452F-8904-CF5C021544D7}" type="slidenum">
               <a:rPr smtClean="0"/>
               <a:pPr/>
               <a:t>‹#›</a:t>
             </a:fld>
             <a:r>
               <a:rPr lang="de-CH" smtClean="0"/>
-              <a:t> of 19</a:t>
+              <a:t> of 23</a:t>
             </a:r>
             <a:endParaRPr dirty="0"/>
           </a:p>
@@ -4757,14 +4761,14 @@
               <a:rPr lang="de-CH" smtClean="0"/>
               <a:t>Slide </a:t>
             </a:r>
-            <a:fld id="{A9EBE385-8836-4EFD-AC88-F75745FFFF4A}" type="slidenum">
+            <a:fld id="{D3CE911D-E769-4ED3-9080-B4DD72C06BAA}" type="slidenum">
               <a:rPr smtClean="0"/>
               <a:pPr/>
               <a:t>‹#›</a:t>
             </a:fld>
             <a:r>
               <a:rPr lang="de-CH" smtClean="0"/>
-              <a:t> of 19</a:t>
+              <a:t> of 23</a:t>
             </a:r>
             <a:endParaRPr dirty="0"/>
           </a:p>
@@ -5035,14 +5039,14 @@
               <a:rPr lang="de-CH" smtClean="0"/>
               <a:t>Slide </a:t>
             </a:r>
-            <a:fld id="{7A83C2E4-E861-4684-876D-9AF61927D4D2}" type="slidenum">
+            <a:fld id="{234DA836-A9B1-4320-B484-D0E3504E3200}" type="slidenum">
               <a:rPr smtClean="0"/>
               <a:pPr/>
               <a:t>‹#›</a:t>
             </a:fld>
             <a:r>
               <a:rPr lang="de-CH" smtClean="0"/>
-              <a:t> of 19</a:t>
+              <a:t> of 23</a:t>
             </a:r>
             <a:endParaRPr dirty="0"/>
           </a:p>
@@ -5506,13 +5510,13 @@
               <a:rPr lang="de-CH" smtClean="0"/>
               <a:t>Slide </a:t>
             </a:r>
-            <a:fld id="{D40DA82C-B4F8-4285-862C-DBEA503EDF5B}" type="slidenum">
+            <a:fld id="{5FD6F66E-09E2-4ABD-A4D5-C264E579CEC9}" type="slidenum">
               <a:rPr lang="de-CH" smtClean="0"/>
               <a:t>1</a:t>
             </a:fld>
             <a:r>
               <a:rPr lang="de-CH" smtClean="0"/>
-              <a:t> of 19</a:t>
+              <a:t> of 23</a:t>
             </a:r>
             <a:endParaRPr lang="de-CH" dirty="0"/>
           </a:p>
@@ -5624,13 +5628,13 @@
               <a:rPr lang="de-CH" smtClean="0"/>
               <a:t>Slide </a:t>
             </a:r>
-            <a:fld id="{3A886E95-7500-4DD4-9FDD-1DDDFC665483}" type="slidenum">
+            <a:fld id="{76B38131-DE43-4E9D-9010-94D7FE2B4613}" type="slidenum">
               <a:rPr lang="de-CH" smtClean="0"/>
               <a:t>10</a:t>
             </a:fld>
             <a:r>
               <a:rPr lang="de-CH" smtClean="0"/>
-              <a:t> of 19</a:t>
+              <a:t> of 23</a:t>
             </a:r>
             <a:endParaRPr dirty="0"/>
           </a:p>
@@ -6716,6 +6720,1254 @@
         </p:nvSpPr>
         <p:spPr>
           <a:xfrm>
+            <a:off x="579816" y="5799293"/>
+            <a:ext cx="7984368" cy="427734"/>
+          </a:xfrm>
+          <a:prstGeom prst="rect">
+            <a:avLst/>
+          </a:prstGeom>
+          <a:solidFill>
+            <a:schemeClr val="accent2">
+              <a:lumMod val="40000"/>
+              <a:lumOff val="60000"/>
+            </a:schemeClr>
+          </a:solidFill>
+          <a:ln w="12700">
+            <a:noFill/>
+          </a:ln>
+        </p:spPr>
+        <p:style>
+          <a:lnRef idx="2">
+            <a:schemeClr val="accent1">
+              <a:shade val="50000"/>
+            </a:schemeClr>
+          </a:lnRef>
+          <a:fillRef idx="1">
+            <a:schemeClr val="accent1"/>
+          </a:fillRef>
+          <a:effectRef idx="0">
+            <a:schemeClr val="accent1"/>
+          </a:effectRef>
+          <a:fontRef idx="minor">
+            <a:schemeClr val="lt1"/>
+          </a:fontRef>
+        </p:style>
+        <p:txBody>
+          <a:bodyPr rtlCol="0" anchor="ctr"/>
+          <a:lstStyle/>
+          <a:p>
+            <a:pPr algn="ctr"/>
+            <a:endParaRPr lang="de-CH" sz="2200" dirty="0" err="1" smtClean="0">
+              <a:latin typeface="AA Zuehlke" pitchFamily="2" charset="0"/>
+            </a:endParaRPr>
+          </a:p>
+        </p:txBody>
+      </p:sp>
+      <p:sp>
+        <p:nvSpPr>
+          <p:cNvPr id="9" name="Rectangle 8"/>
+          <p:cNvSpPr/>
+          <p:nvPr/>
+        </p:nvSpPr>
+        <p:spPr>
+          <a:xfrm>
+            <a:off x="579816" y="2225965"/>
+            <a:ext cx="7984368" cy="3412994"/>
+          </a:xfrm>
+          <a:prstGeom prst="rect">
+            <a:avLst/>
+          </a:prstGeom>
+          <a:solidFill>
+            <a:schemeClr val="accent2">
+              <a:lumMod val="40000"/>
+              <a:lumOff val="60000"/>
+            </a:schemeClr>
+          </a:solidFill>
+          <a:ln w="12700">
+            <a:noFill/>
+          </a:ln>
+        </p:spPr>
+        <p:style>
+          <a:lnRef idx="2">
+            <a:schemeClr val="accent1">
+              <a:shade val="50000"/>
+            </a:schemeClr>
+          </a:lnRef>
+          <a:fillRef idx="1">
+            <a:schemeClr val="accent1"/>
+          </a:fillRef>
+          <a:effectRef idx="0">
+            <a:schemeClr val="accent1"/>
+          </a:effectRef>
+          <a:fontRef idx="minor">
+            <a:schemeClr val="lt1"/>
+          </a:fontRef>
+        </p:style>
+        <p:txBody>
+          <a:bodyPr rtlCol="0" anchor="ctr"/>
+          <a:lstStyle/>
+          <a:p>
+            <a:pPr algn="ctr"/>
+            <a:endParaRPr lang="de-CH" sz="2200" dirty="0" err="1" smtClean="0">
+              <a:latin typeface="AA Zuehlke" pitchFamily="2" charset="0"/>
+            </a:endParaRPr>
+          </a:p>
+        </p:txBody>
+      </p:sp>
+      <p:sp>
+        <p:nvSpPr>
+          <p:cNvPr id="12" name="Rectangle 11"/>
+          <p:cNvSpPr/>
+          <p:nvPr/>
+        </p:nvSpPr>
+        <p:spPr>
+          <a:xfrm>
+            <a:off x="579816" y="3705278"/>
+            <a:ext cx="7984368" cy="427734"/>
+          </a:xfrm>
+          <a:prstGeom prst="rect">
+            <a:avLst/>
+          </a:prstGeom>
+          <a:solidFill>
+            <a:schemeClr val="accent2">
+              <a:lumMod val="60000"/>
+              <a:lumOff val="40000"/>
+            </a:schemeClr>
+          </a:solidFill>
+          <a:ln w="12700">
+            <a:noFill/>
+          </a:ln>
+        </p:spPr>
+        <p:style>
+          <a:lnRef idx="2">
+            <a:schemeClr val="accent1">
+              <a:shade val="50000"/>
+            </a:schemeClr>
+          </a:lnRef>
+          <a:fillRef idx="1">
+            <a:schemeClr val="accent1"/>
+          </a:fillRef>
+          <a:effectRef idx="0">
+            <a:schemeClr val="accent1"/>
+          </a:effectRef>
+          <a:fontRef idx="minor">
+            <a:schemeClr val="lt1"/>
+          </a:fontRef>
+        </p:style>
+        <p:txBody>
+          <a:bodyPr rtlCol="0" anchor="ctr"/>
+          <a:lstStyle/>
+          <a:p>
+            <a:pPr algn="ctr"/>
+            <a:endParaRPr lang="de-CH" sz="2200" dirty="0" err="1" smtClean="0">
+              <a:latin typeface="AA Zuehlke" pitchFamily="2" charset="0"/>
+            </a:endParaRPr>
+          </a:p>
+        </p:txBody>
+      </p:sp>
+      <p:sp>
+        <p:nvSpPr>
+          <p:cNvPr id="13" name="Rectangle 12"/>
+          <p:cNvSpPr/>
+          <p:nvPr/>
+        </p:nvSpPr>
+        <p:spPr>
+          <a:xfrm>
+            <a:off x="579816" y="4070601"/>
+            <a:ext cx="7984368" cy="1140624"/>
+          </a:xfrm>
+          <a:prstGeom prst="rect">
+            <a:avLst/>
+          </a:prstGeom>
+          <a:solidFill>
+            <a:schemeClr val="accent2">
+              <a:lumMod val="60000"/>
+              <a:lumOff val="40000"/>
+            </a:schemeClr>
+          </a:solidFill>
+          <a:ln w="12700">
+            <a:noFill/>
+          </a:ln>
+        </p:spPr>
+        <p:style>
+          <a:lnRef idx="2">
+            <a:schemeClr val="accent1">
+              <a:shade val="50000"/>
+            </a:schemeClr>
+          </a:lnRef>
+          <a:fillRef idx="1">
+            <a:schemeClr val="accent1"/>
+          </a:fillRef>
+          <a:effectRef idx="0">
+            <a:schemeClr val="accent1"/>
+          </a:effectRef>
+          <a:fontRef idx="minor">
+            <a:schemeClr val="lt1"/>
+          </a:fontRef>
+        </p:style>
+        <p:txBody>
+          <a:bodyPr rtlCol="0" anchor="ctr"/>
+          <a:lstStyle/>
+          <a:p>
+            <a:pPr algn="ctr"/>
+            <a:endParaRPr lang="de-CH" sz="2200" dirty="0" err="1" smtClean="0">
+              <a:latin typeface="AA Zuehlke" pitchFamily="2" charset="0"/>
+            </a:endParaRPr>
+          </a:p>
+        </p:txBody>
+      </p:sp>
+      <p:sp>
+        <p:nvSpPr>
+          <p:cNvPr id="3" name="Content Placeholder 2"/>
+          <p:cNvSpPr>
+            <a:spLocks noGrp="1"/>
+          </p:cNvSpPr>
+          <p:nvPr>
+            <p:ph idx="1"/>
+          </p:nvPr>
+        </p:nvSpPr>
+        <p:spPr/>
+        <p:txBody>
+          <a:bodyPr/>
+          <a:lstStyle/>
+          <a:p>
+            <a:r>
+              <a:rPr lang="de-CH" sz="2000" b="1" dirty="0" err="1" smtClean="0"/>
+              <a:t>Compose</a:t>
+            </a:r>
+            <a:r>
+              <a:rPr lang="de-CH" sz="2000" b="1" dirty="0" smtClean="0"/>
+              <a:t> </a:t>
+            </a:r>
+            <a:r>
+              <a:rPr lang="de-CH" sz="2000" b="1" dirty="0" err="1" smtClean="0"/>
+              <a:t>and</a:t>
+            </a:r>
+            <a:r>
+              <a:rPr lang="de-CH" sz="2000" b="1" dirty="0" smtClean="0"/>
+              <a:t> </a:t>
+            </a:r>
+            <a:r>
+              <a:rPr lang="de-CH" sz="2000" b="1" dirty="0" err="1" smtClean="0"/>
+              <a:t>conquer</a:t>
+            </a:r>
+            <a:endParaRPr lang="de-CH" sz="2000" b="1" dirty="0"/>
+          </a:p>
+          <a:p>
+            <a:pPr marL="177800">
+              <a:spcBef>
+                <a:spcPts val="1200"/>
+              </a:spcBef>
+              <a:tabLst>
+                <a:tab pos="541338" algn="l"/>
+              </a:tabLst>
+            </a:pPr>
+            <a:r>
+              <a:rPr lang="de-CH" sz="2000" b="1" dirty="0" err="1" smtClean="0">
+                <a:latin typeface="Consolas" panose="020B0609020204030204" pitchFamily="49" charset="0"/>
+                <a:cs typeface="Consolas" panose="020B0609020204030204" pitchFamily="49" charset="0"/>
+              </a:rPr>
+              <a:t>def</a:t>
+            </a:r>
+            <a:r>
+              <a:rPr lang="de-CH" sz="2000" dirty="0" smtClean="0">
+                <a:latin typeface="Consolas" panose="020B0609020204030204" pitchFamily="49" charset="0"/>
+                <a:cs typeface="Consolas" panose="020B0609020204030204" pitchFamily="49" charset="0"/>
+              </a:rPr>
+              <a:t> </a:t>
+            </a:r>
+            <a:r>
+              <a:rPr lang="de-CH" sz="2000" dirty="0" err="1" smtClean="0">
+                <a:latin typeface="Consolas" panose="020B0609020204030204" pitchFamily="49" charset="0"/>
+                <a:cs typeface="Consolas" panose="020B0609020204030204" pitchFamily="49" charset="0"/>
+              </a:rPr>
+              <a:t>compose</a:t>
+            </a:r>
+            <a:r>
+              <a:rPr lang="de-CH" sz="2000" dirty="0" smtClean="0">
+                <a:latin typeface="Consolas" panose="020B0609020204030204" pitchFamily="49" charset="0"/>
+                <a:cs typeface="Consolas" panose="020B0609020204030204" pitchFamily="49" charset="0"/>
+              </a:rPr>
+              <a:t>[</a:t>
+            </a:r>
+            <a:r>
+              <a:rPr lang="de-CH" sz="2000" dirty="0" err="1" smtClean="0">
+                <a:latin typeface="Consolas" panose="020B0609020204030204" pitchFamily="49" charset="0"/>
+                <a:cs typeface="Consolas" panose="020B0609020204030204" pitchFamily="49" charset="0"/>
+              </a:rPr>
+              <a:t>Outer,Inner,Value</a:t>
+            </a:r>
+            <a:r>
+              <a:rPr lang="de-CH" sz="2000" dirty="0" smtClean="0">
+                <a:latin typeface="Consolas" panose="020B0609020204030204" pitchFamily="49" charset="0"/>
+                <a:cs typeface="Consolas" panose="020B0609020204030204" pitchFamily="49" charset="0"/>
+              </a:rPr>
+              <a:t>](</a:t>
+            </a:r>
+          </a:p>
+          <a:p>
+            <a:pPr marL="177800">
+              <a:spcBef>
+                <a:spcPts val="600"/>
+              </a:spcBef>
+              <a:tabLst>
+                <a:tab pos="541338" algn="l"/>
+              </a:tabLst>
+            </a:pPr>
+            <a:r>
+              <a:rPr lang="de-CH" sz="2000" dirty="0">
+                <a:latin typeface="Consolas" panose="020B0609020204030204" pitchFamily="49" charset="0"/>
+                <a:cs typeface="Consolas" panose="020B0609020204030204" pitchFamily="49" charset="0"/>
+              </a:rPr>
+              <a:t>	</a:t>
+            </a:r>
+            <a:r>
+              <a:rPr lang="de-CH" sz="2000" dirty="0" err="1" smtClean="0">
+                <a:solidFill>
+                  <a:schemeClr val="accent3">
+                    <a:lumMod val="75000"/>
+                  </a:schemeClr>
+                </a:solidFill>
+                <a:latin typeface="Consolas" panose="020B0609020204030204" pitchFamily="49" charset="0"/>
+                <a:cs typeface="Consolas" panose="020B0609020204030204" pitchFamily="49" charset="0"/>
+              </a:rPr>
+              <a:t>outerLens</a:t>
+            </a:r>
+            <a:r>
+              <a:rPr lang="de-CH" sz="2000" dirty="0" smtClean="0">
+                <a:solidFill>
+                  <a:schemeClr val="accent3">
+                    <a:lumMod val="75000"/>
+                  </a:schemeClr>
+                </a:solidFill>
+                <a:latin typeface="Consolas" panose="020B0609020204030204" pitchFamily="49" charset="0"/>
+                <a:cs typeface="Consolas" panose="020B0609020204030204" pitchFamily="49" charset="0"/>
+              </a:rPr>
+              <a:t>: Lens[</a:t>
+            </a:r>
+            <a:r>
+              <a:rPr lang="de-CH" sz="2000" dirty="0" err="1" smtClean="0">
+                <a:solidFill>
+                  <a:schemeClr val="accent3">
+                    <a:lumMod val="75000"/>
+                  </a:schemeClr>
+                </a:solidFill>
+                <a:latin typeface="Consolas" panose="020B0609020204030204" pitchFamily="49" charset="0"/>
+                <a:cs typeface="Consolas" panose="020B0609020204030204" pitchFamily="49" charset="0"/>
+              </a:rPr>
+              <a:t>Outer,Inner</a:t>
+            </a:r>
+            <a:r>
+              <a:rPr lang="de-CH" sz="2000" dirty="0" smtClean="0">
+                <a:solidFill>
+                  <a:schemeClr val="accent3">
+                    <a:lumMod val="75000"/>
+                  </a:schemeClr>
+                </a:solidFill>
+                <a:latin typeface="Consolas" panose="020B0609020204030204" pitchFamily="49" charset="0"/>
+                <a:cs typeface="Consolas" panose="020B0609020204030204" pitchFamily="49" charset="0"/>
+              </a:rPr>
+              <a:t>]</a:t>
+            </a:r>
+            <a:r>
+              <a:rPr lang="de-CH" sz="2000" dirty="0" smtClean="0">
+                <a:latin typeface="Consolas" panose="020B0609020204030204" pitchFamily="49" charset="0"/>
+                <a:cs typeface="Consolas" panose="020B0609020204030204" pitchFamily="49" charset="0"/>
+              </a:rPr>
+              <a:t>, </a:t>
+            </a:r>
+          </a:p>
+          <a:p>
+            <a:pPr marL="177800">
+              <a:spcBef>
+                <a:spcPts val="600"/>
+              </a:spcBef>
+              <a:tabLst>
+                <a:tab pos="541338" algn="l"/>
+              </a:tabLst>
+            </a:pPr>
+            <a:r>
+              <a:rPr lang="de-CH" sz="2000" dirty="0">
+                <a:latin typeface="Consolas" panose="020B0609020204030204" pitchFamily="49" charset="0"/>
+                <a:cs typeface="Consolas" panose="020B0609020204030204" pitchFamily="49" charset="0"/>
+              </a:rPr>
+              <a:t>	</a:t>
+            </a:r>
+            <a:r>
+              <a:rPr lang="de-CH" sz="2000" dirty="0" err="1" smtClean="0">
+                <a:solidFill>
+                  <a:schemeClr val="accent4">
+                    <a:lumMod val="75000"/>
+                  </a:schemeClr>
+                </a:solidFill>
+                <a:latin typeface="Consolas" panose="020B0609020204030204" pitchFamily="49" charset="0"/>
+                <a:cs typeface="Consolas" panose="020B0609020204030204" pitchFamily="49" charset="0"/>
+              </a:rPr>
+              <a:t>innerLens</a:t>
+            </a:r>
+            <a:r>
+              <a:rPr lang="de-CH" sz="2000" dirty="0" smtClean="0">
+                <a:solidFill>
+                  <a:schemeClr val="accent4">
+                    <a:lumMod val="75000"/>
+                  </a:schemeClr>
+                </a:solidFill>
+                <a:latin typeface="Consolas" panose="020B0609020204030204" pitchFamily="49" charset="0"/>
+                <a:cs typeface="Consolas" panose="020B0609020204030204" pitchFamily="49" charset="0"/>
+              </a:rPr>
+              <a:t>: Lens[</a:t>
+            </a:r>
+            <a:r>
+              <a:rPr lang="de-CH" sz="2000" dirty="0" err="1" smtClean="0">
+                <a:solidFill>
+                  <a:schemeClr val="accent4">
+                    <a:lumMod val="75000"/>
+                  </a:schemeClr>
+                </a:solidFill>
+                <a:latin typeface="Consolas" panose="020B0609020204030204" pitchFamily="49" charset="0"/>
+                <a:cs typeface="Consolas" panose="020B0609020204030204" pitchFamily="49" charset="0"/>
+              </a:rPr>
+              <a:t>Inner,Value</a:t>
+            </a:r>
+            <a:r>
+              <a:rPr lang="de-CH" sz="2000" dirty="0" smtClean="0">
+                <a:solidFill>
+                  <a:schemeClr val="accent4">
+                    <a:lumMod val="75000"/>
+                  </a:schemeClr>
+                </a:solidFill>
+                <a:latin typeface="Consolas" panose="020B0609020204030204" pitchFamily="49" charset="0"/>
+                <a:cs typeface="Consolas" panose="020B0609020204030204" pitchFamily="49" charset="0"/>
+              </a:rPr>
+              <a:t>]</a:t>
+            </a:r>
+          </a:p>
+          <a:p>
+            <a:pPr marL="177800">
+              <a:spcBef>
+                <a:spcPts val="600"/>
+              </a:spcBef>
+              <a:tabLst>
+                <a:tab pos="541338" algn="l"/>
+              </a:tabLst>
+            </a:pPr>
+            <a:r>
+              <a:rPr lang="de-CH" sz="2000" dirty="0" smtClean="0">
+                <a:latin typeface="Consolas" panose="020B0609020204030204" pitchFamily="49" charset="0"/>
+                <a:cs typeface="Consolas" panose="020B0609020204030204" pitchFamily="49" charset="0"/>
+              </a:rPr>
+              <a:t>): Lens[</a:t>
+            </a:r>
+            <a:r>
+              <a:rPr lang="de-CH" sz="2000" dirty="0" err="1" smtClean="0">
+                <a:latin typeface="Consolas" panose="020B0609020204030204" pitchFamily="49" charset="0"/>
+                <a:cs typeface="Consolas" panose="020B0609020204030204" pitchFamily="49" charset="0"/>
+              </a:rPr>
+              <a:t>Outer,Value</a:t>
+            </a:r>
+            <a:r>
+              <a:rPr lang="de-CH" sz="2000" dirty="0" smtClean="0">
+                <a:latin typeface="Consolas" panose="020B0609020204030204" pitchFamily="49" charset="0"/>
+                <a:cs typeface="Consolas" panose="020B0609020204030204" pitchFamily="49" charset="0"/>
+              </a:rPr>
+              <a:t>] = Lens(</a:t>
+            </a:r>
+          </a:p>
+          <a:p>
+            <a:pPr marL="177800">
+              <a:spcBef>
+                <a:spcPts val="600"/>
+              </a:spcBef>
+              <a:tabLst>
+                <a:tab pos="541338" algn="l"/>
+              </a:tabLst>
+            </a:pPr>
+            <a:r>
+              <a:rPr lang="de-CH" sz="2000" dirty="0" smtClean="0">
+                <a:latin typeface="Consolas" panose="020B0609020204030204" pitchFamily="49" charset="0"/>
+                <a:cs typeface="Consolas" panose="020B0609020204030204" pitchFamily="49" charset="0"/>
+              </a:rPr>
+              <a:t>	</a:t>
+            </a:r>
+            <a:r>
+              <a:rPr lang="de-CH" sz="2000" dirty="0" err="1" smtClean="0">
+                <a:latin typeface="Consolas" panose="020B0609020204030204" pitchFamily="49" charset="0"/>
+                <a:cs typeface="Consolas" panose="020B0609020204030204" pitchFamily="49" charset="0"/>
+              </a:rPr>
+              <a:t>obj</a:t>
+            </a:r>
+            <a:r>
+              <a:rPr lang="de-CH" sz="2000" dirty="0" smtClean="0">
+                <a:latin typeface="Consolas" panose="020B0609020204030204" pitchFamily="49" charset="0"/>
+                <a:cs typeface="Consolas" panose="020B0609020204030204" pitchFamily="49" charset="0"/>
+              </a:rPr>
+              <a:t> =&gt; </a:t>
+            </a:r>
+            <a:r>
+              <a:rPr lang="de-CH" sz="2000" dirty="0" err="1" smtClean="0">
+                <a:solidFill>
+                  <a:schemeClr val="accent4">
+                    <a:lumMod val="75000"/>
+                  </a:schemeClr>
+                </a:solidFill>
+                <a:latin typeface="Consolas" panose="020B0609020204030204" pitchFamily="49" charset="0"/>
+                <a:cs typeface="Consolas" panose="020B0609020204030204" pitchFamily="49" charset="0"/>
+              </a:rPr>
+              <a:t>innerLens.get</a:t>
+            </a:r>
+            <a:r>
+              <a:rPr lang="de-CH" sz="2000" dirty="0" smtClean="0">
+                <a:latin typeface="Consolas" panose="020B0609020204030204" pitchFamily="49" charset="0"/>
+                <a:cs typeface="Consolas" panose="020B0609020204030204" pitchFamily="49" charset="0"/>
+              </a:rPr>
+              <a:t>(</a:t>
+            </a:r>
+            <a:r>
+              <a:rPr lang="de-CH" sz="2000" dirty="0" err="1" smtClean="0">
+                <a:solidFill>
+                  <a:schemeClr val="accent3">
+                    <a:lumMod val="75000"/>
+                  </a:schemeClr>
+                </a:solidFill>
+                <a:latin typeface="Consolas" panose="020B0609020204030204" pitchFamily="49" charset="0"/>
+                <a:cs typeface="Consolas" panose="020B0609020204030204" pitchFamily="49" charset="0"/>
+              </a:rPr>
+              <a:t>outerLens.get</a:t>
+            </a:r>
+            <a:r>
+              <a:rPr lang="de-CH" sz="2000" dirty="0" smtClean="0">
+                <a:solidFill>
+                  <a:schemeClr val="accent3">
+                    <a:lumMod val="75000"/>
+                  </a:schemeClr>
+                </a:solidFill>
+                <a:latin typeface="Consolas" panose="020B0609020204030204" pitchFamily="49" charset="0"/>
+                <a:cs typeface="Consolas" panose="020B0609020204030204" pitchFamily="49" charset="0"/>
+              </a:rPr>
+              <a:t>(</a:t>
+            </a:r>
+            <a:r>
+              <a:rPr lang="de-CH" sz="2000" dirty="0" err="1" smtClean="0">
+                <a:solidFill>
+                  <a:schemeClr val="accent3">
+                    <a:lumMod val="75000"/>
+                  </a:schemeClr>
+                </a:solidFill>
+                <a:latin typeface="Consolas" panose="020B0609020204030204" pitchFamily="49" charset="0"/>
+                <a:cs typeface="Consolas" panose="020B0609020204030204" pitchFamily="49" charset="0"/>
+              </a:rPr>
+              <a:t>obj</a:t>
+            </a:r>
+            <a:r>
+              <a:rPr lang="de-CH" sz="2000" dirty="0" smtClean="0">
+                <a:solidFill>
+                  <a:schemeClr val="accent3">
+                    <a:lumMod val="75000"/>
+                  </a:schemeClr>
+                </a:solidFill>
+                <a:latin typeface="Consolas" panose="020B0609020204030204" pitchFamily="49" charset="0"/>
+                <a:cs typeface="Consolas" panose="020B0609020204030204" pitchFamily="49" charset="0"/>
+              </a:rPr>
+              <a:t>)</a:t>
+            </a:r>
+            <a:r>
+              <a:rPr lang="de-CH" sz="2000" dirty="0" smtClean="0">
+                <a:solidFill>
+                  <a:schemeClr val="accent4">
+                    <a:lumMod val="75000"/>
+                  </a:schemeClr>
+                </a:solidFill>
+                <a:latin typeface="Consolas" panose="020B0609020204030204" pitchFamily="49" charset="0"/>
+                <a:cs typeface="Consolas" panose="020B0609020204030204" pitchFamily="49" charset="0"/>
+              </a:rPr>
+              <a:t>)</a:t>
+            </a:r>
+            <a:r>
+              <a:rPr lang="de-CH" sz="2000" dirty="0" smtClean="0">
+                <a:latin typeface="Consolas" panose="020B0609020204030204" pitchFamily="49" charset="0"/>
+                <a:cs typeface="Consolas" panose="020B0609020204030204" pitchFamily="49" charset="0"/>
+              </a:rPr>
+              <a:t>,</a:t>
+            </a:r>
+          </a:p>
+          <a:p>
+            <a:pPr marL="177800">
+              <a:spcBef>
+                <a:spcPts val="600"/>
+              </a:spcBef>
+              <a:tabLst>
+                <a:tab pos="541338" algn="l"/>
+              </a:tabLst>
+            </a:pPr>
+            <a:r>
+              <a:rPr lang="de-CH" sz="2000" dirty="0" smtClean="0">
+                <a:latin typeface="Consolas" panose="020B0609020204030204" pitchFamily="49" charset="0"/>
+                <a:cs typeface="Consolas" panose="020B0609020204030204" pitchFamily="49" charset="0"/>
+              </a:rPr>
+              <a:t>	(</a:t>
+            </a:r>
+            <a:r>
+              <a:rPr lang="de-CH" sz="2000" dirty="0" err="1" smtClean="0">
+                <a:latin typeface="Consolas" panose="020B0609020204030204" pitchFamily="49" charset="0"/>
+                <a:cs typeface="Consolas" panose="020B0609020204030204" pitchFamily="49" charset="0"/>
+              </a:rPr>
+              <a:t>obj</a:t>
+            </a:r>
+            <a:r>
+              <a:rPr lang="de-CH" sz="2000" dirty="0" smtClean="0">
+                <a:latin typeface="Consolas" panose="020B0609020204030204" pitchFamily="49" charset="0"/>
+                <a:cs typeface="Consolas" panose="020B0609020204030204" pitchFamily="49" charset="0"/>
+              </a:rPr>
+              <a:t>, </a:t>
+            </a:r>
+            <a:r>
+              <a:rPr lang="de-CH" sz="2000" dirty="0" err="1" smtClean="0">
+                <a:latin typeface="Consolas" panose="020B0609020204030204" pitchFamily="49" charset="0"/>
+                <a:cs typeface="Consolas" panose="020B0609020204030204" pitchFamily="49" charset="0"/>
+              </a:rPr>
+              <a:t>value</a:t>
+            </a:r>
+            <a:r>
+              <a:rPr lang="de-CH" sz="2000" dirty="0" smtClean="0">
+                <a:latin typeface="Consolas" panose="020B0609020204030204" pitchFamily="49" charset="0"/>
+                <a:cs typeface="Consolas" panose="020B0609020204030204" pitchFamily="49" charset="0"/>
+              </a:rPr>
+              <a:t>) =&gt; </a:t>
+            </a:r>
+            <a:r>
+              <a:rPr lang="de-CH" sz="2000" dirty="0" err="1" smtClean="0">
+                <a:solidFill>
+                  <a:schemeClr val="accent3">
+                    <a:lumMod val="75000"/>
+                  </a:schemeClr>
+                </a:solidFill>
+                <a:latin typeface="Consolas" panose="020B0609020204030204" pitchFamily="49" charset="0"/>
+                <a:cs typeface="Consolas" panose="020B0609020204030204" pitchFamily="49" charset="0"/>
+              </a:rPr>
+              <a:t>outerLens.set</a:t>
+            </a:r>
+            <a:r>
+              <a:rPr lang="de-CH" sz="2000" dirty="0" smtClean="0">
+                <a:solidFill>
+                  <a:schemeClr val="accent3">
+                    <a:lumMod val="75000"/>
+                  </a:schemeClr>
+                </a:solidFill>
+                <a:latin typeface="Consolas" panose="020B0609020204030204" pitchFamily="49" charset="0"/>
+                <a:cs typeface="Consolas" panose="020B0609020204030204" pitchFamily="49" charset="0"/>
+              </a:rPr>
+              <a:t>(</a:t>
+            </a:r>
+            <a:r>
+              <a:rPr lang="de-CH" sz="2000" dirty="0" err="1" smtClean="0">
+                <a:solidFill>
+                  <a:schemeClr val="accent3">
+                    <a:lumMod val="75000"/>
+                  </a:schemeClr>
+                </a:solidFill>
+                <a:latin typeface="Consolas" panose="020B0609020204030204" pitchFamily="49" charset="0"/>
+                <a:cs typeface="Consolas" panose="020B0609020204030204" pitchFamily="49" charset="0"/>
+              </a:rPr>
+              <a:t>obj</a:t>
+            </a:r>
+            <a:r>
+              <a:rPr lang="de-CH" sz="2000" dirty="0" smtClean="0">
+                <a:solidFill>
+                  <a:schemeClr val="accent3">
+                    <a:lumMod val="75000"/>
+                  </a:schemeClr>
+                </a:solidFill>
+                <a:latin typeface="Consolas" panose="020B0609020204030204" pitchFamily="49" charset="0"/>
+                <a:cs typeface="Consolas" panose="020B0609020204030204" pitchFamily="49" charset="0"/>
+              </a:rPr>
+              <a:t>,</a:t>
+            </a:r>
+          </a:p>
+          <a:p>
+            <a:pPr marL="177800">
+              <a:spcBef>
+                <a:spcPts val="600"/>
+              </a:spcBef>
+              <a:tabLst>
+                <a:tab pos="541338" algn="l"/>
+              </a:tabLst>
+            </a:pPr>
+            <a:r>
+              <a:rPr lang="de-CH" sz="2000" dirty="0">
+                <a:latin typeface="Consolas" panose="020B0609020204030204" pitchFamily="49" charset="0"/>
+                <a:cs typeface="Consolas" panose="020B0609020204030204" pitchFamily="49" charset="0"/>
+              </a:rPr>
+              <a:t>	</a:t>
+            </a:r>
+            <a:r>
+              <a:rPr lang="de-CH" sz="2000" dirty="0" smtClean="0">
+                <a:latin typeface="Consolas" panose="020B0609020204030204" pitchFamily="49" charset="0"/>
+                <a:cs typeface="Consolas" panose="020B0609020204030204" pitchFamily="49" charset="0"/>
+              </a:rPr>
+              <a:t>	</a:t>
+            </a:r>
+            <a:r>
+              <a:rPr lang="de-CH" sz="2000" dirty="0" err="1" smtClean="0">
+                <a:solidFill>
+                  <a:schemeClr val="accent4">
+                    <a:lumMod val="75000"/>
+                  </a:schemeClr>
+                </a:solidFill>
+                <a:latin typeface="Consolas" panose="020B0609020204030204" pitchFamily="49" charset="0"/>
+                <a:cs typeface="Consolas" panose="020B0609020204030204" pitchFamily="49" charset="0"/>
+              </a:rPr>
+              <a:t>innerLens.set</a:t>
+            </a:r>
+            <a:r>
+              <a:rPr lang="de-CH" sz="2000" dirty="0" smtClean="0">
+                <a:solidFill>
+                  <a:schemeClr val="accent4">
+                    <a:lumMod val="75000"/>
+                  </a:schemeClr>
+                </a:solidFill>
+                <a:latin typeface="Consolas" panose="020B0609020204030204" pitchFamily="49" charset="0"/>
+                <a:cs typeface="Consolas" panose="020B0609020204030204" pitchFamily="49" charset="0"/>
+              </a:rPr>
+              <a:t>(</a:t>
+            </a:r>
+            <a:r>
+              <a:rPr lang="de-CH" sz="2000" dirty="0" err="1" smtClean="0">
+                <a:solidFill>
+                  <a:schemeClr val="accent3">
+                    <a:lumMod val="75000"/>
+                  </a:schemeClr>
+                </a:solidFill>
+                <a:latin typeface="Consolas" panose="020B0609020204030204" pitchFamily="49" charset="0"/>
+                <a:cs typeface="Consolas" panose="020B0609020204030204" pitchFamily="49" charset="0"/>
+              </a:rPr>
+              <a:t>outerLens.get</a:t>
+            </a:r>
+            <a:r>
+              <a:rPr lang="de-CH" sz="2000" dirty="0" smtClean="0">
+                <a:solidFill>
+                  <a:schemeClr val="accent3">
+                    <a:lumMod val="75000"/>
+                  </a:schemeClr>
+                </a:solidFill>
+                <a:latin typeface="Consolas" panose="020B0609020204030204" pitchFamily="49" charset="0"/>
+                <a:cs typeface="Consolas" panose="020B0609020204030204" pitchFamily="49" charset="0"/>
+              </a:rPr>
+              <a:t>(</a:t>
+            </a:r>
+            <a:r>
+              <a:rPr lang="de-CH" sz="2000" dirty="0" err="1" smtClean="0">
+                <a:solidFill>
+                  <a:schemeClr val="accent3">
+                    <a:lumMod val="75000"/>
+                  </a:schemeClr>
+                </a:solidFill>
+                <a:latin typeface="Consolas" panose="020B0609020204030204" pitchFamily="49" charset="0"/>
+                <a:cs typeface="Consolas" panose="020B0609020204030204" pitchFamily="49" charset="0"/>
+              </a:rPr>
+              <a:t>obj</a:t>
+            </a:r>
+            <a:r>
+              <a:rPr lang="de-CH" sz="2000" dirty="0" smtClean="0">
+                <a:solidFill>
+                  <a:schemeClr val="accent3">
+                    <a:lumMod val="75000"/>
+                  </a:schemeClr>
+                </a:solidFill>
+                <a:latin typeface="Consolas" panose="020B0609020204030204" pitchFamily="49" charset="0"/>
+                <a:cs typeface="Consolas" panose="020B0609020204030204" pitchFamily="49" charset="0"/>
+              </a:rPr>
+              <a:t>)</a:t>
+            </a:r>
+            <a:r>
+              <a:rPr lang="de-CH" sz="2000" dirty="0" smtClean="0">
+                <a:solidFill>
+                  <a:schemeClr val="accent4">
+                    <a:lumMod val="75000"/>
+                  </a:schemeClr>
+                </a:solidFill>
+                <a:latin typeface="Consolas" panose="020B0609020204030204" pitchFamily="49" charset="0"/>
+                <a:cs typeface="Consolas" panose="020B0609020204030204" pitchFamily="49" charset="0"/>
+              </a:rPr>
+              <a:t>, </a:t>
+            </a:r>
+            <a:r>
+              <a:rPr lang="de-CH" sz="2000" dirty="0" err="1" smtClean="0">
+                <a:solidFill>
+                  <a:schemeClr val="accent4">
+                    <a:lumMod val="75000"/>
+                  </a:schemeClr>
+                </a:solidFill>
+                <a:latin typeface="Consolas" panose="020B0609020204030204" pitchFamily="49" charset="0"/>
+                <a:cs typeface="Consolas" panose="020B0609020204030204" pitchFamily="49" charset="0"/>
+              </a:rPr>
+              <a:t>value</a:t>
+            </a:r>
+            <a:r>
+              <a:rPr lang="de-CH" sz="2000" dirty="0" smtClean="0">
+                <a:solidFill>
+                  <a:schemeClr val="accent4">
+                    <a:lumMod val="75000"/>
+                  </a:schemeClr>
+                </a:solidFill>
+                <a:latin typeface="Consolas" panose="020B0609020204030204" pitchFamily="49" charset="0"/>
+                <a:cs typeface="Consolas" panose="020B0609020204030204" pitchFamily="49" charset="0"/>
+              </a:rPr>
+              <a:t>)</a:t>
+            </a:r>
+          </a:p>
+          <a:p>
+            <a:pPr marL="177800">
+              <a:spcBef>
+                <a:spcPts val="600"/>
+              </a:spcBef>
+              <a:tabLst>
+                <a:tab pos="541338" algn="l"/>
+              </a:tabLst>
+            </a:pPr>
+            <a:r>
+              <a:rPr lang="de-CH" sz="2000" dirty="0">
+                <a:latin typeface="Consolas" panose="020B0609020204030204" pitchFamily="49" charset="0"/>
+                <a:cs typeface="Consolas" panose="020B0609020204030204" pitchFamily="49" charset="0"/>
+              </a:rPr>
+              <a:t>	</a:t>
+            </a:r>
+            <a:r>
+              <a:rPr lang="de-CH" sz="2000" dirty="0" smtClean="0">
+                <a:latin typeface="Consolas" panose="020B0609020204030204" pitchFamily="49" charset="0"/>
+                <a:cs typeface="Consolas" panose="020B0609020204030204" pitchFamily="49" charset="0"/>
+              </a:rPr>
+              <a:t>)</a:t>
+            </a:r>
+          </a:p>
+          <a:p>
+            <a:pPr marL="177800">
+              <a:spcBef>
+                <a:spcPts val="600"/>
+              </a:spcBef>
+              <a:tabLst>
+                <a:tab pos="541338" algn="l"/>
+              </a:tabLst>
+            </a:pPr>
+            <a:r>
+              <a:rPr lang="de-CH" sz="2000" dirty="0" smtClean="0">
+                <a:latin typeface="Consolas" panose="020B0609020204030204" pitchFamily="49" charset="0"/>
+                <a:cs typeface="Consolas" panose="020B0609020204030204" pitchFamily="49" charset="0"/>
+              </a:rPr>
+              <a:t>)</a:t>
+            </a:r>
+          </a:p>
+          <a:p>
+            <a:pPr marL="177800">
+              <a:spcBef>
+                <a:spcPts val="0"/>
+              </a:spcBef>
+              <a:tabLst>
+                <a:tab pos="541338" algn="l"/>
+              </a:tabLst>
+            </a:pPr>
+            <a:endParaRPr lang="de-CH" sz="1050" dirty="0" smtClean="0">
+              <a:latin typeface="Consolas" panose="020B0609020204030204" pitchFamily="49" charset="0"/>
+              <a:cs typeface="Consolas" panose="020B0609020204030204" pitchFamily="49" charset="0"/>
+            </a:endParaRPr>
+          </a:p>
+          <a:p>
+            <a:pPr marL="177800">
+              <a:spcBef>
+                <a:spcPts val="1200"/>
+              </a:spcBef>
+            </a:pPr>
+            <a:r>
+              <a:rPr lang="de-CH" sz="2000" b="1" dirty="0" err="1" smtClean="0">
+                <a:latin typeface="Consolas" panose="020B0609020204030204" pitchFamily="49" charset="0"/>
+                <a:cs typeface="Consolas" panose="020B0609020204030204" pitchFamily="49" charset="0"/>
+              </a:rPr>
+              <a:t>case</a:t>
+            </a:r>
+            <a:r>
+              <a:rPr lang="de-CH" sz="2000" b="1" dirty="0" smtClean="0">
+                <a:latin typeface="Consolas" panose="020B0609020204030204" pitchFamily="49" charset="0"/>
+                <a:cs typeface="Consolas" panose="020B0609020204030204" pitchFamily="49" charset="0"/>
+              </a:rPr>
+              <a:t> </a:t>
+            </a:r>
+            <a:r>
+              <a:rPr lang="de-CH" sz="2000" b="1" dirty="0" err="1" smtClean="0">
+                <a:latin typeface="Consolas" panose="020B0609020204030204" pitchFamily="49" charset="0"/>
+                <a:cs typeface="Consolas" panose="020B0609020204030204" pitchFamily="49" charset="0"/>
+              </a:rPr>
+              <a:t>class</a:t>
+            </a:r>
+            <a:r>
+              <a:rPr lang="de-CH" sz="2000" b="1" dirty="0" smtClean="0">
+                <a:latin typeface="Consolas" panose="020B0609020204030204" pitchFamily="49" charset="0"/>
+                <a:cs typeface="Consolas" panose="020B0609020204030204" pitchFamily="49" charset="0"/>
+              </a:rPr>
+              <a:t> </a:t>
+            </a:r>
+            <a:r>
+              <a:rPr lang="de-CH" sz="2000" dirty="0" smtClean="0">
+                <a:latin typeface="Consolas" panose="020B0609020204030204" pitchFamily="49" charset="0"/>
+                <a:cs typeface="Consolas" panose="020B0609020204030204" pitchFamily="49" charset="0"/>
+              </a:rPr>
+              <a:t>Lens[O,V](</a:t>
+            </a:r>
+            <a:r>
+              <a:rPr lang="de-CH" sz="2000" dirty="0" err="1" smtClean="0">
+                <a:latin typeface="Consolas" panose="020B0609020204030204" pitchFamily="49" charset="0"/>
+                <a:cs typeface="Consolas" panose="020B0609020204030204" pitchFamily="49" charset="0"/>
+              </a:rPr>
+              <a:t>get</a:t>
+            </a:r>
+            <a:r>
+              <a:rPr lang="de-CH" sz="2000" dirty="0" smtClean="0">
+                <a:latin typeface="Consolas" panose="020B0609020204030204" pitchFamily="49" charset="0"/>
+                <a:cs typeface="Consolas" panose="020B0609020204030204" pitchFamily="49" charset="0"/>
+              </a:rPr>
+              <a:t>: O =&gt; V, </a:t>
+            </a:r>
+            <a:r>
+              <a:rPr lang="de-CH" sz="2000" dirty="0" err="1" smtClean="0">
+                <a:latin typeface="Consolas" panose="020B0609020204030204" pitchFamily="49" charset="0"/>
+                <a:cs typeface="Consolas" panose="020B0609020204030204" pitchFamily="49" charset="0"/>
+              </a:rPr>
+              <a:t>set</a:t>
+            </a:r>
+            <a:r>
+              <a:rPr lang="de-CH" sz="2000" dirty="0" smtClean="0">
+                <a:latin typeface="Consolas" panose="020B0609020204030204" pitchFamily="49" charset="0"/>
+                <a:cs typeface="Consolas" panose="020B0609020204030204" pitchFamily="49" charset="0"/>
+              </a:rPr>
+              <a:t>: (O,V) =&gt; O)</a:t>
+            </a:r>
+          </a:p>
+        </p:txBody>
+      </p:sp>
+      <p:sp>
+        <p:nvSpPr>
+          <p:cNvPr id="4" name="Date Placeholder 3"/>
+          <p:cNvSpPr>
+            <a:spLocks noGrp="1"/>
+          </p:cNvSpPr>
+          <p:nvPr>
+            <p:ph type="dt" sz="half" idx="10"/>
+          </p:nvPr>
+        </p:nvSpPr>
+        <p:spPr/>
+        <p:txBody>
+          <a:bodyPr/>
+          <a:lstStyle/>
+          <a:p>
+            <a:r>
+              <a:rPr lang="de-CH" dirty="0" smtClean="0"/>
+              <a:t>14. November 2014</a:t>
+            </a:r>
+            <a:endParaRPr lang="de-CH" dirty="0"/>
+          </a:p>
+        </p:txBody>
+      </p:sp>
+      <p:sp>
+        <p:nvSpPr>
+          <p:cNvPr id="7" name="Footer Placeholder 6"/>
+          <p:cNvSpPr>
+            <a:spLocks noGrp="1"/>
+          </p:cNvSpPr>
+          <p:nvPr>
+            <p:ph type="ftr" sz="quarter" idx="11"/>
+          </p:nvPr>
+        </p:nvSpPr>
+        <p:spPr/>
+        <p:txBody>
+          <a:bodyPr/>
+          <a:lstStyle/>
+          <a:p>
+            <a:r>
+              <a:rPr lang="de-CH" dirty="0" smtClean="0"/>
+              <a:t>Rezepte aus der funktionalen Programmierung | </a:t>
+            </a:r>
+            <a:r>
+              <a:rPr lang="de-CH" dirty="0" err="1" smtClean="0"/>
+              <a:t>ico</a:t>
+            </a:r>
+            <a:endParaRPr lang="de-CH" dirty="0"/>
+          </a:p>
+        </p:txBody>
+      </p:sp>
+      <p:sp>
+        <p:nvSpPr>
+          <p:cNvPr id="5" name="Slide Number Placeholder 4"/>
+          <p:cNvSpPr>
+            <a:spLocks noGrp="1"/>
+          </p:cNvSpPr>
+          <p:nvPr>
+            <p:ph type="sldNum" sz="quarter" idx="12"/>
+          </p:nvPr>
+        </p:nvSpPr>
+        <p:spPr/>
+        <p:txBody>
+          <a:bodyPr/>
+          <a:lstStyle/>
+          <a:p>
+            <a:r>
+              <a:rPr lang="de-CH" smtClean="0"/>
+              <a:t>Slide </a:t>
+            </a:r>
+            <a:fld id="{58815E32-B0BC-4CA8-9733-E1706CF4E3DF}" type="slidenum">
+              <a:rPr lang="de-CH" smtClean="0"/>
+              <a:t>11</a:t>
+            </a:fld>
+            <a:r>
+              <a:rPr lang="de-CH" smtClean="0"/>
+              <a:t> of 23</a:t>
+            </a:r>
+            <a:endParaRPr dirty="0"/>
+          </a:p>
+        </p:txBody>
+      </p:sp>
+      <p:sp>
+        <p:nvSpPr>
+          <p:cNvPr id="17" name="Text Placeholder 5"/>
+          <p:cNvSpPr>
+            <a:spLocks noGrp="1"/>
+          </p:cNvSpPr>
+          <p:nvPr>
+            <p:ph type="body" sz="quarter" idx="13"/>
+          </p:nvPr>
+        </p:nvSpPr>
+        <p:spPr>
+          <a:xfrm>
+            <a:off x="579438" y="930330"/>
+            <a:ext cx="5845175" cy="645156"/>
+          </a:xfrm>
+        </p:spPr>
+        <p:txBody>
+          <a:bodyPr/>
+          <a:lstStyle/>
+          <a:p>
+            <a:r>
+              <a:rPr lang="en-GB" dirty="0"/>
+              <a:t>Modify nested immutable objects</a:t>
+            </a:r>
+          </a:p>
+        </p:txBody>
+      </p:sp>
+      <p:sp>
+        <p:nvSpPr>
+          <p:cNvPr id="18" name="Title 1"/>
+          <p:cNvSpPr>
+            <a:spLocks noGrp="1"/>
+          </p:cNvSpPr>
+          <p:nvPr>
+            <p:ph type="title"/>
+          </p:nvPr>
+        </p:nvSpPr>
+        <p:spPr>
+          <a:xfrm>
+            <a:off x="579439" y="220993"/>
+            <a:ext cx="5845174" cy="712892"/>
+          </a:xfrm>
+        </p:spPr>
+        <p:txBody>
+          <a:bodyPr/>
+          <a:lstStyle/>
+          <a:p>
+            <a:r>
+              <a:rPr lang="en-GB" dirty="0" smtClean="0"/>
+              <a:t>Lenses</a:t>
+            </a:r>
+            <a:endParaRPr lang="en-GB" dirty="0"/>
+          </a:p>
+        </p:txBody>
+      </p:sp>
+    </p:spTree>
+    <p:extLst>
+      <p:ext uri="{BB962C8B-B14F-4D97-AF65-F5344CB8AC3E}">
+        <p14:creationId xmlns:p14="http://schemas.microsoft.com/office/powerpoint/2010/main" val="2133601722"/>
+      </p:ext>
+    </p:extLst>
+  </p:cSld>
+  <p:clrMapOvr>
+    <a:masterClrMapping/>
+  </p:clrMapOvr>
+  <p:timing>
+    <p:tnLst>
+      <p:par>
+        <p:cTn id="1" dur="indefinite" restart="never" nodeType="tmRoot">
+          <p:childTnLst>
+            <p:seq concurrent="1" nextAc="seek">
+              <p:cTn id="2" dur="indefinite" nodeType="mainSeq">
+                <p:childTnLst>
+                  <p:par>
+                    <p:cTn id="3" fill="hold">
+                      <p:stCondLst>
+                        <p:cond delay="indefinite"/>
+                      </p:stCondLst>
+                      <p:childTnLst>
+                        <p:par>
+                          <p:cTn id="4" fill="hold">
+                            <p:stCondLst>
+                              <p:cond delay="0"/>
+                            </p:stCondLst>
+                            <p:childTnLst>
+                              <p:par>
+                                <p:cTn id="5" presetID="1" presetClass="entr" presetSubtype="0" fill="hold" grpId="0" nodeType="clickEffect">
+                                  <p:stCondLst>
+                                    <p:cond delay="0"/>
+                                  </p:stCondLst>
+                                  <p:childTnLst>
+                                    <p:set>
+                                      <p:cBhvr>
+                                        <p:cTn id="6" dur="1" fill="hold">
+                                          <p:stCondLst>
+                                            <p:cond delay="0"/>
+                                          </p:stCondLst>
+                                        </p:cTn>
+                                        <p:tgtEl>
+                                          <p:spTgt spid="12"/>
+                                        </p:tgtEl>
+                                        <p:attrNameLst>
+                                          <p:attrName>style.visibility</p:attrName>
+                                        </p:attrNameLst>
+                                      </p:cBhvr>
+                                      <p:to>
+                                        <p:strVal val="visible"/>
+                                      </p:to>
+                                    </p:set>
+                                  </p:childTnLst>
+                                </p:cTn>
+                              </p:par>
+                            </p:childTnLst>
+                          </p:cTn>
+                        </p:par>
+                      </p:childTnLst>
+                    </p:cTn>
+                  </p:par>
+                  <p:par>
+                    <p:cTn id="7" fill="hold">
+                      <p:stCondLst>
+                        <p:cond delay="indefinite"/>
+                      </p:stCondLst>
+                      <p:childTnLst>
+                        <p:par>
+                          <p:cTn id="8" fill="hold">
+                            <p:stCondLst>
+                              <p:cond delay="0"/>
+                            </p:stCondLst>
+                            <p:childTnLst>
+                              <p:par>
+                                <p:cTn id="9" presetID="1" presetClass="exit" presetSubtype="0" fill="hold" grpId="1" nodeType="clickEffect">
+                                  <p:stCondLst>
+                                    <p:cond delay="0"/>
+                                  </p:stCondLst>
+                                  <p:childTnLst>
+                                    <p:set>
+                                      <p:cBhvr>
+                                        <p:cTn id="10" dur="1" fill="hold">
+                                          <p:stCondLst>
+                                            <p:cond delay="0"/>
+                                          </p:stCondLst>
+                                        </p:cTn>
+                                        <p:tgtEl>
+                                          <p:spTgt spid="12"/>
+                                        </p:tgtEl>
+                                        <p:attrNameLst>
+                                          <p:attrName>style.visibility</p:attrName>
+                                        </p:attrNameLst>
+                                      </p:cBhvr>
+                                      <p:to>
+                                        <p:strVal val="hidden"/>
+                                      </p:to>
+                                    </p:set>
+                                  </p:childTnLst>
+                                </p:cTn>
+                              </p:par>
+                              <p:par>
+                                <p:cTn id="11" presetID="1" presetClass="entr" presetSubtype="0" fill="hold" grpId="0" nodeType="withEffect">
+                                  <p:stCondLst>
+                                    <p:cond delay="0"/>
+                                  </p:stCondLst>
+                                  <p:childTnLst>
+                                    <p:set>
+                                      <p:cBhvr>
+                                        <p:cTn id="12" dur="1" fill="hold">
+                                          <p:stCondLst>
+                                            <p:cond delay="0"/>
+                                          </p:stCondLst>
+                                        </p:cTn>
+                                        <p:tgtEl>
+                                          <p:spTgt spid="13"/>
+                                        </p:tgtEl>
+                                        <p:attrNameLst>
+                                          <p:attrName>style.visibility</p:attrName>
+                                        </p:attrNameLst>
+                                      </p:cBhvr>
+                                      <p:to>
+                                        <p:strVal val="visible"/>
+                                      </p:to>
+                                    </p:set>
+                                  </p:childTnLst>
+                                </p:cTn>
+                              </p:par>
+                            </p:childTnLst>
+                          </p:cTn>
+                        </p:par>
+                      </p:childTnLst>
+                    </p:cTn>
+                  </p:par>
+                </p:childTnLst>
+              </p:cTn>
+              <p:prevCondLst>
+                <p:cond evt="onPrev" delay="0">
+                  <p:tgtEl>
+                    <p:sldTgt/>
+                  </p:tgtEl>
+                </p:cond>
+              </p:prevCondLst>
+              <p:nextCondLst>
+                <p:cond evt="onNext" delay="0">
+                  <p:tgtEl>
+                    <p:sldTgt/>
+                  </p:tgtEl>
+                </p:cond>
+              </p:nextCondLst>
+            </p:seq>
+          </p:childTnLst>
+        </p:cTn>
+      </p:par>
+    </p:tnLst>
+    <p:bldLst>
+      <p:bldP spid="12" grpId="0" animBg="1"/>
+      <p:bldP spid="12" grpId="1" animBg="1"/>
+      <p:bldP spid="13" grpId="0" animBg="1"/>
+    </p:bldLst>
+  </p:timing>
+</p:sld>
+</file>
+
+<file path=ppt/slides/slide12.xml><?xml version="1.0" encoding="utf-8"?>
+<p:sld xmlns:a="http://schemas.openxmlformats.org/drawingml/2006/main" xmlns:r="http://schemas.openxmlformats.org/officeDocument/2006/relationships" xmlns:p="http://schemas.openxmlformats.org/presentationml/2006/main">
+  <p:cSld>
+    <p:spTree>
+      <p:nvGrpSpPr>
+        <p:cNvPr id="1" name=""/>
+        <p:cNvGrpSpPr/>
+        <p:nvPr/>
+      </p:nvGrpSpPr>
+      <p:grpSpPr>
+        <a:xfrm>
+          <a:off x="0" y="0"/>
+          <a:ext cx="0" cy="0"/>
+          <a:chOff x="0" y="0"/>
+          <a:chExt cx="0" cy="0"/>
+        </a:xfrm>
+      </p:grpSpPr>
+      <p:sp>
+        <p:nvSpPr>
+          <p:cNvPr id="10" name="Rectangle 9"/>
+          <p:cNvSpPr/>
+          <p:nvPr/>
+        </p:nvSpPr>
+        <p:spPr>
+          <a:xfrm>
             <a:off x="579816" y="2217087"/>
             <a:ext cx="7984368" cy="3707028"/>
           </a:xfrm>
@@ -7282,13 +8534,13 @@
               <a:rPr lang="de-CH" smtClean="0"/>
               <a:t>Slide </a:t>
             </a:r>
-            <a:fld id="{B84A63A7-7490-4EB5-8F89-6F6DC5C75427}" type="slidenum">
+            <a:fld id="{ADD2A1F7-B9FF-4D88-A910-F96A6F6561E8}" type="slidenum">
               <a:rPr lang="de-CH" smtClean="0"/>
-              <a:t>11</a:t>
+              <a:t>12</a:t>
             </a:fld>
             <a:r>
               <a:rPr lang="de-CH" smtClean="0"/>
-              <a:t> of 19</a:t>
+              <a:t> of 23</a:t>
             </a:r>
             <a:endParaRPr dirty="0"/>
           </a:p>
@@ -7314,7 +8566,7 @@
 </p:sld>
 </file>
 
-<file path=ppt/slides/slide12.xml><?xml version="1.0" encoding="utf-8"?>
+<file path=ppt/slides/slide13.xml><?xml version="1.0" encoding="utf-8"?>
 <p:sld xmlns:a="http://schemas.openxmlformats.org/drawingml/2006/main" xmlns:r="http://schemas.openxmlformats.org/officeDocument/2006/relationships" xmlns:p="http://schemas.openxmlformats.org/presentationml/2006/main">
   <p:cSld>
     <p:spTree>
@@ -7658,13 +8910,13 @@
               <a:rPr lang="de-CH" smtClean="0"/>
               <a:t>Slide </a:t>
             </a:r>
-            <a:fld id="{E71594E1-F425-4135-AA0C-BEF3EFC6D663}" type="slidenum">
+            <a:fld id="{5A326337-BC78-4F96-B382-FCC14968D14D}" type="slidenum">
               <a:rPr lang="de-CH" smtClean="0"/>
-              <a:t>12</a:t>
+              <a:t>13</a:t>
             </a:fld>
             <a:r>
               <a:rPr lang="de-CH" smtClean="0"/>
-              <a:t> of 19</a:t>
+              <a:t> of 23</a:t>
             </a:r>
             <a:endParaRPr dirty="0"/>
           </a:p>
@@ -7696,214 +8948,6 @@
     <p:extLst>
       <p:ext uri="{BB962C8B-B14F-4D97-AF65-F5344CB8AC3E}">
         <p14:creationId xmlns:p14="http://schemas.microsoft.com/office/powerpoint/2010/main" val="4163302255"/>
-      </p:ext>
-    </p:extLst>
-  </p:cSld>
-  <p:clrMapOvr>
-    <a:masterClrMapping/>
-  </p:clrMapOvr>
-  <p:timing>
-    <p:tnLst>
-      <p:par>
-        <p:cTn id="1" dur="indefinite" restart="never" nodeType="tmRoot"/>
-      </p:par>
-    </p:tnLst>
-  </p:timing>
-</p:sld>
-</file>
-
-<file path=ppt/slides/slide13.xml><?xml version="1.0" encoding="utf-8"?>
-<p:sld xmlns:a="http://schemas.openxmlformats.org/drawingml/2006/main" xmlns:r="http://schemas.openxmlformats.org/officeDocument/2006/relationships" xmlns:p="http://schemas.openxmlformats.org/presentationml/2006/main">
-  <p:cSld>
-    <p:spTree>
-      <p:nvGrpSpPr>
-        <p:cNvPr id="1" name=""/>
-        <p:cNvGrpSpPr/>
-        <p:nvPr/>
-      </p:nvGrpSpPr>
-      <p:grpSpPr>
-        <a:xfrm>
-          <a:off x="0" y="0"/>
-          <a:ext cx="0" cy="0"/>
-          <a:chOff x="0" y="0"/>
-          <a:chExt cx="0" cy="0"/>
-        </a:xfrm>
-      </p:grpSpPr>
-      <p:sp>
-        <p:nvSpPr>
-          <p:cNvPr id="2" name="Title 1"/>
-          <p:cNvSpPr>
-            <a:spLocks noGrp="1"/>
-          </p:cNvSpPr>
-          <p:nvPr>
-            <p:ph type="title"/>
-          </p:nvPr>
-        </p:nvSpPr>
-        <p:spPr/>
-        <p:txBody>
-          <a:bodyPr/>
-          <a:lstStyle/>
-          <a:p>
-            <a:r>
-              <a:rPr lang="en-GB" dirty="0" smtClean="0"/>
-              <a:t>Immutability</a:t>
-            </a:r>
-            <a:endParaRPr lang="en-GB" dirty="0"/>
-          </a:p>
-        </p:txBody>
-      </p:sp>
-      <p:sp>
-        <p:nvSpPr>
-          <p:cNvPr id="3" name="Content Placeholder 2"/>
-          <p:cNvSpPr>
-            <a:spLocks noGrp="1"/>
-          </p:cNvSpPr>
-          <p:nvPr>
-            <p:ph idx="1"/>
-          </p:nvPr>
-        </p:nvSpPr>
-        <p:spPr/>
-        <p:txBody>
-          <a:bodyPr/>
-          <a:lstStyle/>
-          <a:p>
-            <a:pPr marL="342900" indent="-342900">
-              <a:buFont typeface="Arial" panose="020B0604020202020204" pitchFamily="34" charset="0"/>
-              <a:buChar char="•"/>
-            </a:pPr>
-            <a:r>
-              <a:rPr lang="en-GB" dirty="0" smtClean="0"/>
-              <a:t>Immutability is generally desirable</a:t>
-            </a:r>
-          </a:p>
-          <a:p>
-            <a:pPr marL="342900" indent="-342900">
-              <a:buFont typeface="Arial" panose="020B0604020202020204" pitchFamily="34" charset="0"/>
-              <a:buChar char="•"/>
-            </a:pPr>
-            <a:r>
-              <a:rPr lang="en-GB" dirty="0" smtClean="0"/>
-              <a:t>Write new code with immutability in mind &amp; refactor existing code</a:t>
-            </a:r>
-            <a:endParaRPr lang="en-GB" dirty="0" smtClean="0"/>
-          </a:p>
-          <a:p>
-            <a:pPr marL="342900" indent="-342900">
-              <a:buFont typeface="Arial" panose="020B0604020202020204" pitchFamily="34" charset="0"/>
-              <a:buChar char="•"/>
-            </a:pPr>
-            <a:r>
-              <a:rPr lang="en-GB" dirty="0" smtClean="0"/>
-              <a:t>Patterns like lenses can mitigate the added complexity when dealing with destructive updates</a:t>
-            </a:r>
-            <a:endParaRPr lang="en-GB" dirty="0"/>
-          </a:p>
-        </p:txBody>
-      </p:sp>
-      <p:sp>
-        <p:nvSpPr>
-          <p:cNvPr id="4" name="Date Placeholder 3"/>
-          <p:cNvSpPr>
-            <a:spLocks noGrp="1"/>
-          </p:cNvSpPr>
-          <p:nvPr>
-            <p:ph type="dt" sz="half" idx="10"/>
-          </p:nvPr>
-        </p:nvSpPr>
-        <p:spPr/>
-        <p:txBody>
-          <a:bodyPr/>
-          <a:lstStyle/>
-          <a:p>
-            <a:r>
-              <a:rPr lang="de-CH" smtClean="0"/>
-              <a:t>14. September 2015</a:t>
-            </a:r>
-            <a:endParaRPr lang="de-CH" dirty="0"/>
-          </a:p>
-        </p:txBody>
-      </p:sp>
-      <p:sp>
-        <p:nvSpPr>
-          <p:cNvPr id="5" name="Footer Placeholder 4"/>
-          <p:cNvSpPr>
-            <a:spLocks noGrp="1"/>
-          </p:cNvSpPr>
-          <p:nvPr>
-            <p:ph type="ftr" sz="quarter" idx="11"/>
-          </p:nvPr>
-        </p:nvSpPr>
-        <p:spPr/>
-        <p:txBody>
-          <a:bodyPr/>
-          <a:lstStyle/>
-          <a:p>
-            <a:r>
-              <a:rPr lang="en-US" smtClean="0"/>
-              <a:t>Functional Design Patterns for OO Practicioners | Hendrik Schöneberg</a:t>
-            </a:r>
-            <a:endParaRPr lang="de-CH" dirty="0"/>
-          </a:p>
-        </p:txBody>
-      </p:sp>
-      <p:sp>
-        <p:nvSpPr>
-          <p:cNvPr id="7" name="Text Placeholder 6"/>
-          <p:cNvSpPr>
-            <a:spLocks noGrp="1"/>
-          </p:cNvSpPr>
-          <p:nvPr>
-            <p:ph type="body" sz="quarter" idx="13"/>
-          </p:nvPr>
-        </p:nvSpPr>
-        <p:spPr/>
-        <p:txBody>
-          <a:bodyPr/>
-          <a:lstStyle/>
-          <a:p>
-            <a:r>
-              <a:rPr lang="en-GB" dirty="0" smtClean="0"/>
-              <a:t>Lessons learned / summary</a:t>
-            </a:r>
-            <a:endParaRPr lang="en-GB" dirty="0"/>
-          </a:p>
-        </p:txBody>
-      </p:sp>
-      <p:sp>
-        <p:nvSpPr>
-          <p:cNvPr id="8" name="Slide Number Placeholder 7"/>
-          <p:cNvSpPr>
-            <a:spLocks noGrp="1"/>
-          </p:cNvSpPr>
-          <p:nvPr>
-            <p:ph type="sldNum" sz="quarter" idx="12"/>
-          </p:nvPr>
-        </p:nvSpPr>
-        <p:spPr/>
-        <p:txBody>
-          <a:bodyPr/>
-          <a:lstStyle/>
-          <a:p>
-            <a:r>
-              <a:rPr lang="de-CH" smtClean="0"/>
-              <a:t>Slide </a:t>
-            </a:r>
-            <a:fld id="{1B2B28A0-D6C8-47DF-AA52-D5FF4E7CE4AA}" type="slidenum">
-              <a:rPr lang="de-CH" smtClean="0"/>
-              <a:t>13</a:t>
-            </a:fld>
-            <a:r>
-              <a:rPr lang="de-CH" smtClean="0"/>
-              <a:t> of 19</a:t>
-            </a:r>
-            <a:endParaRPr dirty="0"/>
-          </a:p>
-        </p:txBody>
-      </p:sp>
-    </p:spTree>
-    <p:extLst>
-      <p:ext uri="{BB962C8B-B14F-4D97-AF65-F5344CB8AC3E}">
-        <p14:creationId xmlns:p14="http://schemas.microsoft.com/office/powerpoint/2010/main" val="2202274962"/>
       </p:ext>
     </p:extLst>
   </p:cSld>
@@ -7954,7 +8998,7 @@
           <a:p>
             <a:r>
               <a:rPr lang="en-GB" dirty="0" smtClean="0"/>
-              <a:t>Pure Functions</a:t>
+              <a:t>Immutability</a:t>
             </a:r>
             <a:endParaRPr lang="en-GB" dirty="0"/>
           </a:p>
@@ -7974,12 +9018,6 @@
         <p:txBody>
           <a:bodyPr/>
           <a:lstStyle/>
-          <a:p>
-            <a:r>
-              <a:rPr lang="en-GB" dirty="0" smtClean="0"/>
-              <a:t>Definition</a:t>
-            </a:r>
-          </a:p>
           <a:p>
             <a:pPr marL="342900" indent="-342900">
               <a:buFont typeface="Arial" panose="020B0604020202020204" pitchFamily="34" charset="0"/>
@@ -7987,8 +9025,17 @@
             </a:pPr>
             <a:r>
               <a:rPr lang="en-GB" dirty="0" smtClean="0"/>
-              <a:t>A function, where the return value is only determined by the input value</a:t>
-            </a:r>
+              <a:t>Immutability is </a:t>
+            </a:r>
+            <a:r>
+              <a:rPr lang="en-GB" dirty="0" smtClean="0"/>
+              <a:t>a </a:t>
+            </a:r>
+            <a:r>
+              <a:rPr lang="en-GB" dirty="0" smtClean="0"/>
+              <a:t>generally desirable feature</a:t>
+            </a:r>
+            <a:endParaRPr lang="en-GB" dirty="0" smtClean="0"/>
           </a:p>
           <a:p>
             <a:pPr marL="342900" indent="-342900">
@@ -7997,7 +9044,7 @@
             </a:pPr>
             <a:r>
               <a:rPr lang="en-GB" dirty="0" smtClean="0"/>
-              <a:t>A function without side effects</a:t>
+              <a:t>Write new code or refactor existing code always with immutability in mind</a:t>
             </a:r>
           </a:p>
           <a:p>
@@ -8007,8 +9054,9 @@
             </a:pPr>
             <a:r>
               <a:rPr lang="en-GB" dirty="0" smtClean="0"/>
-              <a:t>A pure function cannot depend on hidden state or value or I/O</a:t>
-            </a:r>
+              <a:t>Default to immutability. Switch to mutable data structures for specific purposes only</a:t>
+            </a:r>
+            <a:endParaRPr lang="en-GB" dirty="0" smtClean="0"/>
           </a:p>
           <a:p>
             <a:pPr marL="342900" indent="-342900">
@@ -8016,17 +9064,9 @@
               <a:buChar char="•"/>
             </a:pPr>
             <a:r>
-              <a:rPr lang="en-GB" dirty="0"/>
-              <a:t>An invocation of a pure function can always be replaced with its return value</a:t>
-            </a:r>
-          </a:p>
-          <a:p>
-            <a:endParaRPr lang="en-GB" dirty="0" smtClean="0"/>
-          </a:p>
-          <a:p>
-            <a:pPr lvl="1" indent="0">
-              <a:buNone/>
-            </a:pPr>
+              <a:rPr lang="en-GB" dirty="0" smtClean="0"/>
+              <a:t>Patterns like lenses can mitigate the added complexity when dealing with destructive updates</a:t>
+            </a:r>
             <a:endParaRPr lang="en-GB" dirty="0"/>
           </a:p>
         </p:txBody>
@@ -8094,7 +9134,7 @@
           <a:p>
             <a:r>
               <a:rPr lang="en-GB" dirty="0" smtClean="0"/>
-              <a:t>Introduction</a:t>
+              <a:t>Outcomes</a:t>
             </a:r>
             <a:endParaRPr lang="en-GB" dirty="0"/>
           </a:p>
@@ -8119,13 +9159,13 @@
               <a:rPr lang="de-CH" smtClean="0"/>
               <a:t>Slide </a:t>
             </a:r>
-            <a:fld id="{4318CAE7-44A1-47B2-A736-2837F2B4FD2F}" type="slidenum">
+            <a:fld id="{09E34D84-74FB-4CF0-A9CE-AF4C499AB58D}" type="slidenum">
               <a:rPr lang="de-CH" smtClean="0"/>
               <a:t>14</a:t>
             </a:fld>
             <a:r>
               <a:rPr lang="de-CH" smtClean="0"/>
-              <a:t> of 19</a:t>
+              <a:t> of 23</a:t>
             </a:r>
             <a:endParaRPr dirty="0"/>
           </a:p>
@@ -8134,7 +9174,7 @@
     </p:spTree>
     <p:extLst>
       <p:ext uri="{BB962C8B-B14F-4D97-AF65-F5344CB8AC3E}">
-        <p14:creationId xmlns:p14="http://schemas.microsoft.com/office/powerpoint/2010/main" val="248071837"/>
+        <p14:creationId xmlns:p14="http://schemas.microsoft.com/office/powerpoint/2010/main" val="2202274962"/>
       </p:ext>
     </p:extLst>
   </p:cSld>
@@ -8170,7 +9210,7 @@
       </p:grpSpPr>
       <p:sp>
         <p:nvSpPr>
-          <p:cNvPr id="2" name="Title 1"/>
+          <p:cNvPr id="9" name="Title 8"/>
           <p:cNvSpPr>
             <a:spLocks noGrp="1"/>
           </p:cNvSpPr>
@@ -8193,12 +9233,12 @@
       </p:sp>
       <p:sp>
         <p:nvSpPr>
-          <p:cNvPr id="3" name="Content Placeholder 2"/>
-          <p:cNvSpPr>
-            <a:spLocks noGrp="1"/>
-          </p:cNvSpPr>
-          <p:nvPr>
-            <p:ph idx="1"/>
+          <p:cNvPr id="10" name="Text Placeholder 9"/>
+          <p:cNvSpPr>
+            <a:spLocks noGrp="1"/>
+          </p:cNvSpPr>
+          <p:nvPr>
+            <p:ph type="body" idx="1"/>
           </p:nvPr>
         </p:nvSpPr>
         <p:spPr/>
@@ -8206,31 +9246,7 @@
           <a:bodyPr/>
           <a:lstStyle/>
           <a:p>
-            <a:r>
-              <a:rPr lang="en-GB" dirty="0" smtClean="0"/>
-              <a:t>Definition</a:t>
-            </a:r>
-          </a:p>
-          <a:p>
-            <a:pPr marL="342900" indent="-342900">
-              <a:buFont typeface="Arial" panose="020B0604020202020204" pitchFamily="34" charset="0"/>
-              <a:buChar char="•"/>
-            </a:pPr>
-            <a:r>
-              <a:rPr lang="en-GB" dirty="0" smtClean="0"/>
-              <a:t>An expression is referentially transparent if it can be replaced with its value without changing the behaviour of a program</a:t>
-            </a:r>
-          </a:p>
-          <a:p>
-            <a:pPr marL="342900" indent="-342900">
-              <a:buFont typeface="Arial" panose="020B0604020202020204" pitchFamily="34" charset="0"/>
-              <a:buChar char="•"/>
-            </a:pPr>
-            <a:r>
-              <a:rPr lang="en-GB" dirty="0" smtClean="0"/>
-              <a:t>Usually referential transparency is broken by side effects or dependency on global or hidden state</a:t>
-            </a:r>
-            <a:endParaRPr lang="en-GB" dirty="0"/>
+            <a:endParaRPr lang="en-GB"/>
           </a:p>
         </p:txBody>
       </p:sp>
@@ -8241,7 +9257,7 @@
             <a:spLocks noGrp="1"/>
           </p:cNvSpPr>
           <p:nvPr>
-            <p:ph type="dt" sz="half" idx="10"/>
+            <p:ph type="dt" sz="half" idx="2"/>
           </p:nvPr>
         </p:nvSpPr>
         <p:spPr/>
@@ -8264,7 +9280,7 @@
             <a:spLocks noGrp="1"/>
           </p:cNvSpPr>
           <p:nvPr>
-            <p:ph type="ftr" sz="quarter" idx="11"/>
+            <p:ph type="ftr" sz="quarter" idx="3"/>
           </p:nvPr>
         </p:nvSpPr>
         <p:spPr/>
@@ -8282,35 +9298,12 @@
       </p:sp>
       <p:sp>
         <p:nvSpPr>
-          <p:cNvPr id="7" name="Text Placeholder 6"/>
-          <p:cNvSpPr>
-            <a:spLocks noGrp="1"/>
-          </p:cNvSpPr>
-          <p:nvPr>
-            <p:ph type="body" sz="quarter" idx="13"/>
-          </p:nvPr>
-        </p:nvSpPr>
-        <p:spPr/>
-        <p:txBody>
-          <a:bodyPr/>
-          <a:lstStyle/>
-          <a:p>
-            <a:r>
-              <a:rPr lang="en-GB" dirty="0" smtClean="0"/>
-              <a:t>Referential Transparency</a:t>
-            </a:r>
-            <a:endParaRPr lang="en-GB" dirty="0"/>
-          </a:p>
-        </p:txBody>
-      </p:sp>
-      <p:sp>
-        <p:nvSpPr>
           <p:cNvPr id="8" name="Slide Number Placeholder 7"/>
           <p:cNvSpPr>
             <a:spLocks noGrp="1"/>
           </p:cNvSpPr>
           <p:nvPr>
-            <p:ph type="sldNum" sz="quarter" idx="12"/>
+            <p:ph type="sldNum" sz="quarter" idx="4"/>
           </p:nvPr>
         </p:nvSpPr>
         <p:spPr/>
@@ -8322,35 +9315,64 @@
               <a:rPr lang="de-CH" smtClean="0"/>
               <a:t>Slide </a:t>
             </a:r>
-            <a:fld id="{C3B114EA-B4F1-4E12-97A2-9C88B1CEA55E}" type="slidenum">
+            <a:fld id="{0548E53B-8088-4DA1-A102-B5570BBE6519}" type="slidenum">
               <a:rPr lang="de-CH" smtClean="0"/>
               <a:t>15</a:t>
             </a:fld>
             <a:r>
               <a:rPr lang="de-CH" smtClean="0"/>
-              <a:t> of 19</a:t>
+              <a:t> of 23</a:t>
             </a:r>
             <a:endParaRPr dirty="0"/>
           </a:p>
         </p:txBody>
+      </p:sp>
+      <p:sp>
+        <p:nvSpPr>
+          <p:cNvPr id="11" name="Picture Placeholder 10"/>
+          <p:cNvSpPr>
+            <a:spLocks noGrp="1"/>
+          </p:cNvSpPr>
+          <p:nvPr>
+            <p:ph type="pic" sz="quarter" idx="10"/>
+          </p:nvPr>
+        </p:nvSpPr>
+        <p:spPr/>
+      </p:sp>
+      <p:sp>
+        <p:nvSpPr>
+          <p:cNvPr id="12" name="Picture Placeholder 11"/>
+          <p:cNvSpPr>
+            <a:spLocks noGrp="1"/>
+          </p:cNvSpPr>
+          <p:nvPr>
+            <p:ph type="pic" sz="quarter" idx="11"/>
+          </p:nvPr>
+        </p:nvSpPr>
+        <p:spPr/>
+      </p:sp>
+      <p:sp>
+        <p:nvSpPr>
+          <p:cNvPr id="13" name="Picture Placeholder 12"/>
+          <p:cNvSpPr>
+            <a:spLocks noGrp="1"/>
+          </p:cNvSpPr>
+          <p:nvPr>
+            <p:ph type="pic" sz="quarter" idx="12"/>
+          </p:nvPr>
+        </p:nvSpPr>
+        <p:spPr/>
       </p:sp>
     </p:spTree>
     <p:extLst>
       <p:ext uri="{BB962C8B-B14F-4D97-AF65-F5344CB8AC3E}">
-        <p14:creationId xmlns:p14="http://schemas.microsoft.com/office/powerpoint/2010/main" val="455473412"/>
+        <p14:creationId xmlns:p14="http://schemas.microsoft.com/office/powerpoint/2010/main" val="2926755589"/>
       </p:ext>
     </p:extLst>
   </p:cSld>
   <p:clrMapOvr>
     <a:masterClrMapping/>
   </p:clrMapOvr>
-  <p:timing>
-    <p:tnLst>
-      <p:par>
-        <p:cTn id="1" dur="indefinite" restart="never" nodeType="tmRoot"/>
-      </p:par>
-    </p:tnLst>
-  </p:timing>
 </p:sld>
 </file>
 
@@ -8409,27 +9431,20 @@
           <a:bodyPr/>
           <a:lstStyle/>
           <a:p>
+            <a:r>
+              <a:rPr lang="en-GB" dirty="0" smtClean="0"/>
+              <a:t>Definition</a:t>
+            </a:r>
+          </a:p>
+          <a:p>
             <a:pPr marL="342900" indent="-342900">
               <a:buFont typeface="Arial" panose="020B0604020202020204" pitchFamily="34" charset="0"/>
               <a:buChar char="•"/>
             </a:pPr>
             <a:r>
               <a:rPr lang="en-GB" dirty="0" smtClean="0"/>
-              <a:t>Go </a:t>
-            </a:r>
-            <a:r>
-              <a:rPr lang="en-GB" dirty="0"/>
-              <a:t>hand in hand with immutable </a:t>
-            </a:r>
-            <a:r>
-              <a:rPr lang="en-GB" dirty="0" smtClean="0"/>
-              <a:t>values // </a:t>
-            </a:r>
-            <a:r>
-              <a:rPr lang="en-GB" smtClean="0"/>
-              <a:t>explain why</a:t>
-            </a:r>
-            <a:endParaRPr lang="en-GB" dirty="0"/>
+              <a:t>A function, where the return value is only determined by the input value</a:t>
+            </a:r>
           </a:p>
           <a:p>
             <a:pPr marL="342900" indent="-342900">
@@ -8437,9 +9452,24 @@
               <a:buChar char="•"/>
             </a:pPr>
             <a:r>
-              <a:rPr lang="en-GB" dirty="0"/>
-              <a:t>Functions are easier to test and verify</a:t>
-            </a:r>
+              <a:rPr lang="en-GB" dirty="0" smtClean="0"/>
+              <a:t>A function without side </a:t>
+            </a:r>
+            <a:r>
+              <a:rPr lang="en-GB" dirty="0" smtClean="0"/>
+              <a:t>effects</a:t>
+            </a:r>
+          </a:p>
+          <a:p>
+            <a:pPr marL="608013" lvl="1" indent="-342900">
+              <a:buFont typeface="Arial" panose="020B0604020202020204" pitchFamily="34" charset="0"/>
+              <a:buChar char="•"/>
+            </a:pPr>
+            <a:r>
+              <a:rPr lang="en-GB" dirty="0" smtClean="0"/>
+              <a:t>I/O, logging, external system calls</a:t>
+            </a:r>
+            <a:endParaRPr lang="en-GB" dirty="0" smtClean="0"/>
           </a:p>
           <a:p>
             <a:pPr marL="342900" indent="-342900">
@@ -8447,9 +9477,14 @@
               <a:buChar char="•"/>
             </a:pPr>
             <a:r>
-              <a:rPr lang="en-GB" dirty="0"/>
-              <a:t>Can simplify systems</a:t>
-            </a:r>
+              <a:rPr lang="en-GB" dirty="0" smtClean="0"/>
+              <a:t>A pure function cannot depend on hidden state or value or </a:t>
+            </a:r>
+            <a:r>
+              <a:rPr lang="en-GB" dirty="0" smtClean="0"/>
+              <a:t>I/O</a:t>
+            </a:r>
+            <a:endParaRPr lang="en-GB" dirty="0" smtClean="0"/>
           </a:p>
           <a:p>
             <a:pPr marL="342900" indent="-342900">
@@ -8457,49 +9492,23 @@
               <a:buChar char="•"/>
             </a:pPr>
             <a:r>
+              <a:rPr lang="en-GB" dirty="0"/>
+              <a:t>An invocation of a pure function can always be replaced with its return value</a:t>
+            </a:r>
+          </a:p>
+          <a:p>
+            <a:endParaRPr lang="en-GB" dirty="0" smtClean="0"/>
+          </a:p>
+          <a:p>
+            <a:r>
               <a:rPr lang="en-GB" dirty="0" smtClean="0"/>
-              <a:t>Simplifies concurrency</a:t>
-            </a:r>
-            <a:endParaRPr lang="en-GB" dirty="0"/>
-          </a:p>
-          <a:p>
-            <a:pPr marL="342900" indent="-342900">
-              <a:buFont typeface="Arial" panose="020B0604020202020204" pitchFamily="34" charset="0"/>
-              <a:buChar char="•"/>
-            </a:pPr>
-            <a:r>
-              <a:rPr lang="en-GB" dirty="0" smtClean="0"/>
-              <a:t>Calls to pure functions can be parallelized</a:t>
-            </a:r>
-          </a:p>
-          <a:p>
-            <a:pPr marL="342900" indent="-342900">
-              <a:buFont typeface="Arial" panose="020B0604020202020204" pitchFamily="34" charset="0"/>
-              <a:buChar char="•"/>
-            </a:pPr>
-            <a:r>
-              <a:rPr lang="en-GB" dirty="0" smtClean="0"/>
-              <a:t>Caching: Since the result for a given input is always the same, it only needs to be computed once</a:t>
-            </a:r>
-          </a:p>
-          <a:p>
-            <a:pPr marL="342900" indent="-342900">
-              <a:buFont typeface="Arial" panose="020B0604020202020204" pitchFamily="34" charset="0"/>
-              <a:buChar char="•"/>
-            </a:pPr>
-            <a:r>
-              <a:rPr lang="en-GB" dirty="0" err="1" smtClean="0"/>
-              <a:t>Lazyness</a:t>
-            </a:r>
-            <a:r>
-              <a:rPr lang="en-GB" dirty="0" smtClean="0"/>
-              <a:t>: Since the function does not cause any side effects, we can postpone computation until we actually need the result</a:t>
-            </a:r>
-          </a:p>
-          <a:p>
-            <a:pPr marL="342900" indent="-342900">
-              <a:buFont typeface="Arial" panose="020B0604020202020204" pitchFamily="34" charset="0"/>
-              <a:buChar char="•"/>
+              <a:t>An indicator for impure functions is the void / Unit return type.</a:t>
+            </a:r>
+            <a:endParaRPr lang="en-GB" dirty="0" smtClean="0"/>
+          </a:p>
+          <a:p>
+            <a:pPr lvl="1" indent="0">
+              <a:buNone/>
             </a:pPr>
             <a:endParaRPr lang="en-GB" dirty="0"/>
           </a:p>
@@ -8568,7 +9577,7 @@
           <a:p>
             <a:r>
               <a:rPr lang="en-GB" dirty="0" smtClean="0"/>
-              <a:t>Benefits</a:t>
+              <a:t>Introduction</a:t>
             </a:r>
             <a:endParaRPr lang="en-GB" dirty="0"/>
           </a:p>
@@ -8593,13 +9602,13 @@
               <a:rPr lang="de-CH" smtClean="0"/>
               <a:t>Slide </a:t>
             </a:r>
-            <a:fld id="{F6B2B99D-92D9-4174-952D-B81E203E5DDC}" type="slidenum">
+            <a:fld id="{6C4D1D0C-8CAA-4B5E-B8A3-AD9C15CF4B45}" type="slidenum">
               <a:rPr lang="de-CH" smtClean="0"/>
               <a:t>16</a:t>
             </a:fld>
             <a:r>
               <a:rPr lang="de-CH" smtClean="0"/>
-              <a:t> of 19</a:t>
+              <a:t> of 23</a:t>
             </a:r>
             <a:endParaRPr dirty="0"/>
           </a:p>
@@ -8608,7 +9617,7 @@
     </p:spTree>
     <p:extLst>
       <p:ext uri="{BB962C8B-B14F-4D97-AF65-F5344CB8AC3E}">
-        <p14:creationId xmlns:p14="http://schemas.microsoft.com/office/powerpoint/2010/main" val="799228113"/>
+        <p14:creationId xmlns:p14="http://schemas.microsoft.com/office/powerpoint/2010/main" val="248071837"/>
       </p:ext>
     </p:extLst>
   </p:cSld>
@@ -8680,13 +9689,19 @@
           <a:bodyPr/>
           <a:lstStyle/>
           <a:p>
+            <a:r>
+              <a:rPr lang="en-GB" dirty="0" smtClean="0"/>
+              <a:t>Definition</a:t>
+            </a:r>
+          </a:p>
+          <a:p>
             <a:pPr marL="342900" indent="-342900">
               <a:buFont typeface="Arial" panose="020B0604020202020204" pitchFamily="34" charset="0"/>
               <a:buChar char="•"/>
             </a:pPr>
             <a:r>
               <a:rPr lang="en-GB" dirty="0" smtClean="0"/>
-              <a:t>Obviously, there will be functions with side effects (I/O, global state, user input …)</a:t>
+              <a:t>An expression is referentially transparent if it can be replaced with its value without changing the behaviour of a program</a:t>
             </a:r>
           </a:p>
           <a:p>
@@ -8696,50 +9711,7 @@
             </a:pPr>
             <a:r>
               <a:rPr lang="en-GB" dirty="0" smtClean="0"/>
-              <a:t>The idea is to refactor as many of your functions into pure functions as possible and wrap them into a shell, which handles side effects</a:t>
-            </a:r>
-          </a:p>
-          <a:p>
-            <a:pPr marL="342900" indent="-342900">
-              <a:buFont typeface="Arial" panose="020B0604020202020204" pitchFamily="34" charset="0"/>
-              <a:buChar char="•"/>
-            </a:pPr>
-            <a:r>
-              <a:rPr lang="en-GB" dirty="0" smtClean="0"/>
-              <a:t>Keep a “healthy balance” between pure and impure functions</a:t>
-            </a:r>
-          </a:p>
-          <a:p>
-            <a:pPr marL="342900" indent="-342900">
-              <a:buFont typeface="Arial" panose="020B0604020202020204" pitchFamily="34" charset="0"/>
-              <a:buChar char="•"/>
-            </a:pPr>
-            <a:endParaRPr lang="en-GB" dirty="0" smtClean="0"/>
-          </a:p>
-          <a:p>
-            <a:r>
-              <a:rPr lang="en-GB" dirty="0" smtClean="0"/>
-              <a:t>Useful data structures</a:t>
-            </a:r>
-          </a:p>
-          <a:p>
-            <a:pPr marL="342900" indent="-342900">
-              <a:buFont typeface="Arial" panose="020B0604020202020204" pitchFamily="34" charset="0"/>
-              <a:buChar char="•"/>
-            </a:pPr>
-            <a:r>
-              <a:rPr lang="en-GB" dirty="0" smtClean="0"/>
-              <a:t>Try[T] – Encapsulates exceptions: Disconnects error handling and recovery, forces the caller to deal with the possibility of error.</a:t>
-            </a:r>
-          </a:p>
-          <a:p>
-            <a:pPr marL="342900" indent="-342900">
-              <a:buFont typeface="Arial" panose="020B0604020202020204" pitchFamily="34" charset="0"/>
-              <a:buChar char="•"/>
-            </a:pPr>
-            <a:r>
-              <a:rPr lang="en-GB" dirty="0" smtClean="0"/>
-              <a:t>Option[T] – Represents a value which might be null</a:t>
+              <a:t>Usually referential transparency is broken by side effects or dependency on global or hidden state</a:t>
             </a:r>
             <a:endParaRPr lang="en-GB" dirty="0"/>
           </a:p>
@@ -8808,7 +9780,7 @@
           <a:p>
             <a:r>
               <a:rPr lang="en-GB" dirty="0" smtClean="0"/>
-              <a:t>But how do I get there?</a:t>
+              <a:t>Referential Transparency</a:t>
             </a:r>
             <a:endParaRPr lang="en-GB" dirty="0"/>
           </a:p>
@@ -8833,13 +9805,13 @@
               <a:rPr lang="de-CH" smtClean="0"/>
               <a:t>Slide </a:t>
             </a:r>
-            <a:fld id="{020CBD71-F5D2-43B5-99E9-4EBC36721101}" type="slidenum">
+            <a:fld id="{5BD84473-02DA-45AB-91B5-7F2BCD64D4C2}" type="slidenum">
               <a:rPr lang="de-CH" smtClean="0"/>
               <a:t>17</a:t>
             </a:fld>
             <a:r>
               <a:rPr lang="de-CH" smtClean="0"/>
-              <a:t> of 19</a:t>
+              <a:t> of 23</a:t>
             </a:r>
             <a:endParaRPr dirty="0"/>
           </a:p>
@@ -8848,7 +9820,7 @@
     </p:spTree>
     <p:extLst>
       <p:ext uri="{BB962C8B-B14F-4D97-AF65-F5344CB8AC3E}">
-        <p14:creationId xmlns:p14="http://schemas.microsoft.com/office/powerpoint/2010/main" val="3426570471"/>
+        <p14:creationId xmlns:p14="http://schemas.microsoft.com/office/powerpoint/2010/main" val="455473412"/>
       </p:ext>
     </p:extLst>
   </p:cSld>
@@ -8920,6 +9892,91 @@
           <a:bodyPr/>
           <a:lstStyle/>
           <a:p>
+            <a:pPr marL="342900" indent="-342900">
+              <a:buFont typeface="Arial" panose="020B0604020202020204" pitchFamily="34" charset="0"/>
+              <a:buChar char="•"/>
+            </a:pPr>
+            <a:r>
+              <a:rPr lang="en-GB" dirty="0" smtClean="0"/>
+              <a:t>Go </a:t>
+            </a:r>
+            <a:r>
+              <a:rPr lang="en-GB" dirty="0"/>
+              <a:t>hand in hand with immutable </a:t>
+            </a:r>
+            <a:r>
+              <a:rPr lang="en-GB" dirty="0" smtClean="0"/>
+              <a:t>values</a:t>
+            </a:r>
+            <a:endParaRPr lang="en-GB" dirty="0"/>
+          </a:p>
+          <a:p>
+            <a:pPr marL="342900" indent="-342900">
+              <a:buFont typeface="Arial" panose="020B0604020202020204" pitchFamily="34" charset="0"/>
+              <a:buChar char="•"/>
+            </a:pPr>
+            <a:r>
+              <a:rPr lang="en-GB" dirty="0"/>
+              <a:t>Functions are easier to test and verify</a:t>
+            </a:r>
+          </a:p>
+          <a:p>
+            <a:pPr marL="342900" indent="-342900">
+              <a:buFont typeface="Arial" panose="020B0604020202020204" pitchFamily="34" charset="0"/>
+              <a:buChar char="•"/>
+            </a:pPr>
+            <a:r>
+              <a:rPr lang="en-GB" dirty="0"/>
+              <a:t>Can simplify systems</a:t>
+            </a:r>
+          </a:p>
+          <a:p>
+            <a:pPr marL="342900" indent="-342900">
+              <a:buFont typeface="Arial" panose="020B0604020202020204" pitchFamily="34" charset="0"/>
+              <a:buChar char="•"/>
+            </a:pPr>
+            <a:r>
+              <a:rPr lang="en-GB" dirty="0" smtClean="0"/>
+              <a:t>Simplifies </a:t>
+            </a:r>
+            <a:r>
+              <a:rPr lang="en-GB" dirty="0" smtClean="0"/>
+              <a:t>concurrency, calls </a:t>
+            </a:r>
+            <a:r>
+              <a:rPr lang="en-GB" dirty="0" smtClean="0"/>
+              <a:t>to pure functions can be parallelized</a:t>
+            </a:r>
+          </a:p>
+          <a:p>
+            <a:pPr marL="342900" indent="-342900">
+              <a:buFont typeface="Arial" panose="020B0604020202020204" pitchFamily="34" charset="0"/>
+              <a:buChar char="•"/>
+            </a:pPr>
+            <a:r>
+              <a:rPr lang="en-GB" dirty="0" smtClean="0"/>
+              <a:t>Caching: Since the result for a given input is always the same, it only needs to be computed once</a:t>
+            </a:r>
+          </a:p>
+          <a:p>
+            <a:pPr marL="342900" indent="-342900">
+              <a:buFont typeface="Arial" panose="020B0604020202020204" pitchFamily="34" charset="0"/>
+              <a:buChar char="•"/>
+            </a:pPr>
+            <a:r>
+              <a:rPr lang="en-GB" dirty="0" err="1" smtClean="0"/>
+              <a:t>Lazyness</a:t>
+            </a:r>
+            <a:r>
+              <a:rPr lang="en-GB" dirty="0" smtClean="0"/>
+              <a:t>: Since the function does not cause any side effects, we can postpone computation until we actually need the result</a:t>
+            </a:r>
+          </a:p>
+          <a:p>
+            <a:pPr marL="342900" indent="-342900">
+              <a:buFont typeface="Arial" panose="020B0604020202020204" pitchFamily="34" charset="0"/>
+              <a:buChar char="•"/>
+            </a:pPr>
             <a:endParaRPr lang="en-GB" dirty="0"/>
           </a:p>
         </p:txBody>
@@ -8987,7 +10044,7 @@
           <a:p>
             <a:r>
               <a:rPr lang="en-GB" dirty="0" smtClean="0"/>
-              <a:t>Lessons learned / summary</a:t>
+              <a:t>Benefits</a:t>
             </a:r>
             <a:endParaRPr lang="en-GB" dirty="0"/>
           </a:p>
@@ -9012,13 +10069,13 @@
               <a:rPr lang="de-CH" smtClean="0"/>
               <a:t>Slide </a:t>
             </a:r>
-            <a:fld id="{8AA24468-A6B7-424E-BE74-8FA1DDB1CD80}" type="slidenum">
+            <a:fld id="{D32166D4-3045-4816-B2EB-3F88DB9FD1B2}" type="slidenum">
               <a:rPr lang="de-CH" smtClean="0"/>
               <a:t>18</a:t>
             </a:fld>
             <a:r>
               <a:rPr lang="de-CH" smtClean="0"/>
-              <a:t> of 19</a:t>
+              <a:t> of 23</a:t>
             </a:r>
             <a:endParaRPr dirty="0"/>
           </a:p>
@@ -9027,7 +10084,7 @@
     </p:spTree>
     <p:extLst>
       <p:ext uri="{BB962C8B-B14F-4D97-AF65-F5344CB8AC3E}">
-        <p14:creationId xmlns:p14="http://schemas.microsoft.com/office/powerpoint/2010/main" val="351525945"/>
+        <p14:creationId xmlns:p14="http://schemas.microsoft.com/office/powerpoint/2010/main" val="799228113"/>
       </p:ext>
     </p:extLst>
   </p:cSld>
@@ -9078,7 +10135,7 @@
           <a:p>
             <a:r>
               <a:rPr lang="en-GB" dirty="0" smtClean="0"/>
-              <a:t>Sources</a:t>
+              <a:t>Pure Functions</a:t>
             </a:r>
             <a:endParaRPr lang="en-GB" dirty="0"/>
           </a:p>
@@ -9104,9 +10161,36 @@
               <a:buChar char="•"/>
             </a:pPr>
             <a:r>
-              <a:rPr lang="en-GB" dirty="0"/>
-              <a:t>http://de.slideshare.net/vkostyukov/purely-functional-data-structures-in-scala-26175521</a:t>
-            </a:r>
+              <a:rPr lang="en-GB" dirty="0" smtClean="0"/>
+              <a:t>Obviously, there will be functions with side effects (I/O, global state, user input …)</a:t>
+            </a:r>
+          </a:p>
+          <a:p>
+            <a:pPr marL="342900" indent="-342900">
+              <a:buFont typeface="Arial" panose="020B0604020202020204" pitchFamily="34" charset="0"/>
+              <a:buChar char="•"/>
+            </a:pPr>
+            <a:r>
+              <a:rPr lang="en-GB" dirty="0" smtClean="0"/>
+              <a:t>The idea is to refactor as many of your functions into pure functions as possible and wrap them into a shell, which handles side effects</a:t>
+            </a:r>
+          </a:p>
+          <a:p>
+            <a:pPr marL="342900" indent="-342900">
+              <a:buFont typeface="Arial" panose="020B0604020202020204" pitchFamily="34" charset="0"/>
+              <a:buChar char="•"/>
+            </a:pPr>
+            <a:r>
+              <a:rPr lang="en-GB" dirty="0" smtClean="0"/>
+              <a:t>Keep a “healthy balance” between pure and impure functions</a:t>
+            </a:r>
+          </a:p>
+          <a:p>
+            <a:pPr marL="342900" indent="-342900">
+              <a:buFont typeface="Arial" panose="020B0604020202020204" pitchFamily="34" charset="0"/>
+              <a:buChar char="•"/>
+            </a:pPr>
+            <a:endParaRPr lang="en-GB" dirty="0" smtClean="0"/>
           </a:p>
         </p:txBody>
       </p:sp>
@@ -9171,6 +10255,10 @@
           <a:bodyPr/>
           <a:lstStyle/>
           <a:p>
+            <a:r>
+              <a:rPr lang="en-GB" dirty="0" smtClean="0"/>
+              <a:t>But how do I get there?</a:t>
+            </a:r>
             <a:endParaRPr lang="en-GB" dirty="0"/>
           </a:p>
         </p:txBody>
@@ -9194,13 +10282,13 @@
               <a:rPr lang="de-CH" smtClean="0"/>
               <a:t>Slide </a:t>
             </a:r>
-            <a:fld id="{5ADFCB92-4C87-4718-9675-9BA09BB40946}" type="slidenum">
+            <a:fld id="{FECDF111-C09B-48AD-8D47-9CE7807D0762}" type="slidenum">
               <a:rPr lang="de-CH" smtClean="0"/>
               <a:t>19</a:t>
             </a:fld>
             <a:r>
               <a:rPr lang="de-CH" smtClean="0"/>
-              <a:t> of 19</a:t>
+              <a:t> of 23</a:t>
             </a:r>
             <a:endParaRPr dirty="0"/>
           </a:p>
@@ -9209,7 +10297,7 @@
     </p:spTree>
     <p:extLst>
       <p:ext uri="{BB962C8B-B14F-4D97-AF65-F5344CB8AC3E}">
-        <p14:creationId xmlns:p14="http://schemas.microsoft.com/office/powerpoint/2010/main" val="2070841533"/>
+        <p14:creationId xmlns:p14="http://schemas.microsoft.com/office/powerpoint/2010/main" val="3426570471"/>
       </p:ext>
     </p:extLst>
   </p:cSld>
@@ -9258,6 +10346,10 @@
           <a:bodyPr/>
           <a:lstStyle/>
           <a:p>
+            <a:r>
+              <a:rPr lang="en-GB" smtClean="0"/>
+              <a:t>Immutability</a:t>
+            </a:r>
             <a:endParaRPr lang="en-GB" dirty="0"/>
           </a:p>
         </p:txBody>
@@ -9382,13 +10474,13 @@
               <a:rPr lang="de-CH" smtClean="0"/>
               <a:t>Slide </a:t>
             </a:r>
-            <a:fld id="{180DA63B-0301-4B72-B16B-29C4ACAA9B8F}" type="slidenum">
+            <a:fld id="{419A7991-82A7-420E-9D1F-8DAC2FE71EDA}" type="slidenum">
               <a:rPr lang="de-CH" smtClean="0"/>
               <a:t>2</a:t>
             </a:fld>
             <a:r>
               <a:rPr lang="de-CH" smtClean="0"/>
-              <a:t> of 19</a:t>
+              <a:t> of 23</a:t>
             </a:r>
             <a:endParaRPr lang="de-CH" dirty="0"/>
           </a:p>
@@ -9398,6 +10490,1497 @@
     <p:extLst>
       <p:ext uri="{BB962C8B-B14F-4D97-AF65-F5344CB8AC3E}">
         <p14:creationId xmlns:p14="http://schemas.microsoft.com/office/powerpoint/2010/main" val="3454182098"/>
+      </p:ext>
+    </p:extLst>
+  </p:cSld>
+  <p:clrMapOvr>
+    <a:masterClrMapping/>
+  </p:clrMapOvr>
+  <p:timing>
+    <p:tnLst>
+      <p:par>
+        <p:cTn id="1" dur="indefinite" restart="never" nodeType="tmRoot"/>
+      </p:par>
+    </p:tnLst>
+  </p:timing>
+</p:sld>
+</file>
+
+<file path=ppt/slides/slide20.xml><?xml version="1.0" encoding="utf-8"?>
+<p:sld xmlns:a="http://schemas.openxmlformats.org/drawingml/2006/main" xmlns:r="http://schemas.openxmlformats.org/officeDocument/2006/relationships" xmlns:p="http://schemas.openxmlformats.org/presentationml/2006/main">
+  <p:cSld>
+    <p:spTree>
+      <p:nvGrpSpPr>
+        <p:cNvPr id="1" name=""/>
+        <p:cNvGrpSpPr/>
+        <p:nvPr/>
+      </p:nvGrpSpPr>
+      <p:grpSpPr>
+        <a:xfrm>
+          <a:off x="0" y="0"/>
+          <a:ext cx="0" cy="0"/>
+          <a:chOff x="0" y="0"/>
+          <a:chExt cx="0" cy="0"/>
+        </a:xfrm>
+      </p:grpSpPr>
+      <p:sp>
+        <p:nvSpPr>
+          <p:cNvPr id="2" name="Title 1"/>
+          <p:cNvSpPr>
+            <a:spLocks noGrp="1"/>
+          </p:cNvSpPr>
+          <p:nvPr>
+            <p:ph type="title"/>
+          </p:nvPr>
+        </p:nvSpPr>
+        <p:spPr/>
+        <p:txBody>
+          <a:bodyPr/>
+          <a:lstStyle/>
+          <a:p>
+            <a:r>
+              <a:rPr lang="en-GB" dirty="0" smtClean="0"/>
+              <a:t>Pure Functions</a:t>
+            </a:r>
+            <a:endParaRPr lang="en-GB" dirty="0"/>
+          </a:p>
+        </p:txBody>
+      </p:sp>
+      <p:sp>
+        <p:nvSpPr>
+          <p:cNvPr id="4" name="Date Placeholder 3"/>
+          <p:cNvSpPr>
+            <a:spLocks noGrp="1"/>
+          </p:cNvSpPr>
+          <p:nvPr>
+            <p:ph type="dt" sz="half" idx="10"/>
+          </p:nvPr>
+        </p:nvSpPr>
+        <p:spPr/>
+        <p:txBody>
+          <a:bodyPr/>
+          <a:lstStyle/>
+          <a:p>
+            <a:r>
+              <a:rPr lang="de-CH" smtClean="0"/>
+              <a:t>14. September 2015</a:t>
+            </a:r>
+            <a:endParaRPr lang="de-CH" dirty="0"/>
+          </a:p>
+        </p:txBody>
+      </p:sp>
+      <p:sp>
+        <p:nvSpPr>
+          <p:cNvPr id="5" name="Footer Placeholder 4"/>
+          <p:cNvSpPr>
+            <a:spLocks noGrp="1"/>
+          </p:cNvSpPr>
+          <p:nvPr>
+            <p:ph type="ftr" sz="quarter" idx="11"/>
+          </p:nvPr>
+        </p:nvSpPr>
+        <p:spPr/>
+        <p:txBody>
+          <a:bodyPr/>
+          <a:lstStyle/>
+          <a:p>
+            <a:r>
+              <a:rPr lang="en-US" smtClean="0"/>
+              <a:t>Functional Design Patterns for OO Practicioners | Hendrik Schöneberg</a:t>
+            </a:r>
+            <a:endParaRPr lang="de-CH" dirty="0"/>
+          </a:p>
+        </p:txBody>
+      </p:sp>
+      <p:sp>
+        <p:nvSpPr>
+          <p:cNvPr id="7" name="Text Placeholder 6"/>
+          <p:cNvSpPr>
+            <a:spLocks noGrp="1"/>
+          </p:cNvSpPr>
+          <p:nvPr>
+            <p:ph type="body" sz="quarter" idx="13"/>
+          </p:nvPr>
+        </p:nvSpPr>
+        <p:spPr/>
+        <p:txBody>
+          <a:bodyPr/>
+          <a:lstStyle/>
+          <a:p>
+            <a:r>
+              <a:rPr lang="en-GB" dirty="0" smtClean="0"/>
+              <a:t>Example: Buy coffee!</a:t>
+            </a:r>
+            <a:endParaRPr lang="en-GB" dirty="0"/>
+          </a:p>
+        </p:txBody>
+      </p:sp>
+      <p:sp>
+        <p:nvSpPr>
+          <p:cNvPr id="8" name="Slide Number Placeholder 7"/>
+          <p:cNvSpPr>
+            <a:spLocks noGrp="1"/>
+          </p:cNvSpPr>
+          <p:nvPr>
+            <p:ph type="sldNum" sz="quarter" idx="12"/>
+          </p:nvPr>
+        </p:nvSpPr>
+        <p:spPr/>
+        <p:txBody>
+          <a:bodyPr/>
+          <a:lstStyle/>
+          <a:p>
+            <a:r>
+              <a:rPr lang="de-CH" smtClean="0"/>
+              <a:t>Slide </a:t>
+            </a:r>
+            <a:fld id="{14390932-6F66-4317-8C7B-EC9B4075AEE5}" type="slidenum">
+              <a:rPr lang="de-CH" smtClean="0"/>
+              <a:t>20</a:t>
+            </a:fld>
+            <a:r>
+              <a:rPr lang="de-CH" smtClean="0"/>
+              <a:t> of 23</a:t>
+            </a:r>
+            <a:endParaRPr dirty="0"/>
+          </a:p>
+        </p:txBody>
+      </p:sp>
+      <p:sp>
+        <p:nvSpPr>
+          <p:cNvPr id="6" name="Rectangle 5"/>
+          <p:cNvSpPr/>
+          <p:nvPr/>
+        </p:nvSpPr>
+        <p:spPr>
+          <a:xfrm>
+            <a:off x="3707904" y="2492896"/>
+            <a:ext cx="1728192" cy="576064"/>
+          </a:xfrm>
+          <a:prstGeom prst="rect">
+            <a:avLst/>
+          </a:prstGeom>
+          <a:ln/>
+        </p:spPr>
+        <p:style>
+          <a:lnRef idx="2">
+            <a:schemeClr val="accent1"/>
+          </a:lnRef>
+          <a:fillRef idx="1">
+            <a:schemeClr val="lt1"/>
+          </a:fillRef>
+          <a:effectRef idx="0">
+            <a:schemeClr val="accent1"/>
+          </a:effectRef>
+          <a:fontRef idx="minor">
+            <a:schemeClr val="dk1"/>
+          </a:fontRef>
+        </p:style>
+        <p:txBody>
+          <a:bodyPr rtlCol="0" anchor="ctr"/>
+          <a:lstStyle/>
+          <a:p>
+            <a:pPr algn="ctr"/>
+            <a:r>
+              <a:rPr lang="en-GB" sz="2200" dirty="0" err="1" smtClean="0">
+                <a:latin typeface="AA Zuehlke" pitchFamily="2" charset="0"/>
+              </a:rPr>
+              <a:t>buyCoffee</a:t>
+            </a:r>
+            <a:endParaRPr lang="en-GB" sz="2200" dirty="0" smtClean="0">
+              <a:latin typeface="AA Zuehlke" pitchFamily="2" charset="0"/>
+            </a:endParaRPr>
+          </a:p>
+        </p:txBody>
+      </p:sp>
+      <p:cxnSp>
+        <p:nvCxnSpPr>
+          <p:cNvPr id="17" name="Straight Arrow Connector 16"/>
+          <p:cNvCxnSpPr>
+            <a:endCxn id="6" idx="1"/>
+          </p:cNvCxnSpPr>
+          <p:nvPr/>
+        </p:nvCxnSpPr>
+        <p:spPr>
+          <a:xfrm>
+            <a:off x="2267744" y="2765548"/>
+            <a:ext cx="1440160" cy="15380"/>
+          </a:xfrm>
+          <a:prstGeom prst="straightConnector1">
+            <a:avLst/>
+          </a:prstGeom>
+          <a:ln w="25400">
+            <a:solidFill>
+              <a:schemeClr val="bg2">
+                <a:lumMod val="50000"/>
+              </a:schemeClr>
+            </a:solidFill>
+            <a:tailEnd type="triangle" w="lg" len="med"/>
+          </a:ln>
+        </p:spPr>
+        <p:style>
+          <a:lnRef idx="1">
+            <a:schemeClr val="accent1"/>
+          </a:lnRef>
+          <a:fillRef idx="0">
+            <a:schemeClr val="accent1"/>
+          </a:fillRef>
+          <a:effectRef idx="0">
+            <a:schemeClr val="accent1"/>
+          </a:effectRef>
+          <a:fontRef idx="minor">
+            <a:schemeClr val="tx1"/>
+          </a:fontRef>
+        </p:style>
+      </p:cxnSp>
+      <p:cxnSp>
+        <p:nvCxnSpPr>
+          <p:cNvPr id="19" name="Straight Arrow Connector 18"/>
+          <p:cNvCxnSpPr/>
+          <p:nvPr/>
+        </p:nvCxnSpPr>
+        <p:spPr>
+          <a:xfrm>
+            <a:off x="5436096" y="2780928"/>
+            <a:ext cx="1440160" cy="15380"/>
+          </a:xfrm>
+          <a:prstGeom prst="straightConnector1">
+            <a:avLst/>
+          </a:prstGeom>
+          <a:ln w="25400">
+            <a:solidFill>
+              <a:schemeClr val="bg2">
+                <a:lumMod val="50000"/>
+              </a:schemeClr>
+            </a:solidFill>
+            <a:tailEnd type="triangle" w="lg" len="med"/>
+          </a:ln>
+        </p:spPr>
+        <p:style>
+          <a:lnRef idx="1">
+            <a:schemeClr val="accent1"/>
+          </a:lnRef>
+          <a:fillRef idx="0">
+            <a:schemeClr val="accent1"/>
+          </a:fillRef>
+          <a:effectRef idx="0">
+            <a:schemeClr val="accent1"/>
+          </a:effectRef>
+          <a:fontRef idx="minor">
+            <a:schemeClr val="tx1"/>
+          </a:fontRef>
+        </p:style>
+      </p:cxnSp>
+      <p:cxnSp>
+        <p:nvCxnSpPr>
+          <p:cNvPr id="21" name="Straight Arrow Connector 20"/>
+          <p:cNvCxnSpPr>
+            <a:stCxn id="6" idx="2"/>
+          </p:cNvCxnSpPr>
+          <p:nvPr/>
+        </p:nvCxnSpPr>
+        <p:spPr>
+          <a:xfrm>
+            <a:off x="4572000" y="3068960"/>
+            <a:ext cx="0" cy="1080120"/>
+          </a:xfrm>
+          <a:prstGeom prst="straightConnector1">
+            <a:avLst/>
+          </a:prstGeom>
+          <a:ln w="38100">
+            <a:prstDash val="solid"/>
+            <a:tailEnd type="triangle"/>
+          </a:ln>
+        </p:spPr>
+        <p:style>
+          <a:lnRef idx="1">
+            <a:schemeClr val="accent1"/>
+          </a:lnRef>
+          <a:fillRef idx="0">
+            <a:schemeClr val="accent1"/>
+          </a:fillRef>
+          <a:effectRef idx="0">
+            <a:schemeClr val="accent1"/>
+          </a:effectRef>
+          <a:fontRef idx="minor">
+            <a:schemeClr val="tx1"/>
+          </a:fontRef>
+        </p:style>
+      </p:cxnSp>
+      <p:sp>
+        <p:nvSpPr>
+          <p:cNvPr id="22" name="TextBox 21"/>
+          <p:cNvSpPr txBox="1"/>
+          <p:nvPr/>
+        </p:nvSpPr>
+        <p:spPr>
+          <a:xfrm>
+            <a:off x="2185591" y="2276872"/>
+            <a:ext cx="1594321" cy="360040"/>
+          </a:xfrm>
+          <a:prstGeom prst="rect">
+            <a:avLst/>
+          </a:prstGeom>
+          <a:noFill/>
+        </p:spPr>
+        <p:txBody>
+          <a:bodyPr wrap="square" rtlCol="0">
+            <a:noAutofit/>
+          </a:bodyPr>
+          <a:lstStyle/>
+          <a:p>
+            <a:r>
+              <a:rPr lang="en-GB" sz="2200" dirty="0" err="1" smtClean="0">
+                <a:latin typeface="AA Zuehlke" pitchFamily="2" charset="0"/>
+              </a:rPr>
+              <a:t>CreditCard</a:t>
+            </a:r>
+            <a:endParaRPr lang="en-GB" sz="2200" dirty="0" smtClean="0">
+              <a:latin typeface="AA Zuehlke" pitchFamily="2" charset="0"/>
+            </a:endParaRPr>
+          </a:p>
+        </p:txBody>
+      </p:sp>
+      <p:sp>
+        <p:nvSpPr>
+          <p:cNvPr id="23" name="TextBox 22"/>
+          <p:cNvSpPr txBox="1"/>
+          <p:nvPr/>
+        </p:nvSpPr>
+        <p:spPr>
+          <a:xfrm>
+            <a:off x="6228184" y="2276872"/>
+            <a:ext cx="1021556" cy="308656"/>
+          </a:xfrm>
+          <a:prstGeom prst="rect">
+            <a:avLst/>
+          </a:prstGeom>
+          <a:noFill/>
+        </p:spPr>
+        <p:txBody>
+          <a:bodyPr wrap="square" rtlCol="0">
+            <a:noAutofit/>
+          </a:bodyPr>
+          <a:lstStyle/>
+          <a:p>
+            <a:r>
+              <a:rPr lang="en-GB" sz="2200" dirty="0" smtClean="0">
+                <a:latin typeface="AA Zuehlke" pitchFamily="2" charset="0"/>
+              </a:rPr>
+              <a:t>Cup</a:t>
+            </a:r>
+            <a:endParaRPr lang="en-GB" sz="2200" dirty="0" smtClean="0">
+              <a:latin typeface="AA Zuehlke" pitchFamily="2" charset="0"/>
+            </a:endParaRPr>
+          </a:p>
+        </p:txBody>
+      </p:sp>
+      <p:cxnSp>
+        <p:nvCxnSpPr>
+          <p:cNvPr id="27" name="Straight Connector 26"/>
+          <p:cNvCxnSpPr/>
+          <p:nvPr/>
+        </p:nvCxnSpPr>
+        <p:spPr>
+          <a:xfrm>
+            <a:off x="4716016" y="3645024"/>
+            <a:ext cx="1296144" cy="0"/>
+          </a:xfrm>
+          <a:prstGeom prst="line">
+            <a:avLst/>
+          </a:prstGeom>
+          <a:ln w="25400">
+            <a:solidFill>
+              <a:srgbClr val="C00000"/>
+            </a:solidFill>
+            <a:prstDash val="sysDash"/>
+          </a:ln>
+        </p:spPr>
+        <p:style>
+          <a:lnRef idx="1">
+            <a:schemeClr val="accent1"/>
+          </a:lnRef>
+          <a:fillRef idx="0">
+            <a:schemeClr val="accent1"/>
+          </a:fillRef>
+          <a:effectRef idx="0">
+            <a:schemeClr val="accent1"/>
+          </a:effectRef>
+          <a:fontRef idx="minor">
+            <a:schemeClr val="tx1"/>
+          </a:fontRef>
+        </p:style>
+      </p:cxnSp>
+      <p:sp>
+        <p:nvSpPr>
+          <p:cNvPr id="30" name="TextBox 29"/>
+          <p:cNvSpPr txBox="1"/>
+          <p:nvPr/>
+        </p:nvSpPr>
+        <p:spPr>
+          <a:xfrm>
+            <a:off x="6012160" y="3429000"/>
+            <a:ext cx="1459645" cy="504056"/>
+          </a:xfrm>
+          <a:prstGeom prst="rect">
+            <a:avLst/>
+          </a:prstGeom>
+          <a:noFill/>
+        </p:spPr>
+        <p:txBody>
+          <a:bodyPr wrap="square" rtlCol="0">
+            <a:noAutofit/>
+          </a:bodyPr>
+          <a:lstStyle/>
+          <a:p>
+            <a:r>
+              <a:rPr lang="en-GB" sz="2200" dirty="0" smtClean="0">
+                <a:solidFill>
+                  <a:srgbClr val="C00000"/>
+                </a:solidFill>
+                <a:latin typeface="AA Zuehlke" pitchFamily="2" charset="0"/>
+              </a:rPr>
+              <a:t>side effect!</a:t>
+            </a:r>
+            <a:endParaRPr lang="en-GB" sz="2200" dirty="0" smtClean="0">
+              <a:solidFill>
+                <a:srgbClr val="C00000"/>
+              </a:solidFill>
+              <a:latin typeface="AA Zuehlke" pitchFamily="2" charset="0"/>
+            </a:endParaRPr>
+          </a:p>
+        </p:txBody>
+      </p:sp>
+      <p:sp>
+        <p:nvSpPr>
+          <p:cNvPr id="32" name="Rounded Rectangle 31"/>
+          <p:cNvSpPr/>
+          <p:nvPr/>
+        </p:nvSpPr>
+        <p:spPr>
+          <a:xfrm>
+            <a:off x="3707904" y="4221088"/>
+            <a:ext cx="1728192" cy="1008112"/>
+          </a:xfrm>
+          <a:prstGeom prst="roundRect">
+            <a:avLst/>
+          </a:prstGeom>
+          <a:ln/>
+        </p:spPr>
+        <p:style>
+          <a:lnRef idx="2">
+            <a:schemeClr val="accent1"/>
+          </a:lnRef>
+          <a:fillRef idx="1">
+            <a:schemeClr val="lt1"/>
+          </a:fillRef>
+          <a:effectRef idx="0">
+            <a:schemeClr val="accent1"/>
+          </a:effectRef>
+          <a:fontRef idx="minor">
+            <a:schemeClr val="dk1"/>
+          </a:fontRef>
+        </p:style>
+        <p:txBody>
+          <a:bodyPr rtlCol="0" anchor="ctr"/>
+          <a:lstStyle/>
+          <a:p>
+            <a:pPr algn="ctr"/>
+            <a:r>
+              <a:rPr lang="en-GB" sz="2200" dirty="0" err="1">
+                <a:latin typeface="AA Zuehlke" pitchFamily="2" charset="0"/>
+              </a:rPr>
+              <a:t>CreditCard</a:t>
+            </a:r>
+            <a:r>
+              <a:rPr lang="en-GB" sz="2200" dirty="0">
+                <a:latin typeface="AA Zuehlke" pitchFamily="2" charset="0"/>
+              </a:rPr>
+              <a:t> Transaction Backend</a:t>
+            </a:r>
+          </a:p>
+        </p:txBody>
+      </p:sp>
+      <p:sp>
+        <p:nvSpPr>
+          <p:cNvPr id="33" name="TextBox 32"/>
+          <p:cNvSpPr txBox="1"/>
+          <p:nvPr/>
+        </p:nvSpPr>
+        <p:spPr>
+          <a:xfrm>
+            <a:off x="3599893" y="3392997"/>
+            <a:ext cx="936104" cy="360040"/>
+          </a:xfrm>
+          <a:prstGeom prst="rect">
+            <a:avLst/>
+          </a:prstGeom>
+          <a:noFill/>
+        </p:spPr>
+        <p:txBody>
+          <a:bodyPr wrap="square" rtlCol="0">
+            <a:noAutofit/>
+          </a:bodyPr>
+          <a:lstStyle/>
+          <a:p>
+            <a:r>
+              <a:rPr lang="en-GB" sz="2200" dirty="0" smtClean="0">
+                <a:latin typeface="AA Zuehlke" pitchFamily="2" charset="0"/>
+              </a:rPr>
+              <a:t>charge</a:t>
+            </a:r>
+            <a:endParaRPr lang="en-GB" sz="2200" dirty="0" smtClean="0">
+              <a:latin typeface="AA Zuehlke" pitchFamily="2" charset="0"/>
+            </a:endParaRPr>
+          </a:p>
+        </p:txBody>
+      </p:sp>
+    </p:spTree>
+    <p:extLst>
+      <p:ext uri="{BB962C8B-B14F-4D97-AF65-F5344CB8AC3E}">
+        <p14:creationId xmlns:p14="http://schemas.microsoft.com/office/powerpoint/2010/main" val="351525945"/>
+      </p:ext>
+    </p:extLst>
+  </p:cSld>
+  <p:clrMapOvr>
+    <a:masterClrMapping/>
+  </p:clrMapOvr>
+  <p:timing>
+    <p:tnLst>
+      <p:par>
+        <p:cTn id="1" dur="indefinite" restart="never" nodeType="tmRoot"/>
+      </p:par>
+    </p:tnLst>
+  </p:timing>
+</p:sld>
+</file>
+
+<file path=ppt/slides/slide21.xml><?xml version="1.0" encoding="utf-8"?>
+<p:sld xmlns:a="http://schemas.openxmlformats.org/drawingml/2006/main" xmlns:r="http://schemas.openxmlformats.org/officeDocument/2006/relationships" xmlns:p="http://schemas.openxmlformats.org/presentationml/2006/main">
+  <p:cSld>
+    <p:spTree>
+      <p:nvGrpSpPr>
+        <p:cNvPr id="1" name=""/>
+        <p:cNvGrpSpPr/>
+        <p:nvPr/>
+      </p:nvGrpSpPr>
+      <p:grpSpPr>
+        <a:xfrm>
+          <a:off x="0" y="0"/>
+          <a:ext cx="0" cy="0"/>
+          <a:chOff x="0" y="0"/>
+          <a:chExt cx="0" cy="0"/>
+        </a:xfrm>
+      </p:grpSpPr>
+      <p:sp>
+        <p:nvSpPr>
+          <p:cNvPr id="2" name="Title 1"/>
+          <p:cNvSpPr>
+            <a:spLocks noGrp="1"/>
+          </p:cNvSpPr>
+          <p:nvPr>
+            <p:ph type="title"/>
+          </p:nvPr>
+        </p:nvSpPr>
+        <p:spPr/>
+        <p:txBody>
+          <a:bodyPr/>
+          <a:lstStyle/>
+          <a:p>
+            <a:r>
+              <a:rPr lang="en-GB" dirty="0" smtClean="0"/>
+              <a:t>Pure Functions</a:t>
+            </a:r>
+            <a:endParaRPr lang="en-GB" dirty="0"/>
+          </a:p>
+        </p:txBody>
+      </p:sp>
+      <p:sp>
+        <p:nvSpPr>
+          <p:cNvPr id="4" name="Date Placeholder 3"/>
+          <p:cNvSpPr>
+            <a:spLocks noGrp="1"/>
+          </p:cNvSpPr>
+          <p:nvPr>
+            <p:ph type="dt" sz="half" idx="10"/>
+          </p:nvPr>
+        </p:nvSpPr>
+        <p:spPr/>
+        <p:txBody>
+          <a:bodyPr/>
+          <a:lstStyle/>
+          <a:p>
+            <a:r>
+              <a:rPr lang="de-CH" smtClean="0"/>
+              <a:t>14. September 2015</a:t>
+            </a:r>
+            <a:endParaRPr lang="de-CH" dirty="0"/>
+          </a:p>
+        </p:txBody>
+      </p:sp>
+      <p:sp>
+        <p:nvSpPr>
+          <p:cNvPr id="5" name="Footer Placeholder 4"/>
+          <p:cNvSpPr>
+            <a:spLocks noGrp="1"/>
+          </p:cNvSpPr>
+          <p:nvPr>
+            <p:ph type="ftr" sz="quarter" idx="11"/>
+          </p:nvPr>
+        </p:nvSpPr>
+        <p:spPr/>
+        <p:txBody>
+          <a:bodyPr/>
+          <a:lstStyle/>
+          <a:p>
+            <a:r>
+              <a:rPr lang="en-US" smtClean="0"/>
+              <a:t>Functional Design Patterns for OO Practicioners | Hendrik Schöneberg</a:t>
+            </a:r>
+            <a:endParaRPr lang="de-CH" dirty="0"/>
+          </a:p>
+        </p:txBody>
+      </p:sp>
+      <p:sp>
+        <p:nvSpPr>
+          <p:cNvPr id="7" name="Text Placeholder 6"/>
+          <p:cNvSpPr>
+            <a:spLocks noGrp="1"/>
+          </p:cNvSpPr>
+          <p:nvPr>
+            <p:ph type="body" sz="quarter" idx="13"/>
+          </p:nvPr>
+        </p:nvSpPr>
+        <p:spPr/>
+        <p:txBody>
+          <a:bodyPr/>
+          <a:lstStyle/>
+          <a:p>
+            <a:r>
+              <a:rPr lang="en-GB" dirty="0" smtClean="0"/>
+              <a:t>Example: Buy coffee!</a:t>
+            </a:r>
+            <a:endParaRPr lang="en-GB" dirty="0"/>
+          </a:p>
+        </p:txBody>
+      </p:sp>
+      <p:sp>
+        <p:nvSpPr>
+          <p:cNvPr id="6" name="Rectangle 5"/>
+          <p:cNvSpPr/>
+          <p:nvPr/>
+        </p:nvSpPr>
+        <p:spPr>
+          <a:xfrm>
+            <a:off x="2634067" y="2479085"/>
+            <a:ext cx="1728192" cy="576064"/>
+          </a:xfrm>
+          <a:prstGeom prst="rect">
+            <a:avLst/>
+          </a:prstGeom>
+          <a:ln/>
+        </p:spPr>
+        <p:style>
+          <a:lnRef idx="2">
+            <a:schemeClr val="accent1"/>
+          </a:lnRef>
+          <a:fillRef idx="1">
+            <a:schemeClr val="lt1"/>
+          </a:fillRef>
+          <a:effectRef idx="0">
+            <a:schemeClr val="accent1"/>
+          </a:effectRef>
+          <a:fontRef idx="minor">
+            <a:schemeClr val="dk1"/>
+          </a:fontRef>
+        </p:style>
+        <p:txBody>
+          <a:bodyPr rtlCol="0" anchor="ctr"/>
+          <a:lstStyle/>
+          <a:p>
+            <a:pPr algn="ctr"/>
+            <a:r>
+              <a:rPr lang="en-GB" sz="2200" dirty="0" err="1" smtClean="0">
+                <a:latin typeface="AA Zuehlke" pitchFamily="2" charset="0"/>
+              </a:rPr>
+              <a:t>buyCoffee</a:t>
+            </a:r>
+            <a:endParaRPr lang="en-GB" sz="2200" dirty="0" smtClean="0">
+              <a:latin typeface="AA Zuehlke" pitchFamily="2" charset="0"/>
+            </a:endParaRPr>
+          </a:p>
+        </p:txBody>
+      </p:sp>
+      <p:cxnSp>
+        <p:nvCxnSpPr>
+          <p:cNvPr id="17" name="Straight Arrow Connector 16"/>
+          <p:cNvCxnSpPr>
+            <a:endCxn id="6" idx="1"/>
+          </p:cNvCxnSpPr>
+          <p:nvPr/>
+        </p:nvCxnSpPr>
+        <p:spPr>
+          <a:xfrm>
+            <a:off x="1193907" y="2751737"/>
+            <a:ext cx="1440160" cy="15380"/>
+          </a:xfrm>
+          <a:prstGeom prst="straightConnector1">
+            <a:avLst/>
+          </a:prstGeom>
+          <a:ln w="25400">
+            <a:solidFill>
+              <a:schemeClr val="bg2">
+                <a:lumMod val="50000"/>
+              </a:schemeClr>
+            </a:solidFill>
+            <a:tailEnd type="triangle" w="lg" len="med"/>
+          </a:ln>
+        </p:spPr>
+        <p:style>
+          <a:lnRef idx="1">
+            <a:schemeClr val="accent1"/>
+          </a:lnRef>
+          <a:fillRef idx="0">
+            <a:schemeClr val="accent1"/>
+          </a:fillRef>
+          <a:effectRef idx="0">
+            <a:schemeClr val="accent1"/>
+          </a:effectRef>
+          <a:fontRef idx="minor">
+            <a:schemeClr val="tx1"/>
+          </a:fontRef>
+        </p:style>
+      </p:cxnSp>
+      <p:cxnSp>
+        <p:nvCxnSpPr>
+          <p:cNvPr id="19" name="Straight Arrow Connector 18"/>
+          <p:cNvCxnSpPr/>
+          <p:nvPr/>
+        </p:nvCxnSpPr>
+        <p:spPr>
+          <a:xfrm flipV="1">
+            <a:off x="4362259" y="2119045"/>
+            <a:ext cx="1440160" cy="648072"/>
+          </a:xfrm>
+          <a:prstGeom prst="straightConnector1">
+            <a:avLst/>
+          </a:prstGeom>
+          <a:ln w="25400">
+            <a:solidFill>
+              <a:schemeClr val="bg2">
+                <a:lumMod val="50000"/>
+              </a:schemeClr>
+            </a:solidFill>
+            <a:tailEnd type="triangle" w="lg" len="med"/>
+          </a:ln>
+        </p:spPr>
+        <p:style>
+          <a:lnRef idx="1">
+            <a:schemeClr val="accent1"/>
+          </a:lnRef>
+          <a:fillRef idx="0">
+            <a:schemeClr val="accent1"/>
+          </a:fillRef>
+          <a:effectRef idx="0">
+            <a:schemeClr val="accent1"/>
+          </a:effectRef>
+          <a:fontRef idx="minor">
+            <a:schemeClr val="tx1"/>
+          </a:fontRef>
+        </p:style>
+      </p:cxnSp>
+      <p:sp>
+        <p:nvSpPr>
+          <p:cNvPr id="22" name="TextBox 21"/>
+          <p:cNvSpPr txBox="1"/>
+          <p:nvPr/>
+        </p:nvSpPr>
+        <p:spPr>
+          <a:xfrm>
+            <a:off x="1111754" y="2263061"/>
+            <a:ext cx="1594321" cy="360040"/>
+          </a:xfrm>
+          <a:prstGeom prst="rect">
+            <a:avLst/>
+          </a:prstGeom>
+          <a:noFill/>
+        </p:spPr>
+        <p:txBody>
+          <a:bodyPr wrap="square" rtlCol="0">
+            <a:noAutofit/>
+          </a:bodyPr>
+          <a:lstStyle/>
+          <a:p>
+            <a:r>
+              <a:rPr lang="en-GB" sz="2200" dirty="0" err="1" smtClean="0">
+                <a:latin typeface="AA Zuehlke" pitchFamily="2" charset="0"/>
+              </a:rPr>
+              <a:t>CreditCard</a:t>
+            </a:r>
+            <a:endParaRPr lang="en-GB" sz="2200" dirty="0" smtClean="0">
+              <a:latin typeface="AA Zuehlke" pitchFamily="2" charset="0"/>
+            </a:endParaRPr>
+          </a:p>
+        </p:txBody>
+      </p:sp>
+      <p:sp>
+        <p:nvSpPr>
+          <p:cNvPr id="23" name="TextBox 22"/>
+          <p:cNvSpPr txBox="1"/>
+          <p:nvPr/>
+        </p:nvSpPr>
+        <p:spPr>
+          <a:xfrm>
+            <a:off x="5926708" y="1916832"/>
+            <a:ext cx="1021556" cy="308656"/>
+          </a:xfrm>
+          <a:prstGeom prst="rect">
+            <a:avLst/>
+          </a:prstGeom>
+          <a:noFill/>
+        </p:spPr>
+        <p:txBody>
+          <a:bodyPr wrap="square" rtlCol="0">
+            <a:noAutofit/>
+          </a:bodyPr>
+          <a:lstStyle/>
+          <a:p>
+            <a:r>
+              <a:rPr lang="en-GB" sz="2200" dirty="0" smtClean="0">
+                <a:latin typeface="AA Zuehlke" pitchFamily="2" charset="0"/>
+              </a:rPr>
+              <a:t>Cup</a:t>
+            </a:r>
+            <a:endParaRPr lang="en-GB" sz="2200" dirty="0" smtClean="0">
+              <a:latin typeface="AA Zuehlke" pitchFamily="2" charset="0"/>
+            </a:endParaRPr>
+          </a:p>
+        </p:txBody>
+      </p:sp>
+      <p:sp>
+        <p:nvSpPr>
+          <p:cNvPr id="3" name="Slide Number Placeholder 2"/>
+          <p:cNvSpPr>
+            <a:spLocks noGrp="1"/>
+          </p:cNvSpPr>
+          <p:nvPr>
+            <p:ph type="sldNum" sz="quarter" idx="12"/>
+          </p:nvPr>
+        </p:nvSpPr>
+        <p:spPr/>
+        <p:txBody>
+          <a:bodyPr/>
+          <a:lstStyle/>
+          <a:p>
+            <a:r>
+              <a:rPr lang="de-CH" smtClean="0"/>
+              <a:t>Slide </a:t>
+            </a:r>
+            <a:fld id="{769DFA71-B7EF-4F97-9340-429D5AE50F74}" type="slidenum">
+              <a:rPr lang="de-CH" smtClean="0"/>
+              <a:t>21</a:t>
+            </a:fld>
+            <a:r>
+              <a:rPr lang="de-CH" smtClean="0"/>
+              <a:t> of 23</a:t>
+            </a:r>
+            <a:endParaRPr dirty="0"/>
+          </a:p>
+        </p:txBody>
+      </p:sp>
+      <p:cxnSp>
+        <p:nvCxnSpPr>
+          <p:cNvPr id="18" name="Straight Arrow Connector 17"/>
+          <p:cNvCxnSpPr/>
+          <p:nvPr/>
+        </p:nvCxnSpPr>
+        <p:spPr>
+          <a:xfrm>
+            <a:off x="4362259" y="2767117"/>
+            <a:ext cx="1440160" cy="768326"/>
+          </a:xfrm>
+          <a:prstGeom prst="straightConnector1">
+            <a:avLst/>
+          </a:prstGeom>
+          <a:ln w="25400">
+            <a:solidFill>
+              <a:schemeClr val="bg2">
+                <a:lumMod val="50000"/>
+              </a:schemeClr>
+            </a:solidFill>
+            <a:tailEnd type="triangle" w="lg" len="med"/>
+          </a:ln>
+        </p:spPr>
+        <p:style>
+          <a:lnRef idx="1">
+            <a:schemeClr val="accent1"/>
+          </a:lnRef>
+          <a:fillRef idx="0">
+            <a:schemeClr val="accent1"/>
+          </a:fillRef>
+          <a:effectRef idx="0">
+            <a:schemeClr val="accent1"/>
+          </a:effectRef>
+          <a:fontRef idx="minor">
+            <a:schemeClr val="tx1"/>
+          </a:fontRef>
+        </p:style>
+      </p:cxnSp>
+      <p:sp>
+        <p:nvSpPr>
+          <p:cNvPr id="12" name="TextBox 11"/>
+          <p:cNvSpPr txBox="1"/>
+          <p:nvPr/>
+        </p:nvSpPr>
+        <p:spPr>
+          <a:xfrm>
+            <a:off x="5916539" y="3319419"/>
+            <a:ext cx="1021556" cy="432048"/>
+          </a:xfrm>
+          <a:prstGeom prst="rect">
+            <a:avLst/>
+          </a:prstGeom>
+          <a:noFill/>
+        </p:spPr>
+        <p:txBody>
+          <a:bodyPr wrap="square" rtlCol="0">
+            <a:noAutofit/>
+          </a:bodyPr>
+          <a:lstStyle/>
+          <a:p>
+            <a:r>
+              <a:rPr lang="en-GB" sz="2200" dirty="0" smtClean="0">
+                <a:latin typeface="AA Zuehlke" pitchFamily="2" charset="0"/>
+              </a:rPr>
+              <a:t>Charge</a:t>
+            </a:r>
+            <a:endParaRPr lang="en-GB" sz="2200" dirty="0" smtClean="0">
+              <a:latin typeface="AA Zuehlke" pitchFamily="2" charset="0"/>
+            </a:endParaRPr>
+          </a:p>
+        </p:txBody>
+      </p:sp>
+      <p:sp>
+        <p:nvSpPr>
+          <p:cNvPr id="15" name="TextBox 14"/>
+          <p:cNvSpPr txBox="1"/>
+          <p:nvPr/>
+        </p:nvSpPr>
+        <p:spPr>
+          <a:xfrm>
+            <a:off x="899592" y="3855639"/>
+            <a:ext cx="6690461" cy="2452133"/>
+          </a:xfrm>
+          <a:prstGeom prst="rect">
+            <a:avLst/>
+          </a:prstGeom>
+          <a:noFill/>
+        </p:spPr>
+        <p:txBody>
+          <a:bodyPr wrap="square" rtlCol="0">
+            <a:noAutofit/>
+          </a:bodyPr>
+          <a:lstStyle/>
+          <a:p>
+            <a:pPr marL="342900" indent="-342900">
+              <a:buFont typeface="Arial" panose="020B0604020202020204" pitchFamily="34" charset="0"/>
+              <a:buChar char="•"/>
+            </a:pPr>
+            <a:r>
+              <a:rPr lang="en-GB" sz="2200" dirty="0" smtClean="0">
+                <a:latin typeface="AA Zuehlke" pitchFamily="2" charset="0"/>
+              </a:rPr>
+              <a:t>Side effect encapsulated</a:t>
+            </a:r>
+          </a:p>
+          <a:p>
+            <a:pPr marL="342900" indent="-342900">
+              <a:buFont typeface="Arial" panose="020B0604020202020204" pitchFamily="34" charset="0"/>
+              <a:buChar char="•"/>
+            </a:pPr>
+            <a:r>
+              <a:rPr lang="en-GB" sz="2200" dirty="0">
+                <a:latin typeface="AA Zuehlke" pitchFamily="2" charset="0"/>
+              </a:rPr>
+              <a:t>‘</a:t>
+            </a:r>
+            <a:r>
+              <a:rPr lang="en-GB" sz="2200" dirty="0" err="1">
+                <a:latin typeface="AA Zuehlke" pitchFamily="2" charset="0"/>
+              </a:rPr>
+              <a:t>buyCoffee</a:t>
+            </a:r>
+            <a:r>
+              <a:rPr lang="en-GB" sz="2200" dirty="0">
+                <a:latin typeface="AA Zuehlke" pitchFamily="2" charset="0"/>
+              </a:rPr>
+              <a:t>’ is now </a:t>
+            </a:r>
+            <a:r>
+              <a:rPr lang="en-GB" sz="2200" dirty="0" smtClean="0">
+                <a:latin typeface="AA Zuehlke" pitchFamily="2" charset="0"/>
+              </a:rPr>
+              <a:t>pure</a:t>
+            </a:r>
+          </a:p>
+          <a:p>
+            <a:pPr marL="342900" indent="-342900">
+              <a:buFont typeface="Arial" panose="020B0604020202020204" pitchFamily="34" charset="0"/>
+              <a:buChar char="•"/>
+            </a:pPr>
+            <a:r>
+              <a:rPr lang="en-GB" sz="2200" dirty="0" smtClean="0">
+                <a:latin typeface="AA Zuehlke" pitchFamily="2" charset="0"/>
+              </a:rPr>
+              <a:t>Concerns separated</a:t>
+            </a:r>
+          </a:p>
+          <a:p>
+            <a:pPr marL="342900" indent="-342900">
+              <a:buFont typeface="Arial" panose="020B0604020202020204" pitchFamily="34" charset="0"/>
+              <a:buChar char="•"/>
+            </a:pPr>
+            <a:r>
+              <a:rPr lang="en-GB" sz="2200" dirty="0" smtClean="0">
+                <a:latin typeface="AA Zuehlke" pitchFamily="2" charset="0"/>
+              </a:rPr>
+              <a:t>Caller needs to deal with side effects</a:t>
+            </a:r>
+          </a:p>
+          <a:p>
+            <a:pPr marL="342900" indent="-342900">
+              <a:buFont typeface="Arial" panose="020B0604020202020204" pitchFamily="34" charset="0"/>
+              <a:buChar char="•"/>
+            </a:pPr>
+            <a:r>
+              <a:rPr lang="en-GB" sz="2200" dirty="0" smtClean="0">
+                <a:latin typeface="AA Zuehlke" pitchFamily="2" charset="0"/>
+              </a:rPr>
+              <a:t>Caller can decide to batch / optimize side effects</a:t>
+            </a:r>
+            <a:endParaRPr lang="en-GB" sz="2200" dirty="0">
+              <a:latin typeface="AA Zuehlke" pitchFamily="2" charset="0"/>
+            </a:endParaRPr>
+          </a:p>
+        </p:txBody>
+      </p:sp>
+      <p:sp>
+        <p:nvSpPr>
+          <p:cNvPr id="16" name="TextBox 15"/>
+          <p:cNvSpPr txBox="1"/>
+          <p:nvPr/>
+        </p:nvSpPr>
+        <p:spPr>
+          <a:xfrm>
+            <a:off x="7020272" y="2911133"/>
+            <a:ext cx="1728192" cy="1309955"/>
+          </a:xfrm>
+          <a:prstGeom prst="rect">
+            <a:avLst/>
+          </a:prstGeom>
+          <a:noFill/>
+          <a:ln>
+            <a:solidFill>
+              <a:schemeClr val="bg2">
+                <a:lumMod val="50000"/>
+              </a:schemeClr>
+            </a:solidFill>
+          </a:ln>
+        </p:spPr>
+        <p:txBody>
+          <a:bodyPr wrap="square" rtlCol="0">
+            <a:noAutofit/>
+          </a:bodyPr>
+          <a:lstStyle/>
+          <a:p>
+            <a:r>
+              <a:rPr lang="en-GB" sz="1600" dirty="0" smtClean="0">
+                <a:latin typeface="AA Zuehlke" pitchFamily="2" charset="0"/>
+              </a:rPr>
+              <a:t>Holds information for the credit card backend, but does not result in a side effect</a:t>
+            </a:r>
+            <a:endParaRPr lang="en-GB" sz="1600" dirty="0" smtClean="0">
+              <a:latin typeface="AA Zuehlke" pitchFamily="2" charset="0"/>
+            </a:endParaRPr>
+          </a:p>
+        </p:txBody>
+      </p:sp>
+    </p:spTree>
+    <p:extLst>
+      <p:ext uri="{BB962C8B-B14F-4D97-AF65-F5344CB8AC3E}">
+        <p14:creationId xmlns:p14="http://schemas.microsoft.com/office/powerpoint/2010/main" val="1662171398"/>
+      </p:ext>
+    </p:extLst>
+  </p:cSld>
+  <p:clrMapOvr>
+    <a:masterClrMapping/>
+  </p:clrMapOvr>
+  <p:timing>
+    <p:tnLst>
+      <p:par>
+        <p:cTn id="1" dur="indefinite" restart="never" nodeType="tmRoot"/>
+      </p:par>
+    </p:tnLst>
+  </p:timing>
+</p:sld>
+</file>
+
+<file path=ppt/slides/slide22.xml><?xml version="1.0" encoding="utf-8"?>
+<p:sld xmlns:a="http://schemas.openxmlformats.org/drawingml/2006/main" xmlns:r="http://schemas.openxmlformats.org/officeDocument/2006/relationships" xmlns:p="http://schemas.openxmlformats.org/presentationml/2006/main">
+  <p:cSld>
+    <p:spTree>
+      <p:nvGrpSpPr>
+        <p:cNvPr id="1" name=""/>
+        <p:cNvGrpSpPr/>
+        <p:nvPr/>
+      </p:nvGrpSpPr>
+      <p:grpSpPr>
+        <a:xfrm>
+          <a:off x="0" y="0"/>
+          <a:ext cx="0" cy="0"/>
+          <a:chOff x="0" y="0"/>
+          <a:chExt cx="0" cy="0"/>
+        </a:xfrm>
+      </p:grpSpPr>
+      <p:sp>
+        <p:nvSpPr>
+          <p:cNvPr id="2" name="Title 1"/>
+          <p:cNvSpPr>
+            <a:spLocks noGrp="1"/>
+          </p:cNvSpPr>
+          <p:nvPr>
+            <p:ph type="title"/>
+          </p:nvPr>
+        </p:nvSpPr>
+        <p:spPr/>
+        <p:txBody>
+          <a:bodyPr/>
+          <a:lstStyle/>
+          <a:p>
+            <a:r>
+              <a:rPr lang="en-GB" dirty="0" smtClean="0"/>
+              <a:t>Pure Functions</a:t>
+            </a:r>
+            <a:endParaRPr lang="en-GB" dirty="0"/>
+          </a:p>
+        </p:txBody>
+      </p:sp>
+      <p:sp>
+        <p:nvSpPr>
+          <p:cNvPr id="3" name="Content Placeholder 2"/>
+          <p:cNvSpPr>
+            <a:spLocks noGrp="1"/>
+          </p:cNvSpPr>
+          <p:nvPr>
+            <p:ph idx="1"/>
+          </p:nvPr>
+        </p:nvSpPr>
+        <p:spPr/>
+        <p:txBody>
+          <a:bodyPr/>
+          <a:lstStyle/>
+          <a:p>
+            <a:pPr marL="342900" indent="-342900">
+              <a:buFont typeface="Arial" panose="020B0604020202020204" pitchFamily="34" charset="0"/>
+              <a:buChar char="•"/>
+            </a:pPr>
+            <a:r>
+              <a:rPr lang="en-GB" dirty="0" smtClean="0"/>
+              <a:t>When refactoring existing or writing new code, try to break down your business logic into pure functions and impure ‘shells’ handling the side effects</a:t>
+            </a:r>
+          </a:p>
+          <a:p>
+            <a:pPr marL="342900" indent="-342900">
+              <a:buFont typeface="Arial" panose="020B0604020202020204" pitchFamily="34" charset="0"/>
+              <a:buChar char="•"/>
+            </a:pPr>
+            <a:r>
+              <a:rPr lang="en-GB" dirty="0" smtClean="0"/>
+              <a:t>Encapsulating side effects and handing them to the caller can help to turn your functions pure</a:t>
+            </a:r>
+            <a:endParaRPr lang="en-GB" dirty="0"/>
+          </a:p>
+        </p:txBody>
+      </p:sp>
+      <p:sp>
+        <p:nvSpPr>
+          <p:cNvPr id="4" name="Date Placeholder 3"/>
+          <p:cNvSpPr>
+            <a:spLocks noGrp="1"/>
+          </p:cNvSpPr>
+          <p:nvPr>
+            <p:ph type="dt" sz="half" idx="10"/>
+          </p:nvPr>
+        </p:nvSpPr>
+        <p:spPr/>
+        <p:txBody>
+          <a:bodyPr/>
+          <a:lstStyle/>
+          <a:p>
+            <a:r>
+              <a:rPr lang="de-CH" smtClean="0"/>
+              <a:t>14. September 2015</a:t>
+            </a:r>
+            <a:endParaRPr lang="de-CH" dirty="0"/>
+          </a:p>
+        </p:txBody>
+      </p:sp>
+      <p:sp>
+        <p:nvSpPr>
+          <p:cNvPr id="5" name="Footer Placeholder 4"/>
+          <p:cNvSpPr>
+            <a:spLocks noGrp="1"/>
+          </p:cNvSpPr>
+          <p:nvPr>
+            <p:ph type="ftr" sz="quarter" idx="11"/>
+          </p:nvPr>
+        </p:nvSpPr>
+        <p:spPr/>
+        <p:txBody>
+          <a:bodyPr/>
+          <a:lstStyle/>
+          <a:p>
+            <a:r>
+              <a:rPr lang="en-US" smtClean="0"/>
+              <a:t>Functional Design Patterns for OO Practicioners | Hendrik Schöneberg</a:t>
+            </a:r>
+            <a:endParaRPr lang="de-CH" dirty="0"/>
+          </a:p>
+        </p:txBody>
+      </p:sp>
+      <p:sp>
+        <p:nvSpPr>
+          <p:cNvPr id="7" name="Text Placeholder 6"/>
+          <p:cNvSpPr>
+            <a:spLocks noGrp="1"/>
+          </p:cNvSpPr>
+          <p:nvPr>
+            <p:ph type="body" sz="quarter" idx="13"/>
+          </p:nvPr>
+        </p:nvSpPr>
+        <p:spPr/>
+        <p:txBody>
+          <a:bodyPr/>
+          <a:lstStyle/>
+          <a:p>
+            <a:r>
+              <a:rPr lang="en-GB" dirty="0" smtClean="0"/>
+              <a:t>Outcomes</a:t>
+            </a:r>
+            <a:endParaRPr lang="en-GB" dirty="0"/>
+          </a:p>
+        </p:txBody>
+      </p:sp>
+      <p:sp>
+        <p:nvSpPr>
+          <p:cNvPr id="8" name="Slide Number Placeholder 7"/>
+          <p:cNvSpPr>
+            <a:spLocks noGrp="1"/>
+          </p:cNvSpPr>
+          <p:nvPr>
+            <p:ph type="sldNum" sz="quarter" idx="12"/>
+          </p:nvPr>
+        </p:nvSpPr>
+        <p:spPr/>
+        <p:txBody>
+          <a:bodyPr/>
+          <a:lstStyle/>
+          <a:p>
+            <a:r>
+              <a:rPr lang="de-CH" smtClean="0"/>
+              <a:t>Slide </a:t>
+            </a:r>
+            <a:fld id="{FD332BE7-0B41-4A9B-88F3-74C0C887EC52}" type="slidenum">
+              <a:rPr lang="de-CH" smtClean="0"/>
+              <a:t>22</a:t>
+            </a:fld>
+            <a:r>
+              <a:rPr lang="de-CH" smtClean="0"/>
+              <a:t> of 23</a:t>
+            </a:r>
+            <a:endParaRPr dirty="0"/>
+          </a:p>
+        </p:txBody>
+      </p:sp>
+    </p:spTree>
+    <p:extLst>
+      <p:ext uri="{BB962C8B-B14F-4D97-AF65-F5344CB8AC3E}">
+        <p14:creationId xmlns:p14="http://schemas.microsoft.com/office/powerpoint/2010/main" val="893494727"/>
+      </p:ext>
+    </p:extLst>
+  </p:cSld>
+  <p:clrMapOvr>
+    <a:masterClrMapping/>
+  </p:clrMapOvr>
+</p:sld>
+</file>
+
+<file path=ppt/slides/slide23.xml><?xml version="1.0" encoding="utf-8"?>
+<p:sld xmlns:a="http://schemas.openxmlformats.org/drawingml/2006/main" xmlns:r="http://schemas.openxmlformats.org/officeDocument/2006/relationships" xmlns:p="http://schemas.openxmlformats.org/presentationml/2006/main">
+  <p:cSld>
+    <p:spTree>
+      <p:nvGrpSpPr>
+        <p:cNvPr id="1" name=""/>
+        <p:cNvGrpSpPr/>
+        <p:nvPr/>
+      </p:nvGrpSpPr>
+      <p:grpSpPr>
+        <a:xfrm>
+          <a:off x="0" y="0"/>
+          <a:ext cx="0" cy="0"/>
+          <a:chOff x="0" y="0"/>
+          <a:chExt cx="0" cy="0"/>
+        </a:xfrm>
+      </p:grpSpPr>
+      <p:sp>
+        <p:nvSpPr>
+          <p:cNvPr id="2" name="Title 1"/>
+          <p:cNvSpPr>
+            <a:spLocks noGrp="1"/>
+          </p:cNvSpPr>
+          <p:nvPr>
+            <p:ph type="title"/>
+          </p:nvPr>
+        </p:nvSpPr>
+        <p:spPr/>
+        <p:txBody>
+          <a:bodyPr/>
+          <a:lstStyle/>
+          <a:p>
+            <a:r>
+              <a:rPr lang="en-GB" dirty="0" smtClean="0"/>
+              <a:t>Sources</a:t>
+            </a:r>
+            <a:endParaRPr lang="en-GB" dirty="0"/>
+          </a:p>
+        </p:txBody>
+      </p:sp>
+      <p:sp>
+        <p:nvSpPr>
+          <p:cNvPr id="3" name="Content Placeholder 2"/>
+          <p:cNvSpPr>
+            <a:spLocks noGrp="1"/>
+          </p:cNvSpPr>
+          <p:nvPr>
+            <p:ph idx="1"/>
+          </p:nvPr>
+        </p:nvSpPr>
+        <p:spPr/>
+        <p:txBody>
+          <a:bodyPr/>
+          <a:lstStyle/>
+          <a:p>
+            <a:pPr marL="342900" indent="-342900">
+              <a:buFont typeface="Arial" panose="020B0604020202020204" pitchFamily="34" charset="0"/>
+              <a:buChar char="•"/>
+            </a:pPr>
+            <a:r>
+              <a:rPr lang="en-GB" dirty="0"/>
+              <a:t>http://de.slideshare.net/vkostyukov/purely-functional-data-structures-in-scala-26175521</a:t>
+            </a:r>
+          </a:p>
+        </p:txBody>
+      </p:sp>
+      <p:sp>
+        <p:nvSpPr>
+          <p:cNvPr id="4" name="Date Placeholder 3"/>
+          <p:cNvSpPr>
+            <a:spLocks noGrp="1"/>
+          </p:cNvSpPr>
+          <p:nvPr>
+            <p:ph type="dt" sz="half" idx="10"/>
+          </p:nvPr>
+        </p:nvSpPr>
+        <p:spPr/>
+        <p:txBody>
+          <a:bodyPr/>
+          <a:lstStyle/>
+          <a:p>
+            <a:r>
+              <a:rPr lang="de-CH" smtClean="0"/>
+              <a:t>14. September 2015</a:t>
+            </a:r>
+            <a:endParaRPr lang="de-CH" dirty="0"/>
+          </a:p>
+        </p:txBody>
+      </p:sp>
+      <p:sp>
+        <p:nvSpPr>
+          <p:cNvPr id="5" name="Footer Placeholder 4"/>
+          <p:cNvSpPr>
+            <a:spLocks noGrp="1"/>
+          </p:cNvSpPr>
+          <p:nvPr>
+            <p:ph type="ftr" sz="quarter" idx="11"/>
+          </p:nvPr>
+        </p:nvSpPr>
+        <p:spPr/>
+        <p:txBody>
+          <a:bodyPr/>
+          <a:lstStyle/>
+          <a:p>
+            <a:r>
+              <a:rPr lang="en-US" smtClean="0"/>
+              <a:t>Functional Design Patterns for OO Practicioners | Hendrik Schöneberg</a:t>
+            </a:r>
+            <a:endParaRPr lang="de-CH" dirty="0"/>
+          </a:p>
+        </p:txBody>
+      </p:sp>
+      <p:sp>
+        <p:nvSpPr>
+          <p:cNvPr id="7" name="Text Placeholder 6"/>
+          <p:cNvSpPr>
+            <a:spLocks noGrp="1"/>
+          </p:cNvSpPr>
+          <p:nvPr>
+            <p:ph type="body" sz="quarter" idx="13"/>
+          </p:nvPr>
+        </p:nvSpPr>
+        <p:spPr/>
+        <p:txBody>
+          <a:bodyPr/>
+          <a:lstStyle/>
+          <a:p>
+            <a:endParaRPr lang="en-GB" dirty="0"/>
+          </a:p>
+        </p:txBody>
+      </p:sp>
+      <p:sp>
+        <p:nvSpPr>
+          <p:cNvPr id="8" name="Slide Number Placeholder 7"/>
+          <p:cNvSpPr>
+            <a:spLocks noGrp="1"/>
+          </p:cNvSpPr>
+          <p:nvPr>
+            <p:ph type="sldNum" sz="quarter" idx="12"/>
+          </p:nvPr>
+        </p:nvSpPr>
+        <p:spPr/>
+        <p:txBody>
+          <a:bodyPr/>
+          <a:lstStyle/>
+          <a:p>
+            <a:r>
+              <a:rPr lang="de-CH" smtClean="0"/>
+              <a:t>Slide </a:t>
+            </a:r>
+            <a:fld id="{8B7AE0A3-971B-4B5C-9854-E13A5925060A}" type="slidenum">
+              <a:rPr lang="de-CH" smtClean="0"/>
+              <a:t>23</a:t>
+            </a:fld>
+            <a:r>
+              <a:rPr lang="de-CH" smtClean="0"/>
+              <a:t> of 23</a:t>
+            </a:r>
+            <a:endParaRPr dirty="0"/>
+          </a:p>
+        </p:txBody>
+      </p:sp>
+    </p:spTree>
+    <p:extLst>
+      <p:ext uri="{BB962C8B-B14F-4D97-AF65-F5344CB8AC3E}">
+        <p14:creationId xmlns:p14="http://schemas.microsoft.com/office/powerpoint/2010/main" val="2070841533"/>
       </p:ext>
     </p:extLst>
   </p:cSld>
@@ -9520,7 +12103,19 @@
             </a:pPr>
             <a:r>
               <a:rPr lang="en-GB" dirty="0" smtClean="0"/>
-              <a:t>Code can be reasoned about (referential transparency)</a:t>
+              <a:t>Makes it </a:t>
+            </a:r>
+            <a:r>
+              <a:rPr lang="en-GB" dirty="0" smtClean="0"/>
+              <a:t>easier to reason about your code</a:t>
+            </a:r>
+            <a:r>
+              <a:rPr lang="en-GB" dirty="0" smtClean="0"/>
+              <a:t> </a:t>
+            </a:r>
+            <a:r>
+              <a:rPr lang="en-GB" dirty="0" smtClean="0"/>
+              <a:t>(referential transparency)</a:t>
             </a:r>
           </a:p>
           <a:p>
@@ -9657,13 +12252,13 @@
               <a:rPr lang="de-CH" smtClean="0"/>
               <a:t>Slide </a:t>
             </a:r>
-            <a:fld id="{F90D249B-51D2-4438-93D8-8176871CB939}" type="slidenum">
+            <a:fld id="{DA426297-890C-475C-BEFF-763D033F8F1E}" type="slidenum">
               <a:rPr lang="de-CH" smtClean="0"/>
               <a:t>3</a:t>
             </a:fld>
             <a:r>
               <a:rPr lang="de-CH" smtClean="0"/>
-              <a:t> of 19</a:t>
+              <a:t> of 23</a:t>
             </a:r>
             <a:endParaRPr lang="de-CH" dirty="0"/>
           </a:p>
@@ -9817,13 +12412,13 @@
               <a:rPr lang="de-CH" smtClean="0"/>
               <a:t>Slide </a:t>
             </a:r>
-            <a:fld id="{AF56927E-C905-4365-BF37-8BCC6FB8CCF6}" type="slidenum">
+            <a:fld id="{D6A05511-B494-4850-9EC2-AADADE68B674}" type="slidenum">
               <a:rPr lang="de-CH" smtClean="0"/>
               <a:t>4</a:t>
             </a:fld>
             <a:r>
               <a:rPr lang="de-CH" smtClean="0"/>
-              <a:t> of 19</a:t>
+              <a:t> of 23</a:t>
             </a:r>
             <a:endParaRPr dirty="0"/>
           </a:p>
@@ -10900,7 +13495,11 @@
           <a:p>
             <a:r>
               <a:rPr lang="en-GB" dirty="0" smtClean="0"/>
-              <a:t>Immutable collections in Scala</a:t>
+              <a:t>Operating on immutable </a:t>
+            </a:r>
+            <a:r>
+              <a:rPr lang="en-GB" dirty="0" smtClean="0"/>
+              <a:t>collections in Scala</a:t>
             </a:r>
             <a:endParaRPr lang="en-GB" dirty="0"/>
           </a:p>
@@ -10971,13 +13570,13 @@
               <a:rPr lang="de-CH" smtClean="0"/>
               <a:t>Slide </a:t>
             </a:r>
-            <a:fld id="{690A481E-F9F3-4250-9808-75A87A421DD3}" type="slidenum">
+            <a:fld id="{287DDE60-AD49-4C63-903C-939CE5BF5152}" type="slidenum">
               <a:rPr lang="de-CH" smtClean="0"/>
               <a:t>5</a:t>
             </a:fld>
             <a:r>
               <a:rPr lang="de-CH" smtClean="0"/>
-              <a:t> of 19</a:t>
+              <a:t> of 23</a:t>
             </a:r>
             <a:endParaRPr lang="de-CH" dirty="0"/>
           </a:p>
@@ -11143,13 +13742,13 @@
               <a:rPr lang="de-CH" smtClean="0"/>
               <a:t>Slide </a:t>
             </a:r>
-            <a:fld id="{0E2B6677-4FD8-4801-96C2-0A7C4CD2EAF5}" type="slidenum">
+            <a:fld id="{DE62072E-8D24-43E6-BDD5-BD16B5993EFE}" type="slidenum">
               <a:rPr lang="de-CH" smtClean="0"/>
               <a:t>6</a:t>
             </a:fld>
             <a:r>
               <a:rPr lang="de-CH" smtClean="0"/>
-              <a:t> of 19</a:t>
+              <a:t> of 23</a:t>
             </a:r>
             <a:endParaRPr lang="de-CH" dirty="0"/>
           </a:p>
@@ -11861,13 +14460,13 @@
               <a:rPr lang="de-CH" smtClean="0"/>
               <a:t>Slide </a:t>
             </a:r>
-            <a:fld id="{E67955DB-AA4C-43A7-BB36-E890636970E3}" type="slidenum">
+            <a:fld id="{757A0A98-7CCE-401E-B191-ACBA3BAA7B91}" type="slidenum">
               <a:rPr lang="de-CH" smtClean="0"/>
               <a:t>7</a:t>
             </a:fld>
             <a:r>
               <a:rPr lang="de-CH" smtClean="0"/>
-              <a:t> of 19</a:t>
+              <a:t> of 23</a:t>
             </a:r>
             <a:endParaRPr dirty="0"/>
           </a:p>
@@ -13051,13 +15650,13 @@
               <a:rPr lang="de-CH" smtClean="0"/>
               <a:t>Slide </a:t>
             </a:r>
-            <a:fld id="{E073B292-B6CF-4CA7-902F-F58FD0170F30}" type="slidenum">
+            <a:fld id="{97501833-6DB1-4A3D-911E-696873330411}" type="slidenum">
               <a:rPr lang="de-CH" smtClean="0"/>
               <a:t>8</a:t>
             </a:fld>
             <a:r>
               <a:rPr lang="de-CH" smtClean="0"/>
-              <a:t> of 19</a:t>
+              <a:t> of 23</a:t>
             </a:r>
             <a:endParaRPr dirty="0"/>
           </a:p>
@@ -13455,13 +16054,13 @@
               <a:rPr lang="de-CH" smtClean="0"/>
               <a:t>Slide </a:t>
             </a:r>
-            <a:fld id="{65F4FC0E-D842-4A7B-97CB-2FE1DFE305C0}" type="slidenum">
+            <a:fld id="{75B1FB78-2CB4-4F24-AD58-0DD474E92C01}" type="slidenum">
               <a:rPr lang="de-CH" smtClean="0"/>
               <a:t>9</a:t>
             </a:fld>
             <a:r>
               <a:rPr lang="de-CH" smtClean="0"/>
-              <a:t> of 19</a:t>
+              <a:t> of 23</a:t>
             </a:r>
             <a:endParaRPr dirty="0"/>
           </a:p>

</xml_diff>